<commit_message>
~ arrow letter text size change
</commit_message>
<xml_diff>
--- a/imgs/src/step-by-step-imgs.pptx
+++ b/imgs/src/step-by-step-imgs.pptx
@@ -3822,8 +3822,8 @@
         </p:nvSpPr>
         <p:spPr>
           <a:xfrm>
-            <a:off x="5930495" y="3189798"/>
-            <a:ext cx="472535" cy="953985"/>
+            <a:off x="5694933" y="3002555"/>
+            <a:ext cx="802133" cy="1619399"/>
           </a:xfrm>
           <a:prstGeom prst="upArrow">
             <a:avLst>
@@ -3858,7 +3858,7 @@
           <a:p>
             <a:pPr algn="ctr"/>
             <a:r>
-              <a:rPr lang="en-US" sz="1400" b="1" dirty="0">
+              <a:rPr lang="en-US" sz="2800" b="1" dirty="0">
                 <a:latin typeface="Segoe UI" panose="020B0502040204020203" pitchFamily="34" charset="0"/>
                 <a:cs typeface="Segoe UI" panose="020B0502040204020203" pitchFamily="34" charset="0"/>
               </a:rPr>
@@ -3869,10 +3869,10 @@
       </p:sp>
       <p:sp>
         <p:nvSpPr>
-          <p:cNvPr id="10" name="Arrow: Up 9">
-            <a:extLst>
-              <a:ext uri="{FF2B5EF4-FFF2-40B4-BE49-F238E27FC236}">
-                <a16:creationId xmlns:a16="http://schemas.microsoft.com/office/drawing/2014/main" id="{EEC67991-9264-4BC5-8234-467720888C9D}"/>
+          <p:cNvPr id="13" name="Arrow: Up 12">
+            <a:extLst>
+              <a:ext uri="{FF2B5EF4-FFF2-40B4-BE49-F238E27FC236}">
+                <a16:creationId xmlns:a16="http://schemas.microsoft.com/office/drawing/2014/main" id="{6B9A3E41-C443-4829-8E3F-0A663DD2CDFF}"/>
               </a:ext>
             </a:extLst>
           </p:cNvPr>
@@ -3881,8 +3881,8 @@
         </p:nvSpPr>
         <p:spPr>
           <a:xfrm rot="5400000">
-            <a:off x="3485958" y="5874974"/>
-            <a:ext cx="472535" cy="953985"/>
+            <a:off x="3095667" y="5399289"/>
+            <a:ext cx="802133" cy="1619399"/>
           </a:xfrm>
           <a:prstGeom prst="upArrow">
             <a:avLst>
@@ -3916,7 +3916,7 @@
           <a:lstStyle/>
           <a:p>
             <a:pPr algn="ctr"/>
-            <a:endParaRPr lang="en-US" sz="1400" b="1" dirty="0">
+            <a:endParaRPr lang="en-US" sz="2800" b="1" dirty="0">
               <a:latin typeface="Segoe UI" panose="020B0502040204020203" pitchFamily="34" charset="0"/>
               <a:cs typeface="Segoe UI" panose="020B0502040204020203" pitchFamily="34" charset="0"/>
             </a:endParaRPr>
@@ -3937,8 +3937,8 @@
         </p:nvSpPr>
         <p:spPr>
           <a:xfrm>
-            <a:off x="3496344" y="6198077"/>
-            <a:ext cx="290319" cy="307777"/>
+            <a:off x="3206414" y="5947378"/>
+            <a:ext cx="290319" cy="523220"/>
           </a:xfrm>
           <a:prstGeom prst="rect">
             <a:avLst/>
@@ -3953,7 +3953,7 @@
           <a:p>
             <a:pPr algn="l"/>
             <a:r>
-              <a:rPr lang="en-US" sz="1400" b="1" dirty="0">
+              <a:rPr lang="en-US" sz="2800" b="1" dirty="0">
                 <a:solidFill>
                   <a:schemeClr val="bg1"/>
                 </a:solidFill>

</xml_diff>

<commit_message>
+~ account login scenario
</commit_message>
<xml_diff>
--- a/imgs/src/step-by-step-imgs.pptx
+++ b/imgs/src/step-by-step-imgs.pptx
@@ -7,8 +7,8 @@
   <p:sldIdLst>
     <p:sldId id="257" r:id="rId2"/>
     <p:sldId id="258" r:id="rId3"/>
-    <p:sldId id="259" r:id="rId4"/>
-    <p:sldId id="261" r:id="rId5"/>
+    <p:sldId id="261" r:id="rId4"/>
+    <p:sldId id="259" r:id="rId5"/>
     <p:sldId id="262" r:id="rId6"/>
     <p:sldId id="263" r:id="rId7"/>
     <p:sldId id="264" r:id="rId8"/>
@@ -4295,10 +4295,40 @@
           <a:chExt cx="0" cy="0"/>
         </a:xfrm>
       </p:grpSpPr>
-    </p:spTree>
-    <p:extLst>
-      <p:ext uri="{BB962C8B-B14F-4D97-AF65-F5344CB8AC3E}">
-        <p14:creationId xmlns:p14="http://schemas.microsoft.com/office/powerpoint/2010/main" val="44499024"/>
+      <p:pic>
+        <p:nvPicPr>
+          <p:cNvPr id="4" name="Picture 3">
+            <a:extLst>
+              <a:ext uri="{FF2B5EF4-FFF2-40B4-BE49-F238E27FC236}">
+                <a16:creationId xmlns:a16="http://schemas.microsoft.com/office/drawing/2014/main" id="{2EF669CA-7876-4B42-AC5F-E8A29319696D}"/>
+              </a:ext>
+            </a:extLst>
+          </p:cNvPr>
+          <p:cNvPicPr>
+            <a:picLocks noChangeAspect="1"/>
+          </p:cNvPicPr>
+          <p:nvPr/>
+        </p:nvPicPr>
+        <p:blipFill>
+          <a:blip r:embed="rId2"/>
+          <a:stretch>
+            <a:fillRect/>
+          </a:stretch>
+        </p:blipFill>
+        <p:spPr>
+          <a:xfrm>
+            <a:off x="2671284" y="1652339"/>
+            <a:ext cx="6849431" cy="3553321"/>
+          </a:xfrm>
+          <a:prstGeom prst="rect">
+            <a:avLst/>
+          </a:prstGeom>
+        </p:spPr>
+      </p:pic>
+    </p:spTree>
+    <p:extLst>
+      <p:ext uri="{BB962C8B-B14F-4D97-AF65-F5344CB8AC3E}">
+        <p14:creationId xmlns:p14="http://schemas.microsoft.com/office/powerpoint/2010/main" val="1744603589"/>
       </p:ext>
     </p:extLst>
   </p:cSld>
@@ -4625,10 +4655,40 @@
           <a:chExt cx="0" cy="0"/>
         </a:xfrm>
       </p:grpSpPr>
-    </p:spTree>
-    <p:extLst>
-      <p:ext uri="{BB962C8B-B14F-4D97-AF65-F5344CB8AC3E}">
-        <p14:creationId xmlns:p14="http://schemas.microsoft.com/office/powerpoint/2010/main" val="1744603589"/>
+      <p:pic>
+        <p:nvPicPr>
+          <p:cNvPr id="4" name="Picture 3">
+            <a:extLst>
+              <a:ext uri="{FF2B5EF4-FFF2-40B4-BE49-F238E27FC236}">
+                <a16:creationId xmlns:a16="http://schemas.microsoft.com/office/drawing/2014/main" id="{6213EF1B-9F06-4887-ADD4-D7298F4CE6C5}"/>
+              </a:ext>
+            </a:extLst>
+          </p:cNvPr>
+          <p:cNvPicPr>
+            <a:picLocks noChangeAspect="1"/>
+          </p:cNvPicPr>
+          <p:nvPr/>
+        </p:nvPicPr>
+        <p:blipFill>
+          <a:blip r:embed="rId2"/>
+          <a:stretch>
+            <a:fillRect/>
+          </a:stretch>
+        </p:blipFill>
+        <p:spPr>
+          <a:xfrm>
+            <a:off x="2618890" y="1657102"/>
+            <a:ext cx="6954220" cy="3543795"/>
+          </a:xfrm>
+          <a:prstGeom prst="rect">
+            <a:avLst/>
+          </a:prstGeom>
+        </p:spPr>
+      </p:pic>
+    </p:spTree>
+    <p:extLst>
+      <p:ext uri="{BB962C8B-B14F-4D97-AF65-F5344CB8AC3E}">
+        <p14:creationId xmlns:p14="http://schemas.microsoft.com/office/powerpoint/2010/main" val="44499024"/>
       </p:ext>
     </p:extLst>
   </p:cSld>

</xml_diff>

<commit_message>
+~- sign brings to the correct flow
</commit_message>
<xml_diff>
--- a/imgs/src/step-by-step-imgs.pptx
+++ b/imgs/src/step-by-step-imgs.pptx
@@ -7,49 +7,50 @@
   <p:sldIdLst>
     <p:sldId id="257" r:id="rId2"/>
     <p:sldId id="258" r:id="rId3"/>
-    <p:sldId id="261" r:id="rId4"/>
-    <p:sldId id="259" r:id="rId5"/>
-    <p:sldId id="262" r:id="rId6"/>
-    <p:sldId id="263" r:id="rId7"/>
-    <p:sldId id="264" r:id="rId8"/>
-    <p:sldId id="265" r:id="rId9"/>
-    <p:sldId id="266" r:id="rId10"/>
-    <p:sldId id="267" r:id="rId11"/>
-    <p:sldId id="268" r:id="rId12"/>
-    <p:sldId id="269" r:id="rId13"/>
-    <p:sldId id="270" r:id="rId14"/>
-    <p:sldId id="271" r:id="rId15"/>
-    <p:sldId id="272" r:id="rId16"/>
-    <p:sldId id="273" r:id="rId17"/>
-    <p:sldId id="274" r:id="rId18"/>
-    <p:sldId id="275" r:id="rId19"/>
-    <p:sldId id="276" r:id="rId20"/>
-    <p:sldId id="277" r:id="rId21"/>
-    <p:sldId id="278" r:id="rId22"/>
-    <p:sldId id="279" r:id="rId23"/>
-    <p:sldId id="280" r:id="rId24"/>
-    <p:sldId id="281" r:id="rId25"/>
-    <p:sldId id="282" r:id="rId26"/>
-    <p:sldId id="283" r:id="rId27"/>
-    <p:sldId id="284" r:id="rId28"/>
-    <p:sldId id="285" r:id="rId29"/>
-    <p:sldId id="286" r:id="rId30"/>
-    <p:sldId id="287" r:id="rId31"/>
-    <p:sldId id="288" r:id="rId32"/>
-    <p:sldId id="289" r:id="rId33"/>
-    <p:sldId id="290" r:id="rId34"/>
-    <p:sldId id="291" r:id="rId35"/>
-    <p:sldId id="292" r:id="rId36"/>
-    <p:sldId id="293" r:id="rId37"/>
-    <p:sldId id="294" r:id="rId38"/>
-    <p:sldId id="295" r:id="rId39"/>
-    <p:sldId id="296" r:id="rId40"/>
-    <p:sldId id="297" r:id="rId41"/>
-    <p:sldId id="298" r:id="rId42"/>
-    <p:sldId id="299" r:id="rId43"/>
-    <p:sldId id="300" r:id="rId44"/>
-    <p:sldId id="301" r:id="rId45"/>
-    <p:sldId id="260" r:id="rId46"/>
+    <p:sldId id="302" r:id="rId4"/>
+    <p:sldId id="261" r:id="rId5"/>
+    <p:sldId id="259" r:id="rId6"/>
+    <p:sldId id="262" r:id="rId7"/>
+    <p:sldId id="263" r:id="rId8"/>
+    <p:sldId id="264" r:id="rId9"/>
+    <p:sldId id="265" r:id="rId10"/>
+    <p:sldId id="266" r:id="rId11"/>
+    <p:sldId id="267" r:id="rId12"/>
+    <p:sldId id="268" r:id="rId13"/>
+    <p:sldId id="269" r:id="rId14"/>
+    <p:sldId id="270" r:id="rId15"/>
+    <p:sldId id="271" r:id="rId16"/>
+    <p:sldId id="272" r:id="rId17"/>
+    <p:sldId id="273" r:id="rId18"/>
+    <p:sldId id="274" r:id="rId19"/>
+    <p:sldId id="275" r:id="rId20"/>
+    <p:sldId id="276" r:id="rId21"/>
+    <p:sldId id="277" r:id="rId22"/>
+    <p:sldId id="278" r:id="rId23"/>
+    <p:sldId id="279" r:id="rId24"/>
+    <p:sldId id="280" r:id="rId25"/>
+    <p:sldId id="281" r:id="rId26"/>
+    <p:sldId id="282" r:id="rId27"/>
+    <p:sldId id="283" r:id="rId28"/>
+    <p:sldId id="284" r:id="rId29"/>
+    <p:sldId id="285" r:id="rId30"/>
+    <p:sldId id="286" r:id="rId31"/>
+    <p:sldId id="287" r:id="rId32"/>
+    <p:sldId id="288" r:id="rId33"/>
+    <p:sldId id="289" r:id="rId34"/>
+    <p:sldId id="290" r:id="rId35"/>
+    <p:sldId id="291" r:id="rId36"/>
+    <p:sldId id="292" r:id="rId37"/>
+    <p:sldId id="293" r:id="rId38"/>
+    <p:sldId id="294" r:id="rId39"/>
+    <p:sldId id="295" r:id="rId40"/>
+    <p:sldId id="296" r:id="rId41"/>
+    <p:sldId id="297" r:id="rId42"/>
+    <p:sldId id="298" r:id="rId43"/>
+    <p:sldId id="299" r:id="rId44"/>
+    <p:sldId id="300" r:id="rId45"/>
+    <p:sldId id="301" r:id="rId46"/>
+    <p:sldId id="260" r:id="rId47"/>
   </p:sldIdLst>
   <p:sldSz cx="12192000" cy="6858000"/>
   <p:notesSz cx="6858000" cy="9144000"/>
@@ -3478,10 +3479,40 @@
           <a:chExt cx="0" cy="0"/>
         </a:xfrm>
       </p:grpSpPr>
+      <p:pic>
+        <p:nvPicPr>
+          <p:cNvPr id="4" name="Picture 3">
+            <a:extLst>
+              <a:ext uri="{FF2B5EF4-FFF2-40B4-BE49-F238E27FC236}">
+                <a16:creationId xmlns:a16="http://schemas.microsoft.com/office/drawing/2014/main" id="{7F208649-41D8-4FBE-8112-CEF416531B6C}"/>
+              </a:ext>
+            </a:extLst>
+          </p:cNvPr>
+          <p:cNvPicPr>
+            <a:picLocks noChangeAspect="1"/>
+          </p:cNvPicPr>
+          <p:nvPr/>
+        </p:nvPicPr>
+        <p:blipFill>
+          <a:blip r:embed="rId2"/>
+          <a:stretch>
+            <a:fillRect/>
+          </a:stretch>
+        </p:blipFill>
+        <p:spPr>
+          <a:xfrm>
+            <a:off x="609600" y="314325"/>
+            <a:ext cx="10972800" cy="6229350"/>
+          </a:xfrm>
+          <a:prstGeom prst="rect">
+            <a:avLst/>
+          </a:prstGeom>
+        </p:spPr>
+      </p:pic>
     </p:spTree>
     <p:extLst>
       <p:ext uri="{BB962C8B-B14F-4D97-AF65-F5344CB8AC3E}">
-        <p14:creationId xmlns:p14="http://schemas.microsoft.com/office/powerpoint/2010/main" val="3922008344"/>
+        <p14:creationId xmlns:p14="http://schemas.microsoft.com/office/powerpoint/2010/main" val="4278445235"/>
       </p:ext>
     </p:extLst>
   </p:cSld>
@@ -3508,6 +3539,96 @@
           <a:chExt cx="0" cy="0"/>
         </a:xfrm>
       </p:grpSpPr>
+      <p:pic>
+        <p:nvPicPr>
+          <p:cNvPr id="4" name="Picture 3">
+            <a:extLst>
+              <a:ext uri="{FF2B5EF4-FFF2-40B4-BE49-F238E27FC236}">
+                <a16:creationId xmlns:a16="http://schemas.microsoft.com/office/drawing/2014/main" id="{B47CC250-6DBF-4278-A78A-AA28688ED099}"/>
+              </a:ext>
+            </a:extLst>
+          </p:cNvPr>
+          <p:cNvPicPr>
+            <a:picLocks noChangeAspect="1"/>
+          </p:cNvPicPr>
+          <p:nvPr/>
+        </p:nvPicPr>
+        <p:blipFill>
+          <a:blip r:embed="rId2"/>
+          <a:stretch>
+            <a:fillRect/>
+          </a:stretch>
+        </p:blipFill>
+        <p:spPr>
+          <a:xfrm>
+            <a:off x="609600" y="342900"/>
+            <a:ext cx="10972800" cy="6172200"/>
+          </a:xfrm>
+          <a:prstGeom prst="rect">
+            <a:avLst/>
+          </a:prstGeom>
+        </p:spPr>
+      </p:pic>
+    </p:spTree>
+    <p:extLst>
+      <p:ext uri="{BB962C8B-B14F-4D97-AF65-F5344CB8AC3E}">
+        <p14:creationId xmlns:p14="http://schemas.microsoft.com/office/powerpoint/2010/main" val="3922008344"/>
+      </p:ext>
+    </p:extLst>
+  </p:cSld>
+  <p:clrMapOvr>
+    <a:masterClrMapping/>
+  </p:clrMapOvr>
+</p:sld>
+</file>
+
+<file path=ppt/slides/slide12.xml><?xml version="1.0" encoding="utf-8"?>
+<p:sld xmlns:a="http://schemas.openxmlformats.org/drawingml/2006/main" xmlns:r="http://schemas.openxmlformats.org/officeDocument/2006/relationships" xmlns:p="http://schemas.openxmlformats.org/presentationml/2006/main">
+  <p:cSld>
+    <p:spTree>
+      <p:nvGrpSpPr>
+        <p:cNvPr id="1" name=""/>
+        <p:cNvGrpSpPr/>
+        <p:nvPr/>
+      </p:nvGrpSpPr>
+      <p:grpSpPr>
+        <a:xfrm>
+          <a:off x="0" y="0"/>
+          <a:ext cx="0" cy="0"/>
+          <a:chOff x="0" y="0"/>
+          <a:chExt cx="0" cy="0"/>
+        </a:xfrm>
+      </p:grpSpPr>
+      <p:pic>
+        <p:nvPicPr>
+          <p:cNvPr id="4" name="Picture 3">
+            <a:extLst>
+              <a:ext uri="{FF2B5EF4-FFF2-40B4-BE49-F238E27FC236}">
+                <a16:creationId xmlns:a16="http://schemas.microsoft.com/office/drawing/2014/main" id="{17691914-E246-4238-8D49-73597A0C3C4C}"/>
+              </a:ext>
+            </a:extLst>
+          </p:cNvPr>
+          <p:cNvPicPr>
+            <a:picLocks noChangeAspect="1"/>
+          </p:cNvPicPr>
+          <p:nvPr/>
+        </p:nvPicPr>
+        <p:blipFill>
+          <a:blip r:embed="rId2"/>
+          <a:stretch>
+            <a:fillRect/>
+          </a:stretch>
+        </p:blipFill>
+        <p:spPr>
+          <a:xfrm>
+            <a:off x="723900" y="823912"/>
+            <a:ext cx="10744200" cy="5210175"/>
+          </a:xfrm>
+          <a:prstGeom prst="rect">
+            <a:avLst/>
+          </a:prstGeom>
+        </p:spPr>
+      </p:pic>
     </p:spTree>
     <p:extLst>
       <p:ext uri="{BB962C8B-B14F-4D97-AF65-F5344CB8AC3E}">
@@ -3521,7 +3642,7 @@
 </p:sld>
 </file>
 
-<file path=ppt/slides/slide12.xml><?xml version="1.0" encoding="utf-8"?>
+<file path=ppt/slides/slide13.xml><?xml version="1.0" encoding="utf-8"?>
 <p:sld xmlns:a="http://schemas.openxmlformats.org/drawingml/2006/main" xmlns:r="http://schemas.openxmlformats.org/officeDocument/2006/relationships" xmlns:p="http://schemas.openxmlformats.org/presentationml/2006/main">
   <p:cSld>
     <p:spTree>
@@ -3551,7 +3672,7 @@
 </p:sld>
 </file>
 
-<file path=ppt/slides/slide13.xml><?xml version="1.0" encoding="utf-8"?>
+<file path=ppt/slides/slide14.xml><?xml version="1.0" encoding="utf-8"?>
 <p:sld xmlns:a="http://schemas.openxmlformats.org/drawingml/2006/main" xmlns:r="http://schemas.openxmlformats.org/officeDocument/2006/relationships" xmlns:p="http://schemas.openxmlformats.org/presentationml/2006/main">
   <p:cSld>
     <p:spTree>
@@ -3581,7 +3702,7 @@
 </p:sld>
 </file>
 
-<file path=ppt/slides/slide14.xml><?xml version="1.0" encoding="utf-8"?>
+<file path=ppt/slides/slide15.xml><?xml version="1.0" encoding="utf-8"?>
 <p:sld xmlns:a="http://schemas.openxmlformats.org/drawingml/2006/main" xmlns:r="http://schemas.openxmlformats.org/officeDocument/2006/relationships" xmlns:p="http://schemas.openxmlformats.org/presentationml/2006/main">
   <p:cSld>
     <p:spTree>
@@ -3611,7 +3732,7 @@
 </p:sld>
 </file>
 
-<file path=ppt/slides/slide15.xml><?xml version="1.0" encoding="utf-8"?>
+<file path=ppt/slides/slide16.xml><?xml version="1.0" encoding="utf-8"?>
 <p:sld xmlns:a="http://schemas.openxmlformats.org/drawingml/2006/main" xmlns:r="http://schemas.openxmlformats.org/officeDocument/2006/relationships" xmlns:p="http://schemas.openxmlformats.org/presentationml/2006/main">
   <p:cSld>
     <p:spTree>
@@ -3641,7 +3762,7 @@
 </p:sld>
 </file>
 
-<file path=ppt/slides/slide16.xml><?xml version="1.0" encoding="utf-8"?>
+<file path=ppt/slides/slide17.xml><?xml version="1.0" encoding="utf-8"?>
 <p:sld xmlns:a="http://schemas.openxmlformats.org/drawingml/2006/main" xmlns:r="http://schemas.openxmlformats.org/officeDocument/2006/relationships" xmlns:p="http://schemas.openxmlformats.org/presentationml/2006/main">
   <p:cSld>
     <p:spTree>
@@ -3671,7 +3792,7 @@
 </p:sld>
 </file>
 
-<file path=ppt/slides/slide17.xml><?xml version="1.0" encoding="utf-8"?>
+<file path=ppt/slides/slide18.xml><?xml version="1.0" encoding="utf-8"?>
 <p:sld xmlns:a="http://schemas.openxmlformats.org/drawingml/2006/main" xmlns:r="http://schemas.openxmlformats.org/officeDocument/2006/relationships" xmlns:p="http://schemas.openxmlformats.org/presentationml/2006/main">
   <p:cSld>
     <p:spTree>
@@ -3701,7 +3822,7 @@
 </p:sld>
 </file>
 
-<file path=ppt/slides/slide18.xml><?xml version="1.0" encoding="utf-8"?>
+<file path=ppt/slides/slide19.xml><?xml version="1.0" encoding="utf-8"?>
 <p:sld xmlns:a="http://schemas.openxmlformats.org/drawingml/2006/main" xmlns:r="http://schemas.openxmlformats.org/officeDocument/2006/relationships" xmlns:p="http://schemas.openxmlformats.org/presentationml/2006/main">
   <p:cSld>
     <p:spTree>
@@ -3722,36 +3843,6 @@
     <p:extLst>
       <p:ext uri="{BB962C8B-B14F-4D97-AF65-F5344CB8AC3E}">
         <p14:creationId xmlns:p14="http://schemas.microsoft.com/office/powerpoint/2010/main" val="3161056568"/>
-      </p:ext>
-    </p:extLst>
-  </p:cSld>
-  <p:clrMapOvr>
-    <a:masterClrMapping/>
-  </p:clrMapOvr>
-</p:sld>
-</file>
-
-<file path=ppt/slides/slide19.xml><?xml version="1.0" encoding="utf-8"?>
-<p:sld xmlns:a="http://schemas.openxmlformats.org/drawingml/2006/main" xmlns:r="http://schemas.openxmlformats.org/officeDocument/2006/relationships" xmlns:p="http://schemas.openxmlformats.org/presentationml/2006/main">
-  <p:cSld>
-    <p:spTree>
-      <p:nvGrpSpPr>
-        <p:cNvPr id="1" name=""/>
-        <p:cNvGrpSpPr/>
-        <p:nvPr/>
-      </p:nvGrpSpPr>
-      <p:grpSpPr>
-        <a:xfrm>
-          <a:off x="0" y="0"/>
-          <a:ext cx="0" cy="0"/>
-          <a:chOff x="0" y="0"/>
-          <a:chExt cx="0" cy="0"/>
-        </a:xfrm>
-      </p:grpSpPr>
-    </p:spTree>
-    <p:extLst>
-      <p:ext uri="{BB962C8B-B14F-4D97-AF65-F5344CB8AC3E}">
-        <p14:creationId xmlns:p14="http://schemas.microsoft.com/office/powerpoint/2010/main" val="171621197"/>
       </p:ext>
     </p:extLst>
   </p:cSld>
@@ -3869,10 +3960,10 @@
       </p:sp>
       <p:sp>
         <p:nvSpPr>
-          <p:cNvPr id="13" name="Arrow: Up 12">
-            <a:extLst>
-              <a:ext uri="{FF2B5EF4-FFF2-40B4-BE49-F238E27FC236}">
-                <a16:creationId xmlns:a16="http://schemas.microsoft.com/office/drawing/2014/main" id="{6B9A3E41-C443-4829-8E3F-0A663DD2CDFF}"/>
+          <p:cNvPr id="2" name="Arrow: Up 1">
+            <a:extLst>
+              <a:ext uri="{FF2B5EF4-FFF2-40B4-BE49-F238E27FC236}">
+                <a16:creationId xmlns:a16="http://schemas.microsoft.com/office/drawing/2014/main" id="{8B76CCBD-C1ED-4DDC-97F0-83E06CC708A8}"/>
               </a:ext>
             </a:extLst>
           </p:cNvPr>
@@ -3880,8 +3971,8 @@
           <p:nvPr/>
         </p:nvSpPr>
         <p:spPr>
-          <a:xfrm rot="5400000">
-            <a:off x="3095667" y="5399289"/>
+          <a:xfrm rot="16200000">
+            <a:off x="8684815" y="4705022"/>
             <a:ext cx="802133" cy="1619399"/>
           </a:xfrm>
           <a:prstGeom prst="upArrow">
@@ -3925,10 +4016,10 @@
       </p:sp>
       <p:sp>
         <p:nvSpPr>
-          <p:cNvPr id="11" name="TextBox 10">
-            <a:extLst>
-              <a:ext uri="{FF2B5EF4-FFF2-40B4-BE49-F238E27FC236}">
-                <a16:creationId xmlns:a16="http://schemas.microsoft.com/office/drawing/2014/main" id="{D0A979B9-361B-49F7-BE02-2488D5F139BF}"/>
+          <p:cNvPr id="3" name="TextBox 2">
+            <a:extLst>
+              <a:ext uri="{FF2B5EF4-FFF2-40B4-BE49-F238E27FC236}">
+                <a16:creationId xmlns:a16="http://schemas.microsoft.com/office/drawing/2014/main" id="{0F64D66C-A3B4-40A2-9ED6-B47440BF84AB}"/>
               </a:ext>
             </a:extLst>
           </p:cNvPr>
@@ -3937,7 +4028,7 @@
         </p:nvSpPr>
         <p:spPr>
           <a:xfrm>
-            <a:off x="3206414" y="5947378"/>
+            <a:off x="8942101" y="5244970"/>
             <a:ext cx="290319" cy="523220"/>
           </a:xfrm>
           <a:prstGeom prst="rect">
@@ -3998,7 +4089,7 @@
     </p:spTree>
     <p:extLst>
       <p:ext uri="{BB962C8B-B14F-4D97-AF65-F5344CB8AC3E}">
-        <p14:creationId xmlns:p14="http://schemas.microsoft.com/office/powerpoint/2010/main" val="1669211973"/>
+        <p14:creationId xmlns:p14="http://schemas.microsoft.com/office/powerpoint/2010/main" val="171621197"/>
       </p:ext>
     </p:extLst>
   </p:cSld>
@@ -4028,7 +4119,7 @@
     </p:spTree>
     <p:extLst>
       <p:ext uri="{BB962C8B-B14F-4D97-AF65-F5344CB8AC3E}">
-        <p14:creationId xmlns:p14="http://schemas.microsoft.com/office/powerpoint/2010/main" val="4241489412"/>
+        <p14:creationId xmlns:p14="http://schemas.microsoft.com/office/powerpoint/2010/main" val="1669211973"/>
       </p:ext>
     </p:extLst>
   </p:cSld>
@@ -4058,7 +4149,7 @@
     </p:spTree>
     <p:extLst>
       <p:ext uri="{BB962C8B-B14F-4D97-AF65-F5344CB8AC3E}">
-        <p14:creationId xmlns:p14="http://schemas.microsoft.com/office/powerpoint/2010/main" val="2784679318"/>
+        <p14:creationId xmlns:p14="http://schemas.microsoft.com/office/powerpoint/2010/main" val="4241489412"/>
       </p:ext>
     </p:extLst>
   </p:cSld>
@@ -4088,7 +4179,7 @@
     </p:spTree>
     <p:extLst>
       <p:ext uri="{BB962C8B-B14F-4D97-AF65-F5344CB8AC3E}">
-        <p14:creationId xmlns:p14="http://schemas.microsoft.com/office/powerpoint/2010/main" val="1310995319"/>
+        <p14:creationId xmlns:p14="http://schemas.microsoft.com/office/powerpoint/2010/main" val="2784679318"/>
       </p:ext>
     </p:extLst>
   </p:cSld>
@@ -4118,7 +4209,7 @@
     </p:spTree>
     <p:extLst>
       <p:ext uri="{BB962C8B-B14F-4D97-AF65-F5344CB8AC3E}">
-        <p14:creationId xmlns:p14="http://schemas.microsoft.com/office/powerpoint/2010/main" val="4292414777"/>
+        <p14:creationId xmlns:p14="http://schemas.microsoft.com/office/powerpoint/2010/main" val="1310995319"/>
       </p:ext>
     </p:extLst>
   </p:cSld>
@@ -4148,7 +4239,7 @@
     </p:spTree>
     <p:extLst>
       <p:ext uri="{BB962C8B-B14F-4D97-AF65-F5344CB8AC3E}">
-        <p14:creationId xmlns:p14="http://schemas.microsoft.com/office/powerpoint/2010/main" val="831793758"/>
+        <p14:creationId xmlns:p14="http://schemas.microsoft.com/office/powerpoint/2010/main" val="4292414777"/>
       </p:ext>
     </p:extLst>
   </p:cSld>
@@ -4178,7 +4269,7 @@
     </p:spTree>
     <p:extLst>
       <p:ext uri="{BB962C8B-B14F-4D97-AF65-F5344CB8AC3E}">
-        <p14:creationId xmlns:p14="http://schemas.microsoft.com/office/powerpoint/2010/main" val="2806491056"/>
+        <p14:creationId xmlns:p14="http://schemas.microsoft.com/office/powerpoint/2010/main" val="831793758"/>
       </p:ext>
     </p:extLst>
   </p:cSld>
@@ -4208,7 +4299,7 @@
     </p:spTree>
     <p:extLst>
       <p:ext uri="{BB962C8B-B14F-4D97-AF65-F5344CB8AC3E}">
-        <p14:creationId xmlns:p14="http://schemas.microsoft.com/office/powerpoint/2010/main" val="1918321829"/>
+        <p14:creationId xmlns:p14="http://schemas.microsoft.com/office/powerpoint/2010/main" val="2806491056"/>
       </p:ext>
     </p:extLst>
   </p:cSld>
@@ -4238,7 +4329,7 @@
     </p:spTree>
     <p:extLst>
       <p:ext uri="{BB962C8B-B14F-4D97-AF65-F5344CB8AC3E}">
-        <p14:creationId xmlns:p14="http://schemas.microsoft.com/office/powerpoint/2010/main" val="528842390"/>
+        <p14:creationId xmlns:p14="http://schemas.microsoft.com/office/powerpoint/2010/main" val="1918321829"/>
       </p:ext>
     </p:extLst>
   </p:cSld>
@@ -4268,6 +4359,96 @@
     </p:spTree>
     <p:extLst>
       <p:ext uri="{BB962C8B-B14F-4D97-AF65-F5344CB8AC3E}">
+        <p14:creationId xmlns:p14="http://schemas.microsoft.com/office/powerpoint/2010/main" val="528842390"/>
+      </p:ext>
+    </p:extLst>
+  </p:cSld>
+  <p:clrMapOvr>
+    <a:masterClrMapping/>
+  </p:clrMapOvr>
+</p:sld>
+</file>
+
+<file path=ppt/slides/slide3.xml><?xml version="1.0" encoding="utf-8"?>
+<p:sld xmlns:a="http://schemas.openxmlformats.org/drawingml/2006/main" xmlns:r="http://schemas.openxmlformats.org/officeDocument/2006/relationships" xmlns:p="http://schemas.openxmlformats.org/presentationml/2006/main">
+  <p:cSld>
+    <p:spTree>
+      <p:nvGrpSpPr>
+        <p:cNvPr id="1" name=""/>
+        <p:cNvGrpSpPr/>
+        <p:nvPr/>
+      </p:nvGrpSpPr>
+      <p:grpSpPr>
+        <a:xfrm>
+          <a:off x="0" y="0"/>
+          <a:ext cx="0" cy="0"/>
+          <a:chOff x="0" y="0"/>
+          <a:chExt cx="0" cy="0"/>
+        </a:xfrm>
+      </p:grpSpPr>
+      <p:pic>
+        <p:nvPicPr>
+          <p:cNvPr id="3" name="Picture 2">
+            <a:extLst>
+              <a:ext uri="{FF2B5EF4-FFF2-40B4-BE49-F238E27FC236}">
+                <a16:creationId xmlns:a16="http://schemas.microsoft.com/office/drawing/2014/main" id="{5D03E0FF-9446-4D7F-B6B2-DF1ACC82D297}"/>
+              </a:ext>
+            </a:extLst>
+          </p:cNvPr>
+          <p:cNvPicPr>
+            <a:picLocks noChangeAspect="1"/>
+          </p:cNvPicPr>
+          <p:nvPr/>
+        </p:nvPicPr>
+        <p:blipFill>
+          <a:blip r:embed="rId2"/>
+          <a:stretch>
+            <a:fillRect/>
+          </a:stretch>
+        </p:blipFill>
+        <p:spPr>
+          <a:xfrm>
+            <a:off x="2243137" y="1109662"/>
+            <a:ext cx="7705725" cy="4638675"/>
+          </a:xfrm>
+          <a:prstGeom prst="rect">
+            <a:avLst/>
+          </a:prstGeom>
+        </p:spPr>
+      </p:pic>
+    </p:spTree>
+    <p:extLst>
+      <p:ext uri="{BB962C8B-B14F-4D97-AF65-F5344CB8AC3E}">
+        <p14:creationId xmlns:p14="http://schemas.microsoft.com/office/powerpoint/2010/main" val="3092223672"/>
+      </p:ext>
+    </p:extLst>
+  </p:cSld>
+  <p:clrMapOvr>
+    <a:masterClrMapping/>
+  </p:clrMapOvr>
+</p:sld>
+</file>
+
+<file path=ppt/slides/slide30.xml><?xml version="1.0" encoding="utf-8"?>
+<p:sld xmlns:a="http://schemas.openxmlformats.org/drawingml/2006/main" xmlns:r="http://schemas.openxmlformats.org/officeDocument/2006/relationships" xmlns:p="http://schemas.openxmlformats.org/presentationml/2006/main">
+  <p:cSld>
+    <p:spTree>
+      <p:nvGrpSpPr>
+        <p:cNvPr id="1" name=""/>
+        <p:cNvGrpSpPr/>
+        <p:nvPr/>
+      </p:nvGrpSpPr>
+      <p:grpSpPr>
+        <a:xfrm>
+          <a:off x="0" y="0"/>
+          <a:ext cx="0" cy="0"/>
+          <a:chOff x="0" y="0"/>
+          <a:chExt cx="0" cy="0"/>
+        </a:xfrm>
+      </p:grpSpPr>
+    </p:spTree>
+    <p:extLst>
+      <p:ext uri="{BB962C8B-B14F-4D97-AF65-F5344CB8AC3E}">
         <p14:creationId xmlns:p14="http://schemas.microsoft.com/office/powerpoint/2010/main" val="2084267165"/>
       </p:ext>
     </p:extLst>
@@ -4278,7 +4459,277 @@
 </p:sld>
 </file>
 
-<file path=ppt/slides/slide3.xml><?xml version="1.0" encoding="utf-8"?>
+<file path=ppt/slides/slide31.xml><?xml version="1.0" encoding="utf-8"?>
+<p:sld xmlns:a="http://schemas.openxmlformats.org/drawingml/2006/main" xmlns:r="http://schemas.openxmlformats.org/officeDocument/2006/relationships" xmlns:p="http://schemas.openxmlformats.org/presentationml/2006/main">
+  <p:cSld>
+    <p:spTree>
+      <p:nvGrpSpPr>
+        <p:cNvPr id="1" name=""/>
+        <p:cNvGrpSpPr/>
+        <p:nvPr/>
+      </p:nvGrpSpPr>
+      <p:grpSpPr>
+        <a:xfrm>
+          <a:off x="0" y="0"/>
+          <a:ext cx="0" cy="0"/>
+          <a:chOff x="0" y="0"/>
+          <a:chExt cx="0" cy="0"/>
+        </a:xfrm>
+      </p:grpSpPr>
+    </p:spTree>
+    <p:extLst>
+      <p:ext uri="{BB962C8B-B14F-4D97-AF65-F5344CB8AC3E}">
+        <p14:creationId xmlns:p14="http://schemas.microsoft.com/office/powerpoint/2010/main" val="2903145560"/>
+      </p:ext>
+    </p:extLst>
+  </p:cSld>
+  <p:clrMapOvr>
+    <a:masterClrMapping/>
+  </p:clrMapOvr>
+</p:sld>
+</file>
+
+<file path=ppt/slides/slide32.xml><?xml version="1.0" encoding="utf-8"?>
+<p:sld xmlns:a="http://schemas.openxmlformats.org/drawingml/2006/main" xmlns:r="http://schemas.openxmlformats.org/officeDocument/2006/relationships" xmlns:p="http://schemas.openxmlformats.org/presentationml/2006/main">
+  <p:cSld>
+    <p:spTree>
+      <p:nvGrpSpPr>
+        <p:cNvPr id="1" name=""/>
+        <p:cNvGrpSpPr/>
+        <p:nvPr/>
+      </p:nvGrpSpPr>
+      <p:grpSpPr>
+        <a:xfrm>
+          <a:off x="0" y="0"/>
+          <a:ext cx="0" cy="0"/>
+          <a:chOff x="0" y="0"/>
+          <a:chExt cx="0" cy="0"/>
+        </a:xfrm>
+      </p:grpSpPr>
+    </p:spTree>
+    <p:extLst>
+      <p:ext uri="{BB962C8B-B14F-4D97-AF65-F5344CB8AC3E}">
+        <p14:creationId xmlns:p14="http://schemas.microsoft.com/office/powerpoint/2010/main" val="2275897497"/>
+      </p:ext>
+    </p:extLst>
+  </p:cSld>
+  <p:clrMapOvr>
+    <a:masterClrMapping/>
+  </p:clrMapOvr>
+</p:sld>
+</file>
+
+<file path=ppt/slides/slide33.xml><?xml version="1.0" encoding="utf-8"?>
+<p:sld xmlns:a="http://schemas.openxmlformats.org/drawingml/2006/main" xmlns:r="http://schemas.openxmlformats.org/officeDocument/2006/relationships" xmlns:p="http://schemas.openxmlformats.org/presentationml/2006/main">
+  <p:cSld>
+    <p:spTree>
+      <p:nvGrpSpPr>
+        <p:cNvPr id="1" name=""/>
+        <p:cNvGrpSpPr/>
+        <p:nvPr/>
+      </p:nvGrpSpPr>
+      <p:grpSpPr>
+        <a:xfrm>
+          <a:off x="0" y="0"/>
+          <a:ext cx="0" cy="0"/>
+          <a:chOff x="0" y="0"/>
+          <a:chExt cx="0" cy="0"/>
+        </a:xfrm>
+      </p:grpSpPr>
+    </p:spTree>
+    <p:extLst>
+      <p:ext uri="{BB962C8B-B14F-4D97-AF65-F5344CB8AC3E}">
+        <p14:creationId xmlns:p14="http://schemas.microsoft.com/office/powerpoint/2010/main" val="1648755881"/>
+      </p:ext>
+    </p:extLst>
+  </p:cSld>
+  <p:clrMapOvr>
+    <a:masterClrMapping/>
+  </p:clrMapOvr>
+</p:sld>
+</file>
+
+<file path=ppt/slides/slide34.xml><?xml version="1.0" encoding="utf-8"?>
+<p:sld xmlns:a="http://schemas.openxmlformats.org/drawingml/2006/main" xmlns:r="http://schemas.openxmlformats.org/officeDocument/2006/relationships" xmlns:p="http://schemas.openxmlformats.org/presentationml/2006/main">
+  <p:cSld>
+    <p:spTree>
+      <p:nvGrpSpPr>
+        <p:cNvPr id="1" name=""/>
+        <p:cNvGrpSpPr/>
+        <p:nvPr/>
+      </p:nvGrpSpPr>
+      <p:grpSpPr>
+        <a:xfrm>
+          <a:off x="0" y="0"/>
+          <a:ext cx="0" cy="0"/>
+          <a:chOff x="0" y="0"/>
+          <a:chExt cx="0" cy="0"/>
+        </a:xfrm>
+      </p:grpSpPr>
+    </p:spTree>
+    <p:extLst>
+      <p:ext uri="{BB962C8B-B14F-4D97-AF65-F5344CB8AC3E}">
+        <p14:creationId xmlns:p14="http://schemas.microsoft.com/office/powerpoint/2010/main" val="4130343805"/>
+      </p:ext>
+    </p:extLst>
+  </p:cSld>
+  <p:clrMapOvr>
+    <a:masterClrMapping/>
+  </p:clrMapOvr>
+</p:sld>
+</file>
+
+<file path=ppt/slides/slide35.xml><?xml version="1.0" encoding="utf-8"?>
+<p:sld xmlns:a="http://schemas.openxmlformats.org/drawingml/2006/main" xmlns:r="http://schemas.openxmlformats.org/officeDocument/2006/relationships" xmlns:p="http://schemas.openxmlformats.org/presentationml/2006/main">
+  <p:cSld>
+    <p:spTree>
+      <p:nvGrpSpPr>
+        <p:cNvPr id="1" name=""/>
+        <p:cNvGrpSpPr/>
+        <p:nvPr/>
+      </p:nvGrpSpPr>
+      <p:grpSpPr>
+        <a:xfrm>
+          <a:off x="0" y="0"/>
+          <a:ext cx="0" cy="0"/>
+          <a:chOff x="0" y="0"/>
+          <a:chExt cx="0" cy="0"/>
+        </a:xfrm>
+      </p:grpSpPr>
+    </p:spTree>
+    <p:extLst>
+      <p:ext uri="{BB962C8B-B14F-4D97-AF65-F5344CB8AC3E}">
+        <p14:creationId xmlns:p14="http://schemas.microsoft.com/office/powerpoint/2010/main" val="1937026349"/>
+      </p:ext>
+    </p:extLst>
+  </p:cSld>
+  <p:clrMapOvr>
+    <a:masterClrMapping/>
+  </p:clrMapOvr>
+</p:sld>
+</file>
+
+<file path=ppt/slides/slide36.xml><?xml version="1.0" encoding="utf-8"?>
+<p:sld xmlns:a="http://schemas.openxmlformats.org/drawingml/2006/main" xmlns:r="http://schemas.openxmlformats.org/officeDocument/2006/relationships" xmlns:p="http://schemas.openxmlformats.org/presentationml/2006/main">
+  <p:cSld>
+    <p:spTree>
+      <p:nvGrpSpPr>
+        <p:cNvPr id="1" name=""/>
+        <p:cNvGrpSpPr/>
+        <p:nvPr/>
+      </p:nvGrpSpPr>
+      <p:grpSpPr>
+        <a:xfrm>
+          <a:off x="0" y="0"/>
+          <a:ext cx="0" cy="0"/>
+          <a:chOff x="0" y="0"/>
+          <a:chExt cx="0" cy="0"/>
+        </a:xfrm>
+      </p:grpSpPr>
+    </p:spTree>
+    <p:extLst>
+      <p:ext uri="{BB962C8B-B14F-4D97-AF65-F5344CB8AC3E}">
+        <p14:creationId xmlns:p14="http://schemas.microsoft.com/office/powerpoint/2010/main" val="868494836"/>
+      </p:ext>
+    </p:extLst>
+  </p:cSld>
+  <p:clrMapOvr>
+    <a:masterClrMapping/>
+  </p:clrMapOvr>
+</p:sld>
+</file>
+
+<file path=ppt/slides/slide37.xml><?xml version="1.0" encoding="utf-8"?>
+<p:sld xmlns:a="http://schemas.openxmlformats.org/drawingml/2006/main" xmlns:r="http://schemas.openxmlformats.org/officeDocument/2006/relationships" xmlns:p="http://schemas.openxmlformats.org/presentationml/2006/main">
+  <p:cSld>
+    <p:spTree>
+      <p:nvGrpSpPr>
+        <p:cNvPr id="1" name=""/>
+        <p:cNvGrpSpPr/>
+        <p:nvPr/>
+      </p:nvGrpSpPr>
+      <p:grpSpPr>
+        <a:xfrm>
+          <a:off x="0" y="0"/>
+          <a:ext cx="0" cy="0"/>
+          <a:chOff x="0" y="0"/>
+          <a:chExt cx="0" cy="0"/>
+        </a:xfrm>
+      </p:grpSpPr>
+    </p:spTree>
+    <p:extLst>
+      <p:ext uri="{BB962C8B-B14F-4D97-AF65-F5344CB8AC3E}">
+        <p14:creationId xmlns:p14="http://schemas.microsoft.com/office/powerpoint/2010/main" val="1537562593"/>
+      </p:ext>
+    </p:extLst>
+  </p:cSld>
+  <p:clrMapOvr>
+    <a:masterClrMapping/>
+  </p:clrMapOvr>
+</p:sld>
+</file>
+
+<file path=ppt/slides/slide38.xml><?xml version="1.0" encoding="utf-8"?>
+<p:sld xmlns:a="http://schemas.openxmlformats.org/drawingml/2006/main" xmlns:r="http://schemas.openxmlformats.org/officeDocument/2006/relationships" xmlns:p="http://schemas.openxmlformats.org/presentationml/2006/main">
+  <p:cSld>
+    <p:spTree>
+      <p:nvGrpSpPr>
+        <p:cNvPr id="1" name=""/>
+        <p:cNvGrpSpPr/>
+        <p:nvPr/>
+      </p:nvGrpSpPr>
+      <p:grpSpPr>
+        <a:xfrm>
+          <a:off x="0" y="0"/>
+          <a:ext cx="0" cy="0"/>
+          <a:chOff x="0" y="0"/>
+          <a:chExt cx="0" cy="0"/>
+        </a:xfrm>
+      </p:grpSpPr>
+    </p:spTree>
+    <p:extLst>
+      <p:ext uri="{BB962C8B-B14F-4D97-AF65-F5344CB8AC3E}">
+        <p14:creationId xmlns:p14="http://schemas.microsoft.com/office/powerpoint/2010/main" val="1814952658"/>
+      </p:ext>
+    </p:extLst>
+  </p:cSld>
+  <p:clrMapOvr>
+    <a:masterClrMapping/>
+  </p:clrMapOvr>
+</p:sld>
+</file>
+
+<file path=ppt/slides/slide39.xml><?xml version="1.0" encoding="utf-8"?>
+<p:sld xmlns:a="http://schemas.openxmlformats.org/drawingml/2006/main" xmlns:r="http://schemas.openxmlformats.org/officeDocument/2006/relationships" xmlns:p="http://schemas.openxmlformats.org/presentationml/2006/main">
+  <p:cSld>
+    <p:spTree>
+      <p:nvGrpSpPr>
+        <p:cNvPr id="1" name=""/>
+        <p:cNvGrpSpPr/>
+        <p:nvPr/>
+      </p:nvGrpSpPr>
+      <p:grpSpPr>
+        <a:xfrm>
+          <a:off x="0" y="0"/>
+          <a:ext cx="0" cy="0"/>
+          <a:chOff x="0" y="0"/>
+          <a:chExt cx="0" cy="0"/>
+        </a:xfrm>
+      </p:grpSpPr>
+    </p:spTree>
+    <p:extLst>
+      <p:ext uri="{BB962C8B-B14F-4D97-AF65-F5344CB8AC3E}">
+        <p14:creationId xmlns:p14="http://schemas.microsoft.com/office/powerpoint/2010/main" val="936874074"/>
+      </p:ext>
+    </p:extLst>
+  </p:cSld>
+  <p:clrMapOvr>
+    <a:masterClrMapping/>
+  </p:clrMapOvr>
+</p:sld>
+</file>
+
+<file path=ppt/slides/slide4.xml><?xml version="1.0" encoding="utf-8"?>
 <p:sld xmlns:a="http://schemas.openxmlformats.org/drawingml/2006/main" xmlns:r="http://schemas.openxmlformats.org/officeDocument/2006/relationships" xmlns:p="http://schemas.openxmlformats.org/presentationml/2006/main">
   <p:cSld>
     <p:spTree>
@@ -4338,277 +4789,7 @@
 </p:sld>
 </file>
 
-<file path=ppt/slides/slide30.xml><?xml version="1.0" encoding="utf-8"?>
-<p:sld xmlns:a="http://schemas.openxmlformats.org/drawingml/2006/main" xmlns:r="http://schemas.openxmlformats.org/officeDocument/2006/relationships" xmlns:p="http://schemas.openxmlformats.org/presentationml/2006/main">
-  <p:cSld>
-    <p:spTree>
-      <p:nvGrpSpPr>
-        <p:cNvPr id="1" name=""/>
-        <p:cNvGrpSpPr/>
-        <p:nvPr/>
-      </p:nvGrpSpPr>
-      <p:grpSpPr>
-        <a:xfrm>
-          <a:off x="0" y="0"/>
-          <a:ext cx="0" cy="0"/>
-          <a:chOff x="0" y="0"/>
-          <a:chExt cx="0" cy="0"/>
-        </a:xfrm>
-      </p:grpSpPr>
-    </p:spTree>
-    <p:extLst>
-      <p:ext uri="{BB962C8B-B14F-4D97-AF65-F5344CB8AC3E}">
-        <p14:creationId xmlns:p14="http://schemas.microsoft.com/office/powerpoint/2010/main" val="2903145560"/>
-      </p:ext>
-    </p:extLst>
-  </p:cSld>
-  <p:clrMapOvr>
-    <a:masterClrMapping/>
-  </p:clrMapOvr>
-</p:sld>
-</file>
-
-<file path=ppt/slides/slide31.xml><?xml version="1.0" encoding="utf-8"?>
-<p:sld xmlns:a="http://schemas.openxmlformats.org/drawingml/2006/main" xmlns:r="http://schemas.openxmlformats.org/officeDocument/2006/relationships" xmlns:p="http://schemas.openxmlformats.org/presentationml/2006/main">
-  <p:cSld>
-    <p:spTree>
-      <p:nvGrpSpPr>
-        <p:cNvPr id="1" name=""/>
-        <p:cNvGrpSpPr/>
-        <p:nvPr/>
-      </p:nvGrpSpPr>
-      <p:grpSpPr>
-        <a:xfrm>
-          <a:off x="0" y="0"/>
-          <a:ext cx="0" cy="0"/>
-          <a:chOff x="0" y="0"/>
-          <a:chExt cx="0" cy="0"/>
-        </a:xfrm>
-      </p:grpSpPr>
-    </p:spTree>
-    <p:extLst>
-      <p:ext uri="{BB962C8B-B14F-4D97-AF65-F5344CB8AC3E}">
-        <p14:creationId xmlns:p14="http://schemas.microsoft.com/office/powerpoint/2010/main" val="2275897497"/>
-      </p:ext>
-    </p:extLst>
-  </p:cSld>
-  <p:clrMapOvr>
-    <a:masterClrMapping/>
-  </p:clrMapOvr>
-</p:sld>
-</file>
-
-<file path=ppt/slides/slide32.xml><?xml version="1.0" encoding="utf-8"?>
-<p:sld xmlns:a="http://schemas.openxmlformats.org/drawingml/2006/main" xmlns:r="http://schemas.openxmlformats.org/officeDocument/2006/relationships" xmlns:p="http://schemas.openxmlformats.org/presentationml/2006/main">
-  <p:cSld>
-    <p:spTree>
-      <p:nvGrpSpPr>
-        <p:cNvPr id="1" name=""/>
-        <p:cNvGrpSpPr/>
-        <p:nvPr/>
-      </p:nvGrpSpPr>
-      <p:grpSpPr>
-        <a:xfrm>
-          <a:off x="0" y="0"/>
-          <a:ext cx="0" cy="0"/>
-          <a:chOff x="0" y="0"/>
-          <a:chExt cx="0" cy="0"/>
-        </a:xfrm>
-      </p:grpSpPr>
-    </p:spTree>
-    <p:extLst>
-      <p:ext uri="{BB962C8B-B14F-4D97-AF65-F5344CB8AC3E}">
-        <p14:creationId xmlns:p14="http://schemas.microsoft.com/office/powerpoint/2010/main" val="1648755881"/>
-      </p:ext>
-    </p:extLst>
-  </p:cSld>
-  <p:clrMapOvr>
-    <a:masterClrMapping/>
-  </p:clrMapOvr>
-</p:sld>
-</file>
-
-<file path=ppt/slides/slide33.xml><?xml version="1.0" encoding="utf-8"?>
-<p:sld xmlns:a="http://schemas.openxmlformats.org/drawingml/2006/main" xmlns:r="http://schemas.openxmlformats.org/officeDocument/2006/relationships" xmlns:p="http://schemas.openxmlformats.org/presentationml/2006/main">
-  <p:cSld>
-    <p:spTree>
-      <p:nvGrpSpPr>
-        <p:cNvPr id="1" name=""/>
-        <p:cNvGrpSpPr/>
-        <p:nvPr/>
-      </p:nvGrpSpPr>
-      <p:grpSpPr>
-        <a:xfrm>
-          <a:off x="0" y="0"/>
-          <a:ext cx="0" cy="0"/>
-          <a:chOff x="0" y="0"/>
-          <a:chExt cx="0" cy="0"/>
-        </a:xfrm>
-      </p:grpSpPr>
-    </p:spTree>
-    <p:extLst>
-      <p:ext uri="{BB962C8B-B14F-4D97-AF65-F5344CB8AC3E}">
-        <p14:creationId xmlns:p14="http://schemas.microsoft.com/office/powerpoint/2010/main" val="4130343805"/>
-      </p:ext>
-    </p:extLst>
-  </p:cSld>
-  <p:clrMapOvr>
-    <a:masterClrMapping/>
-  </p:clrMapOvr>
-</p:sld>
-</file>
-
-<file path=ppt/slides/slide34.xml><?xml version="1.0" encoding="utf-8"?>
-<p:sld xmlns:a="http://schemas.openxmlformats.org/drawingml/2006/main" xmlns:r="http://schemas.openxmlformats.org/officeDocument/2006/relationships" xmlns:p="http://schemas.openxmlformats.org/presentationml/2006/main">
-  <p:cSld>
-    <p:spTree>
-      <p:nvGrpSpPr>
-        <p:cNvPr id="1" name=""/>
-        <p:cNvGrpSpPr/>
-        <p:nvPr/>
-      </p:nvGrpSpPr>
-      <p:grpSpPr>
-        <a:xfrm>
-          <a:off x="0" y="0"/>
-          <a:ext cx="0" cy="0"/>
-          <a:chOff x="0" y="0"/>
-          <a:chExt cx="0" cy="0"/>
-        </a:xfrm>
-      </p:grpSpPr>
-    </p:spTree>
-    <p:extLst>
-      <p:ext uri="{BB962C8B-B14F-4D97-AF65-F5344CB8AC3E}">
-        <p14:creationId xmlns:p14="http://schemas.microsoft.com/office/powerpoint/2010/main" val="1937026349"/>
-      </p:ext>
-    </p:extLst>
-  </p:cSld>
-  <p:clrMapOvr>
-    <a:masterClrMapping/>
-  </p:clrMapOvr>
-</p:sld>
-</file>
-
-<file path=ppt/slides/slide35.xml><?xml version="1.0" encoding="utf-8"?>
-<p:sld xmlns:a="http://schemas.openxmlformats.org/drawingml/2006/main" xmlns:r="http://schemas.openxmlformats.org/officeDocument/2006/relationships" xmlns:p="http://schemas.openxmlformats.org/presentationml/2006/main">
-  <p:cSld>
-    <p:spTree>
-      <p:nvGrpSpPr>
-        <p:cNvPr id="1" name=""/>
-        <p:cNvGrpSpPr/>
-        <p:nvPr/>
-      </p:nvGrpSpPr>
-      <p:grpSpPr>
-        <a:xfrm>
-          <a:off x="0" y="0"/>
-          <a:ext cx="0" cy="0"/>
-          <a:chOff x="0" y="0"/>
-          <a:chExt cx="0" cy="0"/>
-        </a:xfrm>
-      </p:grpSpPr>
-    </p:spTree>
-    <p:extLst>
-      <p:ext uri="{BB962C8B-B14F-4D97-AF65-F5344CB8AC3E}">
-        <p14:creationId xmlns:p14="http://schemas.microsoft.com/office/powerpoint/2010/main" val="868494836"/>
-      </p:ext>
-    </p:extLst>
-  </p:cSld>
-  <p:clrMapOvr>
-    <a:masterClrMapping/>
-  </p:clrMapOvr>
-</p:sld>
-</file>
-
-<file path=ppt/slides/slide36.xml><?xml version="1.0" encoding="utf-8"?>
-<p:sld xmlns:a="http://schemas.openxmlformats.org/drawingml/2006/main" xmlns:r="http://schemas.openxmlformats.org/officeDocument/2006/relationships" xmlns:p="http://schemas.openxmlformats.org/presentationml/2006/main">
-  <p:cSld>
-    <p:spTree>
-      <p:nvGrpSpPr>
-        <p:cNvPr id="1" name=""/>
-        <p:cNvGrpSpPr/>
-        <p:nvPr/>
-      </p:nvGrpSpPr>
-      <p:grpSpPr>
-        <a:xfrm>
-          <a:off x="0" y="0"/>
-          <a:ext cx="0" cy="0"/>
-          <a:chOff x="0" y="0"/>
-          <a:chExt cx="0" cy="0"/>
-        </a:xfrm>
-      </p:grpSpPr>
-    </p:spTree>
-    <p:extLst>
-      <p:ext uri="{BB962C8B-B14F-4D97-AF65-F5344CB8AC3E}">
-        <p14:creationId xmlns:p14="http://schemas.microsoft.com/office/powerpoint/2010/main" val="1537562593"/>
-      </p:ext>
-    </p:extLst>
-  </p:cSld>
-  <p:clrMapOvr>
-    <a:masterClrMapping/>
-  </p:clrMapOvr>
-</p:sld>
-</file>
-
-<file path=ppt/slides/slide37.xml><?xml version="1.0" encoding="utf-8"?>
-<p:sld xmlns:a="http://schemas.openxmlformats.org/drawingml/2006/main" xmlns:r="http://schemas.openxmlformats.org/officeDocument/2006/relationships" xmlns:p="http://schemas.openxmlformats.org/presentationml/2006/main">
-  <p:cSld>
-    <p:spTree>
-      <p:nvGrpSpPr>
-        <p:cNvPr id="1" name=""/>
-        <p:cNvGrpSpPr/>
-        <p:nvPr/>
-      </p:nvGrpSpPr>
-      <p:grpSpPr>
-        <a:xfrm>
-          <a:off x="0" y="0"/>
-          <a:ext cx="0" cy="0"/>
-          <a:chOff x="0" y="0"/>
-          <a:chExt cx="0" cy="0"/>
-        </a:xfrm>
-      </p:grpSpPr>
-    </p:spTree>
-    <p:extLst>
-      <p:ext uri="{BB962C8B-B14F-4D97-AF65-F5344CB8AC3E}">
-        <p14:creationId xmlns:p14="http://schemas.microsoft.com/office/powerpoint/2010/main" val="1814952658"/>
-      </p:ext>
-    </p:extLst>
-  </p:cSld>
-  <p:clrMapOvr>
-    <a:masterClrMapping/>
-  </p:clrMapOvr>
-</p:sld>
-</file>
-
-<file path=ppt/slides/slide38.xml><?xml version="1.0" encoding="utf-8"?>
-<p:sld xmlns:a="http://schemas.openxmlformats.org/drawingml/2006/main" xmlns:r="http://schemas.openxmlformats.org/officeDocument/2006/relationships" xmlns:p="http://schemas.openxmlformats.org/presentationml/2006/main">
-  <p:cSld>
-    <p:spTree>
-      <p:nvGrpSpPr>
-        <p:cNvPr id="1" name=""/>
-        <p:cNvGrpSpPr/>
-        <p:nvPr/>
-      </p:nvGrpSpPr>
-      <p:grpSpPr>
-        <a:xfrm>
-          <a:off x="0" y="0"/>
-          <a:ext cx="0" cy="0"/>
-          <a:chOff x="0" y="0"/>
-          <a:chExt cx="0" cy="0"/>
-        </a:xfrm>
-      </p:grpSpPr>
-    </p:spTree>
-    <p:extLst>
-      <p:ext uri="{BB962C8B-B14F-4D97-AF65-F5344CB8AC3E}">
-        <p14:creationId xmlns:p14="http://schemas.microsoft.com/office/powerpoint/2010/main" val="936874074"/>
-      </p:ext>
-    </p:extLst>
-  </p:cSld>
-  <p:clrMapOvr>
-    <a:masterClrMapping/>
-  </p:clrMapOvr>
-</p:sld>
-</file>
-
-<file path=ppt/slides/slide39.xml><?xml version="1.0" encoding="utf-8"?>
+<file path=ppt/slides/slide40.xml><?xml version="1.0" encoding="utf-8"?>
 <p:sld xmlns:a="http://schemas.openxmlformats.org/drawingml/2006/main" xmlns:r="http://schemas.openxmlformats.org/officeDocument/2006/relationships" xmlns:p="http://schemas.openxmlformats.org/presentationml/2006/main">
   <p:cSld>
     <p:spTree>
@@ -4638,67 +4819,7 @@
 </p:sld>
 </file>
 
-<file path=ppt/slides/slide4.xml><?xml version="1.0" encoding="utf-8"?>
-<p:sld xmlns:a="http://schemas.openxmlformats.org/drawingml/2006/main" xmlns:r="http://schemas.openxmlformats.org/officeDocument/2006/relationships" xmlns:p="http://schemas.openxmlformats.org/presentationml/2006/main">
-  <p:cSld>
-    <p:spTree>
-      <p:nvGrpSpPr>
-        <p:cNvPr id="1" name=""/>
-        <p:cNvGrpSpPr/>
-        <p:nvPr/>
-      </p:nvGrpSpPr>
-      <p:grpSpPr>
-        <a:xfrm>
-          <a:off x="0" y="0"/>
-          <a:ext cx="0" cy="0"/>
-          <a:chOff x="0" y="0"/>
-          <a:chExt cx="0" cy="0"/>
-        </a:xfrm>
-      </p:grpSpPr>
-      <p:pic>
-        <p:nvPicPr>
-          <p:cNvPr id="4" name="Picture 3">
-            <a:extLst>
-              <a:ext uri="{FF2B5EF4-FFF2-40B4-BE49-F238E27FC236}">
-                <a16:creationId xmlns:a16="http://schemas.microsoft.com/office/drawing/2014/main" id="{6213EF1B-9F06-4887-ADD4-D7298F4CE6C5}"/>
-              </a:ext>
-            </a:extLst>
-          </p:cNvPr>
-          <p:cNvPicPr>
-            <a:picLocks noChangeAspect="1"/>
-          </p:cNvPicPr>
-          <p:nvPr/>
-        </p:nvPicPr>
-        <p:blipFill>
-          <a:blip r:embed="rId2"/>
-          <a:stretch>
-            <a:fillRect/>
-          </a:stretch>
-        </p:blipFill>
-        <p:spPr>
-          <a:xfrm>
-            <a:off x="2618890" y="1657102"/>
-            <a:ext cx="6954220" cy="3543795"/>
-          </a:xfrm>
-          <a:prstGeom prst="rect">
-            <a:avLst/>
-          </a:prstGeom>
-        </p:spPr>
-      </p:pic>
-    </p:spTree>
-    <p:extLst>
-      <p:ext uri="{BB962C8B-B14F-4D97-AF65-F5344CB8AC3E}">
-        <p14:creationId xmlns:p14="http://schemas.microsoft.com/office/powerpoint/2010/main" val="44499024"/>
-      </p:ext>
-    </p:extLst>
-  </p:cSld>
-  <p:clrMapOvr>
-    <a:masterClrMapping/>
-  </p:clrMapOvr>
-</p:sld>
-</file>
-
-<file path=ppt/slides/slide40.xml><?xml version="1.0" encoding="utf-8"?>
+<file path=ppt/slides/slide41.xml><?xml version="1.0" encoding="utf-8"?>
 <p:sld xmlns:a="http://schemas.openxmlformats.org/drawingml/2006/main" xmlns:r="http://schemas.openxmlformats.org/officeDocument/2006/relationships" xmlns:p="http://schemas.openxmlformats.org/presentationml/2006/main">
   <p:cSld>
     <p:spTree>
@@ -4728,7 +4849,7 @@
 </p:sld>
 </file>
 
-<file path=ppt/slides/slide41.xml><?xml version="1.0" encoding="utf-8"?>
+<file path=ppt/slides/slide42.xml><?xml version="1.0" encoding="utf-8"?>
 <p:sld xmlns:a="http://schemas.openxmlformats.org/drawingml/2006/main" xmlns:r="http://schemas.openxmlformats.org/officeDocument/2006/relationships" xmlns:p="http://schemas.openxmlformats.org/presentationml/2006/main">
   <p:cSld>
     <p:spTree>
@@ -4758,7 +4879,7 @@
 </p:sld>
 </file>
 
-<file path=ppt/slides/slide42.xml><?xml version="1.0" encoding="utf-8"?>
+<file path=ppt/slides/slide43.xml><?xml version="1.0" encoding="utf-8"?>
 <p:sld xmlns:a="http://schemas.openxmlformats.org/drawingml/2006/main" xmlns:r="http://schemas.openxmlformats.org/officeDocument/2006/relationships" xmlns:p="http://schemas.openxmlformats.org/presentationml/2006/main">
   <p:cSld>
     <p:spTree>
@@ -4788,7 +4909,7 @@
 </p:sld>
 </file>
 
-<file path=ppt/slides/slide43.xml><?xml version="1.0" encoding="utf-8"?>
+<file path=ppt/slides/slide44.xml><?xml version="1.0" encoding="utf-8"?>
 <p:sld xmlns:a="http://schemas.openxmlformats.org/drawingml/2006/main" xmlns:r="http://schemas.openxmlformats.org/officeDocument/2006/relationships" xmlns:p="http://schemas.openxmlformats.org/presentationml/2006/main">
   <p:cSld>
     <p:spTree>
@@ -4818,7 +4939,7 @@
 </p:sld>
 </file>
 
-<file path=ppt/slides/slide44.xml><?xml version="1.0" encoding="utf-8"?>
+<file path=ppt/slides/slide45.xml><?xml version="1.0" encoding="utf-8"?>
 <p:sld xmlns:a="http://schemas.openxmlformats.org/drawingml/2006/main" xmlns:r="http://schemas.openxmlformats.org/officeDocument/2006/relationships" xmlns:p="http://schemas.openxmlformats.org/presentationml/2006/main">
   <p:cSld>
     <p:spTree>
@@ -4848,7 +4969,7 @@
 </p:sld>
 </file>
 
-<file path=ppt/slides/slide45.xml><?xml version="1.0" encoding="utf-8"?>
+<file path=ppt/slides/slide46.xml><?xml version="1.0" encoding="utf-8"?>
 <p:sld xmlns:a="http://schemas.openxmlformats.org/drawingml/2006/main" xmlns:r="http://schemas.openxmlformats.org/officeDocument/2006/relationships" xmlns:p="http://schemas.openxmlformats.org/presentationml/2006/main">
   <p:cSld>
     <p:spTree>
@@ -4895,10 +5016,40 @@
           <a:chExt cx="0" cy="0"/>
         </a:xfrm>
       </p:grpSpPr>
+      <p:pic>
+        <p:nvPicPr>
+          <p:cNvPr id="4" name="Picture 3">
+            <a:extLst>
+              <a:ext uri="{FF2B5EF4-FFF2-40B4-BE49-F238E27FC236}">
+                <a16:creationId xmlns:a16="http://schemas.microsoft.com/office/drawing/2014/main" id="{6213EF1B-9F06-4887-ADD4-D7298F4CE6C5}"/>
+              </a:ext>
+            </a:extLst>
+          </p:cNvPr>
+          <p:cNvPicPr>
+            <a:picLocks noChangeAspect="1"/>
+          </p:cNvPicPr>
+          <p:nvPr/>
+        </p:nvPicPr>
+        <p:blipFill>
+          <a:blip r:embed="rId2"/>
+          <a:stretch>
+            <a:fillRect/>
+          </a:stretch>
+        </p:blipFill>
+        <p:spPr>
+          <a:xfrm>
+            <a:off x="2618890" y="1657102"/>
+            <a:ext cx="6954220" cy="3543795"/>
+          </a:xfrm>
+          <a:prstGeom prst="rect">
+            <a:avLst/>
+          </a:prstGeom>
+        </p:spPr>
+      </p:pic>
     </p:spTree>
     <p:extLst>
       <p:ext uri="{BB962C8B-B14F-4D97-AF65-F5344CB8AC3E}">
-        <p14:creationId xmlns:p14="http://schemas.microsoft.com/office/powerpoint/2010/main" val="2531436968"/>
+        <p14:creationId xmlns:p14="http://schemas.microsoft.com/office/powerpoint/2010/main" val="44499024"/>
       </p:ext>
     </p:extLst>
   </p:cSld>
@@ -4925,10 +5076,881 @@
           <a:chExt cx="0" cy="0"/>
         </a:xfrm>
       </p:grpSpPr>
+      <p:pic>
+        <p:nvPicPr>
+          <p:cNvPr id="4" name="Picture 3">
+            <a:extLst>
+              <a:ext uri="{FF2B5EF4-FFF2-40B4-BE49-F238E27FC236}">
+                <a16:creationId xmlns:a16="http://schemas.microsoft.com/office/drawing/2014/main" id="{4C09E6B8-C8A2-4031-91D1-046623F7A774}"/>
+              </a:ext>
+            </a:extLst>
+          </p:cNvPr>
+          <p:cNvPicPr>
+            <a:picLocks noChangeAspect="1"/>
+          </p:cNvPicPr>
+          <p:nvPr/>
+        </p:nvPicPr>
+        <p:blipFill>
+          <a:blip r:embed="rId2"/>
+          <a:stretch>
+            <a:fillRect/>
+          </a:stretch>
+        </p:blipFill>
+        <p:spPr>
+          <a:xfrm>
+            <a:off x="204787" y="604837"/>
+            <a:ext cx="11782425" cy="5648325"/>
+          </a:xfrm>
+          <a:prstGeom prst="rect">
+            <a:avLst/>
+          </a:prstGeom>
+        </p:spPr>
+      </p:pic>
+      <p:sp>
+        <p:nvSpPr>
+          <p:cNvPr id="6" name="Arrow: Up 5">
+            <a:extLst>
+              <a:ext uri="{FF2B5EF4-FFF2-40B4-BE49-F238E27FC236}">
+                <a16:creationId xmlns:a16="http://schemas.microsoft.com/office/drawing/2014/main" id="{3A7E7395-5D52-463D-A935-677AC79F6288}"/>
+              </a:ext>
+            </a:extLst>
+          </p:cNvPr>
+          <p:cNvSpPr/>
+          <p:nvPr/>
+        </p:nvSpPr>
+        <p:spPr>
+          <a:xfrm rot="16200000">
+            <a:off x="3746950" y="1760250"/>
+            <a:ext cx="802133" cy="1619399"/>
+          </a:xfrm>
+          <a:prstGeom prst="upArrow">
+            <a:avLst>
+              <a:gd name="adj1" fmla="val 50000"/>
+              <a:gd name="adj2" fmla="val 89626"/>
+            </a:avLst>
+          </a:prstGeom>
+          <a:solidFill>
+            <a:srgbClr val="C00000"/>
+          </a:solidFill>
+          <a:ln>
+            <a:noFill/>
+          </a:ln>
+        </p:spPr>
+        <p:style>
+          <a:lnRef idx="0">
+            <a:schemeClr val="accent1"/>
+          </a:lnRef>
+          <a:fillRef idx="3">
+            <a:schemeClr val="accent1"/>
+          </a:fillRef>
+          <a:effectRef idx="3">
+            <a:schemeClr val="accent1"/>
+          </a:effectRef>
+          <a:fontRef idx="minor">
+            <a:schemeClr val="lt1"/>
+          </a:fontRef>
+        </p:style>
+        <p:txBody>
+          <a:bodyPr rtlCol="0" anchor="ctr"/>
+          <a:lstStyle/>
+          <a:p>
+            <a:pPr algn="ctr"/>
+            <a:endParaRPr lang="en-US" sz="2800" b="1" dirty="0">
+              <a:latin typeface="Segoe UI" panose="020B0502040204020203" pitchFamily="34" charset="0"/>
+              <a:cs typeface="Segoe UI" panose="020B0502040204020203" pitchFamily="34" charset="0"/>
+            </a:endParaRPr>
+          </a:p>
+        </p:txBody>
+      </p:sp>
+      <p:sp>
+        <p:nvSpPr>
+          <p:cNvPr id="8" name="TextBox 7">
+            <a:extLst>
+              <a:ext uri="{FF2B5EF4-FFF2-40B4-BE49-F238E27FC236}">
+                <a16:creationId xmlns:a16="http://schemas.microsoft.com/office/drawing/2014/main" id="{085F674E-B179-4BD7-AB30-53672980DF26}"/>
+              </a:ext>
+            </a:extLst>
+          </p:cNvPr>
+          <p:cNvSpPr txBox="1"/>
+          <p:nvPr/>
+        </p:nvSpPr>
+        <p:spPr>
+          <a:xfrm>
+            <a:off x="4004236" y="2300198"/>
+            <a:ext cx="290319" cy="523220"/>
+          </a:xfrm>
+          <a:prstGeom prst="rect">
+            <a:avLst/>
+          </a:prstGeom>
+          <a:noFill/>
+        </p:spPr>
+        <p:txBody>
+          <a:bodyPr wrap="square" rtlCol="0">
+            <a:spAutoFit/>
+          </a:bodyPr>
+          <a:lstStyle/>
+          <a:p>
+            <a:pPr algn="l"/>
+            <a:r>
+              <a:rPr lang="en-US" sz="2800" b="1" dirty="0">
+                <a:solidFill>
+                  <a:schemeClr val="bg1"/>
+                </a:solidFill>
+                <a:latin typeface="Segoe UI" panose="020B0502040204020203" pitchFamily="34" charset="0"/>
+                <a:cs typeface="Segoe UI" panose="020B0502040204020203" pitchFamily="34" charset="0"/>
+              </a:rPr>
+              <a:t>A</a:t>
+            </a:r>
+          </a:p>
+        </p:txBody>
+      </p:sp>
+      <p:sp>
+        <p:nvSpPr>
+          <p:cNvPr id="10" name="Arrow: Up 9">
+            <a:extLst>
+              <a:ext uri="{FF2B5EF4-FFF2-40B4-BE49-F238E27FC236}">
+                <a16:creationId xmlns:a16="http://schemas.microsoft.com/office/drawing/2014/main" id="{7CE2C039-8974-4106-8E51-28A30CD9E3B6}"/>
+              </a:ext>
+            </a:extLst>
+          </p:cNvPr>
+          <p:cNvSpPr/>
+          <p:nvPr/>
+        </p:nvSpPr>
+        <p:spPr>
+          <a:xfrm rot="16200000">
+            <a:off x="3083789" y="4607330"/>
+            <a:ext cx="802133" cy="1619399"/>
+          </a:xfrm>
+          <a:prstGeom prst="upArrow">
+            <a:avLst>
+              <a:gd name="adj1" fmla="val 50000"/>
+              <a:gd name="adj2" fmla="val 89626"/>
+            </a:avLst>
+          </a:prstGeom>
+          <a:solidFill>
+            <a:srgbClr val="C00000"/>
+          </a:solidFill>
+          <a:ln>
+            <a:noFill/>
+          </a:ln>
+        </p:spPr>
+        <p:style>
+          <a:lnRef idx="0">
+            <a:schemeClr val="accent1"/>
+          </a:lnRef>
+          <a:fillRef idx="3">
+            <a:schemeClr val="accent1"/>
+          </a:fillRef>
+          <a:effectRef idx="3">
+            <a:schemeClr val="accent1"/>
+          </a:effectRef>
+          <a:fontRef idx="minor">
+            <a:schemeClr val="lt1"/>
+          </a:fontRef>
+        </p:style>
+        <p:txBody>
+          <a:bodyPr rtlCol="0" anchor="ctr"/>
+          <a:lstStyle/>
+          <a:p>
+            <a:pPr algn="ctr"/>
+            <a:endParaRPr lang="en-US" sz="2800" b="1" dirty="0">
+              <a:latin typeface="Segoe UI" panose="020B0502040204020203" pitchFamily="34" charset="0"/>
+              <a:cs typeface="Segoe UI" panose="020B0502040204020203" pitchFamily="34" charset="0"/>
+            </a:endParaRPr>
+          </a:p>
+        </p:txBody>
+      </p:sp>
+      <p:sp>
+        <p:nvSpPr>
+          <p:cNvPr id="12" name="TextBox 11">
+            <a:extLst>
+              <a:ext uri="{FF2B5EF4-FFF2-40B4-BE49-F238E27FC236}">
+                <a16:creationId xmlns:a16="http://schemas.microsoft.com/office/drawing/2014/main" id="{E8A9AA43-869B-4D76-B64B-1D5DC443CD1F}"/>
+              </a:ext>
+            </a:extLst>
+          </p:cNvPr>
+          <p:cNvSpPr txBox="1"/>
+          <p:nvPr/>
+        </p:nvSpPr>
+        <p:spPr>
+          <a:xfrm>
+            <a:off x="3341075" y="5147278"/>
+            <a:ext cx="290319" cy="523220"/>
+          </a:xfrm>
+          <a:prstGeom prst="rect">
+            <a:avLst/>
+          </a:prstGeom>
+          <a:noFill/>
+        </p:spPr>
+        <p:txBody>
+          <a:bodyPr wrap="square" rtlCol="0">
+            <a:spAutoFit/>
+          </a:bodyPr>
+          <a:lstStyle/>
+          <a:p>
+            <a:pPr algn="l"/>
+            <a:r>
+              <a:rPr lang="en-US" sz="2800" b="1" dirty="0">
+                <a:solidFill>
+                  <a:schemeClr val="bg1"/>
+                </a:solidFill>
+                <a:latin typeface="Segoe UI" panose="020B0502040204020203" pitchFamily="34" charset="0"/>
+                <a:cs typeface="Segoe UI" panose="020B0502040204020203" pitchFamily="34" charset="0"/>
+              </a:rPr>
+              <a:t>B</a:t>
+            </a:r>
+          </a:p>
+        </p:txBody>
+      </p:sp>
+      <p:grpSp>
+        <p:nvGrpSpPr>
+          <p:cNvPr id="36" name="Group 35">
+            <a:extLst>
+              <a:ext uri="{FF2B5EF4-FFF2-40B4-BE49-F238E27FC236}">
+                <a16:creationId xmlns:a16="http://schemas.microsoft.com/office/drawing/2014/main" id="{629DC374-4237-4164-89B0-A8CB7D5B5C1B}"/>
+              </a:ext>
+            </a:extLst>
+          </p:cNvPr>
+          <p:cNvGrpSpPr/>
+          <p:nvPr/>
+        </p:nvGrpSpPr>
+        <p:grpSpPr>
+          <a:xfrm>
+            <a:off x="627214" y="3419209"/>
+            <a:ext cx="5382278" cy="1288154"/>
+            <a:chOff x="627214" y="3419209"/>
+            <a:chExt cx="5382278" cy="1288154"/>
+          </a:xfrm>
+        </p:grpSpPr>
+        <p:sp>
+          <p:nvSpPr>
+            <p:cNvPr id="13" name="Rectangle 12">
+              <a:extLst>
+                <a:ext uri="{FF2B5EF4-FFF2-40B4-BE49-F238E27FC236}">
+                  <a16:creationId xmlns:a16="http://schemas.microsoft.com/office/drawing/2014/main" id="{7F6AEB40-F255-4BD6-9556-D6823A601A18}"/>
+                </a:ext>
+              </a:extLst>
+            </p:cNvPr>
+            <p:cNvSpPr/>
+            <p:nvPr/>
+          </p:nvSpPr>
+          <p:spPr>
+            <a:xfrm>
+              <a:off x="631815" y="3429000"/>
+              <a:ext cx="1033910" cy="200340"/>
+            </a:xfrm>
+            <a:prstGeom prst="rect">
+              <a:avLst/>
+            </a:prstGeom>
+            <a:solidFill>
+              <a:schemeClr val="tx1"/>
+            </a:solidFill>
+            <a:ln>
+              <a:noFill/>
+            </a:ln>
+          </p:spPr>
+          <p:style>
+            <a:lnRef idx="2">
+              <a:schemeClr val="accent1">
+                <a:shade val="50000"/>
+              </a:schemeClr>
+            </a:lnRef>
+            <a:fillRef idx="1">
+              <a:schemeClr val="accent1"/>
+            </a:fillRef>
+            <a:effectRef idx="0">
+              <a:schemeClr val="accent1"/>
+            </a:effectRef>
+            <a:fontRef idx="minor">
+              <a:schemeClr val="lt1"/>
+            </a:fontRef>
+          </p:style>
+          <p:txBody>
+            <a:bodyPr rtlCol="0" anchor="ctr"/>
+            <a:lstStyle/>
+            <a:p>
+              <a:pPr algn="ctr"/>
+              <a:endParaRPr lang="en-US"/>
+            </a:p>
+          </p:txBody>
+        </p:sp>
+        <p:sp>
+          <p:nvSpPr>
+            <p:cNvPr id="15" name="Rectangle 14">
+              <a:extLst>
+                <a:ext uri="{FF2B5EF4-FFF2-40B4-BE49-F238E27FC236}">
+                  <a16:creationId xmlns:a16="http://schemas.microsoft.com/office/drawing/2014/main" id="{2F62760A-E79F-47A0-A71E-6FA164D1A39A}"/>
+                </a:ext>
+              </a:extLst>
+            </p:cNvPr>
+            <p:cNvSpPr/>
+            <p:nvPr/>
+          </p:nvSpPr>
+          <p:spPr>
+            <a:xfrm>
+              <a:off x="631815" y="3696436"/>
+              <a:ext cx="1033910" cy="200340"/>
+            </a:xfrm>
+            <a:prstGeom prst="rect">
+              <a:avLst/>
+            </a:prstGeom>
+            <a:solidFill>
+              <a:schemeClr val="tx1"/>
+            </a:solidFill>
+            <a:ln>
+              <a:noFill/>
+            </a:ln>
+          </p:spPr>
+          <p:style>
+            <a:lnRef idx="2">
+              <a:schemeClr val="accent1">
+                <a:shade val="50000"/>
+              </a:schemeClr>
+            </a:lnRef>
+            <a:fillRef idx="1">
+              <a:schemeClr val="accent1"/>
+            </a:fillRef>
+            <a:effectRef idx="0">
+              <a:schemeClr val="accent1"/>
+            </a:effectRef>
+            <a:fontRef idx="minor">
+              <a:schemeClr val="lt1"/>
+            </a:fontRef>
+          </p:style>
+          <p:txBody>
+            <a:bodyPr rtlCol="0" anchor="ctr"/>
+            <a:lstStyle/>
+            <a:p>
+              <a:pPr algn="ctr"/>
+              <a:endParaRPr lang="en-US"/>
+            </a:p>
+          </p:txBody>
+        </p:sp>
+        <p:sp>
+          <p:nvSpPr>
+            <p:cNvPr id="17" name="Rectangle 16">
+              <a:extLst>
+                <a:ext uri="{FF2B5EF4-FFF2-40B4-BE49-F238E27FC236}">
+                  <a16:creationId xmlns:a16="http://schemas.microsoft.com/office/drawing/2014/main" id="{A7863857-EE53-4F0C-B80C-49FA61019E00}"/>
+                </a:ext>
+              </a:extLst>
+            </p:cNvPr>
+            <p:cNvSpPr/>
+            <p:nvPr/>
+          </p:nvSpPr>
+          <p:spPr>
+            <a:xfrm>
+              <a:off x="627214" y="3963872"/>
+              <a:ext cx="1033910" cy="200340"/>
+            </a:xfrm>
+            <a:prstGeom prst="rect">
+              <a:avLst/>
+            </a:prstGeom>
+            <a:solidFill>
+              <a:schemeClr val="tx1"/>
+            </a:solidFill>
+            <a:ln>
+              <a:noFill/>
+            </a:ln>
+          </p:spPr>
+          <p:style>
+            <a:lnRef idx="2">
+              <a:schemeClr val="accent1">
+                <a:shade val="50000"/>
+              </a:schemeClr>
+            </a:lnRef>
+            <a:fillRef idx="1">
+              <a:schemeClr val="accent1"/>
+            </a:fillRef>
+            <a:effectRef idx="0">
+              <a:schemeClr val="accent1"/>
+            </a:effectRef>
+            <a:fontRef idx="minor">
+              <a:schemeClr val="lt1"/>
+            </a:fontRef>
+          </p:style>
+          <p:txBody>
+            <a:bodyPr rtlCol="0" anchor="ctr"/>
+            <a:lstStyle/>
+            <a:p>
+              <a:pPr algn="ctr"/>
+              <a:endParaRPr lang="en-US"/>
+            </a:p>
+          </p:txBody>
+        </p:sp>
+        <p:sp>
+          <p:nvSpPr>
+            <p:cNvPr id="19" name="Rectangle 18">
+              <a:extLst>
+                <a:ext uri="{FF2B5EF4-FFF2-40B4-BE49-F238E27FC236}">
+                  <a16:creationId xmlns:a16="http://schemas.microsoft.com/office/drawing/2014/main" id="{EC0BAC19-6F82-4D5F-B7A8-3D9D4439F20C}"/>
+                </a:ext>
+              </a:extLst>
+            </p:cNvPr>
+            <p:cNvSpPr/>
+            <p:nvPr/>
+          </p:nvSpPr>
+          <p:spPr>
+            <a:xfrm>
+              <a:off x="627214" y="4231308"/>
+              <a:ext cx="1033910" cy="200340"/>
+            </a:xfrm>
+            <a:prstGeom prst="rect">
+              <a:avLst/>
+            </a:prstGeom>
+            <a:solidFill>
+              <a:schemeClr val="tx1"/>
+            </a:solidFill>
+            <a:ln>
+              <a:noFill/>
+            </a:ln>
+          </p:spPr>
+          <p:style>
+            <a:lnRef idx="2">
+              <a:schemeClr val="accent1">
+                <a:shade val="50000"/>
+              </a:schemeClr>
+            </a:lnRef>
+            <a:fillRef idx="1">
+              <a:schemeClr val="accent1"/>
+            </a:fillRef>
+            <a:effectRef idx="0">
+              <a:schemeClr val="accent1"/>
+            </a:effectRef>
+            <a:fontRef idx="minor">
+              <a:schemeClr val="lt1"/>
+            </a:fontRef>
+          </p:style>
+          <p:txBody>
+            <a:bodyPr rtlCol="0" anchor="ctr"/>
+            <a:lstStyle/>
+            <a:p>
+              <a:pPr algn="ctr"/>
+              <a:endParaRPr lang="en-US"/>
+            </a:p>
+          </p:txBody>
+        </p:sp>
+        <p:sp>
+          <p:nvSpPr>
+            <p:cNvPr id="21" name="Rectangle 20">
+              <a:extLst>
+                <a:ext uri="{FF2B5EF4-FFF2-40B4-BE49-F238E27FC236}">
+                  <a16:creationId xmlns:a16="http://schemas.microsoft.com/office/drawing/2014/main" id="{A01103BF-A8C0-42CC-A01E-3EFD4ECDD031}"/>
+                </a:ext>
+              </a:extLst>
+            </p:cNvPr>
+            <p:cNvSpPr/>
+            <p:nvPr/>
+          </p:nvSpPr>
+          <p:spPr>
+            <a:xfrm>
+              <a:off x="627214" y="4507023"/>
+              <a:ext cx="1033910" cy="200340"/>
+            </a:xfrm>
+            <a:prstGeom prst="rect">
+              <a:avLst/>
+            </a:prstGeom>
+            <a:solidFill>
+              <a:schemeClr val="tx1"/>
+            </a:solidFill>
+            <a:ln>
+              <a:noFill/>
+            </a:ln>
+          </p:spPr>
+          <p:style>
+            <a:lnRef idx="2">
+              <a:schemeClr val="accent1">
+                <a:shade val="50000"/>
+              </a:schemeClr>
+            </a:lnRef>
+            <a:fillRef idx="1">
+              <a:schemeClr val="accent1"/>
+            </a:fillRef>
+            <a:effectRef idx="0">
+              <a:schemeClr val="accent1"/>
+            </a:effectRef>
+            <a:fontRef idx="minor">
+              <a:schemeClr val="lt1"/>
+            </a:fontRef>
+          </p:style>
+          <p:txBody>
+            <a:bodyPr rtlCol="0" anchor="ctr"/>
+            <a:lstStyle/>
+            <a:p>
+              <a:pPr algn="ctr"/>
+              <a:endParaRPr lang="en-US"/>
+            </a:p>
+          </p:txBody>
+        </p:sp>
+        <p:sp>
+          <p:nvSpPr>
+            <p:cNvPr id="23" name="Rectangle 22">
+              <a:extLst>
+                <a:ext uri="{FF2B5EF4-FFF2-40B4-BE49-F238E27FC236}">
+                  <a16:creationId xmlns:a16="http://schemas.microsoft.com/office/drawing/2014/main" id="{6C44CFBD-1736-4EB6-B996-9EBA264FFA72}"/>
+                </a:ext>
+              </a:extLst>
+            </p:cNvPr>
+            <p:cNvSpPr/>
+            <p:nvPr/>
+          </p:nvSpPr>
+          <p:spPr>
+            <a:xfrm>
+              <a:off x="3777600" y="3419209"/>
+              <a:ext cx="1033910" cy="200340"/>
+            </a:xfrm>
+            <a:prstGeom prst="rect">
+              <a:avLst/>
+            </a:prstGeom>
+            <a:solidFill>
+              <a:schemeClr val="tx1"/>
+            </a:solidFill>
+            <a:ln>
+              <a:noFill/>
+            </a:ln>
+          </p:spPr>
+          <p:style>
+            <a:lnRef idx="2">
+              <a:schemeClr val="accent1">
+                <a:shade val="50000"/>
+              </a:schemeClr>
+            </a:lnRef>
+            <a:fillRef idx="1">
+              <a:schemeClr val="accent1"/>
+            </a:fillRef>
+            <a:effectRef idx="0">
+              <a:schemeClr val="accent1"/>
+            </a:effectRef>
+            <a:fontRef idx="minor">
+              <a:schemeClr val="lt1"/>
+            </a:fontRef>
+          </p:style>
+          <p:txBody>
+            <a:bodyPr rtlCol="0" anchor="ctr"/>
+            <a:lstStyle/>
+            <a:p>
+              <a:pPr algn="ctr"/>
+              <a:endParaRPr lang="en-US"/>
+            </a:p>
+          </p:txBody>
+        </p:sp>
+        <p:sp>
+          <p:nvSpPr>
+            <p:cNvPr id="25" name="Rectangle 24">
+              <a:extLst>
+                <a:ext uri="{FF2B5EF4-FFF2-40B4-BE49-F238E27FC236}">
+                  <a16:creationId xmlns:a16="http://schemas.microsoft.com/office/drawing/2014/main" id="{85835139-C8BB-4209-967B-C057645DFB52}"/>
+                </a:ext>
+              </a:extLst>
+            </p:cNvPr>
+            <p:cNvSpPr/>
+            <p:nvPr/>
+          </p:nvSpPr>
+          <p:spPr>
+            <a:xfrm>
+              <a:off x="3777600" y="3686645"/>
+              <a:ext cx="1033910" cy="200340"/>
+            </a:xfrm>
+            <a:prstGeom prst="rect">
+              <a:avLst/>
+            </a:prstGeom>
+            <a:solidFill>
+              <a:schemeClr val="tx1"/>
+            </a:solidFill>
+            <a:ln>
+              <a:noFill/>
+            </a:ln>
+          </p:spPr>
+          <p:style>
+            <a:lnRef idx="2">
+              <a:schemeClr val="accent1">
+                <a:shade val="50000"/>
+              </a:schemeClr>
+            </a:lnRef>
+            <a:fillRef idx="1">
+              <a:schemeClr val="accent1"/>
+            </a:fillRef>
+            <a:effectRef idx="0">
+              <a:schemeClr val="accent1"/>
+            </a:effectRef>
+            <a:fontRef idx="minor">
+              <a:schemeClr val="lt1"/>
+            </a:fontRef>
+          </p:style>
+          <p:txBody>
+            <a:bodyPr rtlCol="0" anchor="ctr"/>
+            <a:lstStyle/>
+            <a:p>
+              <a:pPr algn="ctr"/>
+              <a:endParaRPr lang="en-US"/>
+            </a:p>
+          </p:txBody>
+        </p:sp>
+        <p:sp>
+          <p:nvSpPr>
+            <p:cNvPr id="27" name="Rectangle 26">
+              <a:extLst>
+                <a:ext uri="{FF2B5EF4-FFF2-40B4-BE49-F238E27FC236}">
+                  <a16:creationId xmlns:a16="http://schemas.microsoft.com/office/drawing/2014/main" id="{875E64DA-9A7C-478F-A34A-61FF41247115}"/>
+                </a:ext>
+              </a:extLst>
+            </p:cNvPr>
+            <p:cNvSpPr/>
+            <p:nvPr/>
+          </p:nvSpPr>
+          <p:spPr>
+            <a:xfrm>
+              <a:off x="3772999" y="3954081"/>
+              <a:ext cx="1033910" cy="200340"/>
+            </a:xfrm>
+            <a:prstGeom prst="rect">
+              <a:avLst/>
+            </a:prstGeom>
+            <a:solidFill>
+              <a:schemeClr val="tx1"/>
+            </a:solidFill>
+            <a:ln>
+              <a:noFill/>
+            </a:ln>
+          </p:spPr>
+          <p:style>
+            <a:lnRef idx="2">
+              <a:schemeClr val="accent1">
+                <a:shade val="50000"/>
+              </a:schemeClr>
+            </a:lnRef>
+            <a:fillRef idx="1">
+              <a:schemeClr val="accent1"/>
+            </a:fillRef>
+            <a:effectRef idx="0">
+              <a:schemeClr val="accent1"/>
+            </a:effectRef>
+            <a:fontRef idx="minor">
+              <a:schemeClr val="lt1"/>
+            </a:fontRef>
+          </p:style>
+          <p:txBody>
+            <a:bodyPr rtlCol="0" anchor="ctr"/>
+            <a:lstStyle/>
+            <a:p>
+              <a:pPr algn="ctr"/>
+              <a:endParaRPr lang="en-US"/>
+            </a:p>
+          </p:txBody>
+        </p:sp>
+        <p:sp>
+          <p:nvSpPr>
+            <p:cNvPr id="29" name="Rectangle 28">
+              <a:extLst>
+                <a:ext uri="{FF2B5EF4-FFF2-40B4-BE49-F238E27FC236}">
+                  <a16:creationId xmlns:a16="http://schemas.microsoft.com/office/drawing/2014/main" id="{6BED8686-4D28-4F79-AEF9-5A15F0C62C22}"/>
+                </a:ext>
+              </a:extLst>
+            </p:cNvPr>
+            <p:cNvSpPr/>
+            <p:nvPr/>
+          </p:nvSpPr>
+          <p:spPr>
+            <a:xfrm>
+              <a:off x="4923361" y="4231308"/>
+              <a:ext cx="1086131" cy="200340"/>
+            </a:xfrm>
+            <a:prstGeom prst="rect">
+              <a:avLst/>
+            </a:prstGeom>
+            <a:solidFill>
+              <a:schemeClr val="tx1"/>
+            </a:solidFill>
+            <a:ln>
+              <a:noFill/>
+            </a:ln>
+          </p:spPr>
+          <p:style>
+            <a:lnRef idx="2">
+              <a:schemeClr val="accent1">
+                <a:shade val="50000"/>
+              </a:schemeClr>
+            </a:lnRef>
+            <a:fillRef idx="1">
+              <a:schemeClr val="accent1"/>
+            </a:fillRef>
+            <a:effectRef idx="0">
+              <a:schemeClr val="accent1"/>
+            </a:effectRef>
+            <a:fontRef idx="minor">
+              <a:schemeClr val="lt1"/>
+            </a:fontRef>
+          </p:style>
+          <p:txBody>
+            <a:bodyPr rtlCol="0" anchor="ctr"/>
+            <a:lstStyle/>
+            <a:p>
+              <a:pPr algn="ctr"/>
+              <a:endParaRPr lang="en-US"/>
+            </a:p>
+          </p:txBody>
+        </p:sp>
+        <p:sp>
+          <p:nvSpPr>
+            <p:cNvPr id="31" name="Rectangle 30">
+              <a:extLst>
+                <a:ext uri="{FF2B5EF4-FFF2-40B4-BE49-F238E27FC236}">
+                  <a16:creationId xmlns:a16="http://schemas.microsoft.com/office/drawing/2014/main" id="{C675B1C4-DC72-4485-8B80-1696BA2E1CD7}"/>
+                </a:ext>
+              </a:extLst>
+            </p:cNvPr>
+            <p:cNvSpPr/>
+            <p:nvPr/>
+          </p:nvSpPr>
+          <p:spPr>
+            <a:xfrm>
+              <a:off x="4923361" y="4507023"/>
+              <a:ext cx="1086131" cy="200340"/>
+            </a:xfrm>
+            <a:prstGeom prst="rect">
+              <a:avLst/>
+            </a:prstGeom>
+            <a:solidFill>
+              <a:schemeClr val="tx1"/>
+            </a:solidFill>
+            <a:ln>
+              <a:noFill/>
+            </a:ln>
+          </p:spPr>
+          <p:style>
+            <a:lnRef idx="2">
+              <a:schemeClr val="accent1">
+                <a:shade val="50000"/>
+              </a:schemeClr>
+            </a:lnRef>
+            <a:fillRef idx="1">
+              <a:schemeClr val="accent1"/>
+            </a:fillRef>
+            <a:effectRef idx="0">
+              <a:schemeClr val="accent1"/>
+            </a:effectRef>
+            <a:fontRef idx="minor">
+              <a:schemeClr val="lt1"/>
+            </a:fontRef>
+          </p:style>
+          <p:txBody>
+            <a:bodyPr rtlCol="0" anchor="ctr"/>
+            <a:lstStyle/>
+            <a:p>
+              <a:pPr algn="ctr"/>
+              <a:endParaRPr lang="en-US"/>
+            </a:p>
+          </p:txBody>
+        </p:sp>
+        <p:sp>
+          <p:nvSpPr>
+            <p:cNvPr id="33" name="Rectangle 32">
+              <a:extLst>
+                <a:ext uri="{FF2B5EF4-FFF2-40B4-BE49-F238E27FC236}">
+                  <a16:creationId xmlns:a16="http://schemas.microsoft.com/office/drawing/2014/main" id="{AB46010B-FA85-4B6F-8846-5B0E5E62F1AF}"/>
+                </a:ext>
+              </a:extLst>
+            </p:cNvPr>
+            <p:cNvSpPr/>
+            <p:nvPr/>
+          </p:nvSpPr>
+          <p:spPr>
+            <a:xfrm>
+              <a:off x="3772999" y="4222273"/>
+              <a:ext cx="1033910" cy="200340"/>
+            </a:xfrm>
+            <a:prstGeom prst="rect">
+              <a:avLst/>
+            </a:prstGeom>
+            <a:solidFill>
+              <a:schemeClr val="tx1"/>
+            </a:solidFill>
+            <a:ln>
+              <a:noFill/>
+            </a:ln>
+          </p:spPr>
+          <p:style>
+            <a:lnRef idx="2">
+              <a:schemeClr val="accent1">
+                <a:shade val="50000"/>
+              </a:schemeClr>
+            </a:lnRef>
+            <a:fillRef idx="1">
+              <a:schemeClr val="accent1"/>
+            </a:fillRef>
+            <a:effectRef idx="0">
+              <a:schemeClr val="accent1"/>
+            </a:effectRef>
+            <a:fontRef idx="minor">
+              <a:schemeClr val="lt1"/>
+            </a:fontRef>
+          </p:style>
+          <p:txBody>
+            <a:bodyPr rtlCol="0" anchor="ctr"/>
+            <a:lstStyle/>
+            <a:p>
+              <a:pPr algn="ctr"/>
+              <a:endParaRPr lang="en-US"/>
+            </a:p>
+          </p:txBody>
+        </p:sp>
+        <p:sp>
+          <p:nvSpPr>
+            <p:cNvPr id="35" name="Rectangle 34">
+              <a:extLst>
+                <a:ext uri="{FF2B5EF4-FFF2-40B4-BE49-F238E27FC236}">
+                  <a16:creationId xmlns:a16="http://schemas.microsoft.com/office/drawing/2014/main" id="{BDB76BDB-E41B-4957-8B61-54BFE68E3F97}"/>
+                </a:ext>
+              </a:extLst>
+            </p:cNvPr>
+            <p:cNvSpPr/>
+            <p:nvPr/>
+          </p:nvSpPr>
+          <p:spPr>
+            <a:xfrm>
+              <a:off x="3772999" y="4497988"/>
+              <a:ext cx="1033910" cy="200340"/>
+            </a:xfrm>
+            <a:prstGeom prst="rect">
+              <a:avLst/>
+            </a:prstGeom>
+            <a:solidFill>
+              <a:schemeClr val="tx1"/>
+            </a:solidFill>
+            <a:ln>
+              <a:noFill/>
+            </a:ln>
+          </p:spPr>
+          <p:style>
+            <a:lnRef idx="2">
+              <a:schemeClr val="accent1">
+                <a:shade val="50000"/>
+              </a:schemeClr>
+            </a:lnRef>
+            <a:fillRef idx="1">
+              <a:schemeClr val="accent1"/>
+            </a:fillRef>
+            <a:effectRef idx="0">
+              <a:schemeClr val="accent1"/>
+            </a:effectRef>
+            <a:fontRef idx="minor">
+              <a:schemeClr val="lt1"/>
+            </a:fontRef>
+          </p:style>
+          <p:txBody>
+            <a:bodyPr rtlCol="0" anchor="ctr"/>
+            <a:lstStyle/>
+            <a:p>
+              <a:pPr algn="ctr"/>
+              <a:endParaRPr lang="en-US"/>
+            </a:p>
+          </p:txBody>
+        </p:sp>
+      </p:grpSp>
     </p:spTree>
     <p:extLst>
       <p:ext uri="{BB962C8B-B14F-4D97-AF65-F5344CB8AC3E}">
-        <p14:creationId xmlns:p14="http://schemas.microsoft.com/office/powerpoint/2010/main" val="3033485251"/>
+        <p14:creationId xmlns:p14="http://schemas.microsoft.com/office/powerpoint/2010/main" val="2531436968"/>
       </p:ext>
     </p:extLst>
   </p:cSld>
@@ -4955,10 +5977,40 @@
           <a:chExt cx="0" cy="0"/>
         </a:xfrm>
       </p:grpSpPr>
+      <p:pic>
+        <p:nvPicPr>
+          <p:cNvPr id="7" name="Picture 6">
+            <a:extLst>
+              <a:ext uri="{FF2B5EF4-FFF2-40B4-BE49-F238E27FC236}">
+                <a16:creationId xmlns:a16="http://schemas.microsoft.com/office/drawing/2014/main" id="{16F6D8F4-6911-440F-9F0E-B8DDE380786A}"/>
+              </a:ext>
+            </a:extLst>
+          </p:cNvPr>
+          <p:cNvPicPr>
+            <a:picLocks noChangeAspect="1"/>
+          </p:cNvPicPr>
+          <p:nvPr/>
+        </p:nvPicPr>
+        <p:blipFill>
+          <a:blip r:embed="rId2"/>
+          <a:stretch>
+            <a:fillRect/>
+          </a:stretch>
+        </p:blipFill>
+        <p:spPr>
+          <a:xfrm>
+            <a:off x="2109787" y="1724025"/>
+            <a:ext cx="7972425" cy="3409950"/>
+          </a:xfrm>
+          <a:prstGeom prst="rect">
+            <a:avLst/>
+          </a:prstGeom>
+        </p:spPr>
+      </p:pic>
     </p:spTree>
     <p:extLst>
       <p:ext uri="{BB962C8B-B14F-4D97-AF65-F5344CB8AC3E}">
-        <p14:creationId xmlns:p14="http://schemas.microsoft.com/office/powerpoint/2010/main" val="3244628056"/>
+        <p14:creationId xmlns:p14="http://schemas.microsoft.com/office/powerpoint/2010/main" val="3033485251"/>
       </p:ext>
     </p:extLst>
   </p:cSld>
@@ -4985,10 +6037,40 @@
           <a:chExt cx="0" cy="0"/>
         </a:xfrm>
       </p:grpSpPr>
+      <p:pic>
+        <p:nvPicPr>
+          <p:cNvPr id="4" name="Picture 3">
+            <a:extLst>
+              <a:ext uri="{FF2B5EF4-FFF2-40B4-BE49-F238E27FC236}">
+                <a16:creationId xmlns:a16="http://schemas.microsoft.com/office/drawing/2014/main" id="{862C303A-E45C-4C47-8C80-5908C1493D6C}"/>
+              </a:ext>
+            </a:extLst>
+          </p:cNvPr>
+          <p:cNvPicPr>
+            <a:picLocks noChangeAspect="1"/>
+          </p:cNvPicPr>
+          <p:nvPr/>
+        </p:nvPicPr>
+        <p:blipFill>
+          <a:blip r:embed="rId2"/>
+          <a:stretch>
+            <a:fillRect/>
+          </a:stretch>
+        </p:blipFill>
+        <p:spPr>
+          <a:xfrm>
+            <a:off x="2800350" y="2105025"/>
+            <a:ext cx="6591300" cy="2647950"/>
+          </a:xfrm>
+          <a:prstGeom prst="rect">
+            <a:avLst/>
+          </a:prstGeom>
+        </p:spPr>
+      </p:pic>
     </p:spTree>
     <p:extLst>
       <p:ext uri="{BB962C8B-B14F-4D97-AF65-F5344CB8AC3E}">
-        <p14:creationId xmlns:p14="http://schemas.microsoft.com/office/powerpoint/2010/main" val="4074301061"/>
+        <p14:creationId xmlns:p14="http://schemas.microsoft.com/office/powerpoint/2010/main" val="3244628056"/>
       </p:ext>
     </p:extLst>
   </p:cSld>
@@ -5015,10 +6097,40 @@
           <a:chExt cx="0" cy="0"/>
         </a:xfrm>
       </p:grpSpPr>
+      <p:pic>
+        <p:nvPicPr>
+          <p:cNvPr id="4" name="Picture 3">
+            <a:extLst>
+              <a:ext uri="{FF2B5EF4-FFF2-40B4-BE49-F238E27FC236}">
+                <a16:creationId xmlns:a16="http://schemas.microsoft.com/office/drawing/2014/main" id="{21A58B69-488E-4681-954E-4AF44AEFE120}"/>
+              </a:ext>
+            </a:extLst>
+          </p:cNvPr>
+          <p:cNvPicPr>
+            <a:picLocks noChangeAspect="1"/>
+          </p:cNvPicPr>
+          <p:nvPr/>
+        </p:nvPicPr>
+        <p:blipFill>
+          <a:blip r:embed="rId2"/>
+          <a:stretch>
+            <a:fillRect/>
+          </a:stretch>
+        </p:blipFill>
+        <p:spPr>
+          <a:xfrm>
+            <a:off x="609600" y="342900"/>
+            <a:ext cx="10972800" cy="6172200"/>
+          </a:xfrm>
+          <a:prstGeom prst="rect">
+            <a:avLst/>
+          </a:prstGeom>
+        </p:spPr>
+      </p:pic>
     </p:spTree>
     <p:extLst>
       <p:ext uri="{BB962C8B-B14F-4D97-AF65-F5344CB8AC3E}">
-        <p14:creationId xmlns:p14="http://schemas.microsoft.com/office/powerpoint/2010/main" val="4278445235"/>
+        <p14:creationId xmlns:p14="http://schemas.microsoft.com/office/powerpoint/2010/main" val="4074301061"/>
       </p:ext>
     </p:extLst>
   </p:cSld>

</xml_diff>

<commit_message>
+~ completing sign up
</commit_message>
<xml_diff>
--- a/imgs/src/step-by-step-imgs.pptx
+++ b/imgs/src/step-by-step-imgs.pptx
@@ -3509,6 +3509,153 @@
           </a:prstGeom>
         </p:spPr>
       </p:pic>
+      <p:sp>
+        <p:nvSpPr>
+          <p:cNvPr id="7" name="Arrow: Up 6">
+            <a:extLst>
+              <a:ext uri="{FF2B5EF4-FFF2-40B4-BE49-F238E27FC236}">
+                <a16:creationId xmlns:a16="http://schemas.microsoft.com/office/drawing/2014/main" id="{B98AB2D3-DC96-4394-A72E-0E587B37D310}"/>
+              </a:ext>
+            </a:extLst>
+          </p:cNvPr>
+          <p:cNvSpPr/>
+          <p:nvPr/>
+        </p:nvSpPr>
+        <p:spPr>
+          <a:xfrm rot="16200000">
+            <a:off x="3677937" y="5614123"/>
+            <a:ext cx="472535" cy="953985"/>
+          </a:xfrm>
+          <a:prstGeom prst="upArrow">
+            <a:avLst>
+              <a:gd name="adj1" fmla="val 50000"/>
+              <a:gd name="adj2" fmla="val 89626"/>
+            </a:avLst>
+          </a:prstGeom>
+          <a:solidFill>
+            <a:srgbClr val="C00000"/>
+          </a:solidFill>
+          <a:ln>
+            <a:noFill/>
+          </a:ln>
+        </p:spPr>
+        <p:style>
+          <a:lnRef idx="0">
+            <a:schemeClr val="accent1"/>
+          </a:lnRef>
+          <a:fillRef idx="3">
+            <a:schemeClr val="accent1"/>
+          </a:fillRef>
+          <a:effectRef idx="3">
+            <a:schemeClr val="accent1"/>
+          </a:effectRef>
+          <a:fontRef idx="minor">
+            <a:schemeClr val="lt1"/>
+          </a:fontRef>
+        </p:style>
+        <p:txBody>
+          <a:bodyPr rtlCol="0" anchor="ctr"/>
+          <a:lstStyle>
+            <a:defPPr>
+              <a:defRPr lang="en-US"/>
+            </a:defPPr>
+            <a:lvl1pPr marL="0" algn="l" defTabSz="914400" rtl="0" eaLnBrk="1" latinLnBrk="0" hangingPunct="1">
+              <a:defRPr sz="1800" kern="1200">
+                <a:solidFill>
+                  <a:schemeClr val="lt1"/>
+                </a:solidFill>
+                <a:latin typeface="+mn-lt"/>
+                <a:ea typeface="+mn-ea"/>
+                <a:cs typeface="+mn-cs"/>
+              </a:defRPr>
+            </a:lvl1pPr>
+            <a:lvl2pPr marL="457200" algn="l" defTabSz="914400" rtl="0" eaLnBrk="1" latinLnBrk="0" hangingPunct="1">
+              <a:defRPr sz="1800" kern="1200">
+                <a:solidFill>
+                  <a:schemeClr val="lt1"/>
+                </a:solidFill>
+                <a:latin typeface="+mn-lt"/>
+                <a:ea typeface="+mn-ea"/>
+                <a:cs typeface="+mn-cs"/>
+              </a:defRPr>
+            </a:lvl2pPr>
+            <a:lvl3pPr marL="914400" algn="l" defTabSz="914400" rtl="0" eaLnBrk="1" latinLnBrk="0" hangingPunct="1">
+              <a:defRPr sz="1800" kern="1200">
+                <a:solidFill>
+                  <a:schemeClr val="lt1"/>
+                </a:solidFill>
+                <a:latin typeface="+mn-lt"/>
+                <a:ea typeface="+mn-ea"/>
+                <a:cs typeface="+mn-cs"/>
+              </a:defRPr>
+            </a:lvl3pPr>
+            <a:lvl4pPr marL="1371600" algn="l" defTabSz="914400" rtl="0" eaLnBrk="1" latinLnBrk="0" hangingPunct="1">
+              <a:defRPr sz="1800" kern="1200">
+                <a:solidFill>
+                  <a:schemeClr val="lt1"/>
+                </a:solidFill>
+                <a:latin typeface="+mn-lt"/>
+                <a:ea typeface="+mn-ea"/>
+                <a:cs typeface="+mn-cs"/>
+              </a:defRPr>
+            </a:lvl4pPr>
+            <a:lvl5pPr marL="1828800" algn="l" defTabSz="914400" rtl="0" eaLnBrk="1" latinLnBrk="0" hangingPunct="1">
+              <a:defRPr sz="1800" kern="1200">
+                <a:solidFill>
+                  <a:schemeClr val="lt1"/>
+                </a:solidFill>
+                <a:latin typeface="+mn-lt"/>
+                <a:ea typeface="+mn-ea"/>
+                <a:cs typeface="+mn-cs"/>
+              </a:defRPr>
+            </a:lvl5pPr>
+            <a:lvl6pPr marL="2286000" algn="l" defTabSz="914400" rtl="0" eaLnBrk="1" latinLnBrk="0" hangingPunct="1">
+              <a:defRPr sz="1800" kern="1200">
+                <a:solidFill>
+                  <a:schemeClr val="lt1"/>
+                </a:solidFill>
+                <a:latin typeface="+mn-lt"/>
+                <a:ea typeface="+mn-ea"/>
+                <a:cs typeface="+mn-cs"/>
+              </a:defRPr>
+            </a:lvl6pPr>
+            <a:lvl7pPr marL="2743200" algn="l" defTabSz="914400" rtl="0" eaLnBrk="1" latinLnBrk="0" hangingPunct="1">
+              <a:defRPr sz="1800" kern="1200">
+                <a:solidFill>
+                  <a:schemeClr val="lt1"/>
+                </a:solidFill>
+                <a:latin typeface="+mn-lt"/>
+                <a:ea typeface="+mn-ea"/>
+                <a:cs typeface="+mn-cs"/>
+              </a:defRPr>
+            </a:lvl7pPr>
+            <a:lvl8pPr marL="3200400" algn="l" defTabSz="914400" rtl="0" eaLnBrk="1" latinLnBrk="0" hangingPunct="1">
+              <a:defRPr sz="1800" kern="1200">
+                <a:solidFill>
+                  <a:schemeClr val="lt1"/>
+                </a:solidFill>
+                <a:latin typeface="+mn-lt"/>
+                <a:ea typeface="+mn-ea"/>
+                <a:cs typeface="+mn-cs"/>
+              </a:defRPr>
+            </a:lvl8pPr>
+            <a:lvl9pPr marL="3657600" algn="l" defTabSz="914400" rtl="0" eaLnBrk="1" latinLnBrk="0" hangingPunct="1">
+              <a:defRPr sz="1800" kern="1200">
+                <a:solidFill>
+                  <a:schemeClr val="lt1"/>
+                </a:solidFill>
+                <a:latin typeface="+mn-lt"/>
+                <a:ea typeface="+mn-ea"/>
+                <a:cs typeface="+mn-cs"/>
+              </a:defRPr>
+            </a:lvl9pPr>
+          </a:lstStyle>
+          <a:p>
+            <a:pPr algn="ctr"/>
+            <a:endParaRPr lang="en-US"/>
+          </a:p>
+        </p:txBody>
+      </p:sp>
     </p:spTree>
     <p:extLst>
       <p:ext uri="{BB962C8B-B14F-4D97-AF65-F5344CB8AC3E}">
@@ -3569,6 +3716,153 @@
           </a:prstGeom>
         </p:spPr>
       </p:pic>
+      <p:sp>
+        <p:nvSpPr>
+          <p:cNvPr id="6" name="Arrow: Up 5">
+            <a:extLst>
+              <a:ext uri="{FF2B5EF4-FFF2-40B4-BE49-F238E27FC236}">
+                <a16:creationId xmlns:a16="http://schemas.microsoft.com/office/drawing/2014/main" id="{C4A6F13E-5410-4301-9CE4-34EB77DC76A4}"/>
+              </a:ext>
+            </a:extLst>
+          </p:cNvPr>
+          <p:cNvSpPr/>
+          <p:nvPr/>
+        </p:nvSpPr>
+        <p:spPr>
+          <a:xfrm rot="16200000">
+            <a:off x="4679283" y="4620918"/>
+            <a:ext cx="472535" cy="953985"/>
+          </a:xfrm>
+          <a:prstGeom prst="upArrow">
+            <a:avLst>
+              <a:gd name="adj1" fmla="val 50000"/>
+              <a:gd name="adj2" fmla="val 89626"/>
+            </a:avLst>
+          </a:prstGeom>
+          <a:solidFill>
+            <a:srgbClr val="C00000"/>
+          </a:solidFill>
+          <a:ln>
+            <a:noFill/>
+          </a:ln>
+        </p:spPr>
+        <p:style>
+          <a:lnRef idx="0">
+            <a:schemeClr val="accent1"/>
+          </a:lnRef>
+          <a:fillRef idx="3">
+            <a:schemeClr val="accent1"/>
+          </a:fillRef>
+          <a:effectRef idx="3">
+            <a:schemeClr val="accent1"/>
+          </a:effectRef>
+          <a:fontRef idx="minor">
+            <a:schemeClr val="lt1"/>
+          </a:fontRef>
+        </p:style>
+        <p:txBody>
+          <a:bodyPr rtlCol="0" anchor="ctr"/>
+          <a:lstStyle>
+            <a:defPPr>
+              <a:defRPr lang="en-US"/>
+            </a:defPPr>
+            <a:lvl1pPr marL="0" algn="l" defTabSz="914400" rtl="0" eaLnBrk="1" latinLnBrk="0" hangingPunct="1">
+              <a:defRPr sz="1800" kern="1200">
+                <a:solidFill>
+                  <a:schemeClr val="lt1"/>
+                </a:solidFill>
+                <a:latin typeface="+mn-lt"/>
+                <a:ea typeface="+mn-ea"/>
+                <a:cs typeface="+mn-cs"/>
+              </a:defRPr>
+            </a:lvl1pPr>
+            <a:lvl2pPr marL="457200" algn="l" defTabSz="914400" rtl="0" eaLnBrk="1" latinLnBrk="0" hangingPunct="1">
+              <a:defRPr sz="1800" kern="1200">
+                <a:solidFill>
+                  <a:schemeClr val="lt1"/>
+                </a:solidFill>
+                <a:latin typeface="+mn-lt"/>
+                <a:ea typeface="+mn-ea"/>
+                <a:cs typeface="+mn-cs"/>
+              </a:defRPr>
+            </a:lvl2pPr>
+            <a:lvl3pPr marL="914400" algn="l" defTabSz="914400" rtl="0" eaLnBrk="1" latinLnBrk="0" hangingPunct="1">
+              <a:defRPr sz="1800" kern="1200">
+                <a:solidFill>
+                  <a:schemeClr val="lt1"/>
+                </a:solidFill>
+                <a:latin typeface="+mn-lt"/>
+                <a:ea typeface="+mn-ea"/>
+                <a:cs typeface="+mn-cs"/>
+              </a:defRPr>
+            </a:lvl3pPr>
+            <a:lvl4pPr marL="1371600" algn="l" defTabSz="914400" rtl="0" eaLnBrk="1" latinLnBrk="0" hangingPunct="1">
+              <a:defRPr sz="1800" kern="1200">
+                <a:solidFill>
+                  <a:schemeClr val="lt1"/>
+                </a:solidFill>
+                <a:latin typeface="+mn-lt"/>
+                <a:ea typeface="+mn-ea"/>
+                <a:cs typeface="+mn-cs"/>
+              </a:defRPr>
+            </a:lvl4pPr>
+            <a:lvl5pPr marL="1828800" algn="l" defTabSz="914400" rtl="0" eaLnBrk="1" latinLnBrk="0" hangingPunct="1">
+              <a:defRPr sz="1800" kern="1200">
+                <a:solidFill>
+                  <a:schemeClr val="lt1"/>
+                </a:solidFill>
+                <a:latin typeface="+mn-lt"/>
+                <a:ea typeface="+mn-ea"/>
+                <a:cs typeface="+mn-cs"/>
+              </a:defRPr>
+            </a:lvl5pPr>
+            <a:lvl6pPr marL="2286000" algn="l" defTabSz="914400" rtl="0" eaLnBrk="1" latinLnBrk="0" hangingPunct="1">
+              <a:defRPr sz="1800" kern="1200">
+                <a:solidFill>
+                  <a:schemeClr val="lt1"/>
+                </a:solidFill>
+                <a:latin typeface="+mn-lt"/>
+                <a:ea typeface="+mn-ea"/>
+                <a:cs typeface="+mn-cs"/>
+              </a:defRPr>
+            </a:lvl6pPr>
+            <a:lvl7pPr marL="2743200" algn="l" defTabSz="914400" rtl="0" eaLnBrk="1" latinLnBrk="0" hangingPunct="1">
+              <a:defRPr sz="1800" kern="1200">
+                <a:solidFill>
+                  <a:schemeClr val="lt1"/>
+                </a:solidFill>
+                <a:latin typeface="+mn-lt"/>
+                <a:ea typeface="+mn-ea"/>
+                <a:cs typeface="+mn-cs"/>
+              </a:defRPr>
+            </a:lvl7pPr>
+            <a:lvl8pPr marL="3200400" algn="l" defTabSz="914400" rtl="0" eaLnBrk="1" latinLnBrk="0" hangingPunct="1">
+              <a:defRPr sz="1800" kern="1200">
+                <a:solidFill>
+                  <a:schemeClr val="lt1"/>
+                </a:solidFill>
+                <a:latin typeface="+mn-lt"/>
+                <a:ea typeface="+mn-ea"/>
+                <a:cs typeface="+mn-cs"/>
+              </a:defRPr>
+            </a:lvl8pPr>
+            <a:lvl9pPr marL="3657600" algn="l" defTabSz="914400" rtl="0" eaLnBrk="1" latinLnBrk="0" hangingPunct="1">
+              <a:defRPr sz="1800" kern="1200">
+                <a:solidFill>
+                  <a:schemeClr val="lt1"/>
+                </a:solidFill>
+                <a:latin typeface="+mn-lt"/>
+                <a:ea typeface="+mn-ea"/>
+                <a:cs typeface="+mn-cs"/>
+              </a:defRPr>
+            </a:lvl9pPr>
+          </a:lstStyle>
+          <a:p>
+            <a:pPr algn="ctr"/>
+            <a:endParaRPr lang="en-US"/>
+          </a:p>
+        </p:txBody>
+      </p:sp>
     </p:spTree>
     <p:extLst>
       <p:ext uri="{BB962C8B-B14F-4D97-AF65-F5344CB8AC3E}">
@@ -3629,6 +3923,153 @@
           </a:prstGeom>
         </p:spPr>
       </p:pic>
+      <p:sp>
+        <p:nvSpPr>
+          <p:cNvPr id="6" name="Arrow: Up 5">
+            <a:extLst>
+              <a:ext uri="{FF2B5EF4-FFF2-40B4-BE49-F238E27FC236}">
+                <a16:creationId xmlns:a16="http://schemas.microsoft.com/office/drawing/2014/main" id="{FB88BD3B-C4AB-4141-8825-E7794F6387E9}"/>
+              </a:ext>
+            </a:extLst>
+          </p:cNvPr>
+          <p:cNvSpPr/>
+          <p:nvPr/>
+        </p:nvSpPr>
+        <p:spPr>
+          <a:xfrm rot="16200000">
+            <a:off x="4166398" y="3383482"/>
+            <a:ext cx="472535" cy="953985"/>
+          </a:xfrm>
+          <a:prstGeom prst="upArrow">
+            <a:avLst>
+              <a:gd name="adj1" fmla="val 50000"/>
+              <a:gd name="adj2" fmla="val 89626"/>
+            </a:avLst>
+          </a:prstGeom>
+          <a:solidFill>
+            <a:srgbClr val="C00000"/>
+          </a:solidFill>
+          <a:ln>
+            <a:noFill/>
+          </a:ln>
+        </p:spPr>
+        <p:style>
+          <a:lnRef idx="0">
+            <a:schemeClr val="accent1"/>
+          </a:lnRef>
+          <a:fillRef idx="3">
+            <a:schemeClr val="accent1"/>
+          </a:fillRef>
+          <a:effectRef idx="3">
+            <a:schemeClr val="accent1"/>
+          </a:effectRef>
+          <a:fontRef idx="minor">
+            <a:schemeClr val="lt1"/>
+          </a:fontRef>
+        </p:style>
+        <p:txBody>
+          <a:bodyPr rtlCol="0" anchor="ctr"/>
+          <a:lstStyle>
+            <a:defPPr>
+              <a:defRPr lang="en-US"/>
+            </a:defPPr>
+            <a:lvl1pPr marL="0" algn="l" defTabSz="914400" rtl="0" eaLnBrk="1" latinLnBrk="0" hangingPunct="1">
+              <a:defRPr sz="1800" kern="1200">
+                <a:solidFill>
+                  <a:schemeClr val="lt1"/>
+                </a:solidFill>
+                <a:latin typeface="+mn-lt"/>
+                <a:ea typeface="+mn-ea"/>
+                <a:cs typeface="+mn-cs"/>
+              </a:defRPr>
+            </a:lvl1pPr>
+            <a:lvl2pPr marL="457200" algn="l" defTabSz="914400" rtl="0" eaLnBrk="1" latinLnBrk="0" hangingPunct="1">
+              <a:defRPr sz="1800" kern="1200">
+                <a:solidFill>
+                  <a:schemeClr val="lt1"/>
+                </a:solidFill>
+                <a:latin typeface="+mn-lt"/>
+                <a:ea typeface="+mn-ea"/>
+                <a:cs typeface="+mn-cs"/>
+              </a:defRPr>
+            </a:lvl2pPr>
+            <a:lvl3pPr marL="914400" algn="l" defTabSz="914400" rtl="0" eaLnBrk="1" latinLnBrk="0" hangingPunct="1">
+              <a:defRPr sz="1800" kern="1200">
+                <a:solidFill>
+                  <a:schemeClr val="lt1"/>
+                </a:solidFill>
+                <a:latin typeface="+mn-lt"/>
+                <a:ea typeface="+mn-ea"/>
+                <a:cs typeface="+mn-cs"/>
+              </a:defRPr>
+            </a:lvl3pPr>
+            <a:lvl4pPr marL="1371600" algn="l" defTabSz="914400" rtl="0" eaLnBrk="1" latinLnBrk="0" hangingPunct="1">
+              <a:defRPr sz="1800" kern="1200">
+                <a:solidFill>
+                  <a:schemeClr val="lt1"/>
+                </a:solidFill>
+                <a:latin typeface="+mn-lt"/>
+                <a:ea typeface="+mn-ea"/>
+                <a:cs typeface="+mn-cs"/>
+              </a:defRPr>
+            </a:lvl4pPr>
+            <a:lvl5pPr marL="1828800" algn="l" defTabSz="914400" rtl="0" eaLnBrk="1" latinLnBrk="0" hangingPunct="1">
+              <a:defRPr sz="1800" kern="1200">
+                <a:solidFill>
+                  <a:schemeClr val="lt1"/>
+                </a:solidFill>
+                <a:latin typeface="+mn-lt"/>
+                <a:ea typeface="+mn-ea"/>
+                <a:cs typeface="+mn-cs"/>
+              </a:defRPr>
+            </a:lvl5pPr>
+            <a:lvl6pPr marL="2286000" algn="l" defTabSz="914400" rtl="0" eaLnBrk="1" latinLnBrk="0" hangingPunct="1">
+              <a:defRPr sz="1800" kern="1200">
+                <a:solidFill>
+                  <a:schemeClr val="lt1"/>
+                </a:solidFill>
+                <a:latin typeface="+mn-lt"/>
+                <a:ea typeface="+mn-ea"/>
+                <a:cs typeface="+mn-cs"/>
+              </a:defRPr>
+            </a:lvl6pPr>
+            <a:lvl7pPr marL="2743200" algn="l" defTabSz="914400" rtl="0" eaLnBrk="1" latinLnBrk="0" hangingPunct="1">
+              <a:defRPr sz="1800" kern="1200">
+                <a:solidFill>
+                  <a:schemeClr val="lt1"/>
+                </a:solidFill>
+                <a:latin typeface="+mn-lt"/>
+                <a:ea typeface="+mn-ea"/>
+                <a:cs typeface="+mn-cs"/>
+              </a:defRPr>
+            </a:lvl7pPr>
+            <a:lvl8pPr marL="3200400" algn="l" defTabSz="914400" rtl="0" eaLnBrk="1" latinLnBrk="0" hangingPunct="1">
+              <a:defRPr sz="1800" kern="1200">
+                <a:solidFill>
+                  <a:schemeClr val="lt1"/>
+                </a:solidFill>
+                <a:latin typeface="+mn-lt"/>
+                <a:ea typeface="+mn-ea"/>
+                <a:cs typeface="+mn-cs"/>
+              </a:defRPr>
+            </a:lvl8pPr>
+            <a:lvl9pPr marL="3657600" algn="l" defTabSz="914400" rtl="0" eaLnBrk="1" latinLnBrk="0" hangingPunct="1">
+              <a:defRPr sz="1800" kern="1200">
+                <a:solidFill>
+                  <a:schemeClr val="lt1"/>
+                </a:solidFill>
+                <a:latin typeface="+mn-lt"/>
+                <a:ea typeface="+mn-ea"/>
+                <a:cs typeface="+mn-cs"/>
+              </a:defRPr>
+            </a:lvl9pPr>
+          </a:lstStyle>
+          <a:p>
+            <a:pPr algn="ctr"/>
+            <a:endParaRPr lang="en-US"/>
+          </a:p>
+        </p:txBody>
+      </p:sp>
     </p:spTree>
     <p:extLst>
       <p:ext uri="{BB962C8B-B14F-4D97-AF65-F5344CB8AC3E}">
@@ -3659,6 +4100,183 @@
           <a:chExt cx="0" cy="0"/>
         </a:xfrm>
       </p:grpSpPr>
+      <p:pic>
+        <p:nvPicPr>
+          <p:cNvPr id="4" name="Picture 3">
+            <a:extLst>
+              <a:ext uri="{FF2B5EF4-FFF2-40B4-BE49-F238E27FC236}">
+                <a16:creationId xmlns:a16="http://schemas.microsoft.com/office/drawing/2014/main" id="{6D1C090B-14B5-4834-9A97-0BA6E5C2EB9E}"/>
+              </a:ext>
+            </a:extLst>
+          </p:cNvPr>
+          <p:cNvPicPr>
+            <a:picLocks noChangeAspect="1"/>
+          </p:cNvPicPr>
+          <p:nvPr/>
+        </p:nvPicPr>
+        <p:blipFill>
+          <a:blip r:embed="rId2"/>
+          <a:stretch>
+            <a:fillRect/>
+          </a:stretch>
+        </p:blipFill>
+        <p:spPr>
+          <a:xfrm>
+            <a:off x="776287" y="904875"/>
+            <a:ext cx="10639425" cy="5048250"/>
+          </a:xfrm>
+          <a:prstGeom prst="rect">
+            <a:avLst/>
+          </a:prstGeom>
+        </p:spPr>
+      </p:pic>
+      <p:sp>
+        <p:nvSpPr>
+          <p:cNvPr id="6" name="Arrow: Up 5">
+            <a:extLst>
+              <a:ext uri="{FF2B5EF4-FFF2-40B4-BE49-F238E27FC236}">
+                <a16:creationId xmlns:a16="http://schemas.microsoft.com/office/drawing/2014/main" id="{4D5708EA-73B1-4DEC-9018-3BF09B7AA8D9}"/>
+              </a:ext>
+            </a:extLst>
+          </p:cNvPr>
+          <p:cNvSpPr/>
+          <p:nvPr/>
+        </p:nvSpPr>
+        <p:spPr>
+          <a:xfrm rot="16200000">
+            <a:off x="3596527" y="3538162"/>
+            <a:ext cx="472535" cy="953985"/>
+          </a:xfrm>
+          <a:prstGeom prst="upArrow">
+            <a:avLst>
+              <a:gd name="adj1" fmla="val 50000"/>
+              <a:gd name="adj2" fmla="val 89626"/>
+            </a:avLst>
+          </a:prstGeom>
+          <a:solidFill>
+            <a:srgbClr val="C00000"/>
+          </a:solidFill>
+          <a:ln>
+            <a:noFill/>
+          </a:ln>
+        </p:spPr>
+        <p:style>
+          <a:lnRef idx="0">
+            <a:schemeClr val="accent1"/>
+          </a:lnRef>
+          <a:fillRef idx="3">
+            <a:schemeClr val="accent1"/>
+          </a:fillRef>
+          <a:effectRef idx="3">
+            <a:schemeClr val="accent1"/>
+          </a:effectRef>
+          <a:fontRef idx="minor">
+            <a:schemeClr val="lt1"/>
+          </a:fontRef>
+        </p:style>
+        <p:txBody>
+          <a:bodyPr rtlCol="0" anchor="ctr"/>
+          <a:lstStyle>
+            <a:defPPr>
+              <a:defRPr lang="en-US"/>
+            </a:defPPr>
+            <a:lvl1pPr marL="0" algn="l" defTabSz="914400" rtl="0" eaLnBrk="1" latinLnBrk="0" hangingPunct="1">
+              <a:defRPr sz="1800" kern="1200">
+                <a:solidFill>
+                  <a:schemeClr val="lt1"/>
+                </a:solidFill>
+                <a:latin typeface="+mn-lt"/>
+                <a:ea typeface="+mn-ea"/>
+                <a:cs typeface="+mn-cs"/>
+              </a:defRPr>
+            </a:lvl1pPr>
+            <a:lvl2pPr marL="457200" algn="l" defTabSz="914400" rtl="0" eaLnBrk="1" latinLnBrk="0" hangingPunct="1">
+              <a:defRPr sz="1800" kern="1200">
+                <a:solidFill>
+                  <a:schemeClr val="lt1"/>
+                </a:solidFill>
+                <a:latin typeface="+mn-lt"/>
+                <a:ea typeface="+mn-ea"/>
+                <a:cs typeface="+mn-cs"/>
+              </a:defRPr>
+            </a:lvl2pPr>
+            <a:lvl3pPr marL="914400" algn="l" defTabSz="914400" rtl="0" eaLnBrk="1" latinLnBrk="0" hangingPunct="1">
+              <a:defRPr sz="1800" kern="1200">
+                <a:solidFill>
+                  <a:schemeClr val="lt1"/>
+                </a:solidFill>
+                <a:latin typeface="+mn-lt"/>
+                <a:ea typeface="+mn-ea"/>
+                <a:cs typeface="+mn-cs"/>
+              </a:defRPr>
+            </a:lvl3pPr>
+            <a:lvl4pPr marL="1371600" algn="l" defTabSz="914400" rtl="0" eaLnBrk="1" latinLnBrk="0" hangingPunct="1">
+              <a:defRPr sz="1800" kern="1200">
+                <a:solidFill>
+                  <a:schemeClr val="lt1"/>
+                </a:solidFill>
+                <a:latin typeface="+mn-lt"/>
+                <a:ea typeface="+mn-ea"/>
+                <a:cs typeface="+mn-cs"/>
+              </a:defRPr>
+            </a:lvl4pPr>
+            <a:lvl5pPr marL="1828800" algn="l" defTabSz="914400" rtl="0" eaLnBrk="1" latinLnBrk="0" hangingPunct="1">
+              <a:defRPr sz="1800" kern="1200">
+                <a:solidFill>
+                  <a:schemeClr val="lt1"/>
+                </a:solidFill>
+                <a:latin typeface="+mn-lt"/>
+                <a:ea typeface="+mn-ea"/>
+                <a:cs typeface="+mn-cs"/>
+              </a:defRPr>
+            </a:lvl5pPr>
+            <a:lvl6pPr marL="2286000" algn="l" defTabSz="914400" rtl="0" eaLnBrk="1" latinLnBrk="0" hangingPunct="1">
+              <a:defRPr sz="1800" kern="1200">
+                <a:solidFill>
+                  <a:schemeClr val="lt1"/>
+                </a:solidFill>
+                <a:latin typeface="+mn-lt"/>
+                <a:ea typeface="+mn-ea"/>
+                <a:cs typeface="+mn-cs"/>
+              </a:defRPr>
+            </a:lvl6pPr>
+            <a:lvl7pPr marL="2743200" algn="l" defTabSz="914400" rtl="0" eaLnBrk="1" latinLnBrk="0" hangingPunct="1">
+              <a:defRPr sz="1800" kern="1200">
+                <a:solidFill>
+                  <a:schemeClr val="lt1"/>
+                </a:solidFill>
+                <a:latin typeface="+mn-lt"/>
+                <a:ea typeface="+mn-ea"/>
+                <a:cs typeface="+mn-cs"/>
+              </a:defRPr>
+            </a:lvl7pPr>
+            <a:lvl8pPr marL="3200400" algn="l" defTabSz="914400" rtl="0" eaLnBrk="1" latinLnBrk="0" hangingPunct="1">
+              <a:defRPr sz="1800" kern="1200">
+                <a:solidFill>
+                  <a:schemeClr val="lt1"/>
+                </a:solidFill>
+                <a:latin typeface="+mn-lt"/>
+                <a:ea typeface="+mn-ea"/>
+                <a:cs typeface="+mn-cs"/>
+              </a:defRPr>
+            </a:lvl8pPr>
+            <a:lvl9pPr marL="3657600" algn="l" defTabSz="914400" rtl="0" eaLnBrk="1" latinLnBrk="0" hangingPunct="1">
+              <a:defRPr sz="1800" kern="1200">
+                <a:solidFill>
+                  <a:schemeClr val="lt1"/>
+                </a:solidFill>
+                <a:latin typeface="+mn-lt"/>
+                <a:ea typeface="+mn-ea"/>
+                <a:cs typeface="+mn-cs"/>
+              </a:defRPr>
+            </a:lvl9pPr>
+          </a:lstStyle>
+          <a:p>
+            <a:pPr algn="ctr"/>
+            <a:endParaRPr lang="en-US"/>
+          </a:p>
+        </p:txBody>
+      </p:sp>
     </p:spTree>
     <p:extLst>
       <p:ext uri="{BB962C8B-B14F-4D97-AF65-F5344CB8AC3E}">
@@ -3689,6 +4307,260 @@
           <a:chExt cx="0" cy="0"/>
         </a:xfrm>
       </p:grpSpPr>
+      <p:pic>
+        <p:nvPicPr>
+          <p:cNvPr id="4" name="Picture 3">
+            <a:extLst>
+              <a:ext uri="{FF2B5EF4-FFF2-40B4-BE49-F238E27FC236}">
+                <a16:creationId xmlns:a16="http://schemas.microsoft.com/office/drawing/2014/main" id="{5F19284C-DD83-4933-8AB4-47C993A703E9}"/>
+              </a:ext>
+            </a:extLst>
+          </p:cNvPr>
+          <p:cNvPicPr>
+            <a:picLocks noChangeAspect="1"/>
+          </p:cNvPicPr>
+          <p:nvPr/>
+        </p:nvPicPr>
+        <p:blipFill>
+          <a:blip r:embed="rId2"/>
+          <a:stretch>
+            <a:fillRect/>
+          </a:stretch>
+        </p:blipFill>
+        <p:spPr>
+          <a:xfrm>
+            <a:off x="1162050" y="804862"/>
+            <a:ext cx="9867900" cy="5248275"/>
+          </a:xfrm>
+          <a:prstGeom prst="rect">
+            <a:avLst/>
+          </a:prstGeom>
+        </p:spPr>
+      </p:pic>
+      <p:sp>
+        <p:nvSpPr>
+          <p:cNvPr id="8" name="Rectangle 7">
+            <a:extLst>
+              <a:ext uri="{FF2B5EF4-FFF2-40B4-BE49-F238E27FC236}">
+                <a16:creationId xmlns:a16="http://schemas.microsoft.com/office/drawing/2014/main" id="{06883479-CC85-4E2E-8048-649AB39DD082}"/>
+              </a:ext>
+            </a:extLst>
+          </p:cNvPr>
+          <p:cNvSpPr/>
+          <p:nvPr/>
+        </p:nvSpPr>
+        <p:spPr>
+          <a:xfrm>
+            <a:off x="3566123" y="5433165"/>
+            <a:ext cx="5328478" cy="544633"/>
+          </a:xfrm>
+          <a:prstGeom prst="rect">
+            <a:avLst/>
+          </a:prstGeom>
+          <a:solidFill>
+            <a:schemeClr val="bg1"/>
+          </a:solidFill>
+          <a:ln/>
+        </p:spPr>
+        <p:style>
+          <a:lnRef idx="0">
+            <a:schemeClr val="dk1"/>
+          </a:lnRef>
+          <a:fillRef idx="3">
+            <a:schemeClr val="dk1"/>
+          </a:fillRef>
+          <a:effectRef idx="3">
+            <a:schemeClr val="dk1"/>
+          </a:effectRef>
+          <a:fontRef idx="minor">
+            <a:schemeClr val="lt1"/>
+          </a:fontRef>
+        </p:style>
+        <p:txBody>
+          <a:bodyPr rtlCol="0" anchor="ctr"/>
+          <a:lstStyle/>
+          <a:p>
+            <a:pPr algn="ctr"/>
+            <a:endParaRPr lang="en-US"/>
+          </a:p>
+        </p:txBody>
+      </p:sp>
+      <p:pic>
+        <p:nvPicPr>
+          <p:cNvPr id="7" name="Picture 6">
+            <a:extLst>
+              <a:ext uri="{FF2B5EF4-FFF2-40B4-BE49-F238E27FC236}">
+                <a16:creationId xmlns:a16="http://schemas.microsoft.com/office/drawing/2014/main" id="{F8EAFADD-BF02-44AD-B962-C406EB44AE65}"/>
+              </a:ext>
+            </a:extLst>
+          </p:cNvPr>
+          <p:cNvPicPr>
+            <a:picLocks noChangeAspect="1"/>
+          </p:cNvPicPr>
+          <p:nvPr/>
+        </p:nvPicPr>
+        <p:blipFill rotWithShape="1">
+          <a:blip r:embed="rId3"/>
+          <a:srcRect l="9402" t="48119" r="9658" b="17095"/>
+          <a:stretch/>
+        </p:blipFill>
+        <p:spPr>
+          <a:xfrm>
+            <a:off x="3715647" y="5539811"/>
+            <a:ext cx="770956" cy="331340"/>
+          </a:xfrm>
+          <a:prstGeom prst="rect">
+            <a:avLst/>
+          </a:prstGeom>
+        </p:spPr>
+      </p:pic>
+      <p:sp>
+        <p:nvSpPr>
+          <p:cNvPr id="10" name="Arrow: Up 9">
+            <a:extLst>
+              <a:ext uri="{FF2B5EF4-FFF2-40B4-BE49-F238E27FC236}">
+                <a16:creationId xmlns:a16="http://schemas.microsoft.com/office/drawing/2014/main" id="{CE87367B-FAAB-41C4-B00C-E9F543F87095}"/>
+              </a:ext>
+            </a:extLst>
+          </p:cNvPr>
+          <p:cNvSpPr/>
+          <p:nvPr/>
+        </p:nvSpPr>
+        <p:spPr>
+          <a:xfrm rot="16200000">
+            <a:off x="4848477" y="5228488"/>
+            <a:ext cx="472535" cy="953985"/>
+          </a:xfrm>
+          <a:prstGeom prst="upArrow">
+            <a:avLst>
+              <a:gd name="adj1" fmla="val 50000"/>
+              <a:gd name="adj2" fmla="val 89626"/>
+            </a:avLst>
+          </a:prstGeom>
+          <a:solidFill>
+            <a:srgbClr val="C00000"/>
+          </a:solidFill>
+          <a:ln>
+            <a:noFill/>
+          </a:ln>
+        </p:spPr>
+        <p:style>
+          <a:lnRef idx="0">
+            <a:schemeClr val="accent1"/>
+          </a:lnRef>
+          <a:fillRef idx="3">
+            <a:schemeClr val="accent1"/>
+          </a:fillRef>
+          <a:effectRef idx="3">
+            <a:schemeClr val="accent1"/>
+          </a:effectRef>
+          <a:fontRef idx="minor">
+            <a:schemeClr val="lt1"/>
+          </a:fontRef>
+        </p:style>
+        <p:txBody>
+          <a:bodyPr rtlCol="0" anchor="ctr"/>
+          <a:lstStyle>
+            <a:defPPr>
+              <a:defRPr lang="en-US"/>
+            </a:defPPr>
+            <a:lvl1pPr marL="0" algn="l" defTabSz="914400" rtl="0" eaLnBrk="1" latinLnBrk="0" hangingPunct="1">
+              <a:defRPr sz="1800" kern="1200">
+                <a:solidFill>
+                  <a:schemeClr val="lt1"/>
+                </a:solidFill>
+                <a:latin typeface="+mn-lt"/>
+                <a:ea typeface="+mn-ea"/>
+                <a:cs typeface="+mn-cs"/>
+              </a:defRPr>
+            </a:lvl1pPr>
+            <a:lvl2pPr marL="457200" algn="l" defTabSz="914400" rtl="0" eaLnBrk="1" latinLnBrk="0" hangingPunct="1">
+              <a:defRPr sz="1800" kern="1200">
+                <a:solidFill>
+                  <a:schemeClr val="lt1"/>
+                </a:solidFill>
+                <a:latin typeface="+mn-lt"/>
+                <a:ea typeface="+mn-ea"/>
+                <a:cs typeface="+mn-cs"/>
+              </a:defRPr>
+            </a:lvl2pPr>
+            <a:lvl3pPr marL="914400" algn="l" defTabSz="914400" rtl="0" eaLnBrk="1" latinLnBrk="0" hangingPunct="1">
+              <a:defRPr sz="1800" kern="1200">
+                <a:solidFill>
+                  <a:schemeClr val="lt1"/>
+                </a:solidFill>
+                <a:latin typeface="+mn-lt"/>
+                <a:ea typeface="+mn-ea"/>
+                <a:cs typeface="+mn-cs"/>
+              </a:defRPr>
+            </a:lvl3pPr>
+            <a:lvl4pPr marL="1371600" algn="l" defTabSz="914400" rtl="0" eaLnBrk="1" latinLnBrk="0" hangingPunct="1">
+              <a:defRPr sz="1800" kern="1200">
+                <a:solidFill>
+                  <a:schemeClr val="lt1"/>
+                </a:solidFill>
+                <a:latin typeface="+mn-lt"/>
+                <a:ea typeface="+mn-ea"/>
+                <a:cs typeface="+mn-cs"/>
+              </a:defRPr>
+            </a:lvl4pPr>
+            <a:lvl5pPr marL="1828800" algn="l" defTabSz="914400" rtl="0" eaLnBrk="1" latinLnBrk="0" hangingPunct="1">
+              <a:defRPr sz="1800" kern="1200">
+                <a:solidFill>
+                  <a:schemeClr val="lt1"/>
+                </a:solidFill>
+                <a:latin typeface="+mn-lt"/>
+                <a:ea typeface="+mn-ea"/>
+                <a:cs typeface="+mn-cs"/>
+              </a:defRPr>
+            </a:lvl5pPr>
+            <a:lvl6pPr marL="2286000" algn="l" defTabSz="914400" rtl="0" eaLnBrk="1" latinLnBrk="0" hangingPunct="1">
+              <a:defRPr sz="1800" kern="1200">
+                <a:solidFill>
+                  <a:schemeClr val="lt1"/>
+                </a:solidFill>
+                <a:latin typeface="+mn-lt"/>
+                <a:ea typeface="+mn-ea"/>
+                <a:cs typeface="+mn-cs"/>
+              </a:defRPr>
+            </a:lvl6pPr>
+            <a:lvl7pPr marL="2743200" algn="l" defTabSz="914400" rtl="0" eaLnBrk="1" latinLnBrk="0" hangingPunct="1">
+              <a:defRPr sz="1800" kern="1200">
+                <a:solidFill>
+                  <a:schemeClr val="lt1"/>
+                </a:solidFill>
+                <a:latin typeface="+mn-lt"/>
+                <a:ea typeface="+mn-ea"/>
+                <a:cs typeface="+mn-cs"/>
+              </a:defRPr>
+            </a:lvl7pPr>
+            <a:lvl8pPr marL="3200400" algn="l" defTabSz="914400" rtl="0" eaLnBrk="1" latinLnBrk="0" hangingPunct="1">
+              <a:defRPr sz="1800" kern="1200">
+                <a:solidFill>
+                  <a:schemeClr val="lt1"/>
+                </a:solidFill>
+                <a:latin typeface="+mn-lt"/>
+                <a:ea typeface="+mn-ea"/>
+                <a:cs typeface="+mn-cs"/>
+              </a:defRPr>
+            </a:lvl8pPr>
+            <a:lvl9pPr marL="3657600" algn="l" defTabSz="914400" rtl="0" eaLnBrk="1" latinLnBrk="0" hangingPunct="1">
+              <a:defRPr sz="1800" kern="1200">
+                <a:solidFill>
+                  <a:schemeClr val="lt1"/>
+                </a:solidFill>
+                <a:latin typeface="+mn-lt"/>
+                <a:ea typeface="+mn-ea"/>
+                <a:cs typeface="+mn-cs"/>
+              </a:defRPr>
+            </a:lvl9pPr>
+          </a:lstStyle>
+          <a:p>
+            <a:pPr algn="ctr"/>
+            <a:endParaRPr lang="en-US"/>
+          </a:p>
+        </p:txBody>
+      </p:sp>
     </p:spTree>
     <p:extLst>
       <p:ext uri="{BB962C8B-B14F-4D97-AF65-F5344CB8AC3E}">
@@ -3719,6 +4591,36 @@
           <a:chExt cx="0" cy="0"/>
         </a:xfrm>
       </p:grpSpPr>
+      <p:pic>
+        <p:nvPicPr>
+          <p:cNvPr id="4" name="Picture 3">
+            <a:extLst>
+              <a:ext uri="{FF2B5EF4-FFF2-40B4-BE49-F238E27FC236}">
+                <a16:creationId xmlns:a16="http://schemas.microsoft.com/office/drawing/2014/main" id="{AE2B99B1-4536-4169-9FDF-9F2F04E47CD8}"/>
+              </a:ext>
+            </a:extLst>
+          </p:cNvPr>
+          <p:cNvPicPr>
+            <a:picLocks noChangeAspect="1"/>
+          </p:cNvPicPr>
+          <p:nvPr/>
+        </p:nvPicPr>
+        <p:blipFill>
+          <a:blip r:embed="rId2"/>
+          <a:stretch>
+            <a:fillRect/>
+          </a:stretch>
+        </p:blipFill>
+        <p:spPr>
+          <a:xfrm>
+            <a:off x="609600" y="342900"/>
+            <a:ext cx="10972800" cy="6172200"/>
+          </a:xfrm>
+          <a:prstGeom prst="rect">
+            <a:avLst/>
+          </a:prstGeom>
+        </p:spPr>
+      </p:pic>
     </p:spTree>
     <p:extLst>
       <p:ext uri="{BB962C8B-B14F-4D97-AF65-F5344CB8AC3E}">

</xml_diff>

<commit_message>
+~ going to office portal
</commit_message>
<xml_diff>
--- a/imgs/src/step-by-step-imgs.pptx
+++ b/imgs/src/step-by-step-imgs.pptx
@@ -19,12 +19,12 @@
     <p:sldId id="268" r:id="rId13"/>
     <p:sldId id="269" r:id="rId14"/>
     <p:sldId id="270" r:id="rId15"/>
-    <p:sldId id="271" r:id="rId16"/>
-    <p:sldId id="272" r:id="rId17"/>
-    <p:sldId id="273" r:id="rId18"/>
-    <p:sldId id="274" r:id="rId19"/>
-    <p:sldId id="275" r:id="rId20"/>
-    <p:sldId id="276" r:id="rId21"/>
+    <p:sldId id="273" r:id="rId16"/>
+    <p:sldId id="274" r:id="rId17"/>
+    <p:sldId id="275" r:id="rId18"/>
+    <p:sldId id="276" r:id="rId19"/>
+    <p:sldId id="271" r:id="rId20"/>
+    <p:sldId id="272" r:id="rId21"/>
     <p:sldId id="277" r:id="rId22"/>
     <p:sldId id="278" r:id="rId23"/>
     <p:sldId id="279" r:id="rId24"/>
@@ -4596,6 +4596,352 @@
           <p:cNvPr id="4" name="Picture 3">
             <a:extLst>
               <a:ext uri="{FF2B5EF4-FFF2-40B4-BE49-F238E27FC236}">
+                <a16:creationId xmlns:a16="http://schemas.microsoft.com/office/drawing/2014/main" id="{7D13E03E-EFEE-4FE5-A4C5-4FC199A711E0}"/>
+              </a:ext>
+            </a:extLst>
+          </p:cNvPr>
+          <p:cNvPicPr>
+            <a:picLocks noChangeAspect="1"/>
+          </p:cNvPicPr>
+          <p:nvPr/>
+        </p:nvPicPr>
+        <p:blipFill>
+          <a:blip r:embed="rId2"/>
+          <a:stretch>
+            <a:fillRect/>
+          </a:stretch>
+        </p:blipFill>
+        <p:spPr>
+          <a:xfrm>
+            <a:off x="-1238250" y="-347662"/>
+            <a:ext cx="14668500" cy="7553325"/>
+          </a:xfrm>
+          <a:prstGeom prst="rect">
+            <a:avLst/>
+          </a:prstGeom>
+        </p:spPr>
+      </p:pic>
+      <p:sp>
+        <p:nvSpPr>
+          <p:cNvPr id="6" name="Arrow: Up 5">
+            <a:extLst>
+              <a:ext uri="{FF2B5EF4-FFF2-40B4-BE49-F238E27FC236}">
+                <a16:creationId xmlns:a16="http://schemas.microsoft.com/office/drawing/2014/main" id="{A743BB4F-32F6-4A13-831C-BB7EFF85E65E}"/>
+              </a:ext>
+            </a:extLst>
+          </p:cNvPr>
+          <p:cNvSpPr/>
+          <p:nvPr/>
+        </p:nvSpPr>
+        <p:spPr>
+          <a:xfrm rot="16200000">
+            <a:off x="7874450" y="2133780"/>
+            <a:ext cx="802133" cy="1619399"/>
+          </a:xfrm>
+          <a:prstGeom prst="upArrow">
+            <a:avLst>
+              <a:gd name="adj1" fmla="val 50000"/>
+              <a:gd name="adj2" fmla="val 89626"/>
+            </a:avLst>
+          </a:prstGeom>
+          <a:solidFill>
+            <a:srgbClr val="C00000"/>
+          </a:solidFill>
+          <a:ln>
+            <a:noFill/>
+          </a:ln>
+        </p:spPr>
+        <p:style>
+          <a:lnRef idx="0">
+            <a:schemeClr val="accent1"/>
+          </a:lnRef>
+          <a:fillRef idx="3">
+            <a:schemeClr val="accent1"/>
+          </a:fillRef>
+          <a:effectRef idx="3">
+            <a:schemeClr val="accent1"/>
+          </a:effectRef>
+          <a:fontRef idx="minor">
+            <a:schemeClr val="lt1"/>
+          </a:fontRef>
+        </p:style>
+        <p:txBody>
+          <a:bodyPr rtlCol="0" anchor="ctr"/>
+          <a:lstStyle/>
+          <a:p>
+            <a:pPr algn="ctr"/>
+            <a:endParaRPr lang="en-US" sz="2800" b="1" dirty="0">
+              <a:latin typeface="Segoe UI" panose="020B0502040204020203" pitchFamily="34" charset="0"/>
+              <a:cs typeface="Segoe UI" panose="020B0502040204020203" pitchFamily="34" charset="0"/>
+            </a:endParaRPr>
+          </a:p>
+        </p:txBody>
+      </p:sp>
+      <p:sp>
+        <p:nvSpPr>
+          <p:cNvPr id="8" name="TextBox 7">
+            <a:extLst>
+              <a:ext uri="{FF2B5EF4-FFF2-40B4-BE49-F238E27FC236}">
+                <a16:creationId xmlns:a16="http://schemas.microsoft.com/office/drawing/2014/main" id="{B47EFCD5-64D3-4465-8CFE-A03C147A20AE}"/>
+              </a:ext>
+            </a:extLst>
+          </p:cNvPr>
+          <p:cNvSpPr txBox="1"/>
+          <p:nvPr/>
+        </p:nvSpPr>
+        <p:spPr>
+          <a:xfrm>
+            <a:off x="8131736" y="2673728"/>
+            <a:ext cx="290319" cy="523220"/>
+          </a:xfrm>
+          <a:prstGeom prst="rect">
+            <a:avLst/>
+          </a:prstGeom>
+          <a:noFill/>
+        </p:spPr>
+        <p:txBody>
+          <a:bodyPr wrap="square" rtlCol="0">
+            <a:spAutoFit/>
+          </a:bodyPr>
+          <a:lstStyle/>
+          <a:p>
+            <a:pPr algn="l"/>
+            <a:r>
+              <a:rPr lang="en-US" sz="2800" b="1" dirty="0">
+                <a:solidFill>
+                  <a:schemeClr val="bg1"/>
+                </a:solidFill>
+                <a:latin typeface="Segoe UI" panose="020B0502040204020203" pitchFamily="34" charset="0"/>
+                <a:cs typeface="Segoe UI" panose="020B0502040204020203" pitchFamily="34" charset="0"/>
+              </a:rPr>
+              <a:t>A</a:t>
+            </a:r>
+          </a:p>
+        </p:txBody>
+      </p:sp>
+      <p:sp>
+        <p:nvSpPr>
+          <p:cNvPr id="10" name="Arrow: Up 9">
+            <a:extLst>
+              <a:ext uri="{FF2B5EF4-FFF2-40B4-BE49-F238E27FC236}">
+                <a16:creationId xmlns:a16="http://schemas.microsoft.com/office/drawing/2014/main" id="{909B79A6-75A7-4147-88D4-1AFD96F878E8}"/>
+              </a:ext>
+            </a:extLst>
+          </p:cNvPr>
+          <p:cNvSpPr/>
+          <p:nvPr/>
+        </p:nvSpPr>
+        <p:spPr>
+          <a:xfrm rot="16200000">
+            <a:off x="1384230" y="5746595"/>
+            <a:ext cx="802133" cy="1619399"/>
+          </a:xfrm>
+          <a:prstGeom prst="upArrow">
+            <a:avLst>
+              <a:gd name="adj1" fmla="val 50000"/>
+              <a:gd name="adj2" fmla="val 89626"/>
+            </a:avLst>
+          </a:prstGeom>
+          <a:solidFill>
+            <a:srgbClr val="C00000"/>
+          </a:solidFill>
+          <a:ln>
+            <a:noFill/>
+          </a:ln>
+        </p:spPr>
+        <p:style>
+          <a:lnRef idx="0">
+            <a:schemeClr val="accent1"/>
+          </a:lnRef>
+          <a:fillRef idx="3">
+            <a:schemeClr val="accent1"/>
+          </a:fillRef>
+          <a:effectRef idx="3">
+            <a:schemeClr val="accent1"/>
+          </a:effectRef>
+          <a:fontRef idx="minor">
+            <a:schemeClr val="lt1"/>
+          </a:fontRef>
+        </p:style>
+        <p:txBody>
+          <a:bodyPr rtlCol="0" anchor="ctr"/>
+          <a:lstStyle/>
+          <a:p>
+            <a:pPr algn="ctr"/>
+            <a:endParaRPr lang="en-US" sz="2800" b="1" dirty="0">
+              <a:latin typeface="Segoe UI" panose="020B0502040204020203" pitchFamily="34" charset="0"/>
+              <a:cs typeface="Segoe UI" panose="020B0502040204020203" pitchFamily="34" charset="0"/>
+            </a:endParaRPr>
+          </a:p>
+        </p:txBody>
+      </p:sp>
+      <p:sp>
+        <p:nvSpPr>
+          <p:cNvPr id="12" name="TextBox 11">
+            <a:extLst>
+              <a:ext uri="{FF2B5EF4-FFF2-40B4-BE49-F238E27FC236}">
+                <a16:creationId xmlns:a16="http://schemas.microsoft.com/office/drawing/2014/main" id="{5DAE240E-7A89-4817-A068-D74CF4A87FAC}"/>
+              </a:ext>
+            </a:extLst>
+          </p:cNvPr>
+          <p:cNvSpPr txBox="1"/>
+          <p:nvPr/>
+        </p:nvSpPr>
+        <p:spPr>
+          <a:xfrm>
+            <a:off x="1641516" y="6286543"/>
+            <a:ext cx="290319" cy="523220"/>
+          </a:xfrm>
+          <a:prstGeom prst="rect">
+            <a:avLst/>
+          </a:prstGeom>
+          <a:noFill/>
+        </p:spPr>
+        <p:txBody>
+          <a:bodyPr wrap="square" rtlCol="0">
+            <a:spAutoFit/>
+          </a:bodyPr>
+          <a:lstStyle/>
+          <a:p>
+            <a:pPr algn="l"/>
+            <a:r>
+              <a:rPr lang="en-US" sz="2800" b="1" dirty="0">
+                <a:solidFill>
+                  <a:schemeClr val="bg1"/>
+                </a:solidFill>
+                <a:latin typeface="Segoe UI" panose="020B0502040204020203" pitchFamily="34" charset="0"/>
+                <a:cs typeface="Segoe UI" panose="020B0502040204020203" pitchFamily="34" charset="0"/>
+              </a:rPr>
+              <a:t>B</a:t>
+            </a:r>
+          </a:p>
+        </p:txBody>
+      </p:sp>
+    </p:spTree>
+    <p:extLst>
+      <p:ext uri="{BB962C8B-B14F-4D97-AF65-F5344CB8AC3E}">
+        <p14:creationId xmlns:p14="http://schemas.microsoft.com/office/powerpoint/2010/main" val="526848501"/>
+      </p:ext>
+    </p:extLst>
+  </p:cSld>
+  <p:clrMapOvr>
+    <a:masterClrMapping/>
+  </p:clrMapOvr>
+</p:sld>
+</file>
+
+<file path=ppt/slides/slide16.xml><?xml version="1.0" encoding="utf-8"?>
+<p:sld xmlns:a="http://schemas.openxmlformats.org/drawingml/2006/main" xmlns:r="http://schemas.openxmlformats.org/officeDocument/2006/relationships" xmlns:p="http://schemas.openxmlformats.org/presentationml/2006/main">
+  <p:cSld>
+    <p:spTree>
+      <p:nvGrpSpPr>
+        <p:cNvPr id="1" name=""/>
+        <p:cNvGrpSpPr/>
+        <p:nvPr/>
+      </p:nvGrpSpPr>
+      <p:grpSpPr>
+        <a:xfrm>
+          <a:off x="0" y="0"/>
+          <a:ext cx="0" cy="0"/>
+          <a:chOff x="0" y="0"/>
+          <a:chExt cx="0" cy="0"/>
+        </a:xfrm>
+      </p:grpSpPr>
+    </p:spTree>
+    <p:extLst>
+      <p:ext uri="{BB962C8B-B14F-4D97-AF65-F5344CB8AC3E}">
+        <p14:creationId xmlns:p14="http://schemas.microsoft.com/office/powerpoint/2010/main" val="1827399890"/>
+      </p:ext>
+    </p:extLst>
+  </p:cSld>
+  <p:clrMapOvr>
+    <a:masterClrMapping/>
+  </p:clrMapOvr>
+</p:sld>
+</file>
+
+<file path=ppt/slides/slide17.xml><?xml version="1.0" encoding="utf-8"?>
+<p:sld xmlns:a="http://schemas.openxmlformats.org/drawingml/2006/main" xmlns:r="http://schemas.openxmlformats.org/officeDocument/2006/relationships" xmlns:p="http://schemas.openxmlformats.org/presentationml/2006/main">
+  <p:cSld>
+    <p:spTree>
+      <p:nvGrpSpPr>
+        <p:cNvPr id="1" name=""/>
+        <p:cNvGrpSpPr/>
+        <p:nvPr/>
+      </p:nvGrpSpPr>
+      <p:grpSpPr>
+        <a:xfrm>
+          <a:off x="0" y="0"/>
+          <a:ext cx="0" cy="0"/>
+          <a:chOff x="0" y="0"/>
+          <a:chExt cx="0" cy="0"/>
+        </a:xfrm>
+      </p:grpSpPr>
+    </p:spTree>
+    <p:extLst>
+      <p:ext uri="{BB962C8B-B14F-4D97-AF65-F5344CB8AC3E}">
+        <p14:creationId xmlns:p14="http://schemas.microsoft.com/office/powerpoint/2010/main" val="3161056568"/>
+      </p:ext>
+    </p:extLst>
+  </p:cSld>
+  <p:clrMapOvr>
+    <a:masterClrMapping/>
+  </p:clrMapOvr>
+</p:sld>
+</file>
+
+<file path=ppt/slides/slide18.xml><?xml version="1.0" encoding="utf-8"?>
+<p:sld xmlns:a="http://schemas.openxmlformats.org/drawingml/2006/main" xmlns:r="http://schemas.openxmlformats.org/officeDocument/2006/relationships" xmlns:p="http://schemas.openxmlformats.org/presentationml/2006/main">
+  <p:cSld>
+    <p:spTree>
+      <p:nvGrpSpPr>
+        <p:cNvPr id="1" name=""/>
+        <p:cNvGrpSpPr/>
+        <p:nvPr/>
+      </p:nvGrpSpPr>
+      <p:grpSpPr>
+        <a:xfrm>
+          <a:off x="0" y="0"/>
+          <a:ext cx="0" cy="0"/>
+          <a:chOff x="0" y="0"/>
+          <a:chExt cx="0" cy="0"/>
+        </a:xfrm>
+      </p:grpSpPr>
+    </p:spTree>
+    <p:extLst>
+      <p:ext uri="{BB962C8B-B14F-4D97-AF65-F5344CB8AC3E}">
+        <p14:creationId xmlns:p14="http://schemas.microsoft.com/office/powerpoint/2010/main" val="171621197"/>
+      </p:ext>
+    </p:extLst>
+  </p:cSld>
+  <p:clrMapOvr>
+    <a:masterClrMapping/>
+  </p:clrMapOvr>
+</p:sld>
+</file>
+
+<file path=ppt/slides/slide19.xml><?xml version="1.0" encoding="utf-8"?>
+<p:sld xmlns:a="http://schemas.openxmlformats.org/drawingml/2006/main" xmlns:r="http://schemas.openxmlformats.org/officeDocument/2006/relationships" xmlns:p="http://schemas.openxmlformats.org/presentationml/2006/main">
+  <p:cSld>
+    <p:spTree>
+      <p:nvGrpSpPr>
+        <p:cNvPr id="1" name=""/>
+        <p:cNvGrpSpPr/>
+        <p:nvPr/>
+      </p:nvGrpSpPr>
+      <p:grpSpPr>
+        <a:xfrm>
+          <a:off x="0" y="0"/>
+          <a:ext cx="0" cy="0"/>
+          <a:chOff x="0" y="0"/>
+          <a:chExt cx="0" cy="0"/>
+        </a:xfrm>
+      </p:grpSpPr>
+      <p:pic>
+        <p:nvPicPr>
+          <p:cNvPr id="4" name="Picture 3">
+            <a:extLst>
+              <a:ext uri="{FF2B5EF4-FFF2-40B4-BE49-F238E27FC236}">
                 <a16:creationId xmlns:a16="http://schemas.microsoft.com/office/drawing/2014/main" id="{AE2B99B1-4536-4169-9FDF-9F2F04E47CD8}"/>
               </a:ext>
             </a:extLst>
@@ -4634,126 +4980,6 @@
 </p:sld>
 </file>
 
-<file path=ppt/slides/slide16.xml><?xml version="1.0" encoding="utf-8"?>
-<p:sld xmlns:a="http://schemas.openxmlformats.org/drawingml/2006/main" xmlns:r="http://schemas.openxmlformats.org/officeDocument/2006/relationships" xmlns:p="http://schemas.openxmlformats.org/presentationml/2006/main">
-  <p:cSld>
-    <p:spTree>
-      <p:nvGrpSpPr>
-        <p:cNvPr id="1" name=""/>
-        <p:cNvGrpSpPr/>
-        <p:nvPr/>
-      </p:nvGrpSpPr>
-      <p:grpSpPr>
-        <a:xfrm>
-          <a:off x="0" y="0"/>
-          <a:ext cx="0" cy="0"/>
-          <a:chOff x="0" y="0"/>
-          <a:chExt cx="0" cy="0"/>
-        </a:xfrm>
-      </p:grpSpPr>
-    </p:spTree>
-    <p:extLst>
-      <p:ext uri="{BB962C8B-B14F-4D97-AF65-F5344CB8AC3E}">
-        <p14:creationId xmlns:p14="http://schemas.microsoft.com/office/powerpoint/2010/main" val="1356783828"/>
-      </p:ext>
-    </p:extLst>
-  </p:cSld>
-  <p:clrMapOvr>
-    <a:masterClrMapping/>
-  </p:clrMapOvr>
-</p:sld>
-</file>
-
-<file path=ppt/slides/slide17.xml><?xml version="1.0" encoding="utf-8"?>
-<p:sld xmlns:a="http://schemas.openxmlformats.org/drawingml/2006/main" xmlns:r="http://schemas.openxmlformats.org/officeDocument/2006/relationships" xmlns:p="http://schemas.openxmlformats.org/presentationml/2006/main">
-  <p:cSld>
-    <p:spTree>
-      <p:nvGrpSpPr>
-        <p:cNvPr id="1" name=""/>
-        <p:cNvGrpSpPr/>
-        <p:nvPr/>
-      </p:nvGrpSpPr>
-      <p:grpSpPr>
-        <a:xfrm>
-          <a:off x="0" y="0"/>
-          <a:ext cx="0" cy="0"/>
-          <a:chOff x="0" y="0"/>
-          <a:chExt cx="0" cy="0"/>
-        </a:xfrm>
-      </p:grpSpPr>
-    </p:spTree>
-    <p:extLst>
-      <p:ext uri="{BB962C8B-B14F-4D97-AF65-F5344CB8AC3E}">
-        <p14:creationId xmlns:p14="http://schemas.microsoft.com/office/powerpoint/2010/main" val="526848501"/>
-      </p:ext>
-    </p:extLst>
-  </p:cSld>
-  <p:clrMapOvr>
-    <a:masterClrMapping/>
-  </p:clrMapOvr>
-</p:sld>
-</file>
-
-<file path=ppt/slides/slide18.xml><?xml version="1.0" encoding="utf-8"?>
-<p:sld xmlns:a="http://schemas.openxmlformats.org/drawingml/2006/main" xmlns:r="http://schemas.openxmlformats.org/officeDocument/2006/relationships" xmlns:p="http://schemas.openxmlformats.org/presentationml/2006/main">
-  <p:cSld>
-    <p:spTree>
-      <p:nvGrpSpPr>
-        <p:cNvPr id="1" name=""/>
-        <p:cNvGrpSpPr/>
-        <p:nvPr/>
-      </p:nvGrpSpPr>
-      <p:grpSpPr>
-        <a:xfrm>
-          <a:off x="0" y="0"/>
-          <a:ext cx="0" cy="0"/>
-          <a:chOff x="0" y="0"/>
-          <a:chExt cx="0" cy="0"/>
-        </a:xfrm>
-      </p:grpSpPr>
-    </p:spTree>
-    <p:extLst>
-      <p:ext uri="{BB962C8B-B14F-4D97-AF65-F5344CB8AC3E}">
-        <p14:creationId xmlns:p14="http://schemas.microsoft.com/office/powerpoint/2010/main" val="1827399890"/>
-      </p:ext>
-    </p:extLst>
-  </p:cSld>
-  <p:clrMapOvr>
-    <a:masterClrMapping/>
-  </p:clrMapOvr>
-</p:sld>
-</file>
-
-<file path=ppt/slides/slide19.xml><?xml version="1.0" encoding="utf-8"?>
-<p:sld xmlns:a="http://schemas.openxmlformats.org/drawingml/2006/main" xmlns:r="http://schemas.openxmlformats.org/officeDocument/2006/relationships" xmlns:p="http://schemas.openxmlformats.org/presentationml/2006/main">
-  <p:cSld>
-    <p:spTree>
-      <p:nvGrpSpPr>
-        <p:cNvPr id="1" name=""/>
-        <p:cNvGrpSpPr/>
-        <p:nvPr/>
-      </p:nvGrpSpPr>
-      <p:grpSpPr>
-        <a:xfrm>
-          <a:off x="0" y="0"/>
-          <a:ext cx="0" cy="0"/>
-          <a:chOff x="0" y="0"/>
-          <a:chExt cx="0" cy="0"/>
-        </a:xfrm>
-      </p:grpSpPr>
-    </p:spTree>
-    <p:extLst>
-      <p:ext uri="{BB962C8B-B14F-4D97-AF65-F5344CB8AC3E}">
-        <p14:creationId xmlns:p14="http://schemas.microsoft.com/office/powerpoint/2010/main" val="3161056568"/>
-      </p:ext>
-    </p:extLst>
-  </p:cSld>
-  <p:clrMapOvr>
-    <a:masterClrMapping/>
-  </p:clrMapOvr>
-</p:sld>
-</file>
-
 <file path=ppt/slides/slide2.xml><?xml version="1.0" encoding="utf-8"?>
 <p:sld xmlns:a="http://schemas.openxmlformats.org/drawingml/2006/main" xmlns:r="http://schemas.openxmlformats.org/officeDocument/2006/relationships" xmlns:p="http://schemas.openxmlformats.org/presentationml/2006/main">
   <p:cSld>
@@ -4988,10 +5214,40 @@
           <a:chExt cx="0" cy="0"/>
         </a:xfrm>
       </p:grpSpPr>
+      <p:pic>
+        <p:nvPicPr>
+          <p:cNvPr id="4" name="Picture 3">
+            <a:extLst>
+              <a:ext uri="{FF2B5EF4-FFF2-40B4-BE49-F238E27FC236}">
+                <a16:creationId xmlns:a16="http://schemas.microsoft.com/office/drawing/2014/main" id="{763769CC-5434-4008-AC47-03F3AD644E9F}"/>
+              </a:ext>
+            </a:extLst>
+          </p:cNvPr>
+          <p:cNvPicPr>
+            <a:picLocks noChangeAspect="1"/>
+          </p:cNvPicPr>
+          <p:nvPr/>
+        </p:nvPicPr>
+        <p:blipFill>
+          <a:blip r:embed="rId2"/>
+          <a:stretch>
+            <a:fillRect/>
+          </a:stretch>
+        </p:blipFill>
+        <p:spPr>
+          <a:xfrm>
+            <a:off x="2171700" y="1157287"/>
+            <a:ext cx="7848600" cy="4543425"/>
+          </a:xfrm>
+          <a:prstGeom prst="rect">
+            <a:avLst/>
+          </a:prstGeom>
+        </p:spPr>
+      </p:pic>
     </p:spTree>
     <p:extLst>
       <p:ext uri="{BB962C8B-B14F-4D97-AF65-F5344CB8AC3E}">
-        <p14:creationId xmlns:p14="http://schemas.microsoft.com/office/powerpoint/2010/main" val="171621197"/>
+        <p14:creationId xmlns:p14="http://schemas.microsoft.com/office/powerpoint/2010/main" val="1356783828"/>
       </p:ext>
     </p:extLst>
   </p:cSld>
@@ -5018,6 +5274,36 @@
           <a:chExt cx="0" cy="0"/>
         </a:xfrm>
       </p:grpSpPr>
+      <p:pic>
+        <p:nvPicPr>
+          <p:cNvPr id="4" name="Picture 3">
+            <a:extLst>
+              <a:ext uri="{FF2B5EF4-FFF2-40B4-BE49-F238E27FC236}">
+                <a16:creationId xmlns:a16="http://schemas.microsoft.com/office/drawing/2014/main" id="{62488B07-20C5-4C32-A48E-77BF552448B5}"/>
+              </a:ext>
+            </a:extLst>
+          </p:cNvPr>
+          <p:cNvPicPr>
+            <a:picLocks noChangeAspect="1"/>
+          </p:cNvPicPr>
+          <p:nvPr/>
+        </p:nvPicPr>
+        <p:blipFill>
+          <a:blip r:embed="rId2"/>
+          <a:stretch>
+            <a:fillRect/>
+          </a:stretch>
+        </p:blipFill>
+        <p:spPr>
+          <a:xfrm>
+            <a:off x="3976687" y="2562225"/>
+            <a:ext cx="4238625" cy="1733550"/>
+          </a:xfrm>
+          <a:prstGeom prst="rect">
+            <a:avLst/>
+          </a:prstGeom>
+        </p:spPr>
+      </p:pic>
     </p:spTree>
     <p:extLst>
       <p:ext uri="{BB962C8B-B14F-4D97-AF65-F5344CB8AC3E}">
@@ -5048,6 +5334,36 @@
           <a:chExt cx="0" cy="0"/>
         </a:xfrm>
       </p:grpSpPr>
+      <p:pic>
+        <p:nvPicPr>
+          <p:cNvPr id="4" name="Picture 3">
+            <a:extLst>
+              <a:ext uri="{FF2B5EF4-FFF2-40B4-BE49-F238E27FC236}">
+                <a16:creationId xmlns:a16="http://schemas.microsoft.com/office/drawing/2014/main" id="{8697CD62-ED90-47CF-91B2-2EB5026FFC64}"/>
+              </a:ext>
+            </a:extLst>
+          </p:cNvPr>
+          <p:cNvPicPr>
+            <a:picLocks noChangeAspect="1"/>
+          </p:cNvPicPr>
+          <p:nvPr/>
+        </p:nvPicPr>
+        <p:blipFill>
+          <a:blip r:embed="rId2"/>
+          <a:stretch>
+            <a:fillRect/>
+          </a:stretch>
+        </p:blipFill>
+        <p:spPr>
+          <a:xfrm>
+            <a:off x="609600" y="342900"/>
+            <a:ext cx="10972800" cy="6172200"/>
+          </a:xfrm>
+          <a:prstGeom prst="rect">
+            <a:avLst/>
+          </a:prstGeom>
+        </p:spPr>
+      </p:pic>
     </p:spTree>
     <p:extLst>
       <p:ext uri="{BB962C8B-B14F-4D97-AF65-F5344CB8AC3E}">

</xml_diff>

<commit_message>
~ 5 more steps
</commit_message>
<xml_diff>
--- a/imgs/src/step-by-step-imgs.pptx
+++ b/imgs/src/step-by-step-imgs.pptx
@@ -20,37 +20,33 @@
     <p:sldId id="269" r:id="rId14"/>
     <p:sldId id="270" r:id="rId15"/>
     <p:sldId id="273" r:id="rId16"/>
-    <p:sldId id="274" r:id="rId17"/>
-    <p:sldId id="275" r:id="rId18"/>
-    <p:sldId id="276" r:id="rId19"/>
-    <p:sldId id="271" r:id="rId20"/>
-    <p:sldId id="272" r:id="rId21"/>
-    <p:sldId id="277" r:id="rId22"/>
-    <p:sldId id="278" r:id="rId23"/>
-    <p:sldId id="279" r:id="rId24"/>
-    <p:sldId id="280" r:id="rId25"/>
-    <p:sldId id="281" r:id="rId26"/>
-    <p:sldId id="282" r:id="rId27"/>
-    <p:sldId id="283" r:id="rId28"/>
-    <p:sldId id="284" r:id="rId29"/>
-    <p:sldId id="285" r:id="rId30"/>
-    <p:sldId id="286" r:id="rId31"/>
-    <p:sldId id="287" r:id="rId32"/>
-    <p:sldId id="288" r:id="rId33"/>
-    <p:sldId id="289" r:id="rId34"/>
-    <p:sldId id="290" r:id="rId35"/>
-    <p:sldId id="291" r:id="rId36"/>
-    <p:sldId id="292" r:id="rId37"/>
-    <p:sldId id="293" r:id="rId38"/>
-    <p:sldId id="294" r:id="rId39"/>
-    <p:sldId id="295" r:id="rId40"/>
-    <p:sldId id="296" r:id="rId41"/>
-    <p:sldId id="297" r:id="rId42"/>
-    <p:sldId id="298" r:id="rId43"/>
-    <p:sldId id="299" r:id="rId44"/>
-    <p:sldId id="300" r:id="rId45"/>
-    <p:sldId id="301" r:id="rId46"/>
-    <p:sldId id="260" r:id="rId47"/>
+    <p:sldId id="271" r:id="rId17"/>
+    <p:sldId id="272" r:id="rId18"/>
+    <p:sldId id="278" r:id="rId19"/>
+    <p:sldId id="279" r:id="rId20"/>
+    <p:sldId id="280" r:id="rId21"/>
+    <p:sldId id="281" r:id="rId22"/>
+    <p:sldId id="282" r:id="rId23"/>
+    <p:sldId id="283" r:id="rId24"/>
+    <p:sldId id="284" r:id="rId25"/>
+    <p:sldId id="285" r:id="rId26"/>
+    <p:sldId id="286" r:id="rId27"/>
+    <p:sldId id="287" r:id="rId28"/>
+    <p:sldId id="288" r:id="rId29"/>
+    <p:sldId id="289" r:id="rId30"/>
+    <p:sldId id="290" r:id="rId31"/>
+    <p:sldId id="291" r:id="rId32"/>
+    <p:sldId id="292" r:id="rId33"/>
+    <p:sldId id="293" r:id="rId34"/>
+    <p:sldId id="294" r:id="rId35"/>
+    <p:sldId id="295" r:id="rId36"/>
+    <p:sldId id="296" r:id="rId37"/>
+    <p:sldId id="297" r:id="rId38"/>
+    <p:sldId id="298" r:id="rId39"/>
+    <p:sldId id="299" r:id="rId40"/>
+    <p:sldId id="300" r:id="rId41"/>
+    <p:sldId id="301" r:id="rId42"/>
+    <p:sldId id="260" r:id="rId43"/>
   </p:sldIdLst>
   <p:sldSz cx="12192000" cy="6858000"/>
   <p:notesSz cx="6858000" cy="9144000"/>
@@ -4847,10 +4843,93 @@
           <a:chExt cx="0" cy="0"/>
         </a:xfrm>
       </p:grpSpPr>
+      <p:pic>
+        <p:nvPicPr>
+          <p:cNvPr id="4" name="Picture 3">
+            <a:extLst>
+              <a:ext uri="{FF2B5EF4-FFF2-40B4-BE49-F238E27FC236}">
+                <a16:creationId xmlns:a16="http://schemas.microsoft.com/office/drawing/2014/main" id="{AE2B99B1-4536-4169-9FDF-9F2F04E47CD8}"/>
+              </a:ext>
+            </a:extLst>
+          </p:cNvPr>
+          <p:cNvPicPr>
+            <a:picLocks noChangeAspect="1"/>
+          </p:cNvPicPr>
+          <p:nvPr/>
+        </p:nvPicPr>
+        <p:blipFill>
+          <a:blip r:embed="rId2"/>
+          <a:stretch>
+            <a:fillRect/>
+          </a:stretch>
+        </p:blipFill>
+        <p:spPr>
+          <a:xfrm>
+            <a:off x="609600" y="342900"/>
+            <a:ext cx="10972800" cy="6172200"/>
+          </a:xfrm>
+          <a:prstGeom prst="rect">
+            <a:avLst/>
+          </a:prstGeom>
+        </p:spPr>
+      </p:pic>
+      <p:sp>
+        <p:nvSpPr>
+          <p:cNvPr id="6" name="Arrow: Up 5">
+            <a:extLst>
+              <a:ext uri="{FF2B5EF4-FFF2-40B4-BE49-F238E27FC236}">
+                <a16:creationId xmlns:a16="http://schemas.microsoft.com/office/drawing/2014/main" id="{89843461-8039-4E69-8857-DF859BBCCAD2}"/>
+              </a:ext>
+            </a:extLst>
+          </p:cNvPr>
+          <p:cNvSpPr/>
+          <p:nvPr/>
+        </p:nvSpPr>
+        <p:spPr>
+          <a:xfrm>
+            <a:off x="7648252" y="1862810"/>
+            <a:ext cx="472535" cy="953985"/>
+          </a:xfrm>
+          <a:prstGeom prst="upArrow">
+            <a:avLst>
+              <a:gd name="adj1" fmla="val 50000"/>
+              <a:gd name="adj2" fmla="val 89626"/>
+            </a:avLst>
+          </a:prstGeom>
+          <a:solidFill>
+            <a:srgbClr val="C00000"/>
+          </a:solidFill>
+          <a:ln>
+            <a:noFill/>
+          </a:ln>
+        </p:spPr>
+        <p:style>
+          <a:lnRef idx="0">
+            <a:schemeClr val="accent1"/>
+          </a:lnRef>
+          <a:fillRef idx="3">
+            <a:schemeClr val="accent1"/>
+          </a:fillRef>
+          <a:effectRef idx="3">
+            <a:schemeClr val="accent1"/>
+          </a:effectRef>
+          <a:fontRef idx="minor">
+            <a:schemeClr val="lt1"/>
+          </a:fontRef>
+        </p:style>
+        <p:txBody>
+          <a:bodyPr rtlCol="0" anchor="ctr"/>
+          <a:lstStyle/>
+          <a:p>
+            <a:pPr algn="ctr"/>
+            <a:endParaRPr lang="en-US"/>
+          </a:p>
+        </p:txBody>
+      </p:sp>
     </p:spTree>
     <p:extLst>
       <p:ext uri="{BB962C8B-B14F-4D97-AF65-F5344CB8AC3E}">
-        <p14:creationId xmlns:p14="http://schemas.microsoft.com/office/powerpoint/2010/main" val="1827399890"/>
+        <p14:creationId xmlns:p14="http://schemas.microsoft.com/office/powerpoint/2010/main" val="1127063973"/>
       </p:ext>
     </p:extLst>
   </p:cSld>
@@ -4877,10 +4956,93 @@
           <a:chExt cx="0" cy="0"/>
         </a:xfrm>
       </p:grpSpPr>
+      <p:pic>
+        <p:nvPicPr>
+          <p:cNvPr id="4" name="Picture 3">
+            <a:extLst>
+              <a:ext uri="{FF2B5EF4-FFF2-40B4-BE49-F238E27FC236}">
+                <a16:creationId xmlns:a16="http://schemas.microsoft.com/office/drawing/2014/main" id="{763769CC-5434-4008-AC47-03F3AD644E9F}"/>
+              </a:ext>
+            </a:extLst>
+          </p:cNvPr>
+          <p:cNvPicPr>
+            <a:picLocks noChangeAspect="1"/>
+          </p:cNvPicPr>
+          <p:nvPr/>
+        </p:nvPicPr>
+        <p:blipFill>
+          <a:blip r:embed="rId2"/>
+          <a:stretch>
+            <a:fillRect/>
+          </a:stretch>
+        </p:blipFill>
+        <p:spPr>
+          <a:xfrm>
+            <a:off x="2171700" y="1157287"/>
+            <a:ext cx="7848600" cy="4543425"/>
+          </a:xfrm>
+          <a:prstGeom prst="rect">
+            <a:avLst/>
+          </a:prstGeom>
+        </p:spPr>
+      </p:pic>
+      <p:sp>
+        <p:nvSpPr>
+          <p:cNvPr id="6" name="Arrow: Up 5">
+            <a:extLst>
+              <a:ext uri="{FF2B5EF4-FFF2-40B4-BE49-F238E27FC236}">
+                <a16:creationId xmlns:a16="http://schemas.microsoft.com/office/drawing/2014/main" id="{CF39076D-2B22-490B-A1B0-94BAC9BF11EF}"/>
+              </a:ext>
+            </a:extLst>
+          </p:cNvPr>
+          <p:cNvSpPr/>
+          <p:nvPr/>
+        </p:nvSpPr>
+        <p:spPr>
+          <a:xfrm>
+            <a:off x="6777162" y="3784092"/>
+            <a:ext cx="472535" cy="953985"/>
+          </a:xfrm>
+          <a:prstGeom prst="upArrow">
+            <a:avLst>
+              <a:gd name="adj1" fmla="val 50000"/>
+              <a:gd name="adj2" fmla="val 89626"/>
+            </a:avLst>
+          </a:prstGeom>
+          <a:solidFill>
+            <a:srgbClr val="C00000"/>
+          </a:solidFill>
+          <a:ln>
+            <a:noFill/>
+          </a:ln>
+        </p:spPr>
+        <p:style>
+          <a:lnRef idx="0">
+            <a:schemeClr val="accent1"/>
+          </a:lnRef>
+          <a:fillRef idx="3">
+            <a:schemeClr val="accent1"/>
+          </a:fillRef>
+          <a:effectRef idx="3">
+            <a:schemeClr val="accent1"/>
+          </a:effectRef>
+          <a:fontRef idx="minor">
+            <a:schemeClr val="lt1"/>
+          </a:fontRef>
+        </p:style>
+        <p:txBody>
+          <a:bodyPr rtlCol="0" anchor="ctr"/>
+          <a:lstStyle/>
+          <a:p>
+            <a:pPr algn="ctr"/>
+            <a:endParaRPr lang="en-US"/>
+          </a:p>
+        </p:txBody>
+      </p:sp>
     </p:spTree>
     <p:extLst>
       <p:ext uri="{BB962C8B-B14F-4D97-AF65-F5344CB8AC3E}">
-        <p14:creationId xmlns:p14="http://schemas.microsoft.com/office/powerpoint/2010/main" val="3161056568"/>
+        <p14:creationId xmlns:p14="http://schemas.microsoft.com/office/powerpoint/2010/main" val="1356783828"/>
       </p:ext>
     </p:extLst>
   </p:cSld>
@@ -4907,10 +5069,236 @@
           <a:chExt cx="0" cy="0"/>
         </a:xfrm>
       </p:grpSpPr>
+      <p:pic>
+        <p:nvPicPr>
+          <p:cNvPr id="4" name="Picture 3">
+            <a:extLst>
+              <a:ext uri="{FF2B5EF4-FFF2-40B4-BE49-F238E27FC236}">
+                <a16:creationId xmlns:a16="http://schemas.microsoft.com/office/drawing/2014/main" id="{8697CD62-ED90-47CF-91B2-2EB5026FFC64}"/>
+              </a:ext>
+            </a:extLst>
+          </p:cNvPr>
+          <p:cNvPicPr>
+            <a:picLocks noChangeAspect="1"/>
+          </p:cNvPicPr>
+          <p:nvPr/>
+        </p:nvPicPr>
+        <p:blipFill>
+          <a:blip r:embed="rId2"/>
+          <a:stretch>
+            <a:fillRect/>
+          </a:stretch>
+        </p:blipFill>
+        <p:spPr>
+          <a:xfrm>
+            <a:off x="609600" y="342900"/>
+            <a:ext cx="10972800" cy="6172200"/>
+          </a:xfrm>
+          <a:prstGeom prst="rect">
+            <a:avLst/>
+          </a:prstGeom>
+        </p:spPr>
+      </p:pic>
+      <p:sp>
+        <p:nvSpPr>
+          <p:cNvPr id="8" name="Arrow: Up 7">
+            <a:extLst>
+              <a:ext uri="{FF2B5EF4-FFF2-40B4-BE49-F238E27FC236}">
+                <a16:creationId xmlns:a16="http://schemas.microsoft.com/office/drawing/2014/main" id="{98D3F908-04D1-4777-91F7-726849A4A0A2}"/>
+              </a:ext>
+            </a:extLst>
+          </p:cNvPr>
+          <p:cNvSpPr/>
+          <p:nvPr/>
+        </p:nvSpPr>
+        <p:spPr>
+          <a:xfrm>
+            <a:off x="10414449" y="815891"/>
+            <a:ext cx="802133" cy="1619399"/>
+          </a:xfrm>
+          <a:prstGeom prst="upArrow">
+            <a:avLst>
+              <a:gd name="adj1" fmla="val 50000"/>
+              <a:gd name="adj2" fmla="val 89626"/>
+            </a:avLst>
+          </a:prstGeom>
+          <a:solidFill>
+            <a:srgbClr val="C00000"/>
+          </a:solidFill>
+          <a:ln>
+            <a:noFill/>
+          </a:ln>
+        </p:spPr>
+        <p:style>
+          <a:lnRef idx="0">
+            <a:schemeClr val="accent1"/>
+          </a:lnRef>
+          <a:fillRef idx="3">
+            <a:schemeClr val="accent1"/>
+          </a:fillRef>
+          <a:effectRef idx="3">
+            <a:schemeClr val="accent1"/>
+          </a:effectRef>
+          <a:fontRef idx="minor">
+            <a:schemeClr val="lt1"/>
+          </a:fontRef>
+        </p:style>
+        <p:txBody>
+          <a:bodyPr rtlCol="0" anchor="ctr"/>
+          <a:lstStyle/>
+          <a:p>
+            <a:pPr algn="ctr"/>
+            <a:endParaRPr lang="en-US" sz="2800" b="1" dirty="0">
+              <a:latin typeface="Segoe UI" panose="020B0502040204020203" pitchFamily="34" charset="0"/>
+              <a:cs typeface="Segoe UI" panose="020B0502040204020203" pitchFamily="34" charset="0"/>
+            </a:endParaRPr>
+          </a:p>
+        </p:txBody>
+      </p:sp>
+      <p:sp>
+        <p:nvSpPr>
+          <p:cNvPr id="10" name="TextBox 9">
+            <a:extLst>
+              <a:ext uri="{FF2B5EF4-FFF2-40B4-BE49-F238E27FC236}">
+                <a16:creationId xmlns:a16="http://schemas.microsoft.com/office/drawing/2014/main" id="{C3AB4731-C723-44F2-9003-119C199CC0CC}"/>
+              </a:ext>
+            </a:extLst>
+          </p:cNvPr>
+          <p:cNvSpPr txBox="1"/>
+          <p:nvPr/>
+        </p:nvSpPr>
+        <p:spPr>
+          <a:xfrm>
+            <a:off x="10606607" y="1412826"/>
+            <a:ext cx="290319" cy="523220"/>
+          </a:xfrm>
+          <a:prstGeom prst="rect">
+            <a:avLst/>
+          </a:prstGeom>
+          <a:noFill/>
+        </p:spPr>
+        <p:txBody>
+          <a:bodyPr wrap="square" rtlCol="0">
+            <a:spAutoFit/>
+          </a:bodyPr>
+          <a:lstStyle/>
+          <a:p>
+            <a:pPr algn="l"/>
+            <a:r>
+              <a:rPr lang="en-US" sz="2800" b="1" dirty="0">
+                <a:solidFill>
+                  <a:schemeClr val="bg1"/>
+                </a:solidFill>
+                <a:latin typeface="Segoe UI" panose="020B0502040204020203" pitchFamily="34" charset="0"/>
+                <a:cs typeface="Segoe UI" panose="020B0502040204020203" pitchFamily="34" charset="0"/>
+              </a:rPr>
+              <a:t>A</a:t>
+            </a:r>
+          </a:p>
+        </p:txBody>
+      </p:sp>
+      <p:sp>
+        <p:nvSpPr>
+          <p:cNvPr id="12" name="Arrow: Up 11">
+            <a:extLst>
+              <a:ext uri="{FF2B5EF4-FFF2-40B4-BE49-F238E27FC236}">
+                <a16:creationId xmlns:a16="http://schemas.microsoft.com/office/drawing/2014/main" id="{BB0830C3-12B7-41C6-9BCD-B9D2A1EFBCC8}"/>
+              </a:ext>
+            </a:extLst>
+          </p:cNvPr>
+          <p:cNvSpPr/>
+          <p:nvPr/>
+        </p:nvSpPr>
+        <p:spPr>
+          <a:xfrm rot="16200000">
+            <a:off x="2416225" y="3850215"/>
+            <a:ext cx="802133" cy="1619399"/>
+          </a:xfrm>
+          <a:prstGeom prst="upArrow">
+            <a:avLst>
+              <a:gd name="adj1" fmla="val 50000"/>
+              <a:gd name="adj2" fmla="val 89626"/>
+            </a:avLst>
+          </a:prstGeom>
+          <a:solidFill>
+            <a:srgbClr val="C00000"/>
+          </a:solidFill>
+          <a:ln>
+            <a:noFill/>
+          </a:ln>
+        </p:spPr>
+        <p:style>
+          <a:lnRef idx="0">
+            <a:schemeClr val="accent1"/>
+          </a:lnRef>
+          <a:fillRef idx="3">
+            <a:schemeClr val="accent1"/>
+          </a:fillRef>
+          <a:effectRef idx="3">
+            <a:schemeClr val="accent1"/>
+          </a:effectRef>
+          <a:fontRef idx="minor">
+            <a:schemeClr val="lt1"/>
+          </a:fontRef>
+        </p:style>
+        <p:txBody>
+          <a:bodyPr rtlCol="0" anchor="ctr"/>
+          <a:lstStyle/>
+          <a:p>
+            <a:pPr algn="ctr"/>
+            <a:endParaRPr lang="en-US" sz="2800" b="1" dirty="0">
+              <a:latin typeface="Segoe UI" panose="020B0502040204020203" pitchFamily="34" charset="0"/>
+              <a:cs typeface="Segoe UI" panose="020B0502040204020203" pitchFamily="34" charset="0"/>
+            </a:endParaRPr>
+          </a:p>
+        </p:txBody>
+      </p:sp>
+      <p:sp>
+        <p:nvSpPr>
+          <p:cNvPr id="14" name="TextBox 13">
+            <a:extLst>
+              <a:ext uri="{FF2B5EF4-FFF2-40B4-BE49-F238E27FC236}">
+                <a16:creationId xmlns:a16="http://schemas.microsoft.com/office/drawing/2014/main" id="{5EFBB78B-8574-4FC0-8412-4248DE850286}"/>
+              </a:ext>
+            </a:extLst>
+          </p:cNvPr>
+          <p:cNvSpPr txBox="1"/>
+          <p:nvPr/>
+        </p:nvSpPr>
+        <p:spPr>
+          <a:xfrm>
+            <a:off x="2673511" y="4390163"/>
+            <a:ext cx="290319" cy="523220"/>
+          </a:xfrm>
+          <a:prstGeom prst="rect">
+            <a:avLst/>
+          </a:prstGeom>
+          <a:noFill/>
+        </p:spPr>
+        <p:txBody>
+          <a:bodyPr wrap="square" rtlCol="0">
+            <a:spAutoFit/>
+          </a:bodyPr>
+          <a:lstStyle/>
+          <a:p>
+            <a:pPr algn="l"/>
+            <a:r>
+              <a:rPr lang="en-US" sz="2800" b="1" dirty="0">
+                <a:solidFill>
+                  <a:schemeClr val="bg1"/>
+                </a:solidFill>
+                <a:latin typeface="Segoe UI" panose="020B0502040204020203" pitchFamily="34" charset="0"/>
+                <a:cs typeface="Segoe UI" panose="020B0502040204020203" pitchFamily="34" charset="0"/>
+              </a:rPr>
+              <a:t>B</a:t>
+            </a:r>
+          </a:p>
+        </p:txBody>
+      </p:sp>
     </p:spTree>
     <p:extLst>
       <p:ext uri="{BB962C8B-B14F-4D97-AF65-F5344CB8AC3E}">
-        <p14:creationId xmlns:p14="http://schemas.microsoft.com/office/powerpoint/2010/main" val="171621197"/>
+        <p14:creationId xmlns:p14="http://schemas.microsoft.com/office/powerpoint/2010/main" val="4241489412"/>
       </p:ext>
     </p:extLst>
   </p:cSld>
@@ -4937,40 +5325,10 @@
           <a:chExt cx="0" cy="0"/>
         </a:xfrm>
       </p:grpSpPr>
-      <p:pic>
-        <p:nvPicPr>
-          <p:cNvPr id="4" name="Picture 3">
-            <a:extLst>
-              <a:ext uri="{FF2B5EF4-FFF2-40B4-BE49-F238E27FC236}">
-                <a16:creationId xmlns:a16="http://schemas.microsoft.com/office/drawing/2014/main" id="{AE2B99B1-4536-4169-9FDF-9F2F04E47CD8}"/>
-              </a:ext>
-            </a:extLst>
-          </p:cNvPr>
-          <p:cNvPicPr>
-            <a:picLocks noChangeAspect="1"/>
-          </p:cNvPicPr>
-          <p:nvPr/>
-        </p:nvPicPr>
-        <p:blipFill>
-          <a:blip r:embed="rId2"/>
-          <a:stretch>
-            <a:fillRect/>
-          </a:stretch>
-        </p:blipFill>
-        <p:spPr>
-          <a:xfrm>
-            <a:off x="609600" y="342900"/>
-            <a:ext cx="10972800" cy="6172200"/>
-          </a:xfrm>
-          <a:prstGeom prst="rect">
-            <a:avLst/>
-          </a:prstGeom>
-        </p:spPr>
-      </p:pic>
     </p:spTree>
     <p:extLst>
       <p:ext uri="{BB962C8B-B14F-4D97-AF65-F5344CB8AC3E}">
-        <p14:creationId xmlns:p14="http://schemas.microsoft.com/office/powerpoint/2010/main" val="1127063973"/>
+        <p14:creationId xmlns:p14="http://schemas.microsoft.com/office/powerpoint/2010/main" val="2784679318"/>
       </p:ext>
     </p:extLst>
   </p:cSld>
@@ -5214,40 +5572,10 @@
           <a:chExt cx="0" cy="0"/>
         </a:xfrm>
       </p:grpSpPr>
-      <p:pic>
-        <p:nvPicPr>
-          <p:cNvPr id="4" name="Picture 3">
-            <a:extLst>
-              <a:ext uri="{FF2B5EF4-FFF2-40B4-BE49-F238E27FC236}">
-                <a16:creationId xmlns:a16="http://schemas.microsoft.com/office/drawing/2014/main" id="{763769CC-5434-4008-AC47-03F3AD644E9F}"/>
-              </a:ext>
-            </a:extLst>
-          </p:cNvPr>
-          <p:cNvPicPr>
-            <a:picLocks noChangeAspect="1"/>
-          </p:cNvPicPr>
-          <p:nvPr/>
-        </p:nvPicPr>
-        <p:blipFill>
-          <a:blip r:embed="rId2"/>
-          <a:stretch>
-            <a:fillRect/>
-          </a:stretch>
-        </p:blipFill>
-        <p:spPr>
-          <a:xfrm>
-            <a:off x="2171700" y="1157287"/>
-            <a:ext cx="7848600" cy="4543425"/>
-          </a:xfrm>
-          <a:prstGeom prst="rect">
-            <a:avLst/>
-          </a:prstGeom>
-        </p:spPr>
-      </p:pic>
     </p:spTree>
     <p:extLst>
       <p:ext uri="{BB962C8B-B14F-4D97-AF65-F5344CB8AC3E}">
-        <p14:creationId xmlns:p14="http://schemas.microsoft.com/office/powerpoint/2010/main" val="1356783828"/>
+        <p14:creationId xmlns:p14="http://schemas.microsoft.com/office/powerpoint/2010/main" val="1310995319"/>
       </p:ext>
     </p:extLst>
   </p:cSld>
@@ -5274,40 +5602,10 @@
           <a:chExt cx="0" cy="0"/>
         </a:xfrm>
       </p:grpSpPr>
-      <p:pic>
-        <p:nvPicPr>
-          <p:cNvPr id="4" name="Picture 3">
-            <a:extLst>
-              <a:ext uri="{FF2B5EF4-FFF2-40B4-BE49-F238E27FC236}">
-                <a16:creationId xmlns:a16="http://schemas.microsoft.com/office/drawing/2014/main" id="{62488B07-20C5-4C32-A48E-77BF552448B5}"/>
-              </a:ext>
-            </a:extLst>
-          </p:cNvPr>
-          <p:cNvPicPr>
-            <a:picLocks noChangeAspect="1"/>
-          </p:cNvPicPr>
-          <p:nvPr/>
-        </p:nvPicPr>
-        <p:blipFill>
-          <a:blip r:embed="rId2"/>
-          <a:stretch>
-            <a:fillRect/>
-          </a:stretch>
-        </p:blipFill>
-        <p:spPr>
-          <a:xfrm>
-            <a:off x="3976687" y="2562225"/>
-            <a:ext cx="4238625" cy="1733550"/>
-          </a:xfrm>
-          <a:prstGeom prst="rect">
-            <a:avLst/>
-          </a:prstGeom>
-        </p:spPr>
-      </p:pic>
     </p:spTree>
     <p:extLst>
       <p:ext uri="{BB962C8B-B14F-4D97-AF65-F5344CB8AC3E}">
-        <p14:creationId xmlns:p14="http://schemas.microsoft.com/office/powerpoint/2010/main" val="1669211973"/>
+        <p14:creationId xmlns:p14="http://schemas.microsoft.com/office/powerpoint/2010/main" val="4292414777"/>
       </p:ext>
     </p:extLst>
   </p:cSld>
@@ -5334,40 +5632,10 @@
           <a:chExt cx="0" cy="0"/>
         </a:xfrm>
       </p:grpSpPr>
-      <p:pic>
-        <p:nvPicPr>
-          <p:cNvPr id="4" name="Picture 3">
-            <a:extLst>
-              <a:ext uri="{FF2B5EF4-FFF2-40B4-BE49-F238E27FC236}">
-                <a16:creationId xmlns:a16="http://schemas.microsoft.com/office/drawing/2014/main" id="{8697CD62-ED90-47CF-91B2-2EB5026FFC64}"/>
-              </a:ext>
-            </a:extLst>
-          </p:cNvPr>
-          <p:cNvPicPr>
-            <a:picLocks noChangeAspect="1"/>
-          </p:cNvPicPr>
-          <p:nvPr/>
-        </p:nvPicPr>
-        <p:blipFill>
-          <a:blip r:embed="rId2"/>
-          <a:stretch>
-            <a:fillRect/>
-          </a:stretch>
-        </p:blipFill>
-        <p:spPr>
-          <a:xfrm>
-            <a:off x="609600" y="342900"/>
-            <a:ext cx="10972800" cy="6172200"/>
-          </a:xfrm>
-          <a:prstGeom prst="rect">
-            <a:avLst/>
-          </a:prstGeom>
-        </p:spPr>
-      </p:pic>
     </p:spTree>
     <p:extLst>
       <p:ext uri="{BB962C8B-B14F-4D97-AF65-F5344CB8AC3E}">
-        <p14:creationId xmlns:p14="http://schemas.microsoft.com/office/powerpoint/2010/main" val="4241489412"/>
+        <p14:creationId xmlns:p14="http://schemas.microsoft.com/office/powerpoint/2010/main" val="831793758"/>
       </p:ext>
     </p:extLst>
   </p:cSld>
@@ -5397,7 +5665,7 @@
     </p:spTree>
     <p:extLst>
       <p:ext uri="{BB962C8B-B14F-4D97-AF65-F5344CB8AC3E}">
-        <p14:creationId xmlns:p14="http://schemas.microsoft.com/office/powerpoint/2010/main" val="2784679318"/>
+        <p14:creationId xmlns:p14="http://schemas.microsoft.com/office/powerpoint/2010/main" val="2806491056"/>
       </p:ext>
     </p:extLst>
   </p:cSld>
@@ -5427,7 +5695,7 @@
     </p:spTree>
     <p:extLst>
       <p:ext uri="{BB962C8B-B14F-4D97-AF65-F5344CB8AC3E}">
-        <p14:creationId xmlns:p14="http://schemas.microsoft.com/office/powerpoint/2010/main" val="1310995319"/>
+        <p14:creationId xmlns:p14="http://schemas.microsoft.com/office/powerpoint/2010/main" val="1918321829"/>
       </p:ext>
     </p:extLst>
   </p:cSld>
@@ -5457,7 +5725,7 @@
     </p:spTree>
     <p:extLst>
       <p:ext uri="{BB962C8B-B14F-4D97-AF65-F5344CB8AC3E}">
-        <p14:creationId xmlns:p14="http://schemas.microsoft.com/office/powerpoint/2010/main" val="4292414777"/>
+        <p14:creationId xmlns:p14="http://schemas.microsoft.com/office/powerpoint/2010/main" val="528842390"/>
       </p:ext>
     </p:extLst>
   </p:cSld>
@@ -5487,7 +5755,7 @@
     </p:spTree>
     <p:extLst>
       <p:ext uri="{BB962C8B-B14F-4D97-AF65-F5344CB8AC3E}">
-        <p14:creationId xmlns:p14="http://schemas.microsoft.com/office/powerpoint/2010/main" val="831793758"/>
+        <p14:creationId xmlns:p14="http://schemas.microsoft.com/office/powerpoint/2010/main" val="2084267165"/>
       </p:ext>
     </p:extLst>
   </p:cSld>
@@ -5517,7 +5785,7 @@
     </p:spTree>
     <p:extLst>
       <p:ext uri="{BB962C8B-B14F-4D97-AF65-F5344CB8AC3E}">
-        <p14:creationId xmlns:p14="http://schemas.microsoft.com/office/powerpoint/2010/main" val="2806491056"/>
+        <p14:creationId xmlns:p14="http://schemas.microsoft.com/office/powerpoint/2010/main" val="2903145560"/>
       </p:ext>
     </p:extLst>
   </p:cSld>
@@ -5547,7 +5815,7 @@
     </p:spTree>
     <p:extLst>
       <p:ext uri="{BB962C8B-B14F-4D97-AF65-F5344CB8AC3E}">
-        <p14:creationId xmlns:p14="http://schemas.microsoft.com/office/powerpoint/2010/main" val="1918321829"/>
+        <p14:creationId xmlns:p14="http://schemas.microsoft.com/office/powerpoint/2010/main" val="2275897497"/>
       </p:ext>
     </p:extLst>
   </p:cSld>
@@ -5577,7 +5845,7 @@
     </p:spTree>
     <p:extLst>
       <p:ext uri="{BB962C8B-B14F-4D97-AF65-F5344CB8AC3E}">
-        <p14:creationId xmlns:p14="http://schemas.microsoft.com/office/powerpoint/2010/main" val="528842390"/>
+        <p14:creationId xmlns:p14="http://schemas.microsoft.com/office/powerpoint/2010/main" val="1648755881"/>
       </p:ext>
     </p:extLst>
   </p:cSld>
@@ -5667,7 +5935,7 @@
     </p:spTree>
     <p:extLst>
       <p:ext uri="{BB962C8B-B14F-4D97-AF65-F5344CB8AC3E}">
-        <p14:creationId xmlns:p14="http://schemas.microsoft.com/office/powerpoint/2010/main" val="2084267165"/>
+        <p14:creationId xmlns:p14="http://schemas.microsoft.com/office/powerpoint/2010/main" val="4130343805"/>
       </p:ext>
     </p:extLst>
   </p:cSld>
@@ -5697,7 +5965,7 @@
     </p:spTree>
     <p:extLst>
       <p:ext uri="{BB962C8B-B14F-4D97-AF65-F5344CB8AC3E}">
-        <p14:creationId xmlns:p14="http://schemas.microsoft.com/office/powerpoint/2010/main" val="2903145560"/>
+        <p14:creationId xmlns:p14="http://schemas.microsoft.com/office/powerpoint/2010/main" val="1937026349"/>
       </p:ext>
     </p:extLst>
   </p:cSld>
@@ -5727,7 +5995,7 @@
     </p:spTree>
     <p:extLst>
       <p:ext uri="{BB962C8B-B14F-4D97-AF65-F5344CB8AC3E}">
-        <p14:creationId xmlns:p14="http://schemas.microsoft.com/office/powerpoint/2010/main" val="2275897497"/>
+        <p14:creationId xmlns:p14="http://schemas.microsoft.com/office/powerpoint/2010/main" val="868494836"/>
       </p:ext>
     </p:extLst>
   </p:cSld>
@@ -5757,7 +6025,7 @@
     </p:spTree>
     <p:extLst>
       <p:ext uri="{BB962C8B-B14F-4D97-AF65-F5344CB8AC3E}">
-        <p14:creationId xmlns:p14="http://schemas.microsoft.com/office/powerpoint/2010/main" val="1648755881"/>
+        <p14:creationId xmlns:p14="http://schemas.microsoft.com/office/powerpoint/2010/main" val="1537562593"/>
       </p:ext>
     </p:extLst>
   </p:cSld>
@@ -5787,7 +6055,7 @@
     </p:spTree>
     <p:extLst>
       <p:ext uri="{BB962C8B-B14F-4D97-AF65-F5344CB8AC3E}">
-        <p14:creationId xmlns:p14="http://schemas.microsoft.com/office/powerpoint/2010/main" val="4130343805"/>
+        <p14:creationId xmlns:p14="http://schemas.microsoft.com/office/powerpoint/2010/main" val="1814952658"/>
       </p:ext>
     </p:extLst>
   </p:cSld>
@@ -5817,7 +6085,7 @@
     </p:spTree>
     <p:extLst>
       <p:ext uri="{BB962C8B-B14F-4D97-AF65-F5344CB8AC3E}">
-        <p14:creationId xmlns:p14="http://schemas.microsoft.com/office/powerpoint/2010/main" val="1937026349"/>
+        <p14:creationId xmlns:p14="http://schemas.microsoft.com/office/powerpoint/2010/main" val="936874074"/>
       </p:ext>
     </p:extLst>
   </p:cSld>
@@ -5847,7 +6115,7 @@
     </p:spTree>
     <p:extLst>
       <p:ext uri="{BB962C8B-B14F-4D97-AF65-F5344CB8AC3E}">
-        <p14:creationId xmlns:p14="http://schemas.microsoft.com/office/powerpoint/2010/main" val="868494836"/>
+        <p14:creationId xmlns:p14="http://schemas.microsoft.com/office/powerpoint/2010/main" val="3934463429"/>
       </p:ext>
     </p:extLst>
   </p:cSld>
@@ -5877,7 +6145,7 @@
     </p:spTree>
     <p:extLst>
       <p:ext uri="{BB962C8B-B14F-4D97-AF65-F5344CB8AC3E}">
-        <p14:creationId xmlns:p14="http://schemas.microsoft.com/office/powerpoint/2010/main" val="1537562593"/>
+        <p14:creationId xmlns:p14="http://schemas.microsoft.com/office/powerpoint/2010/main" val="1224890792"/>
       </p:ext>
     </p:extLst>
   </p:cSld>
@@ -5907,7 +6175,7 @@
     </p:spTree>
     <p:extLst>
       <p:ext uri="{BB962C8B-B14F-4D97-AF65-F5344CB8AC3E}">
-        <p14:creationId xmlns:p14="http://schemas.microsoft.com/office/powerpoint/2010/main" val="1814952658"/>
+        <p14:creationId xmlns:p14="http://schemas.microsoft.com/office/powerpoint/2010/main" val="4134941636"/>
       </p:ext>
     </p:extLst>
   </p:cSld>
@@ -5937,7 +6205,7 @@
     </p:spTree>
     <p:extLst>
       <p:ext uri="{BB962C8B-B14F-4D97-AF65-F5344CB8AC3E}">
-        <p14:creationId xmlns:p14="http://schemas.microsoft.com/office/powerpoint/2010/main" val="936874074"/>
+        <p14:creationId xmlns:p14="http://schemas.microsoft.com/office/powerpoint/2010/main" val="774581792"/>
       </p:ext>
     </p:extLst>
   </p:cSld>
@@ -6027,7 +6295,7 @@
     </p:spTree>
     <p:extLst>
       <p:ext uri="{BB962C8B-B14F-4D97-AF65-F5344CB8AC3E}">
-        <p14:creationId xmlns:p14="http://schemas.microsoft.com/office/powerpoint/2010/main" val="3934463429"/>
+        <p14:creationId xmlns:p14="http://schemas.microsoft.com/office/powerpoint/2010/main" val="2652805623"/>
       </p:ext>
     </p:extLst>
   </p:cSld>
@@ -6057,7 +6325,7 @@
     </p:spTree>
     <p:extLst>
       <p:ext uri="{BB962C8B-B14F-4D97-AF65-F5344CB8AC3E}">
-        <p14:creationId xmlns:p14="http://schemas.microsoft.com/office/powerpoint/2010/main" val="1224890792"/>
+        <p14:creationId xmlns:p14="http://schemas.microsoft.com/office/powerpoint/2010/main" val="2180391466"/>
       </p:ext>
     </p:extLst>
   </p:cSld>
@@ -6068,126 +6336,6 @@
 </file>
 
 <file path=ppt/slides/slide42.xml><?xml version="1.0" encoding="utf-8"?>
-<p:sld xmlns:a="http://schemas.openxmlformats.org/drawingml/2006/main" xmlns:r="http://schemas.openxmlformats.org/officeDocument/2006/relationships" xmlns:p="http://schemas.openxmlformats.org/presentationml/2006/main">
-  <p:cSld>
-    <p:spTree>
-      <p:nvGrpSpPr>
-        <p:cNvPr id="1" name=""/>
-        <p:cNvGrpSpPr/>
-        <p:nvPr/>
-      </p:nvGrpSpPr>
-      <p:grpSpPr>
-        <a:xfrm>
-          <a:off x="0" y="0"/>
-          <a:ext cx="0" cy="0"/>
-          <a:chOff x="0" y="0"/>
-          <a:chExt cx="0" cy="0"/>
-        </a:xfrm>
-      </p:grpSpPr>
-    </p:spTree>
-    <p:extLst>
-      <p:ext uri="{BB962C8B-B14F-4D97-AF65-F5344CB8AC3E}">
-        <p14:creationId xmlns:p14="http://schemas.microsoft.com/office/powerpoint/2010/main" val="4134941636"/>
-      </p:ext>
-    </p:extLst>
-  </p:cSld>
-  <p:clrMapOvr>
-    <a:masterClrMapping/>
-  </p:clrMapOvr>
-</p:sld>
-</file>
-
-<file path=ppt/slides/slide43.xml><?xml version="1.0" encoding="utf-8"?>
-<p:sld xmlns:a="http://schemas.openxmlformats.org/drawingml/2006/main" xmlns:r="http://schemas.openxmlformats.org/officeDocument/2006/relationships" xmlns:p="http://schemas.openxmlformats.org/presentationml/2006/main">
-  <p:cSld>
-    <p:spTree>
-      <p:nvGrpSpPr>
-        <p:cNvPr id="1" name=""/>
-        <p:cNvGrpSpPr/>
-        <p:nvPr/>
-      </p:nvGrpSpPr>
-      <p:grpSpPr>
-        <a:xfrm>
-          <a:off x="0" y="0"/>
-          <a:ext cx="0" cy="0"/>
-          <a:chOff x="0" y="0"/>
-          <a:chExt cx="0" cy="0"/>
-        </a:xfrm>
-      </p:grpSpPr>
-    </p:spTree>
-    <p:extLst>
-      <p:ext uri="{BB962C8B-B14F-4D97-AF65-F5344CB8AC3E}">
-        <p14:creationId xmlns:p14="http://schemas.microsoft.com/office/powerpoint/2010/main" val="774581792"/>
-      </p:ext>
-    </p:extLst>
-  </p:cSld>
-  <p:clrMapOvr>
-    <a:masterClrMapping/>
-  </p:clrMapOvr>
-</p:sld>
-</file>
-
-<file path=ppt/slides/slide44.xml><?xml version="1.0" encoding="utf-8"?>
-<p:sld xmlns:a="http://schemas.openxmlformats.org/drawingml/2006/main" xmlns:r="http://schemas.openxmlformats.org/officeDocument/2006/relationships" xmlns:p="http://schemas.openxmlformats.org/presentationml/2006/main">
-  <p:cSld>
-    <p:spTree>
-      <p:nvGrpSpPr>
-        <p:cNvPr id="1" name=""/>
-        <p:cNvGrpSpPr/>
-        <p:nvPr/>
-      </p:nvGrpSpPr>
-      <p:grpSpPr>
-        <a:xfrm>
-          <a:off x="0" y="0"/>
-          <a:ext cx="0" cy="0"/>
-          <a:chOff x="0" y="0"/>
-          <a:chExt cx="0" cy="0"/>
-        </a:xfrm>
-      </p:grpSpPr>
-    </p:spTree>
-    <p:extLst>
-      <p:ext uri="{BB962C8B-B14F-4D97-AF65-F5344CB8AC3E}">
-        <p14:creationId xmlns:p14="http://schemas.microsoft.com/office/powerpoint/2010/main" val="2652805623"/>
-      </p:ext>
-    </p:extLst>
-  </p:cSld>
-  <p:clrMapOvr>
-    <a:masterClrMapping/>
-  </p:clrMapOvr>
-</p:sld>
-</file>
-
-<file path=ppt/slides/slide45.xml><?xml version="1.0" encoding="utf-8"?>
-<p:sld xmlns:a="http://schemas.openxmlformats.org/drawingml/2006/main" xmlns:r="http://schemas.openxmlformats.org/officeDocument/2006/relationships" xmlns:p="http://schemas.openxmlformats.org/presentationml/2006/main">
-  <p:cSld>
-    <p:spTree>
-      <p:nvGrpSpPr>
-        <p:cNvPr id="1" name=""/>
-        <p:cNvGrpSpPr/>
-        <p:nvPr/>
-      </p:nvGrpSpPr>
-      <p:grpSpPr>
-        <a:xfrm>
-          <a:off x="0" y="0"/>
-          <a:ext cx="0" cy="0"/>
-          <a:chOff x="0" y="0"/>
-          <a:chExt cx="0" cy="0"/>
-        </a:xfrm>
-      </p:grpSpPr>
-    </p:spTree>
-    <p:extLst>
-      <p:ext uri="{BB962C8B-B14F-4D97-AF65-F5344CB8AC3E}">
-        <p14:creationId xmlns:p14="http://schemas.microsoft.com/office/powerpoint/2010/main" val="2180391466"/>
-      </p:ext>
-    </p:extLst>
-  </p:cSld>
-  <p:clrMapOvr>
-    <a:masterClrMapping/>
-  </p:clrMapOvr>
-</p:sld>
-</file>
-
-<file path=ppt/slides/slide46.xml><?xml version="1.0" encoding="utf-8"?>
 <p:sld xmlns:a="http://schemas.openxmlformats.org/drawingml/2006/main" xmlns:r="http://schemas.openxmlformats.org/officeDocument/2006/relationships" xmlns:p="http://schemas.openxmlformats.org/presentationml/2006/main">
   <p:cSld>
     <p:spTree>

</xml_diff>

<commit_message>
+~ completed dynamics setup
</commit_message>
<xml_diff>
--- a/imgs/src/step-by-step-imgs.pptx
+++ b/imgs/src/step-by-step-imgs.pptx
@@ -20,16 +20,16 @@
     <p:sldId id="269" r:id="rId14"/>
     <p:sldId id="270" r:id="rId15"/>
     <p:sldId id="273" r:id="rId16"/>
-    <p:sldId id="271" r:id="rId17"/>
-    <p:sldId id="272" r:id="rId18"/>
-    <p:sldId id="278" r:id="rId19"/>
-    <p:sldId id="279" r:id="rId20"/>
-    <p:sldId id="280" r:id="rId21"/>
-    <p:sldId id="281" r:id="rId22"/>
-    <p:sldId id="282" r:id="rId23"/>
-    <p:sldId id="283" r:id="rId24"/>
-    <p:sldId id="284" r:id="rId25"/>
-    <p:sldId id="285" r:id="rId26"/>
+    <p:sldId id="279" r:id="rId17"/>
+    <p:sldId id="280" r:id="rId18"/>
+    <p:sldId id="281" r:id="rId19"/>
+    <p:sldId id="282" r:id="rId20"/>
+    <p:sldId id="283" r:id="rId21"/>
+    <p:sldId id="284" r:id="rId22"/>
+    <p:sldId id="285" r:id="rId23"/>
+    <p:sldId id="271" r:id="rId24"/>
+    <p:sldId id="272" r:id="rId25"/>
+    <p:sldId id="278" r:id="rId26"/>
     <p:sldId id="286" r:id="rId27"/>
     <p:sldId id="287" r:id="rId28"/>
     <p:sldId id="288" r:id="rId29"/>
@@ -4848,7 +4848,7 @@
           <p:cNvPr id="4" name="Picture 3">
             <a:extLst>
               <a:ext uri="{FF2B5EF4-FFF2-40B4-BE49-F238E27FC236}">
-                <a16:creationId xmlns:a16="http://schemas.microsoft.com/office/drawing/2014/main" id="{AE2B99B1-4536-4169-9FDF-9F2F04E47CD8}"/>
+                <a16:creationId xmlns:a16="http://schemas.microsoft.com/office/drawing/2014/main" id="{F21A5E34-6D4B-4946-8AA1-25E30390D46E}"/>
               </a:ext>
             </a:extLst>
           </p:cNvPr>
@@ -4865,8 +4865,8 @@
         </p:blipFill>
         <p:spPr>
           <a:xfrm>
-            <a:off x="609600" y="342900"/>
-            <a:ext cx="10972800" cy="6172200"/>
+            <a:off x="2005012" y="304800"/>
+            <a:ext cx="8181975" cy="6248400"/>
           </a:xfrm>
           <a:prstGeom prst="rect">
             <a:avLst/>
@@ -4878,7 +4878,7 @@
           <p:cNvPr id="6" name="Arrow: Up 5">
             <a:extLst>
               <a:ext uri="{FF2B5EF4-FFF2-40B4-BE49-F238E27FC236}">
-                <a16:creationId xmlns:a16="http://schemas.microsoft.com/office/drawing/2014/main" id="{89843461-8039-4E69-8857-DF859BBCCAD2}"/>
+                <a16:creationId xmlns:a16="http://schemas.microsoft.com/office/drawing/2014/main" id="{66123B85-6374-4C89-ADC8-CE8E7583029E}"/>
               </a:ext>
             </a:extLst>
           </p:cNvPr>
@@ -4886,9 +4886,9 @@
           <p:nvPr/>
         </p:nvSpPr>
         <p:spPr>
-          <a:xfrm>
-            <a:off x="7648252" y="1862810"/>
-            <a:ext cx="472535" cy="953985"/>
+          <a:xfrm rot="16200000">
+            <a:off x="3783918" y="3760663"/>
+            <a:ext cx="802133" cy="1619399"/>
           </a:xfrm>
           <a:prstGeom prst="upArrow">
             <a:avLst>
@@ -4922,14 +4922,17 @@
           <a:lstStyle/>
           <a:p>
             <a:pPr algn="ctr"/>
-            <a:endParaRPr lang="en-US"/>
+            <a:endParaRPr lang="en-US" sz="2800" b="1" dirty="0">
+              <a:latin typeface="Segoe UI" panose="020B0502040204020203" pitchFamily="34" charset="0"/>
+              <a:cs typeface="Segoe UI" panose="020B0502040204020203" pitchFamily="34" charset="0"/>
+            </a:endParaRPr>
           </a:p>
         </p:txBody>
       </p:sp>
     </p:spTree>
     <p:extLst>
       <p:ext uri="{BB962C8B-B14F-4D97-AF65-F5344CB8AC3E}">
-        <p14:creationId xmlns:p14="http://schemas.microsoft.com/office/powerpoint/2010/main" val="1127063973"/>
+        <p14:creationId xmlns:p14="http://schemas.microsoft.com/office/powerpoint/2010/main" val="2784679318"/>
       </p:ext>
     </p:extLst>
   </p:cSld>
@@ -4961,7 +4964,7 @@
           <p:cNvPr id="4" name="Picture 3">
             <a:extLst>
               <a:ext uri="{FF2B5EF4-FFF2-40B4-BE49-F238E27FC236}">
-                <a16:creationId xmlns:a16="http://schemas.microsoft.com/office/drawing/2014/main" id="{763769CC-5434-4008-AC47-03F3AD644E9F}"/>
+                <a16:creationId xmlns:a16="http://schemas.microsoft.com/office/drawing/2014/main" id="{7796A036-26ED-4BAE-A3B3-4A3DC9714691}"/>
               </a:ext>
             </a:extLst>
           </p:cNvPr>
@@ -4978,71 +4981,18 @@
         </p:blipFill>
         <p:spPr>
           <a:xfrm>
-            <a:off x="2171700" y="1157287"/>
-            <a:ext cx="7848600" cy="4543425"/>
+            <a:off x="2009775" y="1381125"/>
+            <a:ext cx="8172450" cy="4095750"/>
           </a:xfrm>
           <a:prstGeom prst="rect">
             <a:avLst/>
           </a:prstGeom>
         </p:spPr>
       </p:pic>
-      <p:sp>
-        <p:nvSpPr>
-          <p:cNvPr id="6" name="Arrow: Up 5">
-            <a:extLst>
-              <a:ext uri="{FF2B5EF4-FFF2-40B4-BE49-F238E27FC236}">
-                <a16:creationId xmlns:a16="http://schemas.microsoft.com/office/drawing/2014/main" id="{CF39076D-2B22-490B-A1B0-94BAC9BF11EF}"/>
-              </a:ext>
-            </a:extLst>
-          </p:cNvPr>
-          <p:cNvSpPr/>
-          <p:nvPr/>
-        </p:nvSpPr>
-        <p:spPr>
-          <a:xfrm>
-            <a:off x="6777162" y="3784092"/>
-            <a:ext cx="472535" cy="953985"/>
-          </a:xfrm>
-          <a:prstGeom prst="upArrow">
-            <a:avLst>
-              <a:gd name="adj1" fmla="val 50000"/>
-              <a:gd name="adj2" fmla="val 89626"/>
-            </a:avLst>
-          </a:prstGeom>
-          <a:solidFill>
-            <a:srgbClr val="C00000"/>
-          </a:solidFill>
-          <a:ln>
-            <a:noFill/>
-          </a:ln>
-        </p:spPr>
-        <p:style>
-          <a:lnRef idx="0">
-            <a:schemeClr val="accent1"/>
-          </a:lnRef>
-          <a:fillRef idx="3">
-            <a:schemeClr val="accent1"/>
-          </a:fillRef>
-          <a:effectRef idx="3">
-            <a:schemeClr val="accent1"/>
-          </a:effectRef>
-          <a:fontRef idx="minor">
-            <a:schemeClr val="lt1"/>
-          </a:fontRef>
-        </p:style>
-        <p:txBody>
-          <a:bodyPr rtlCol="0" anchor="ctr"/>
-          <a:lstStyle/>
-          <a:p>
-            <a:pPr algn="ctr"/>
-            <a:endParaRPr lang="en-US"/>
-          </a:p>
-        </p:txBody>
-      </p:sp>
     </p:spTree>
     <p:extLst>
       <p:ext uri="{BB962C8B-B14F-4D97-AF65-F5344CB8AC3E}">
-        <p14:creationId xmlns:p14="http://schemas.microsoft.com/office/powerpoint/2010/main" val="1356783828"/>
+        <p14:creationId xmlns:p14="http://schemas.microsoft.com/office/powerpoint/2010/main" val="1310995319"/>
       </p:ext>
     </p:extLst>
   </p:cSld>
@@ -5074,7 +5024,7 @@
           <p:cNvPr id="4" name="Picture 3">
             <a:extLst>
               <a:ext uri="{FF2B5EF4-FFF2-40B4-BE49-F238E27FC236}">
-                <a16:creationId xmlns:a16="http://schemas.microsoft.com/office/drawing/2014/main" id="{8697CD62-ED90-47CF-91B2-2EB5026FFC64}"/>
+                <a16:creationId xmlns:a16="http://schemas.microsoft.com/office/drawing/2014/main" id="{B47A8A26-F744-49A0-9F68-CF77739A6376}"/>
               </a:ext>
             </a:extLst>
           </p:cNvPr>
@@ -5091,8 +5041,8 @@
         </p:blipFill>
         <p:spPr>
           <a:xfrm>
-            <a:off x="609600" y="342900"/>
-            <a:ext cx="10972800" cy="6172200"/>
+            <a:off x="2014537" y="1395412"/>
+            <a:ext cx="8162925" cy="4067175"/>
           </a:xfrm>
           <a:prstGeom prst="rect">
             <a:avLst/>
@@ -5101,10 +5051,10 @@
       </p:pic>
       <p:sp>
         <p:nvSpPr>
-          <p:cNvPr id="8" name="Arrow: Up 7">
-            <a:extLst>
-              <a:ext uri="{FF2B5EF4-FFF2-40B4-BE49-F238E27FC236}">
-                <a16:creationId xmlns:a16="http://schemas.microsoft.com/office/drawing/2014/main" id="{98D3F908-04D1-4777-91F7-726849A4A0A2}"/>
+          <p:cNvPr id="6" name="Arrow: Up 5">
+            <a:extLst>
+              <a:ext uri="{FF2B5EF4-FFF2-40B4-BE49-F238E27FC236}">
+                <a16:creationId xmlns:a16="http://schemas.microsoft.com/office/drawing/2014/main" id="{64056A5E-D70A-4D02-8EE5-E4BE4D3067AC}"/>
               </a:ext>
             </a:extLst>
           </p:cNvPr>
@@ -5113,7 +5063,7 @@
         </p:nvSpPr>
         <p:spPr>
           <a:xfrm>
-            <a:off x="10414449" y="815891"/>
+            <a:off x="4796119" y="1717267"/>
             <a:ext cx="802133" cy="1619399"/>
           </a:xfrm>
           <a:prstGeom prst="upArrow">
@@ -5157,10 +5107,10 @@
       </p:sp>
       <p:sp>
         <p:nvSpPr>
-          <p:cNvPr id="10" name="TextBox 9">
-            <a:extLst>
-              <a:ext uri="{FF2B5EF4-FFF2-40B4-BE49-F238E27FC236}">
-                <a16:creationId xmlns:a16="http://schemas.microsoft.com/office/drawing/2014/main" id="{C3AB4731-C723-44F2-9003-119C199CC0CC}"/>
+          <p:cNvPr id="8" name="TextBox 7">
+            <a:extLst>
+              <a:ext uri="{FF2B5EF4-FFF2-40B4-BE49-F238E27FC236}">
+                <a16:creationId xmlns:a16="http://schemas.microsoft.com/office/drawing/2014/main" id="{A3B5A497-90CD-4AA8-8CC6-641421BA8DC7}"/>
               </a:ext>
             </a:extLst>
           </p:cNvPr>
@@ -5169,7 +5119,7 @@
         </p:nvSpPr>
         <p:spPr>
           <a:xfrm>
-            <a:off x="10606607" y="1412826"/>
+            <a:off x="4988277" y="2257215"/>
             <a:ext cx="290319" cy="523220"/>
           </a:xfrm>
           <a:prstGeom prst="rect">
@@ -5199,10 +5149,10 @@
       </p:sp>
       <p:sp>
         <p:nvSpPr>
-          <p:cNvPr id="12" name="Arrow: Up 11">
-            <a:extLst>
-              <a:ext uri="{FF2B5EF4-FFF2-40B4-BE49-F238E27FC236}">
-                <a16:creationId xmlns:a16="http://schemas.microsoft.com/office/drawing/2014/main" id="{BB0830C3-12B7-41C6-9BCD-B9D2A1EFBCC8}"/>
+          <p:cNvPr id="10" name="Arrow: Up 9">
+            <a:extLst>
+              <a:ext uri="{FF2B5EF4-FFF2-40B4-BE49-F238E27FC236}">
+                <a16:creationId xmlns:a16="http://schemas.microsoft.com/office/drawing/2014/main" id="{28191C5E-0311-428F-9AB8-254A5630288A}"/>
               </a:ext>
             </a:extLst>
           </p:cNvPr>
@@ -5210,8 +5160,8 @@
           <p:nvPr/>
         </p:nvSpPr>
         <p:spPr>
-          <a:xfrm rot="16200000">
-            <a:off x="2416225" y="3850215"/>
+          <a:xfrm>
+            <a:off x="6593749" y="2619300"/>
             <a:ext cx="802133" cy="1619399"/>
           </a:xfrm>
           <a:prstGeom prst="upArrow">
@@ -5255,10 +5205,10 @@
       </p:sp>
       <p:sp>
         <p:nvSpPr>
-          <p:cNvPr id="14" name="TextBox 13">
-            <a:extLst>
-              <a:ext uri="{FF2B5EF4-FFF2-40B4-BE49-F238E27FC236}">
-                <a16:creationId xmlns:a16="http://schemas.microsoft.com/office/drawing/2014/main" id="{5EFBB78B-8574-4FC0-8412-4248DE850286}"/>
+          <p:cNvPr id="12" name="TextBox 11">
+            <a:extLst>
+              <a:ext uri="{FF2B5EF4-FFF2-40B4-BE49-F238E27FC236}">
+                <a16:creationId xmlns:a16="http://schemas.microsoft.com/office/drawing/2014/main" id="{59DAA8E2-EBCF-4C80-9E60-1C3DCAB7E688}"/>
               </a:ext>
             </a:extLst>
           </p:cNvPr>
@@ -5267,7 +5217,7 @@
         </p:nvSpPr>
         <p:spPr>
           <a:xfrm>
-            <a:off x="2673511" y="4390163"/>
+            <a:off x="6785907" y="3159248"/>
             <a:ext cx="290319" cy="523220"/>
           </a:xfrm>
           <a:prstGeom prst="rect">
@@ -5298,7 +5248,7 @@
     </p:spTree>
     <p:extLst>
       <p:ext uri="{BB962C8B-B14F-4D97-AF65-F5344CB8AC3E}">
-        <p14:creationId xmlns:p14="http://schemas.microsoft.com/office/powerpoint/2010/main" val="4241489412"/>
+        <p14:creationId xmlns:p14="http://schemas.microsoft.com/office/powerpoint/2010/main" val="4292414777"/>
       </p:ext>
     </p:extLst>
   </p:cSld>
@@ -5325,10 +5275,138 @@
           <a:chExt cx="0" cy="0"/>
         </a:xfrm>
       </p:grpSpPr>
+      <p:pic>
+        <p:nvPicPr>
+          <p:cNvPr id="4" name="Picture 3">
+            <a:extLst>
+              <a:ext uri="{FF2B5EF4-FFF2-40B4-BE49-F238E27FC236}">
+                <a16:creationId xmlns:a16="http://schemas.microsoft.com/office/drawing/2014/main" id="{5CB39BDA-3DDE-469C-B3DB-B3F102BA4DCF}"/>
+              </a:ext>
+            </a:extLst>
+          </p:cNvPr>
+          <p:cNvPicPr>
+            <a:picLocks noChangeAspect="1"/>
+          </p:cNvPicPr>
+          <p:nvPr/>
+        </p:nvPicPr>
+        <p:blipFill>
+          <a:blip r:embed="rId2"/>
+          <a:stretch>
+            <a:fillRect/>
+          </a:stretch>
+        </p:blipFill>
+        <p:spPr>
+          <a:xfrm>
+            <a:off x="2005012" y="1309687"/>
+            <a:ext cx="8181975" cy="4238625"/>
+          </a:xfrm>
+          <a:prstGeom prst="rect">
+            <a:avLst/>
+          </a:prstGeom>
+        </p:spPr>
+      </p:pic>
+      <p:sp>
+        <p:nvSpPr>
+          <p:cNvPr id="6" name="Arrow: Up 5">
+            <a:extLst>
+              <a:ext uri="{FF2B5EF4-FFF2-40B4-BE49-F238E27FC236}">
+                <a16:creationId xmlns:a16="http://schemas.microsoft.com/office/drawing/2014/main" id="{68C2EB49-4750-4752-8DA6-5CF5C6FEA46E}"/>
+              </a:ext>
+            </a:extLst>
+          </p:cNvPr>
+          <p:cNvSpPr/>
+          <p:nvPr/>
+        </p:nvSpPr>
+        <p:spPr>
+          <a:xfrm>
+            <a:off x="2687593" y="3280344"/>
+            <a:ext cx="802133" cy="1619399"/>
+          </a:xfrm>
+          <a:prstGeom prst="upArrow">
+            <a:avLst>
+              <a:gd name="adj1" fmla="val 50000"/>
+              <a:gd name="adj2" fmla="val 89626"/>
+            </a:avLst>
+          </a:prstGeom>
+          <a:solidFill>
+            <a:srgbClr val="C00000"/>
+          </a:solidFill>
+          <a:ln>
+            <a:noFill/>
+          </a:ln>
+        </p:spPr>
+        <p:style>
+          <a:lnRef idx="0">
+            <a:schemeClr val="accent1"/>
+          </a:lnRef>
+          <a:fillRef idx="3">
+            <a:schemeClr val="accent1"/>
+          </a:fillRef>
+          <a:effectRef idx="3">
+            <a:schemeClr val="accent1"/>
+          </a:effectRef>
+          <a:fontRef idx="minor">
+            <a:schemeClr val="lt1"/>
+          </a:fontRef>
+        </p:style>
+        <p:txBody>
+          <a:bodyPr rtlCol="0" anchor="ctr"/>
+          <a:lstStyle/>
+          <a:p>
+            <a:pPr algn="ctr"/>
+            <a:endParaRPr lang="en-US" sz="2800" b="1" dirty="0">
+              <a:latin typeface="Segoe UI" panose="020B0502040204020203" pitchFamily="34" charset="0"/>
+              <a:cs typeface="Segoe UI" panose="020B0502040204020203" pitchFamily="34" charset="0"/>
+            </a:endParaRPr>
+          </a:p>
+        </p:txBody>
+      </p:sp>
+      <p:sp>
+        <p:nvSpPr>
+          <p:cNvPr id="8" name="TextBox 7">
+            <a:extLst>
+              <a:ext uri="{FF2B5EF4-FFF2-40B4-BE49-F238E27FC236}">
+                <a16:creationId xmlns:a16="http://schemas.microsoft.com/office/drawing/2014/main" id="{F72F49D7-DB6F-42FC-B4D4-D8AEAF1E227A}"/>
+              </a:ext>
+            </a:extLst>
+          </p:cNvPr>
+          <p:cNvSpPr txBox="1"/>
+          <p:nvPr/>
+        </p:nvSpPr>
+        <p:spPr>
+          <a:xfrm>
+            <a:off x="2879751" y="3820292"/>
+            <a:ext cx="290319" cy="523220"/>
+          </a:xfrm>
+          <a:prstGeom prst="rect">
+            <a:avLst/>
+          </a:prstGeom>
+          <a:noFill/>
+        </p:spPr>
+        <p:txBody>
+          <a:bodyPr wrap="square" rtlCol="0">
+            <a:spAutoFit/>
+          </a:bodyPr>
+          <a:lstStyle/>
+          <a:p>
+            <a:pPr algn="l"/>
+            <a:r>
+              <a:rPr lang="en-US" sz="2800" b="1" dirty="0">
+                <a:solidFill>
+                  <a:schemeClr val="bg1"/>
+                </a:solidFill>
+                <a:latin typeface="Segoe UI" panose="020B0502040204020203" pitchFamily="34" charset="0"/>
+                <a:cs typeface="Segoe UI" panose="020B0502040204020203" pitchFamily="34" charset="0"/>
+              </a:rPr>
+              <a:t>C</a:t>
+            </a:r>
+          </a:p>
+        </p:txBody>
+      </p:sp>
     </p:spTree>
     <p:extLst>
       <p:ext uri="{BB962C8B-B14F-4D97-AF65-F5344CB8AC3E}">
-        <p14:creationId xmlns:p14="http://schemas.microsoft.com/office/powerpoint/2010/main" val="2784679318"/>
+        <p14:creationId xmlns:p14="http://schemas.microsoft.com/office/powerpoint/2010/main" val="831793758"/>
       </p:ext>
     </p:extLst>
   </p:cSld>
@@ -5572,10 +5650,96 @@
           <a:chExt cx="0" cy="0"/>
         </a:xfrm>
       </p:grpSpPr>
+      <p:pic>
+        <p:nvPicPr>
+          <p:cNvPr id="4" name="Picture 3">
+            <a:extLst>
+              <a:ext uri="{FF2B5EF4-FFF2-40B4-BE49-F238E27FC236}">
+                <a16:creationId xmlns:a16="http://schemas.microsoft.com/office/drawing/2014/main" id="{932BDEF3-F0DC-4603-BC87-E0BF4C21CE63}"/>
+              </a:ext>
+            </a:extLst>
+          </p:cNvPr>
+          <p:cNvPicPr>
+            <a:picLocks noChangeAspect="1"/>
+          </p:cNvPicPr>
+          <p:nvPr/>
+        </p:nvPicPr>
+        <p:blipFill>
+          <a:blip r:embed="rId2"/>
+          <a:stretch>
+            <a:fillRect/>
+          </a:stretch>
+        </p:blipFill>
+        <p:spPr>
+          <a:xfrm>
+            <a:off x="2000250" y="1590675"/>
+            <a:ext cx="8191500" cy="3676650"/>
+          </a:xfrm>
+          <a:prstGeom prst="rect">
+            <a:avLst/>
+          </a:prstGeom>
+        </p:spPr>
+      </p:pic>
+      <p:sp>
+        <p:nvSpPr>
+          <p:cNvPr id="6" name="Arrow: Up 5">
+            <a:extLst>
+              <a:ext uri="{FF2B5EF4-FFF2-40B4-BE49-F238E27FC236}">
+                <a16:creationId xmlns:a16="http://schemas.microsoft.com/office/drawing/2014/main" id="{FA149F40-A253-4F63-8CF4-986F72B0EFCC}"/>
+              </a:ext>
+            </a:extLst>
+          </p:cNvPr>
+          <p:cNvSpPr/>
+          <p:nvPr/>
+        </p:nvSpPr>
+        <p:spPr>
+          <a:xfrm rot="16200000">
+            <a:off x="3547828" y="2278996"/>
+            <a:ext cx="802133" cy="1619399"/>
+          </a:xfrm>
+          <a:prstGeom prst="upArrow">
+            <a:avLst>
+              <a:gd name="adj1" fmla="val 50000"/>
+              <a:gd name="adj2" fmla="val 89626"/>
+            </a:avLst>
+          </a:prstGeom>
+          <a:solidFill>
+            <a:srgbClr val="C00000"/>
+          </a:solidFill>
+          <a:ln>
+            <a:noFill/>
+          </a:ln>
+        </p:spPr>
+        <p:style>
+          <a:lnRef idx="0">
+            <a:schemeClr val="accent1"/>
+          </a:lnRef>
+          <a:fillRef idx="3">
+            <a:schemeClr val="accent1"/>
+          </a:fillRef>
+          <a:effectRef idx="3">
+            <a:schemeClr val="accent1"/>
+          </a:effectRef>
+          <a:fontRef idx="minor">
+            <a:schemeClr val="lt1"/>
+          </a:fontRef>
+        </p:style>
+        <p:txBody>
+          <a:bodyPr rtlCol="0" anchor="ctr"/>
+          <a:lstStyle/>
+          <a:p>
+            <a:pPr algn="ctr"/>
+            <a:endParaRPr lang="en-US" sz="2800" b="1" dirty="0">
+              <a:latin typeface="Segoe UI" panose="020B0502040204020203" pitchFamily="34" charset="0"/>
+              <a:cs typeface="Segoe UI" panose="020B0502040204020203" pitchFamily="34" charset="0"/>
+            </a:endParaRPr>
+          </a:p>
+        </p:txBody>
+      </p:sp>
     </p:spTree>
     <p:extLst>
       <p:ext uri="{BB962C8B-B14F-4D97-AF65-F5344CB8AC3E}">
-        <p14:creationId xmlns:p14="http://schemas.microsoft.com/office/powerpoint/2010/main" val="1310995319"/>
+        <p14:creationId xmlns:p14="http://schemas.microsoft.com/office/powerpoint/2010/main" val="2806491056"/>
       </p:ext>
     </p:extLst>
   </p:cSld>
@@ -5602,10 +5766,364 @@
           <a:chExt cx="0" cy="0"/>
         </a:xfrm>
       </p:grpSpPr>
+      <p:pic>
+        <p:nvPicPr>
+          <p:cNvPr id="4" name="Picture 3">
+            <a:extLst>
+              <a:ext uri="{FF2B5EF4-FFF2-40B4-BE49-F238E27FC236}">
+                <a16:creationId xmlns:a16="http://schemas.microsoft.com/office/drawing/2014/main" id="{71550629-96FC-4E67-99CF-2A15FF6201F0}"/>
+              </a:ext>
+            </a:extLst>
+          </p:cNvPr>
+          <p:cNvPicPr>
+            <a:picLocks noChangeAspect="1"/>
+          </p:cNvPicPr>
+          <p:nvPr/>
+        </p:nvPicPr>
+        <p:blipFill>
+          <a:blip r:embed="rId2"/>
+          <a:stretch>
+            <a:fillRect/>
+          </a:stretch>
+        </p:blipFill>
+        <p:spPr>
+          <a:xfrm>
+            <a:off x="2005012" y="1352550"/>
+            <a:ext cx="8181975" cy="4152900"/>
+          </a:xfrm>
+          <a:prstGeom prst="rect">
+            <a:avLst/>
+          </a:prstGeom>
+        </p:spPr>
+      </p:pic>
+      <p:sp>
+        <p:nvSpPr>
+          <p:cNvPr id="6" name="Arrow: Up 5">
+            <a:extLst>
+              <a:ext uri="{FF2B5EF4-FFF2-40B4-BE49-F238E27FC236}">
+                <a16:creationId xmlns:a16="http://schemas.microsoft.com/office/drawing/2014/main" id="{27F17E6C-D8F3-499B-B498-F2E6C80ED6E4}"/>
+              </a:ext>
+            </a:extLst>
+          </p:cNvPr>
+          <p:cNvSpPr/>
+          <p:nvPr/>
+        </p:nvSpPr>
+        <p:spPr>
+          <a:xfrm>
+            <a:off x="2134004" y="3785087"/>
+            <a:ext cx="802133" cy="1619399"/>
+          </a:xfrm>
+          <a:prstGeom prst="upArrow">
+            <a:avLst>
+              <a:gd name="adj1" fmla="val 50000"/>
+              <a:gd name="adj2" fmla="val 89626"/>
+            </a:avLst>
+          </a:prstGeom>
+          <a:solidFill>
+            <a:srgbClr val="C00000"/>
+          </a:solidFill>
+          <a:ln>
+            <a:noFill/>
+          </a:ln>
+        </p:spPr>
+        <p:style>
+          <a:lnRef idx="0">
+            <a:schemeClr val="accent1"/>
+          </a:lnRef>
+          <a:fillRef idx="3">
+            <a:schemeClr val="accent1"/>
+          </a:fillRef>
+          <a:effectRef idx="3">
+            <a:schemeClr val="accent1"/>
+          </a:effectRef>
+          <a:fontRef idx="minor">
+            <a:schemeClr val="lt1"/>
+          </a:fontRef>
+        </p:style>
+        <p:txBody>
+          <a:bodyPr rtlCol="0" anchor="ctr"/>
+          <a:lstStyle/>
+          <a:p>
+            <a:pPr algn="ctr"/>
+            <a:endParaRPr lang="en-US" sz="2800" b="1" dirty="0">
+              <a:latin typeface="Segoe UI" panose="020B0502040204020203" pitchFamily="34" charset="0"/>
+              <a:cs typeface="Segoe UI" panose="020B0502040204020203" pitchFamily="34" charset="0"/>
+            </a:endParaRPr>
+          </a:p>
+        </p:txBody>
+      </p:sp>
+      <p:sp>
+        <p:nvSpPr>
+          <p:cNvPr id="8" name="TextBox 7">
+            <a:extLst>
+              <a:ext uri="{FF2B5EF4-FFF2-40B4-BE49-F238E27FC236}">
+                <a16:creationId xmlns:a16="http://schemas.microsoft.com/office/drawing/2014/main" id="{0F586391-C06B-4965-BD49-A05F09EAF0A3}"/>
+              </a:ext>
+            </a:extLst>
+          </p:cNvPr>
+          <p:cNvSpPr txBox="1"/>
+          <p:nvPr/>
+        </p:nvSpPr>
+        <p:spPr>
+          <a:xfrm>
+            <a:off x="2326162" y="4325035"/>
+            <a:ext cx="290319" cy="523220"/>
+          </a:xfrm>
+          <a:prstGeom prst="rect">
+            <a:avLst/>
+          </a:prstGeom>
+          <a:noFill/>
+        </p:spPr>
+        <p:txBody>
+          <a:bodyPr wrap="square" rtlCol="0">
+            <a:spAutoFit/>
+          </a:bodyPr>
+          <a:lstStyle/>
+          <a:p>
+            <a:pPr algn="l"/>
+            <a:r>
+              <a:rPr lang="en-US" sz="2800" b="1" dirty="0">
+                <a:solidFill>
+                  <a:schemeClr val="bg1"/>
+                </a:solidFill>
+                <a:latin typeface="Segoe UI" panose="020B0502040204020203" pitchFamily="34" charset="0"/>
+                <a:cs typeface="Segoe UI" panose="020B0502040204020203" pitchFamily="34" charset="0"/>
+              </a:rPr>
+              <a:t>A</a:t>
+            </a:r>
+          </a:p>
+        </p:txBody>
+      </p:sp>
+      <p:sp>
+        <p:nvSpPr>
+          <p:cNvPr id="10" name="Arrow: Up 9">
+            <a:extLst>
+              <a:ext uri="{FF2B5EF4-FFF2-40B4-BE49-F238E27FC236}">
+                <a16:creationId xmlns:a16="http://schemas.microsoft.com/office/drawing/2014/main" id="{3029AAE9-D4BA-4480-981C-B3B05C7C804A}"/>
+              </a:ext>
+            </a:extLst>
+          </p:cNvPr>
+          <p:cNvSpPr/>
+          <p:nvPr/>
+        </p:nvSpPr>
+        <p:spPr>
+          <a:xfrm>
+            <a:off x="3947916" y="2277377"/>
+            <a:ext cx="802133" cy="1619399"/>
+          </a:xfrm>
+          <a:prstGeom prst="upArrow">
+            <a:avLst>
+              <a:gd name="adj1" fmla="val 50000"/>
+              <a:gd name="adj2" fmla="val 89626"/>
+            </a:avLst>
+          </a:prstGeom>
+          <a:solidFill>
+            <a:srgbClr val="C00000"/>
+          </a:solidFill>
+          <a:ln>
+            <a:noFill/>
+          </a:ln>
+        </p:spPr>
+        <p:style>
+          <a:lnRef idx="0">
+            <a:schemeClr val="accent1"/>
+          </a:lnRef>
+          <a:fillRef idx="3">
+            <a:schemeClr val="accent1"/>
+          </a:fillRef>
+          <a:effectRef idx="3">
+            <a:schemeClr val="accent1"/>
+          </a:effectRef>
+          <a:fontRef idx="minor">
+            <a:schemeClr val="lt1"/>
+          </a:fontRef>
+        </p:style>
+        <p:txBody>
+          <a:bodyPr rtlCol="0" anchor="ctr"/>
+          <a:lstStyle/>
+          <a:p>
+            <a:pPr algn="ctr"/>
+            <a:endParaRPr lang="en-US" sz="2800" b="1" dirty="0">
+              <a:latin typeface="Segoe UI" panose="020B0502040204020203" pitchFamily="34" charset="0"/>
+              <a:cs typeface="Segoe UI" panose="020B0502040204020203" pitchFamily="34" charset="0"/>
+            </a:endParaRPr>
+          </a:p>
+        </p:txBody>
+      </p:sp>
+      <p:sp>
+        <p:nvSpPr>
+          <p:cNvPr id="12" name="TextBox 11">
+            <a:extLst>
+              <a:ext uri="{FF2B5EF4-FFF2-40B4-BE49-F238E27FC236}">
+                <a16:creationId xmlns:a16="http://schemas.microsoft.com/office/drawing/2014/main" id="{617ECFC3-91FA-4DC4-8291-228F816BECB9}"/>
+              </a:ext>
+            </a:extLst>
+          </p:cNvPr>
+          <p:cNvSpPr txBox="1"/>
+          <p:nvPr/>
+        </p:nvSpPr>
+        <p:spPr>
+          <a:xfrm>
+            <a:off x="4140074" y="2817325"/>
+            <a:ext cx="290319" cy="523220"/>
+          </a:xfrm>
+          <a:prstGeom prst="rect">
+            <a:avLst/>
+          </a:prstGeom>
+          <a:noFill/>
+        </p:spPr>
+        <p:txBody>
+          <a:bodyPr wrap="square" rtlCol="0">
+            <a:spAutoFit/>
+          </a:bodyPr>
+          <a:lstStyle/>
+          <a:p>
+            <a:pPr algn="l"/>
+            <a:r>
+              <a:rPr lang="en-US" sz="2800" b="1" dirty="0">
+                <a:solidFill>
+                  <a:schemeClr val="bg1"/>
+                </a:solidFill>
+                <a:latin typeface="Segoe UI" panose="020B0502040204020203" pitchFamily="34" charset="0"/>
+                <a:cs typeface="Segoe UI" panose="020B0502040204020203" pitchFamily="34" charset="0"/>
+              </a:rPr>
+              <a:t>B</a:t>
+            </a:r>
+          </a:p>
+        </p:txBody>
+      </p:sp>
+      <p:pic>
+        <p:nvPicPr>
+          <p:cNvPr id="15" name="Picture 14">
+            <a:extLst>
+              <a:ext uri="{FF2B5EF4-FFF2-40B4-BE49-F238E27FC236}">
+                <a16:creationId xmlns:a16="http://schemas.microsoft.com/office/drawing/2014/main" id="{3960078F-975C-45C5-AB18-941ED747863F}"/>
+              </a:ext>
+            </a:extLst>
+          </p:cNvPr>
+          <p:cNvPicPr>
+            <a:picLocks noChangeAspect="1"/>
+          </p:cNvPicPr>
+          <p:nvPr/>
+        </p:nvPicPr>
+        <p:blipFill>
+          <a:blip r:embed="rId3"/>
+          <a:stretch>
+            <a:fillRect/>
+          </a:stretch>
+        </p:blipFill>
+        <p:spPr>
+          <a:xfrm>
+            <a:off x="4750049" y="3896776"/>
+            <a:ext cx="4591050" cy="2343150"/>
+          </a:xfrm>
+          <a:prstGeom prst="rect">
+            <a:avLst/>
+          </a:prstGeom>
+        </p:spPr>
+      </p:pic>
+      <p:sp>
+        <p:nvSpPr>
+          <p:cNvPr id="17" name="Arrow: Up 16">
+            <a:extLst>
+              <a:ext uri="{FF2B5EF4-FFF2-40B4-BE49-F238E27FC236}">
+                <a16:creationId xmlns:a16="http://schemas.microsoft.com/office/drawing/2014/main" id="{C80F160C-5AEF-4541-9DDC-8BC96DC7DCD6}"/>
+              </a:ext>
+            </a:extLst>
+          </p:cNvPr>
+          <p:cNvSpPr/>
+          <p:nvPr/>
+        </p:nvSpPr>
+        <p:spPr>
+          <a:xfrm rot="10800000">
+            <a:off x="7438137" y="4139393"/>
+            <a:ext cx="802133" cy="1619399"/>
+          </a:xfrm>
+          <a:prstGeom prst="upArrow">
+            <a:avLst>
+              <a:gd name="adj1" fmla="val 50000"/>
+              <a:gd name="adj2" fmla="val 89626"/>
+            </a:avLst>
+          </a:prstGeom>
+          <a:solidFill>
+            <a:srgbClr val="C00000"/>
+          </a:solidFill>
+          <a:ln>
+            <a:noFill/>
+          </a:ln>
+        </p:spPr>
+        <p:style>
+          <a:lnRef idx="0">
+            <a:schemeClr val="accent1"/>
+          </a:lnRef>
+          <a:fillRef idx="3">
+            <a:schemeClr val="accent1"/>
+          </a:fillRef>
+          <a:effectRef idx="3">
+            <a:schemeClr val="accent1"/>
+          </a:effectRef>
+          <a:fontRef idx="minor">
+            <a:schemeClr val="lt1"/>
+          </a:fontRef>
+        </p:style>
+        <p:txBody>
+          <a:bodyPr rtlCol="0" anchor="ctr"/>
+          <a:lstStyle/>
+          <a:p>
+            <a:pPr algn="ctr"/>
+            <a:endParaRPr lang="en-US" sz="2800" b="1" dirty="0">
+              <a:latin typeface="Segoe UI" panose="020B0502040204020203" pitchFamily="34" charset="0"/>
+              <a:cs typeface="Segoe UI" panose="020B0502040204020203" pitchFamily="34" charset="0"/>
+            </a:endParaRPr>
+          </a:p>
+        </p:txBody>
+      </p:sp>
+      <p:sp>
+        <p:nvSpPr>
+          <p:cNvPr id="19" name="TextBox 18">
+            <a:extLst>
+              <a:ext uri="{FF2B5EF4-FFF2-40B4-BE49-F238E27FC236}">
+                <a16:creationId xmlns:a16="http://schemas.microsoft.com/office/drawing/2014/main" id="{7F25F45A-60AF-462E-8D7D-E44E7427B9FA}"/>
+              </a:ext>
+            </a:extLst>
+          </p:cNvPr>
+          <p:cNvSpPr txBox="1"/>
+          <p:nvPr/>
+        </p:nvSpPr>
+        <p:spPr>
+          <a:xfrm>
+            <a:off x="7630294" y="4619742"/>
+            <a:ext cx="290319" cy="523220"/>
+          </a:xfrm>
+          <a:prstGeom prst="rect">
+            <a:avLst/>
+          </a:prstGeom>
+          <a:noFill/>
+        </p:spPr>
+        <p:txBody>
+          <a:bodyPr wrap="square" rtlCol="0">
+            <a:spAutoFit/>
+          </a:bodyPr>
+          <a:lstStyle/>
+          <a:p>
+            <a:pPr algn="l"/>
+            <a:r>
+              <a:rPr lang="en-US" sz="2800" b="1" dirty="0">
+                <a:solidFill>
+                  <a:schemeClr val="bg1"/>
+                </a:solidFill>
+                <a:latin typeface="Segoe UI" panose="020B0502040204020203" pitchFamily="34" charset="0"/>
+                <a:cs typeface="Segoe UI" panose="020B0502040204020203" pitchFamily="34" charset="0"/>
+              </a:rPr>
+              <a:t>C</a:t>
+            </a:r>
+          </a:p>
+        </p:txBody>
+      </p:sp>
     </p:spTree>
     <p:extLst>
       <p:ext uri="{BB962C8B-B14F-4D97-AF65-F5344CB8AC3E}">
-        <p14:creationId xmlns:p14="http://schemas.microsoft.com/office/powerpoint/2010/main" val="4292414777"/>
+        <p14:creationId xmlns:p14="http://schemas.microsoft.com/office/powerpoint/2010/main" val="1918321829"/>
       </p:ext>
     </p:extLst>
   </p:cSld>
@@ -5635,7 +6153,7 @@
     </p:spTree>
     <p:extLst>
       <p:ext uri="{BB962C8B-B14F-4D97-AF65-F5344CB8AC3E}">
-        <p14:creationId xmlns:p14="http://schemas.microsoft.com/office/powerpoint/2010/main" val="831793758"/>
+        <p14:creationId xmlns:p14="http://schemas.microsoft.com/office/powerpoint/2010/main" val="528842390"/>
       </p:ext>
     </p:extLst>
   </p:cSld>
@@ -5662,10 +6180,93 @@
           <a:chExt cx="0" cy="0"/>
         </a:xfrm>
       </p:grpSpPr>
+      <p:pic>
+        <p:nvPicPr>
+          <p:cNvPr id="4" name="Picture 3">
+            <a:extLst>
+              <a:ext uri="{FF2B5EF4-FFF2-40B4-BE49-F238E27FC236}">
+                <a16:creationId xmlns:a16="http://schemas.microsoft.com/office/drawing/2014/main" id="{AE2B99B1-4536-4169-9FDF-9F2F04E47CD8}"/>
+              </a:ext>
+            </a:extLst>
+          </p:cNvPr>
+          <p:cNvPicPr>
+            <a:picLocks noChangeAspect="1"/>
+          </p:cNvPicPr>
+          <p:nvPr/>
+        </p:nvPicPr>
+        <p:blipFill>
+          <a:blip r:embed="rId2"/>
+          <a:stretch>
+            <a:fillRect/>
+          </a:stretch>
+        </p:blipFill>
+        <p:spPr>
+          <a:xfrm>
+            <a:off x="609600" y="342900"/>
+            <a:ext cx="10972800" cy="6172200"/>
+          </a:xfrm>
+          <a:prstGeom prst="rect">
+            <a:avLst/>
+          </a:prstGeom>
+        </p:spPr>
+      </p:pic>
+      <p:sp>
+        <p:nvSpPr>
+          <p:cNvPr id="6" name="Arrow: Up 5">
+            <a:extLst>
+              <a:ext uri="{FF2B5EF4-FFF2-40B4-BE49-F238E27FC236}">
+                <a16:creationId xmlns:a16="http://schemas.microsoft.com/office/drawing/2014/main" id="{89843461-8039-4E69-8857-DF859BBCCAD2}"/>
+              </a:ext>
+            </a:extLst>
+          </p:cNvPr>
+          <p:cNvSpPr/>
+          <p:nvPr/>
+        </p:nvSpPr>
+        <p:spPr>
+          <a:xfrm>
+            <a:off x="7648252" y="1862810"/>
+            <a:ext cx="472535" cy="953985"/>
+          </a:xfrm>
+          <a:prstGeom prst="upArrow">
+            <a:avLst>
+              <a:gd name="adj1" fmla="val 50000"/>
+              <a:gd name="adj2" fmla="val 89626"/>
+            </a:avLst>
+          </a:prstGeom>
+          <a:solidFill>
+            <a:srgbClr val="C00000"/>
+          </a:solidFill>
+          <a:ln>
+            <a:noFill/>
+          </a:ln>
+        </p:spPr>
+        <p:style>
+          <a:lnRef idx="0">
+            <a:schemeClr val="accent1"/>
+          </a:lnRef>
+          <a:fillRef idx="3">
+            <a:schemeClr val="accent1"/>
+          </a:fillRef>
+          <a:effectRef idx="3">
+            <a:schemeClr val="accent1"/>
+          </a:effectRef>
+          <a:fontRef idx="minor">
+            <a:schemeClr val="lt1"/>
+          </a:fontRef>
+        </p:style>
+        <p:txBody>
+          <a:bodyPr rtlCol="0" anchor="ctr"/>
+          <a:lstStyle/>
+          <a:p>
+            <a:pPr algn="ctr"/>
+            <a:endParaRPr lang="en-US"/>
+          </a:p>
+        </p:txBody>
+      </p:sp>
     </p:spTree>
     <p:extLst>
       <p:ext uri="{BB962C8B-B14F-4D97-AF65-F5344CB8AC3E}">
-        <p14:creationId xmlns:p14="http://schemas.microsoft.com/office/powerpoint/2010/main" val="2806491056"/>
+        <p14:creationId xmlns:p14="http://schemas.microsoft.com/office/powerpoint/2010/main" val="1127063973"/>
       </p:ext>
     </p:extLst>
   </p:cSld>
@@ -5692,10 +6293,93 @@
           <a:chExt cx="0" cy="0"/>
         </a:xfrm>
       </p:grpSpPr>
+      <p:pic>
+        <p:nvPicPr>
+          <p:cNvPr id="4" name="Picture 3">
+            <a:extLst>
+              <a:ext uri="{FF2B5EF4-FFF2-40B4-BE49-F238E27FC236}">
+                <a16:creationId xmlns:a16="http://schemas.microsoft.com/office/drawing/2014/main" id="{763769CC-5434-4008-AC47-03F3AD644E9F}"/>
+              </a:ext>
+            </a:extLst>
+          </p:cNvPr>
+          <p:cNvPicPr>
+            <a:picLocks noChangeAspect="1"/>
+          </p:cNvPicPr>
+          <p:nvPr/>
+        </p:nvPicPr>
+        <p:blipFill>
+          <a:blip r:embed="rId2"/>
+          <a:stretch>
+            <a:fillRect/>
+          </a:stretch>
+        </p:blipFill>
+        <p:spPr>
+          <a:xfrm>
+            <a:off x="2171700" y="1157287"/>
+            <a:ext cx="7848600" cy="4543425"/>
+          </a:xfrm>
+          <a:prstGeom prst="rect">
+            <a:avLst/>
+          </a:prstGeom>
+        </p:spPr>
+      </p:pic>
+      <p:sp>
+        <p:nvSpPr>
+          <p:cNvPr id="6" name="Arrow: Up 5">
+            <a:extLst>
+              <a:ext uri="{FF2B5EF4-FFF2-40B4-BE49-F238E27FC236}">
+                <a16:creationId xmlns:a16="http://schemas.microsoft.com/office/drawing/2014/main" id="{CF39076D-2B22-490B-A1B0-94BAC9BF11EF}"/>
+              </a:ext>
+            </a:extLst>
+          </p:cNvPr>
+          <p:cNvSpPr/>
+          <p:nvPr/>
+        </p:nvSpPr>
+        <p:spPr>
+          <a:xfrm>
+            <a:off x="6777162" y="3784092"/>
+            <a:ext cx="472535" cy="953985"/>
+          </a:xfrm>
+          <a:prstGeom prst="upArrow">
+            <a:avLst>
+              <a:gd name="adj1" fmla="val 50000"/>
+              <a:gd name="adj2" fmla="val 89626"/>
+            </a:avLst>
+          </a:prstGeom>
+          <a:solidFill>
+            <a:srgbClr val="C00000"/>
+          </a:solidFill>
+          <a:ln>
+            <a:noFill/>
+          </a:ln>
+        </p:spPr>
+        <p:style>
+          <a:lnRef idx="0">
+            <a:schemeClr val="accent1"/>
+          </a:lnRef>
+          <a:fillRef idx="3">
+            <a:schemeClr val="accent1"/>
+          </a:fillRef>
+          <a:effectRef idx="3">
+            <a:schemeClr val="accent1"/>
+          </a:effectRef>
+          <a:fontRef idx="minor">
+            <a:schemeClr val="lt1"/>
+          </a:fontRef>
+        </p:style>
+        <p:txBody>
+          <a:bodyPr rtlCol="0" anchor="ctr"/>
+          <a:lstStyle/>
+          <a:p>
+            <a:pPr algn="ctr"/>
+            <a:endParaRPr lang="en-US"/>
+          </a:p>
+        </p:txBody>
+      </p:sp>
     </p:spTree>
     <p:extLst>
       <p:ext uri="{BB962C8B-B14F-4D97-AF65-F5344CB8AC3E}">
-        <p14:creationId xmlns:p14="http://schemas.microsoft.com/office/powerpoint/2010/main" val="1918321829"/>
+        <p14:creationId xmlns:p14="http://schemas.microsoft.com/office/powerpoint/2010/main" val="1356783828"/>
       </p:ext>
     </p:extLst>
   </p:cSld>
@@ -5722,10 +6406,236 @@
           <a:chExt cx="0" cy="0"/>
         </a:xfrm>
       </p:grpSpPr>
+      <p:pic>
+        <p:nvPicPr>
+          <p:cNvPr id="4" name="Picture 3">
+            <a:extLst>
+              <a:ext uri="{FF2B5EF4-FFF2-40B4-BE49-F238E27FC236}">
+                <a16:creationId xmlns:a16="http://schemas.microsoft.com/office/drawing/2014/main" id="{8697CD62-ED90-47CF-91B2-2EB5026FFC64}"/>
+              </a:ext>
+            </a:extLst>
+          </p:cNvPr>
+          <p:cNvPicPr>
+            <a:picLocks noChangeAspect="1"/>
+          </p:cNvPicPr>
+          <p:nvPr/>
+        </p:nvPicPr>
+        <p:blipFill>
+          <a:blip r:embed="rId2"/>
+          <a:stretch>
+            <a:fillRect/>
+          </a:stretch>
+        </p:blipFill>
+        <p:spPr>
+          <a:xfrm>
+            <a:off x="609600" y="342900"/>
+            <a:ext cx="10972800" cy="6172200"/>
+          </a:xfrm>
+          <a:prstGeom prst="rect">
+            <a:avLst/>
+          </a:prstGeom>
+        </p:spPr>
+      </p:pic>
+      <p:sp>
+        <p:nvSpPr>
+          <p:cNvPr id="8" name="Arrow: Up 7">
+            <a:extLst>
+              <a:ext uri="{FF2B5EF4-FFF2-40B4-BE49-F238E27FC236}">
+                <a16:creationId xmlns:a16="http://schemas.microsoft.com/office/drawing/2014/main" id="{98D3F908-04D1-4777-91F7-726849A4A0A2}"/>
+              </a:ext>
+            </a:extLst>
+          </p:cNvPr>
+          <p:cNvSpPr/>
+          <p:nvPr/>
+        </p:nvSpPr>
+        <p:spPr>
+          <a:xfrm>
+            <a:off x="10414449" y="815891"/>
+            <a:ext cx="802133" cy="1619399"/>
+          </a:xfrm>
+          <a:prstGeom prst="upArrow">
+            <a:avLst>
+              <a:gd name="adj1" fmla="val 50000"/>
+              <a:gd name="adj2" fmla="val 89626"/>
+            </a:avLst>
+          </a:prstGeom>
+          <a:solidFill>
+            <a:srgbClr val="C00000"/>
+          </a:solidFill>
+          <a:ln>
+            <a:noFill/>
+          </a:ln>
+        </p:spPr>
+        <p:style>
+          <a:lnRef idx="0">
+            <a:schemeClr val="accent1"/>
+          </a:lnRef>
+          <a:fillRef idx="3">
+            <a:schemeClr val="accent1"/>
+          </a:fillRef>
+          <a:effectRef idx="3">
+            <a:schemeClr val="accent1"/>
+          </a:effectRef>
+          <a:fontRef idx="minor">
+            <a:schemeClr val="lt1"/>
+          </a:fontRef>
+        </p:style>
+        <p:txBody>
+          <a:bodyPr rtlCol="0" anchor="ctr"/>
+          <a:lstStyle/>
+          <a:p>
+            <a:pPr algn="ctr"/>
+            <a:endParaRPr lang="en-US" sz="2800" b="1" dirty="0">
+              <a:latin typeface="Segoe UI" panose="020B0502040204020203" pitchFamily="34" charset="0"/>
+              <a:cs typeface="Segoe UI" panose="020B0502040204020203" pitchFamily="34" charset="0"/>
+            </a:endParaRPr>
+          </a:p>
+        </p:txBody>
+      </p:sp>
+      <p:sp>
+        <p:nvSpPr>
+          <p:cNvPr id="10" name="TextBox 9">
+            <a:extLst>
+              <a:ext uri="{FF2B5EF4-FFF2-40B4-BE49-F238E27FC236}">
+                <a16:creationId xmlns:a16="http://schemas.microsoft.com/office/drawing/2014/main" id="{C3AB4731-C723-44F2-9003-119C199CC0CC}"/>
+              </a:ext>
+            </a:extLst>
+          </p:cNvPr>
+          <p:cNvSpPr txBox="1"/>
+          <p:nvPr/>
+        </p:nvSpPr>
+        <p:spPr>
+          <a:xfrm>
+            <a:off x="10606607" y="1412826"/>
+            <a:ext cx="290319" cy="523220"/>
+          </a:xfrm>
+          <a:prstGeom prst="rect">
+            <a:avLst/>
+          </a:prstGeom>
+          <a:noFill/>
+        </p:spPr>
+        <p:txBody>
+          <a:bodyPr wrap="square" rtlCol="0">
+            <a:spAutoFit/>
+          </a:bodyPr>
+          <a:lstStyle/>
+          <a:p>
+            <a:pPr algn="l"/>
+            <a:r>
+              <a:rPr lang="en-US" sz="2800" b="1" dirty="0">
+                <a:solidFill>
+                  <a:schemeClr val="bg1"/>
+                </a:solidFill>
+                <a:latin typeface="Segoe UI" panose="020B0502040204020203" pitchFamily="34" charset="0"/>
+                <a:cs typeface="Segoe UI" panose="020B0502040204020203" pitchFamily="34" charset="0"/>
+              </a:rPr>
+              <a:t>A</a:t>
+            </a:r>
+          </a:p>
+        </p:txBody>
+      </p:sp>
+      <p:sp>
+        <p:nvSpPr>
+          <p:cNvPr id="12" name="Arrow: Up 11">
+            <a:extLst>
+              <a:ext uri="{FF2B5EF4-FFF2-40B4-BE49-F238E27FC236}">
+                <a16:creationId xmlns:a16="http://schemas.microsoft.com/office/drawing/2014/main" id="{BB0830C3-12B7-41C6-9BCD-B9D2A1EFBCC8}"/>
+              </a:ext>
+            </a:extLst>
+          </p:cNvPr>
+          <p:cNvSpPr/>
+          <p:nvPr/>
+        </p:nvSpPr>
+        <p:spPr>
+          <a:xfrm rot="16200000">
+            <a:off x="2416225" y="3850215"/>
+            <a:ext cx="802133" cy="1619399"/>
+          </a:xfrm>
+          <a:prstGeom prst="upArrow">
+            <a:avLst>
+              <a:gd name="adj1" fmla="val 50000"/>
+              <a:gd name="adj2" fmla="val 89626"/>
+            </a:avLst>
+          </a:prstGeom>
+          <a:solidFill>
+            <a:srgbClr val="C00000"/>
+          </a:solidFill>
+          <a:ln>
+            <a:noFill/>
+          </a:ln>
+        </p:spPr>
+        <p:style>
+          <a:lnRef idx="0">
+            <a:schemeClr val="accent1"/>
+          </a:lnRef>
+          <a:fillRef idx="3">
+            <a:schemeClr val="accent1"/>
+          </a:fillRef>
+          <a:effectRef idx="3">
+            <a:schemeClr val="accent1"/>
+          </a:effectRef>
+          <a:fontRef idx="minor">
+            <a:schemeClr val="lt1"/>
+          </a:fontRef>
+        </p:style>
+        <p:txBody>
+          <a:bodyPr rtlCol="0" anchor="ctr"/>
+          <a:lstStyle/>
+          <a:p>
+            <a:pPr algn="ctr"/>
+            <a:endParaRPr lang="en-US" sz="2800" b="1" dirty="0">
+              <a:latin typeface="Segoe UI" panose="020B0502040204020203" pitchFamily="34" charset="0"/>
+              <a:cs typeface="Segoe UI" panose="020B0502040204020203" pitchFamily="34" charset="0"/>
+            </a:endParaRPr>
+          </a:p>
+        </p:txBody>
+      </p:sp>
+      <p:sp>
+        <p:nvSpPr>
+          <p:cNvPr id="14" name="TextBox 13">
+            <a:extLst>
+              <a:ext uri="{FF2B5EF4-FFF2-40B4-BE49-F238E27FC236}">
+                <a16:creationId xmlns:a16="http://schemas.microsoft.com/office/drawing/2014/main" id="{5EFBB78B-8574-4FC0-8412-4248DE850286}"/>
+              </a:ext>
+            </a:extLst>
+          </p:cNvPr>
+          <p:cNvSpPr txBox="1"/>
+          <p:nvPr/>
+        </p:nvSpPr>
+        <p:spPr>
+          <a:xfrm>
+            <a:off x="2673511" y="4390163"/>
+            <a:ext cx="290319" cy="523220"/>
+          </a:xfrm>
+          <a:prstGeom prst="rect">
+            <a:avLst/>
+          </a:prstGeom>
+          <a:noFill/>
+        </p:spPr>
+        <p:txBody>
+          <a:bodyPr wrap="square" rtlCol="0">
+            <a:spAutoFit/>
+          </a:bodyPr>
+          <a:lstStyle/>
+          <a:p>
+            <a:pPr algn="l"/>
+            <a:r>
+              <a:rPr lang="en-US" sz="2800" b="1" dirty="0">
+                <a:solidFill>
+                  <a:schemeClr val="bg1"/>
+                </a:solidFill>
+                <a:latin typeface="Segoe UI" panose="020B0502040204020203" pitchFamily="34" charset="0"/>
+                <a:cs typeface="Segoe UI" panose="020B0502040204020203" pitchFamily="34" charset="0"/>
+              </a:rPr>
+              <a:t>B</a:t>
+            </a:r>
+          </a:p>
+        </p:txBody>
+      </p:sp>
     </p:spTree>
     <p:extLst>
       <p:ext uri="{BB962C8B-B14F-4D97-AF65-F5344CB8AC3E}">
-        <p14:creationId xmlns:p14="http://schemas.microsoft.com/office/powerpoint/2010/main" val="528842390"/>
+        <p14:creationId xmlns:p14="http://schemas.microsoft.com/office/powerpoint/2010/main" val="4241489412"/>
       </p:ext>
     </p:extLst>
   </p:cSld>
@@ -6247,7 +7157,7 @@
           <p:nvPr/>
         </p:nvPicPr>
         <p:blipFill>
-          <a:blip r:embed="rId2"/>
+          <a:blip/>
           <a:stretch>
             <a:fillRect/>
           </a:stretch>
@@ -6397,7 +7307,7 @@
           <p:nvPr/>
         </p:nvPicPr>
         <p:blipFill>
-          <a:blip r:embed="rId2"/>
+          <a:blip/>
           <a:stretch>
             <a:fillRect/>
           </a:stretch>

</xml_diff>

<commit_message>
+~ az sign up steps
</commit_message>
<xml_diff>
--- a/imgs/src/step-by-step-imgs.pptx
+++ b/imgs/src/step-by-step-imgs.pptx
@@ -5,48 +5,50 @@
     <p:sldMasterId id="2147483648" r:id="rId1"/>
   </p:sldMasterIdLst>
   <p:sldIdLst>
-    <p:sldId id="257" r:id="rId2"/>
-    <p:sldId id="258" r:id="rId3"/>
-    <p:sldId id="302" r:id="rId4"/>
-    <p:sldId id="261" r:id="rId5"/>
-    <p:sldId id="259" r:id="rId6"/>
-    <p:sldId id="262" r:id="rId7"/>
-    <p:sldId id="263" r:id="rId8"/>
-    <p:sldId id="264" r:id="rId9"/>
-    <p:sldId id="265" r:id="rId10"/>
-    <p:sldId id="266" r:id="rId11"/>
-    <p:sldId id="267" r:id="rId12"/>
-    <p:sldId id="268" r:id="rId13"/>
-    <p:sldId id="269" r:id="rId14"/>
-    <p:sldId id="270" r:id="rId15"/>
-    <p:sldId id="273" r:id="rId16"/>
-    <p:sldId id="279" r:id="rId17"/>
-    <p:sldId id="280" r:id="rId18"/>
-    <p:sldId id="281" r:id="rId19"/>
-    <p:sldId id="282" r:id="rId20"/>
-    <p:sldId id="283" r:id="rId21"/>
-    <p:sldId id="284" r:id="rId22"/>
-    <p:sldId id="285" r:id="rId23"/>
+    <p:sldId id="303" r:id="rId2"/>
+    <p:sldId id="257" r:id="rId3"/>
+    <p:sldId id="258" r:id="rId4"/>
+    <p:sldId id="302" r:id="rId5"/>
+    <p:sldId id="261" r:id="rId6"/>
+    <p:sldId id="259" r:id="rId7"/>
+    <p:sldId id="262" r:id="rId8"/>
+    <p:sldId id="263" r:id="rId9"/>
+    <p:sldId id="264" r:id="rId10"/>
+    <p:sldId id="265" r:id="rId11"/>
+    <p:sldId id="266" r:id="rId12"/>
+    <p:sldId id="267" r:id="rId13"/>
+    <p:sldId id="268" r:id="rId14"/>
+    <p:sldId id="269" r:id="rId15"/>
+    <p:sldId id="270" r:id="rId16"/>
+    <p:sldId id="273" r:id="rId17"/>
+    <p:sldId id="279" r:id="rId18"/>
+    <p:sldId id="280" r:id="rId19"/>
+    <p:sldId id="281" r:id="rId20"/>
+    <p:sldId id="282" r:id="rId21"/>
+    <p:sldId id="283" r:id="rId22"/>
+    <p:sldId id="284" r:id="rId23"/>
     <p:sldId id="271" r:id="rId24"/>
     <p:sldId id="272" r:id="rId25"/>
     <p:sldId id="278" r:id="rId26"/>
-    <p:sldId id="286" r:id="rId27"/>
-    <p:sldId id="287" r:id="rId28"/>
-    <p:sldId id="288" r:id="rId29"/>
-    <p:sldId id="289" r:id="rId30"/>
-    <p:sldId id="290" r:id="rId31"/>
-    <p:sldId id="291" r:id="rId32"/>
-    <p:sldId id="292" r:id="rId33"/>
-    <p:sldId id="293" r:id="rId34"/>
-    <p:sldId id="294" r:id="rId35"/>
-    <p:sldId id="295" r:id="rId36"/>
-    <p:sldId id="296" r:id="rId37"/>
-    <p:sldId id="297" r:id="rId38"/>
-    <p:sldId id="298" r:id="rId39"/>
-    <p:sldId id="299" r:id="rId40"/>
-    <p:sldId id="300" r:id="rId41"/>
-    <p:sldId id="301" r:id="rId42"/>
-    <p:sldId id="260" r:id="rId43"/>
+    <p:sldId id="304" r:id="rId27"/>
+    <p:sldId id="285" r:id="rId28"/>
+    <p:sldId id="286" r:id="rId29"/>
+    <p:sldId id="287" r:id="rId30"/>
+    <p:sldId id="288" r:id="rId31"/>
+    <p:sldId id="289" r:id="rId32"/>
+    <p:sldId id="290" r:id="rId33"/>
+    <p:sldId id="291" r:id="rId34"/>
+    <p:sldId id="292" r:id="rId35"/>
+    <p:sldId id="293" r:id="rId36"/>
+    <p:sldId id="294" r:id="rId37"/>
+    <p:sldId id="295" r:id="rId38"/>
+    <p:sldId id="296" r:id="rId39"/>
+    <p:sldId id="297" r:id="rId40"/>
+    <p:sldId id="298" r:id="rId41"/>
+    <p:sldId id="299" r:id="rId42"/>
+    <p:sldId id="300" r:id="rId43"/>
+    <p:sldId id="301" r:id="rId44"/>
+    <p:sldId id="260" r:id="rId45"/>
   </p:sldIdLst>
   <p:sldSz cx="12192000" cy="6858000"/>
   <p:notesSz cx="6858000" cy="9144000"/>
@@ -3362,12 +3364,95 @@
           <a:chExt cx="0" cy="0"/>
         </a:xfrm>
       </p:grpSpPr>
+      <p:sp>
+        <p:nvSpPr>
+          <p:cNvPr id="2" name="Title 1">
+            <a:extLst>
+              <a:ext uri="{FF2B5EF4-FFF2-40B4-BE49-F238E27FC236}">
+                <a16:creationId xmlns:a16="http://schemas.microsoft.com/office/drawing/2014/main" id="{CE520E94-AC40-4D5F-B6CE-8F3ECFBB0573}"/>
+              </a:ext>
+            </a:extLst>
+          </p:cNvPr>
+          <p:cNvSpPr>
+            <a:spLocks noGrp="1"/>
+          </p:cNvSpPr>
+          <p:nvPr>
+            <p:ph type="title"/>
+          </p:nvPr>
+        </p:nvSpPr>
+        <p:spPr/>
+        <p:txBody>
+          <a:bodyPr/>
+          <a:lstStyle/>
+          <a:p>
+            <a:r>
+              <a:rPr lang="en-US" dirty="0"/>
+              <a:t>Setting Up Dynamics</a:t>
+            </a:r>
+          </a:p>
+        </p:txBody>
+      </p:sp>
+      <p:sp>
+        <p:nvSpPr>
+          <p:cNvPr id="3" name="Content Placeholder 2">
+            <a:extLst>
+              <a:ext uri="{FF2B5EF4-FFF2-40B4-BE49-F238E27FC236}">
+                <a16:creationId xmlns:a16="http://schemas.microsoft.com/office/drawing/2014/main" id="{5F0FDCB7-8075-470D-83AE-2D416D895DB2}"/>
+              </a:ext>
+            </a:extLst>
+          </p:cNvPr>
+          <p:cNvSpPr>
+            <a:spLocks noGrp="1"/>
+          </p:cNvSpPr>
+          <p:nvPr>
+            <p:ph idx="1"/>
+          </p:nvPr>
+        </p:nvSpPr>
+        <p:spPr/>
+        <p:txBody>
+          <a:bodyPr/>
+          <a:lstStyle/>
+          <a:p>
+            <a:endParaRPr lang="en-US"/>
+          </a:p>
+        </p:txBody>
+      </p:sp>
+    </p:spTree>
+    <p:extLst>
+      <p:ext uri="{BB962C8B-B14F-4D97-AF65-F5344CB8AC3E}">
+        <p14:creationId xmlns:p14="http://schemas.microsoft.com/office/powerpoint/2010/main" val="3311127924"/>
+      </p:ext>
+    </p:extLst>
+  </p:cSld>
+  <p:clrMapOvr>
+    <a:masterClrMapping/>
+  </p:clrMapOvr>
+</p:sld>
+</file>
+
+<file path=ppt/slides/slide10.xml><?xml version="1.0" encoding="utf-8"?>
+<p:sld xmlns:a="http://schemas.openxmlformats.org/drawingml/2006/main" xmlns:r="http://schemas.openxmlformats.org/officeDocument/2006/relationships" xmlns:p="http://schemas.openxmlformats.org/presentationml/2006/main">
+  <p:cSld>
+    <p:spTree>
+      <p:nvGrpSpPr>
+        <p:cNvPr id="1" name=""/>
+        <p:cNvGrpSpPr/>
+        <p:nvPr/>
+      </p:nvGrpSpPr>
+      <p:grpSpPr>
+        <a:xfrm>
+          <a:off x="0" y="0"/>
+          <a:ext cx="0" cy="0"/>
+          <a:chOff x="0" y="0"/>
+          <a:chExt cx="0" cy="0"/>
+        </a:xfrm>
+      </p:grpSpPr>
       <p:pic>
         <p:nvPicPr>
-          <p:cNvPr id="6" name="Picture 5">
-            <a:extLst>
-              <a:ext uri="{FF2B5EF4-FFF2-40B4-BE49-F238E27FC236}">
-                <a16:creationId xmlns:a16="http://schemas.microsoft.com/office/drawing/2014/main" id="{54CFF132-EBC7-47C5-832A-95B208BCF548}"/>
+          <p:cNvPr id="4" name="Picture 3">
+            <a:extLst>
+              <a:ext uri="{FF2B5EF4-FFF2-40B4-BE49-F238E27FC236}">
+                <a16:creationId xmlns:a16="http://schemas.microsoft.com/office/drawing/2014/main" id="{21A58B69-488E-4681-954E-4AF44AEFE120}"/>
               </a:ext>
             </a:extLst>
           </p:cNvPr>
@@ -3384,71 +3469,18 @@
         </p:blipFill>
         <p:spPr>
           <a:xfrm>
-            <a:off x="1" y="0"/>
-            <a:ext cx="12195910" cy="6623707"/>
+            <a:off x="609600" y="342900"/>
+            <a:ext cx="10972800" cy="6172200"/>
           </a:xfrm>
           <a:prstGeom prst="rect">
             <a:avLst/>
           </a:prstGeom>
         </p:spPr>
       </p:pic>
-      <p:sp>
-        <p:nvSpPr>
-          <p:cNvPr id="8" name="Arrow: Up 7">
-            <a:extLst>
-              <a:ext uri="{FF2B5EF4-FFF2-40B4-BE49-F238E27FC236}">
-                <a16:creationId xmlns:a16="http://schemas.microsoft.com/office/drawing/2014/main" id="{4630EFF8-87F7-4F86-922C-241271BB89A5}"/>
-              </a:ext>
-            </a:extLst>
-          </p:cNvPr>
-          <p:cNvSpPr/>
-          <p:nvPr/>
-        </p:nvSpPr>
-        <p:spPr>
-          <a:xfrm>
-            <a:off x="1281970" y="3686400"/>
-            <a:ext cx="472535" cy="953985"/>
-          </a:xfrm>
-          <a:prstGeom prst="upArrow">
-            <a:avLst>
-              <a:gd name="adj1" fmla="val 50000"/>
-              <a:gd name="adj2" fmla="val 89626"/>
-            </a:avLst>
-          </a:prstGeom>
-          <a:solidFill>
-            <a:srgbClr val="C00000"/>
-          </a:solidFill>
-          <a:ln>
-            <a:noFill/>
-          </a:ln>
-        </p:spPr>
-        <p:style>
-          <a:lnRef idx="0">
-            <a:schemeClr val="accent1"/>
-          </a:lnRef>
-          <a:fillRef idx="3">
-            <a:schemeClr val="accent1"/>
-          </a:fillRef>
-          <a:effectRef idx="3">
-            <a:schemeClr val="accent1"/>
-          </a:effectRef>
-          <a:fontRef idx="minor">
-            <a:schemeClr val="lt1"/>
-          </a:fontRef>
-        </p:style>
-        <p:txBody>
-          <a:bodyPr rtlCol="0" anchor="ctr"/>
-          <a:lstStyle/>
-          <a:p>
-            <a:pPr algn="ctr"/>
-            <a:endParaRPr lang="en-US"/>
-          </a:p>
-        </p:txBody>
-      </p:sp>
     </p:spTree>
     <p:extLst>
       <p:ext uri="{BB962C8B-B14F-4D97-AF65-F5344CB8AC3E}">
-        <p14:creationId xmlns:p14="http://schemas.microsoft.com/office/powerpoint/2010/main" val="1960626006"/>
+        <p14:creationId xmlns:p14="http://schemas.microsoft.com/office/powerpoint/2010/main" val="4074301061"/>
       </p:ext>
     </p:extLst>
   </p:cSld>
@@ -3458,7 +3490,7 @@
 </p:sld>
 </file>
 
-<file path=ppt/slides/slide10.xml><?xml version="1.0" encoding="utf-8"?>
+<file path=ppt/slides/slide11.xml><?xml version="1.0" encoding="utf-8"?>
 <p:sld xmlns:a="http://schemas.openxmlformats.org/drawingml/2006/main" xmlns:r="http://schemas.openxmlformats.org/officeDocument/2006/relationships" xmlns:p="http://schemas.openxmlformats.org/presentationml/2006/main">
   <p:cSld>
     <p:spTree>
@@ -3665,7 +3697,7 @@
 </p:sld>
 </file>
 
-<file path=ppt/slides/slide11.xml><?xml version="1.0" encoding="utf-8"?>
+<file path=ppt/slides/slide12.xml><?xml version="1.0" encoding="utf-8"?>
 <p:sld xmlns:a="http://schemas.openxmlformats.org/drawingml/2006/main" xmlns:r="http://schemas.openxmlformats.org/officeDocument/2006/relationships" xmlns:p="http://schemas.openxmlformats.org/presentationml/2006/main">
   <p:cSld>
     <p:spTree>
@@ -3872,7 +3904,7 @@
 </p:sld>
 </file>
 
-<file path=ppt/slides/slide12.xml><?xml version="1.0" encoding="utf-8"?>
+<file path=ppt/slides/slide13.xml><?xml version="1.0" encoding="utf-8"?>
 <p:sld xmlns:a="http://schemas.openxmlformats.org/drawingml/2006/main" xmlns:r="http://schemas.openxmlformats.org/officeDocument/2006/relationships" xmlns:p="http://schemas.openxmlformats.org/presentationml/2006/main">
   <p:cSld>
     <p:spTree>
@@ -4079,7 +4111,7 @@
 </p:sld>
 </file>
 
-<file path=ppt/slides/slide13.xml><?xml version="1.0" encoding="utf-8"?>
+<file path=ppt/slides/slide14.xml><?xml version="1.0" encoding="utf-8"?>
 <p:sld xmlns:a="http://schemas.openxmlformats.org/drawingml/2006/main" xmlns:r="http://schemas.openxmlformats.org/officeDocument/2006/relationships" xmlns:p="http://schemas.openxmlformats.org/presentationml/2006/main">
   <p:cSld>
     <p:spTree>
@@ -4286,7 +4318,7 @@
 </p:sld>
 </file>
 
-<file path=ppt/slides/slide14.xml><?xml version="1.0" encoding="utf-8"?>
+<file path=ppt/slides/slide15.xml><?xml version="1.0" encoding="utf-8"?>
 <p:sld xmlns:a="http://schemas.openxmlformats.org/drawingml/2006/main" xmlns:r="http://schemas.openxmlformats.org/officeDocument/2006/relationships" xmlns:p="http://schemas.openxmlformats.org/presentationml/2006/main">
   <p:cSld>
     <p:spTree>
@@ -4570,262 +4602,6 @@
 </p:sld>
 </file>
 
-<file path=ppt/slides/slide15.xml><?xml version="1.0" encoding="utf-8"?>
-<p:sld xmlns:a="http://schemas.openxmlformats.org/drawingml/2006/main" xmlns:r="http://schemas.openxmlformats.org/officeDocument/2006/relationships" xmlns:p="http://schemas.openxmlformats.org/presentationml/2006/main">
-  <p:cSld>
-    <p:spTree>
-      <p:nvGrpSpPr>
-        <p:cNvPr id="1" name=""/>
-        <p:cNvGrpSpPr/>
-        <p:nvPr/>
-      </p:nvGrpSpPr>
-      <p:grpSpPr>
-        <a:xfrm>
-          <a:off x="0" y="0"/>
-          <a:ext cx="0" cy="0"/>
-          <a:chOff x="0" y="0"/>
-          <a:chExt cx="0" cy="0"/>
-        </a:xfrm>
-      </p:grpSpPr>
-      <p:pic>
-        <p:nvPicPr>
-          <p:cNvPr id="4" name="Picture 3">
-            <a:extLst>
-              <a:ext uri="{FF2B5EF4-FFF2-40B4-BE49-F238E27FC236}">
-                <a16:creationId xmlns:a16="http://schemas.microsoft.com/office/drawing/2014/main" id="{7D13E03E-EFEE-4FE5-A4C5-4FC199A711E0}"/>
-              </a:ext>
-            </a:extLst>
-          </p:cNvPr>
-          <p:cNvPicPr>
-            <a:picLocks noChangeAspect="1"/>
-          </p:cNvPicPr>
-          <p:nvPr/>
-        </p:nvPicPr>
-        <p:blipFill>
-          <a:blip r:embed="rId2"/>
-          <a:stretch>
-            <a:fillRect/>
-          </a:stretch>
-        </p:blipFill>
-        <p:spPr>
-          <a:xfrm>
-            <a:off x="-1238250" y="-347662"/>
-            <a:ext cx="14668500" cy="7553325"/>
-          </a:xfrm>
-          <a:prstGeom prst="rect">
-            <a:avLst/>
-          </a:prstGeom>
-        </p:spPr>
-      </p:pic>
-      <p:sp>
-        <p:nvSpPr>
-          <p:cNvPr id="6" name="Arrow: Up 5">
-            <a:extLst>
-              <a:ext uri="{FF2B5EF4-FFF2-40B4-BE49-F238E27FC236}">
-                <a16:creationId xmlns:a16="http://schemas.microsoft.com/office/drawing/2014/main" id="{A743BB4F-32F6-4A13-831C-BB7EFF85E65E}"/>
-              </a:ext>
-            </a:extLst>
-          </p:cNvPr>
-          <p:cNvSpPr/>
-          <p:nvPr/>
-        </p:nvSpPr>
-        <p:spPr>
-          <a:xfrm rot="16200000">
-            <a:off x="7874450" y="2133780"/>
-            <a:ext cx="802133" cy="1619399"/>
-          </a:xfrm>
-          <a:prstGeom prst="upArrow">
-            <a:avLst>
-              <a:gd name="adj1" fmla="val 50000"/>
-              <a:gd name="adj2" fmla="val 89626"/>
-            </a:avLst>
-          </a:prstGeom>
-          <a:solidFill>
-            <a:srgbClr val="C00000"/>
-          </a:solidFill>
-          <a:ln>
-            <a:noFill/>
-          </a:ln>
-        </p:spPr>
-        <p:style>
-          <a:lnRef idx="0">
-            <a:schemeClr val="accent1"/>
-          </a:lnRef>
-          <a:fillRef idx="3">
-            <a:schemeClr val="accent1"/>
-          </a:fillRef>
-          <a:effectRef idx="3">
-            <a:schemeClr val="accent1"/>
-          </a:effectRef>
-          <a:fontRef idx="minor">
-            <a:schemeClr val="lt1"/>
-          </a:fontRef>
-        </p:style>
-        <p:txBody>
-          <a:bodyPr rtlCol="0" anchor="ctr"/>
-          <a:lstStyle/>
-          <a:p>
-            <a:pPr algn="ctr"/>
-            <a:endParaRPr lang="en-US" sz="2800" b="1" dirty="0">
-              <a:latin typeface="Segoe UI" panose="020B0502040204020203" pitchFamily="34" charset="0"/>
-              <a:cs typeface="Segoe UI" panose="020B0502040204020203" pitchFamily="34" charset="0"/>
-            </a:endParaRPr>
-          </a:p>
-        </p:txBody>
-      </p:sp>
-      <p:sp>
-        <p:nvSpPr>
-          <p:cNvPr id="8" name="TextBox 7">
-            <a:extLst>
-              <a:ext uri="{FF2B5EF4-FFF2-40B4-BE49-F238E27FC236}">
-                <a16:creationId xmlns:a16="http://schemas.microsoft.com/office/drawing/2014/main" id="{B47EFCD5-64D3-4465-8CFE-A03C147A20AE}"/>
-              </a:ext>
-            </a:extLst>
-          </p:cNvPr>
-          <p:cNvSpPr txBox="1"/>
-          <p:nvPr/>
-        </p:nvSpPr>
-        <p:spPr>
-          <a:xfrm>
-            <a:off x="8131736" y="2673728"/>
-            <a:ext cx="290319" cy="523220"/>
-          </a:xfrm>
-          <a:prstGeom prst="rect">
-            <a:avLst/>
-          </a:prstGeom>
-          <a:noFill/>
-        </p:spPr>
-        <p:txBody>
-          <a:bodyPr wrap="square" rtlCol="0">
-            <a:spAutoFit/>
-          </a:bodyPr>
-          <a:lstStyle/>
-          <a:p>
-            <a:pPr algn="l"/>
-            <a:r>
-              <a:rPr lang="en-US" sz="2800" b="1" dirty="0">
-                <a:solidFill>
-                  <a:schemeClr val="bg1"/>
-                </a:solidFill>
-                <a:latin typeface="Segoe UI" panose="020B0502040204020203" pitchFamily="34" charset="0"/>
-                <a:cs typeface="Segoe UI" panose="020B0502040204020203" pitchFamily="34" charset="0"/>
-              </a:rPr>
-              <a:t>A</a:t>
-            </a:r>
-          </a:p>
-        </p:txBody>
-      </p:sp>
-      <p:sp>
-        <p:nvSpPr>
-          <p:cNvPr id="10" name="Arrow: Up 9">
-            <a:extLst>
-              <a:ext uri="{FF2B5EF4-FFF2-40B4-BE49-F238E27FC236}">
-                <a16:creationId xmlns:a16="http://schemas.microsoft.com/office/drawing/2014/main" id="{909B79A6-75A7-4147-88D4-1AFD96F878E8}"/>
-              </a:ext>
-            </a:extLst>
-          </p:cNvPr>
-          <p:cNvSpPr/>
-          <p:nvPr/>
-        </p:nvSpPr>
-        <p:spPr>
-          <a:xfrm rot="16200000">
-            <a:off x="1384230" y="5746595"/>
-            <a:ext cx="802133" cy="1619399"/>
-          </a:xfrm>
-          <a:prstGeom prst="upArrow">
-            <a:avLst>
-              <a:gd name="adj1" fmla="val 50000"/>
-              <a:gd name="adj2" fmla="val 89626"/>
-            </a:avLst>
-          </a:prstGeom>
-          <a:solidFill>
-            <a:srgbClr val="C00000"/>
-          </a:solidFill>
-          <a:ln>
-            <a:noFill/>
-          </a:ln>
-        </p:spPr>
-        <p:style>
-          <a:lnRef idx="0">
-            <a:schemeClr val="accent1"/>
-          </a:lnRef>
-          <a:fillRef idx="3">
-            <a:schemeClr val="accent1"/>
-          </a:fillRef>
-          <a:effectRef idx="3">
-            <a:schemeClr val="accent1"/>
-          </a:effectRef>
-          <a:fontRef idx="minor">
-            <a:schemeClr val="lt1"/>
-          </a:fontRef>
-        </p:style>
-        <p:txBody>
-          <a:bodyPr rtlCol="0" anchor="ctr"/>
-          <a:lstStyle/>
-          <a:p>
-            <a:pPr algn="ctr"/>
-            <a:endParaRPr lang="en-US" sz="2800" b="1" dirty="0">
-              <a:latin typeface="Segoe UI" panose="020B0502040204020203" pitchFamily="34" charset="0"/>
-              <a:cs typeface="Segoe UI" panose="020B0502040204020203" pitchFamily="34" charset="0"/>
-            </a:endParaRPr>
-          </a:p>
-        </p:txBody>
-      </p:sp>
-      <p:sp>
-        <p:nvSpPr>
-          <p:cNvPr id="12" name="TextBox 11">
-            <a:extLst>
-              <a:ext uri="{FF2B5EF4-FFF2-40B4-BE49-F238E27FC236}">
-                <a16:creationId xmlns:a16="http://schemas.microsoft.com/office/drawing/2014/main" id="{5DAE240E-7A89-4817-A068-D74CF4A87FAC}"/>
-              </a:ext>
-            </a:extLst>
-          </p:cNvPr>
-          <p:cNvSpPr txBox="1"/>
-          <p:nvPr/>
-        </p:nvSpPr>
-        <p:spPr>
-          <a:xfrm>
-            <a:off x="1641516" y="6286543"/>
-            <a:ext cx="290319" cy="523220"/>
-          </a:xfrm>
-          <a:prstGeom prst="rect">
-            <a:avLst/>
-          </a:prstGeom>
-          <a:noFill/>
-        </p:spPr>
-        <p:txBody>
-          <a:bodyPr wrap="square" rtlCol="0">
-            <a:spAutoFit/>
-          </a:bodyPr>
-          <a:lstStyle/>
-          <a:p>
-            <a:pPr algn="l"/>
-            <a:r>
-              <a:rPr lang="en-US" sz="2800" b="1" dirty="0">
-                <a:solidFill>
-                  <a:schemeClr val="bg1"/>
-                </a:solidFill>
-                <a:latin typeface="Segoe UI" panose="020B0502040204020203" pitchFamily="34" charset="0"/>
-                <a:cs typeface="Segoe UI" panose="020B0502040204020203" pitchFamily="34" charset="0"/>
-              </a:rPr>
-              <a:t>B</a:t>
-            </a:r>
-          </a:p>
-        </p:txBody>
-      </p:sp>
-    </p:spTree>
-    <p:extLst>
-      <p:ext uri="{BB962C8B-B14F-4D97-AF65-F5344CB8AC3E}">
-        <p14:creationId xmlns:p14="http://schemas.microsoft.com/office/powerpoint/2010/main" val="526848501"/>
-      </p:ext>
-    </p:extLst>
-  </p:cSld>
-  <p:clrMapOvr>
-    <a:masterClrMapping/>
-  </p:clrMapOvr>
-</p:sld>
-</file>
-
 <file path=ppt/slides/slide16.xml><?xml version="1.0" encoding="utf-8"?>
 <p:sld xmlns:a="http://schemas.openxmlformats.org/drawingml/2006/main" xmlns:r="http://schemas.openxmlformats.org/officeDocument/2006/relationships" xmlns:p="http://schemas.openxmlformats.org/presentationml/2006/main">
   <p:cSld>
@@ -4848,7 +4624,7 @@
           <p:cNvPr id="4" name="Picture 3">
             <a:extLst>
               <a:ext uri="{FF2B5EF4-FFF2-40B4-BE49-F238E27FC236}">
-                <a16:creationId xmlns:a16="http://schemas.microsoft.com/office/drawing/2014/main" id="{F21A5E34-6D4B-4946-8AA1-25E30390D46E}"/>
+                <a16:creationId xmlns:a16="http://schemas.microsoft.com/office/drawing/2014/main" id="{7D13E03E-EFEE-4FE5-A4C5-4FC199A711E0}"/>
               </a:ext>
             </a:extLst>
           </p:cNvPr>
@@ -4865,8 +4641,8 @@
         </p:blipFill>
         <p:spPr>
           <a:xfrm>
-            <a:off x="2005012" y="304800"/>
-            <a:ext cx="8181975" cy="6248400"/>
+            <a:off x="-1238250" y="-347662"/>
+            <a:ext cx="14668500" cy="7553325"/>
           </a:xfrm>
           <a:prstGeom prst="rect">
             <a:avLst/>
@@ -4878,7 +4654,7 @@
           <p:cNvPr id="6" name="Arrow: Up 5">
             <a:extLst>
               <a:ext uri="{FF2B5EF4-FFF2-40B4-BE49-F238E27FC236}">
-                <a16:creationId xmlns:a16="http://schemas.microsoft.com/office/drawing/2014/main" id="{66123B85-6374-4C89-ADC8-CE8E7583029E}"/>
+                <a16:creationId xmlns:a16="http://schemas.microsoft.com/office/drawing/2014/main" id="{A743BB4F-32F6-4A13-831C-BB7EFF85E65E}"/>
               </a:ext>
             </a:extLst>
           </p:cNvPr>
@@ -4887,7 +4663,7 @@
         </p:nvSpPr>
         <p:spPr>
           <a:xfrm rot="16200000">
-            <a:off x="3783918" y="3760663"/>
+            <a:off x="7874450" y="2133780"/>
             <a:ext cx="802133" cy="1619399"/>
           </a:xfrm>
           <a:prstGeom prst="upArrow">
@@ -4929,10 +4705,150 @@
           </a:p>
         </p:txBody>
       </p:sp>
+      <p:sp>
+        <p:nvSpPr>
+          <p:cNvPr id="8" name="TextBox 7">
+            <a:extLst>
+              <a:ext uri="{FF2B5EF4-FFF2-40B4-BE49-F238E27FC236}">
+                <a16:creationId xmlns:a16="http://schemas.microsoft.com/office/drawing/2014/main" id="{B47EFCD5-64D3-4465-8CFE-A03C147A20AE}"/>
+              </a:ext>
+            </a:extLst>
+          </p:cNvPr>
+          <p:cNvSpPr txBox="1"/>
+          <p:nvPr/>
+        </p:nvSpPr>
+        <p:spPr>
+          <a:xfrm>
+            <a:off x="8131736" y="2673728"/>
+            <a:ext cx="290319" cy="523220"/>
+          </a:xfrm>
+          <a:prstGeom prst="rect">
+            <a:avLst/>
+          </a:prstGeom>
+          <a:noFill/>
+        </p:spPr>
+        <p:txBody>
+          <a:bodyPr wrap="square" rtlCol="0">
+            <a:spAutoFit/>
+          </a:bodyPr>
+          <a:lstStyle/>
+          <a:p>
+            <a:pPr algn="l"/>
+            <a:r>
+              <a:rPr lang="en-US" sz="2800" b="1" dirty="0">
+                <a:solidFill>
+                  <a:schemeClr val="bg1"/>
+                </a:solidFill>
+                <a:latin typeface="Segoe UI" panose="020B0502040204020203" pitchFamily="34" charset="0"/>
+                <a:cs typeface="Segoe UI" panose="020B0502040204020203" pitchFamily="34" charset="0"/>
+              </a:rPr>
+              <a:t>A</a:t>
+            </a:r>
+          </a:p>
+        </p:txBody>
+      </p:sp>
+      <p:sp>
+        <p:nvSpPr>
+          <p:cNvPr id="10" name="Arrow: Up 9">
+            <a:extLst>
+              <a:ext uri="{FF2B5EF4-FFF2-40B4-BE49-F238E27FC236}">
+                <a16:creationId xmlns:a16="http://schemas.microsoft.com/office/drawing/2014/main" id="{909B79A6-75A7-4147-88D4-1AFD96F878E8}"/>
+              </a:ext>
+            </a:extLst>
+          </p:cNvPr>
+          <p:cNvSpPr/>
+          <p:nvPr/>
+        </p:nvSpPr>
+        <p:spPr>
+          <a:xfrm rot="16200000">
+            <a:off x="1384230" y="5746595"/>
+            <a:ext cx="802133" cy="1619399"/>
+          </a:xfrm>
+          <a:prstGeom prst="upArrow">
+            <a:avLst>
+              <a:gd name="adj1" fmla="val 50000"/>
+              <a:gd name="adj2" fmla="val 89626"/>
+            </a:avLst>
+          </a:prstGeom>
+          <a:solidFill>
+            <a:srgbClr val="C00000"/>
+          </a:solidFill>
+          <a:ln>
+            <a:noFill/>
+          </a:ln>
+        </p:spPr>
+        <p:style>
+          <a:lnRef idx="0">
+            <a:schemeClr val="accent1"/>
+          </a:lnRef>
+          <a:fillRef idx="3">
+            <a:schemeClr val="accent1"/>
+          </a:fillRef>
+          <a:effectRef idx="3">
+            <a:schemeClr val="accent1"/>
+          </a:effectRef>
+          <a:fontRef idx="minor">
+            <a:schemeClr val="lt1"/>
+          </a:fontRef>
+        </p:style>
+        <p:txBody>
+          <a:bodyPr rtlCol="0" anchor="ctr"/>
+          <a:lstStyle/>
+          <a:p>
+            <a:pPr algn="ctr"/>
+            <a:endParaRPr lang="en-US" sz="2800" b="1" dirty="0">
+              <a:latin typeface="Segoe UI" panose="020B0502040204020203" pitchFamily="34" charset="0"/>
+              <a:cs typeface="Segoe UI" panose="020B0502040204020203" pitchFamily="34" charset="0"/>
+            </a:endParaRPr>
+          </a:p>
+        </p:txBody>
+      </p:sp>
+      <p:sp>
+        <p:nvSpPr>
+          <p:cNvPr id="12" name="TextBox 11">
+            <a:extLst>
+              <a:ext uri="{FF2B5EF4-FFF2-40B4-BE49-F238E27FC236}">
+                <a16:creationId xmlns:a16="http://schemas.microsoft.com/office/drawing/2014/main" id="{5DAE240E-7A89-4817-A068-D74CF4A87FAC}"/>
+              </a:ext>
+            </a:extLst>
+          </p:cNvPr>
+          <p:cNvSpPr txBox="1"/>
+          <p:nvPr/>
+        </p:nvSpPr>
+        <p:spPr>
+          <a:xfrm>
+            <a:off x="1641516" y="6286543"/>
+            <a:ext cx="290319" cy="523220"/>
+          </a:xfrm>
+          <a:prstGeom prst="rect">
+            <a:avLst/>
+          </a:prstGeom>
+          <a:noFill/>
+        </p:spPr>
+        <p:txBody>
+          <a:bodyPr wrap="square" rtlCol="0">
+            <a:spAutoFit/>
+          </a:bodyPr>
+          <a:lstStyle/>
+          <a:p>
+            <a:pPr algn="l"/>
+            <a:r>
+              <a:rPr lang="en-US" sz="2800" b="1" dirty="0">
+                <a:solidFill>
+                  <a:schemeClr val="bg1"/>
+                </a:solidFill>
+                <a:latin typeface="Segoe UI" panose="020B0502040204020203" pitchFamily="34" charset="0"/>
+                <a:cs typeface="Segoe UI" panose="020B0502040204020203" pitchFamily="34" charset="0"/>
+              </a:rPr>
+              <a:t>B</a:t>
+            </a:r>
+          </a:p>
+        </p:txBody>
+      </p:sp>
     </p:spTree>
     <p:extLst>
       <p:ext uri="{BB962C8B-B14F-4D97-AF65-F5344CB8AC3E}">
-        <p14:creationId xmlns:p14="http://schemas.microsoft.com/office/powerpoint/2010/main" val="2784679318"/>
+        <p14:creationId xmlns:p14="http://schemas.microsoft.com/office/powerpoint/2010/main" val="526848501"/>
       </p:ext>
     </p:extLst>
   </p:cSld>
@@ -4964,7 +4880,7 @@
           <p:cNvPr id="4" name="Picture 3">
             <a:extLst>
               <a:ext uri="{FF2B5EF4-FFF2-40B4-BE49-F238E27FC236}">
-                <a16:creationId xmlns:a16="http://schemas.microsoft.com/office/drawing/2014/main" id="{7796A036-26ED-4BAE-A3B3-4A3DC9714691}"/>
+                <a16:creationId xmlns:a16="http://schemas.microsoft.com/office/drawing/2014/main" id="{F21A5E34-6D4B-4946-8AA1-25E30390D46E}"/>
               </a:ext>
             </a:extLst>
           </p:cNvPr>
@@ -4981,18 +4897,74 @@
         </p:blipFill>
         <p:spPr>
           <a:xfrm>
-            <a:off x="2009775" y="1381125"/>
-            <a:ext cx="8172450" cy="4095750"/>
+            <a:off x="2005012" y="304800"/>
+            <a:ext cx="8181975" cy="6248400"/>
           </a:xfrm>
           <a:prstGeom prst="rect">
             <a:avLst/>
           </a:prstGeom>
         </p:spPr>
       </p:pic>
+      <p:sp>
+        <p:nvSpPr>
+          <p:cNvPr id="6" name="Arrow: Up 5">
+            <a:extLst>
+              <a:ext uri="{FF2B5EF4-FFF2-40B4-BE49-F238E27FC236}">
+                <a16:creationId xmlns:a16="http://schemas.microsoft.com/office/drawing/2014/main" id="{66123B85-6374-4C89-ADC8-CE8E7583029E}"/>
+              </a:ext>
+            </a:extLst>
+          </p:cNvPr>
+          <p:cNvSpPr/>
+          <p:nvPr/>
+        </p:nvSpPr>
+        <p:spPr>
+          <a:xfrm rot="16200000">
+            <a:off x="3783918" y="3760663"/>
+            <a:ext cx="802133" cy="1619399"/>
+          </a:xfrm>
+          <a:prstGeom prst="upArrow">
+            <a:avLst>
+              <a:gd name="adj1" fmla="val 50000"/>
+              <a:gd name="adj2" fmla="val 89626"/>
+            </a:avLst>
+          </a:prstGeom>
+          <a:solidFill>
+            <a:srgbClr val="C00000"/>
+          </a:solidFill>
+          <a:ln>
+            <a:noFill/>
+          </a:ln>
+        </p:spPr>
+        <p:style>
+          <a:lnRef idx="0">
+            <a:schemeClr val="accent1"/>
+          </a:lnRef>
+          <a:fillRef idx="3">
+            <a:schemeClr val="accent1"/>
+          </a:fillRef>
+          <a:effectRef idx="3">
+            <a:schemeClr val="accent1"/>
+          </a:effectRef>
+          <a:fontRef idx="minor">
+            <a:schemeClr val="lt1"/>
+          </a:fontRef>
+        </p:style>
+        <p:txBody>
+          <a:bodyPr rtlCol="0" anchor="ctr"/>
+          <a:lstStyle/>
+          <a:p>
+            <a:pPr algn="ctr"/>
+            <a:endParaRPr lang="en-US" sz="2800" b="1" dirty="0">
+              <a:latin typeface="Segoe UI" panose="020B0502040204020203" pitchFamily="34" charset="0"/>
+              <a:cs typeface="Segoe UI" panose="020B0502040204020203" pitchFamily="34" charset="0"/>
+            </a:endParaRPr>
+          </a:p>
+        </p:txBody>
+      </p:sp>
     </p:spTree>
     <p:extLst>
       <p:ext uri="{BB962C8B-B14F-4D97-AF65-F5344CB8AC3E}">
-        <p14:creationId xmlns:p14="http://schemas.microsoft.com/office/powerpoint/2010/main" val="1310995319"/>
+        <p14:creationId xmlns:p14="http://schemas.microsoft.com/office/powerpoint/2010/main" val="2784679318"/>
       </p:ext>
     </p:extLst>
   </p:cSld>
@@ -5024,7 +4996,7 @@
           <p:cNvPr id="4" name="Picture 3">
             <a:extLst>
               <a:ext uri="{FF2B5EF4-FFF2-40B4-BE49-F238E27FC236}">
-                <a16:creationId xmlns:a16="http://schemas.microsoft.com/office/drawing/2014/main" id="{B47A8A26-F744-49A0-9F68-CF77739A6376}"/>
+                <a16:creationId xmlns:a16="http://schemas.microsoft.com/office/drawing/2014/main" id="{7796A036-26ED-4BAE-A3B3-4A3DC9714691}"/>
               </a:ext>
             </a:extLst>
           </p:cNvPr>
@@ -5041,214 +5013,18 @@
         </p:blipFill>
         <p:spPr>
           <a:xfrm>
-            <a:off x="2014537" y="1395412"/>
-            <a:ext cx="8162925" cy="4067175"/>
+            <a:off x="2009775" y="1381125"/>
+            <a:ext cx="8172450" cy="4095750"/>
           </a:xfrm>
           <a:prstGeom prst="rect">
             <a:avLst/>
           </a:prstGeom>
         </p:spPr>
       </p:pic>
-      <p:sp>
-        <p:nvSpPr>
-          <p:cNvPr id="6" name="Arrow: Up 5">
-            <a:extLst>
-              <a:ext uri="{FF2B5EF4-FFF2-40B4-BE49-F238E27FC236}">
-                <a16:creationId xmlns:a16="http://schemas.microsoft.com/office/drawing/2014/main" id="{64056A5E-D70A-4D02-8EE5-E4BE4D3067AC}"/>
-              </a:ext>
-            </a:extLst>
-          </p:cNvPr>
-          <p:cNvSpPr/>
-          <p:nvPr/>
-        </p:nvSpPr>
-        <p:spPr>
-          <a:xfrm>
-            <a:off x="4796119" y="1717267"/>
-            <a:ext cx="802133" cy="1619399"/>
-          </a:xfrm>
-          <a:prstGeom prst="upArrow">
-            <a:avLst>
-              <a:gd name="adj1" fmla="val 50000"/>
-              <a:gd name="adj2" fmla="val 89626"/>
-            </a:avLst>
-          </a:prstGeom>
-          <a:solidFill>
-            <a:srgbClr val="C00000"/>
-          </a:solidFill>
-          <a:ln>
-            <a:noFill/>
-          </a:ln>
-        </p:spPr>
-        <p:style>
-          <a:lnRef idx="0">
-            <a:schemeClr val="accent1"/>
-          </a:lnRef>
-          <a:fillRef idx="3">
-            <a:schemeClr val="accent1"/>
-          </a:fillRef>
-          <a:effectRef idx="3">
-            <a:schemeClr val="accent1"/>
-          </a:effectRef>
-          <a:fontRef idx="minor">
-            <a:schemeClr val="lt1"/>
-          </a:fontRef>
-        </p:style>
-        <p:txBody>
-          <a:bodyPr rtlCol="0" anchor="ctr"/>
-          <a:lstStyle/>
-          <a:p>
-            <a:pPr algn="ctr"/>
-            <a:endParaRPr lang="en-US" sz="2800" b="1" dirty="0">
-              <a:latin typeface="Segoe UI" panose="020B0502040204020203" pitchFamily="34" charset="0"/>
-              <a:cs typeface="Segoe UI" panose="020B0502040204020203" pitchFamily="34" charset="0"/>
-            </a:endParaRPr>
-          </a:p>
-        </p:txBody>
-      </p:sp>
-      <p:sp>
-        <p:nvSpPr>
-          <p:cNvPr id="8" name="TextBox 7">
-            <a:extLst>
-              <a:ext uri="{FF2B5EF4-FFF2-40B4-BE49-F238E27FC236}">
-                <a16:creationId xmlns:a16="http://schemas.microsoft.com/office/drawing/2014/main" id="{A3B5A497-90CD-4AA8-8CC6-641421BA8DC7}"/>
-              </a:ext>
-            </a:extLst>
-          </p:cNvPr>
-          <p:cNvSpPr txBox="1"/>
-          <p:nvPr/>
-        </p:nvSpPr>
-        <p:spPr>
-          <a:xfrm>
-            <a:off x="4988277" y="2257215"/>
-            <a:ext cx="290319" cy="523220"/>
-          </a:xfrm>
-          <a:prstGeom prst="rect">
-            <a:avLst/>
-          </a:prstGeom>
-          <a:noFill/>
-        </p:spPr>
-        <p:txBody>
-          <a:bodyPr wrap="square" rtlCol="0">
-            <a:spAutoFit/>
-          </a:bodyPr>
-          <a:lstStyle/>
-          <a:p>
-            <a:pPr algn="l"/>
-            <a:r>
-              <a:rPr lang="en-US" sz="2800" b="1" dirty="0">
-                <a:solidFill>
-                  <a:schemeClr val="bg1"/>
-                </a:solidFill>
-                <a:latin typeface="Segoe UI" panose="020B0502040204020203" pitchFamily="34" charset="0"/>
-                <a:cs typeface="Segoe UI" panose="020B0502040204020203" pitchFamily="34" charset="0"/>
-              </a:rPr>
-              <a:t>A</a:t>
-            </a:r>
-          </a:p>
-        </p:txBody>
-      </p:sp>
-      <p:sp>
-        <p:nvSpPr>
-          <p:cNvPr id="10" name="Arrow: Up 9">
-            <a:extLst>
-              <a:ext uri="{FF2B5EF4-FFF2-40B4-BE49-F238E27FC236}">
-                <a16:creationId xmlns:a16="http://schemas.microsoft.com/office/drawing/2014/main" id="{28191C5E-0311-428F-9AB8-254A5630288A}"/>
-              </a:ext>
-            </a:extLst>
-          </p:cNvPr>
-          <p:cNvSpPr/>
-          <p:nvPr/>
-        </p:nvSpPr>
-        <p:spPr>
-          <a:xfrm>
-            <a:off x="6593749" y="2619300"/>
-            <a:ext cx="802133" cy="1619399"/>
-          </a:xfrm>
-          <a:prstGeom prst="upArrow">
-            <a:avLst>
-              <a:gd name="adj1" fmla="val 50000"/>
-              <a:gd name="adj2" fmla="val 89626"/>
-            </a:avLst>
-          </a:prstGeom>
-          <a:solidFill>
-            <a:srgbClr val="C00000"/>
-          </a:solidFill>
-          <a:ln>
-            <a:noFill/>
-          </a:ln>
-        </p:spPr>
-        <p:style>
-          <a:lnRef idx="0">
-            <a:schemeClr val="accent1"/>
-          </a:lnRef>
-          <a:fillRef idx="3">
-            <a:schemeClr val="accent1"/>
-          </a:fillRef>
-          <a:effectRef idx="3">
-            <a:schemeClr val="accent1"/>
-          </a:effectRef>
-          <a:fontRef idx="minor">
-            <a:schemeClr val="lt1"/>
-          </a:fontRef>
-        </p:style>
-        <p:txBody>
-          <a:bodyPr rtlCol="0" anchor="ctr"/>
-          <a:lstStyle/>
-          <a:p>
-            <a:pPr algn="ctr"/>
-            <a:endParaRPr lang="en-US" sz="2800" b="1" dirty="0">
-              <a:latin typeface="Segoe UI" panose="020B0502040204020203" pitchFamily="34" charset="0"/>
-              <a:cs typeface="Segoe UI" panose="020B0502040204020203" pitchFamily="34" charset="0"/>
-            </a:endParaRPr>
-          </a:p>
-        </p:txBody>
-      </p:sp>
-      <p:sp>
-        <p:nvSpPr>
-          <p:cNvPr id="12" name="TextBox 11">
-            <a:extLst>
-              <a:ext uri="{FF2B5EF4-FFF2-40B4-BE49-F238E27FC236}">
-                <a16:creationId xmlns:a16="http://schemas.microsoft.com/office/drawing/2014/main" id="{59DAA8E2-EBCF-4C80-9E60-1C3DCAB7E688}"/>
-              </a:ext>
-            </a:extLst>
-          </p:cNvPr>
-          <p:cNvSpPr txBox="1"/>
-          <p:nvPr/>
-        </p:nvSpPr>
-        <p:spPr>
-          <a:xfrm>
-            <a:off x="6785907" y="3159248"/>
-            <a:ext cx="290319" cy="523220"/>
-          </a:xfrm>
-          <a:prstGeom prst="rect">
-            <a:avLst/>
-          </a:prstGeom>
-          <a:noFill/>
-        </p:spPr>
-        <p:txBody>
-          <a:bodyPr wrap="square" rtlCol="0">
-            <a:spAutoFit/>
-          </a:bodyPr>
-          <a:lstStyle/>
-          <a:p>
-            <a:pPr algn="l"/>
-            <a:r>
-              <a:rPr lang="en-US" sz="2800" b="1" dirty="0">
-                <a:solidFill>
-                  <a:schemeClr val="bg1"/>
-                </a:solidFill>
-                <a:latin typeface="Segoe UI" panose="020B0502040204020203" pitchFamily="34" charset="0"/>
-                <a:cs typeface="Segoe UI" panose="020B0502040204020203" pitchFamily="34" charset="0"/>
-              </a:rPr>
-              <a:t>B</a:t>
-            </a:r>
-          </a:p>
-        </p:txBody>
-      </p:sp>
     </p:spTree>
     <p:extLst>
       <p:ext uri="{BB962C8B-B14F-4D97-AF65-F5344CB8AC3E}">
-        <p14:creationId xmlns:p14="http://schemas.microsoft.com/office/powerpoint/2010/main" val="4292414777"/>
+        <p14:creationId xmlns:p14="http://schemas.microsoft.com/office/powerpoint/2010/main" val="1310995319"/>
       </p:ext>
     </p:extLst>
   </p:cSld>
@@ -5280,7 +5056,7 @@
           <p:cNvPr id="4" name="Picture 3">
             <a:extLst>
               <a:ext uri="{FF2B5EF4-FFF2-40B4-BE49-F238E27FC236}">
-                <a16:creationId xmlns:a16="http://schemas.microsoft.com/office/drawing/2014/main" id="{5CB39BDA-3DDE-469C-B3DB-B3F102BA4DCF}"/>
+                <a16:creationId xmlns:a16="http://schemas.microsoft.com/office/drawing/2014/main" id="{B47A8A26-F744-49A0-9F68-CF77739A6376}"/>
               </a:ext>
             </a:extLst>
           </p:cNvPr>
@@ -5297,8 +5073,8 @@
         </p:blipFill>
         <p:spPr>
           <a:xfrm>
-            <a:off x="2005012" y="1309687"/>
-            <a:ext cx="8181975" cy="4238625"/>
+            <a:off x="2014537" y="1395412"/>
+            <a:ext cx="8162925" cy="4067175"/>
           </a:xfrm>
           <a:prstGeom prst="rect">
             <a:avLst/>
@@ -5310,7 +5086,7 @@
           <p:cNvPr id="6" name="Arrow: Up 5">
             <a:extLst>
               <a:ext uri="{FF2B5EF4-FFF2-40B4-BE49-F238E27FC236}">
-                <a16:creationId xmlns:a16="http://schemas.microsoft.com/office/drawing/2014/main" id="{68C2EB49-4750-4752-8DA6-5CF5C6FEA46E}"/>
+                <a16:creationId xmlns:a16="http://schemas.microsoft.com/office/drawing/2014/main" id="{64056A5E-D70A-4D02-8EE5-E4BE4D3067AC}"/>
               </a:ext>
             </a:extLst>
           </p:cNvPr>
@@ -5319,7 +5095,7 @@
         </p:nvSpPr>
         <p:spPr>
           <a:xfrm>
-            <a:off x="2687593" y="3280344"/>
+            <a:off x="4796119" y="1717267"/>
             <a:ext cx="802133" cy="1619399"/>
           </a:xfrm>
           <a:prstGeom prst="upArrow">
@@ -5366,7 +5142,7 @@
           <p:cNvPr id="8" name="TextBox 7">
             <a:extLst>
               <a:ext uri="{FF2B5EF4-FFF2-40B4-BE49-F238E27FC236}">
-                <a16:creationId xmlns:a16="http://schemas.microsoft.com/office/drawing/2014/main" id="{F72F49D7-DB6F-42FC-B4D4-D8AEAF1E227A}"/>
+                <a16:creationId xmlns:a16="http://schemas.microsoft.com/office/drawing/2014/main" id="{A3B5A497-90CD-4AA8-8CC6-641421BA8DC7}"/>
               </a:ext>
             </a:extLst>
           </p:cNvPr>
@@ -5375,7 +5151,7 @@
         </p:nvSpPr>
         <p:spPr>
           <a:xfrm>
-            <a:off x="2879751" y="3820292"/>
+            <a:off x="4988277" y="2257215"/>
             <a:ext cx="290319" cy="523220"/>
           </a:xfrm>
           <a:prstGeom prst="rect">
@@ -5398,7 +5174,105 @@
                 <a:latin typeface="Segoe UI" panose="020B0502040204020203" pitchFamily="34" charset="0"/>
                 <a:cs typeface="Segoe UI" panose="020B0502040204020203" pitchFamily="34" charset="0"/>
               </a:rPr>
-              <a:t>C</a:t>
+              <a:t>A</a:t>
+            </a:r>
+          </a:p>
+        </p:txBody>
+      </p:sp>
+      <p:sp>
+        <p:nvSpPr>
+          <p:cNvPr id="10" name="Arrow: Up 9">
+            <a:extLst>
+              <a:ext uri="{FF2B5EF4-FFF2-40B4-BE49-F238E27FC236}">
+                <a16:creationId xmlns:a16="http://schemas.microsoft.com/office/drawing/2014/main" id="{28191C5E-0311-428F-9AB8-254A5630288A}"/>
+              </a:ext>
+            </a:extLst>
+          </p:cNvPr>
+          <p:cNvSpPr/>
+          <p:nvPr/>
+        </p:nvSpPr>
+        <p:spPr>
+          <a:xfrm>
+            <a:off x="6593749" y="2619300"/>
+            <a:ext cx="802133" cy="1619399"/>
+          </a:xfrm>
+          <a:prstGeom prst="upArrow">
+            <a:avLst>
+              <a:gd name="adj1" fmla="val 50000"/>
+              <a:gd name="adj2" fmla="val 89626"/>
+            </a:avLst>
+          </a:prstGeom>
+          <a:solidFill>
+            <a:srgbClr val="C00000"/>
+          </a:solidFill>
+          <a:ln>
+            <a:noFill/>
+          </a:ln>
+        </p:spPr>
+        <p:style>
+          <a:lnRef idx="0">
+            <a:schemeClr val="accent1"/>
+          </a:lnRef>
+          <a:fillRef idx="3">
+            <a:schemeClr val="accent1"/>
+          </a:fillRef>
+          <a:effectRef idx="3">
+            <a:schemeClr val="accent1"/>
+          </a:effectRef>
+          <a:fontRef idx="minor">
+            <a:schemeClr val="lt1"/>
+          </a:fontRef>
+        </p:style>
+        <p:txBody>
+          <a:bodyPr rtlCol="0" anchor="ctr"/>
+          <a:lstStyle/>
+          <a:p>
+            <a:pPr algn="ctr"/>
+            <a:endParaRPr lang="en-US" sz="2800" b="1" dirty="0">
+              <a:latin typeface="Segoe UI" panose="020B0502040204020203" pitchFamily="34" charset="0"/>
+              <a:cs typeface="Segoe UI" panose="020B0502040204020203" pitchFamily="34" charset="0"/>
+            </a:endParaRPr>
+          </a:p>
+        </p:txBody>
+      </p:sp>
+      <p:sp>
+        <p:nvSpPr>
+          <p:cNvPr id="12" name="TextBox 11">
+            <a:extLst>
+              <a:ext uri="{FF2B5EF4-FFF2-40B4-BE49-F238E27FC236}">
+                <a16:creationId xmlns:a16="http://schemas.microsoft.com/office/drawing/2014/main" id="{59DAA8E2-EBCF-4C80-9E60-1C3DCAB7E688}"/>
+              </a:ext>
+            </a:extLst>
+          </p:cNvPr>
+          <p:cNvSpPr txBox="1"/>
+          <p:nvPr/>
+        </p:nvSpPr>
+        <p:spPr>
+          <a:xfrm>
+            <a:off x="6785907" y="3159248"/>
+            <a:ext cx="290319" cy="523220"/>
+          </a:xfrm>
+          <a:prstGeom prst="rect">
+            <a:avLst/>
+          </a:prstGeom>
+          <a:noFill/>
+        </p:spPr>
+        <p:txBody>
+          <a:bodyPr wrap="square" rtlCol="0">
+            <a:spAutoFit/>
+          </a:bodyPr>
+          <a:lstStyle/>
+          <a:p>
+            <a:pPr algn="l"/>
+            <a:r>
+              <a:rPr lang="en-US" sz="2800" b="1" dirty="0">
+                <a:solidFill>
+                  <a:schemeClr val="bg1"/>
+                </a:solidFill>
+                <a:latin typeface="Segoe UI" panose="020B0502040204020203" pitchFamily="34" charset="0"/>
+                <a:cs typeface="Segoe UI" panose="020B0502040204020203" pitchFamily="34" charset="0"/>
+              </a:rPr>
+              <a:t>B</a:t>
             </a:r>
           </a:p>
         </p:txBody>
@@ -5406,7 +5280,7 @@
     </p:spTree>
     <p:extLst>
       <p:ext uri="{BB962C8B-B14F-4D97-AF65-F5344CB8AC3E}">
-        <p14:creationId xmlns:p14="http://schemas.microsoft.com/office/powerpoint/2010/main" val="831793758"/>
+        <p14:creationId xmlns:p14="http://schemas.microsoft.com/office/powerpoint/2010/main" val="4292414777"/>
       </p:ext>
     </p:extLst>
   </p:cSld>
@@ -5438,7 +5312,7 @@
           <p:cNvPr id="6" name="Picture 5">
             <a:extLst>
               <a:ext uri="{FF2B5EF4-FFF2-40B4-BE49-F238E27FC236}">
-                <a16:creationId xmlns:a16="http://schemas.microsoft.com/office/drawing/2014/main" id="{880DCB38-0C19-4820-8353-E33E8B234890}"/>
+                <a16:creationId xmlns:a16="http://schemas.microsoft.com/office/drawing/2014/main" id="{54CFF132-EBC7-47C5-832A-95B208BCF548}"/>
               </a:ext>
             </a:extLst>
           </p:cNvPr>
@@ -5455,8 +5329,8 @@
         </p:blipFill>
         <p:spPr>
           <a:xfrm>
-            <a:off x="-1819275" y="-762000"/>
-            <a:ext cx="15830550" cy="8382000"/>
+            <a:off x="1" y="0"/>
+            <a:ext cx="12195910" cy="6623707"/>
           </a:xfrm>
           <a:prstGeom prst="rect">
             <a:avLst/>
@@ -5468,7 +5342,7 @@
           <p:cNvPr id="8" name="Arrow: Up 7">
             <a:extLst>
               <a:ext uri="{FF2B5EF4-FFF2-40B4-BE49-F238E27FC236}">
-                <a16:creationId xmlns:a16="http://schemas.microsoft.com/office/drawing/2014/main" id="{0A438ACE-D7F4-4CEA-BE64-9E6A3E6F9226}"/>
+                <a16:creationId xmlns:a16="http://schemas.microsoft.com/office/drawing/2014/main" id="{4630EFF8-87F7-4F86-922C-241271BB89A5}"/>
               </a:ext>
             </a:extLst>
           </p:cNvPr>
@@ -5477,8 +5351,8 @@
         </p:nvSpPr>
         <p:spPr>
           <a:xfrm>
-            <a:off x="5694933" y="3002555"/>
-            <a:ext cx="802133" cy="1619399"/>
+            <a:off x="1281970" y="3686400"/>
+            <a:ext cx="472535" cy="953985"/>
           </a:xfrm>
           <a:prstGeom prst="upArrow">
             <a:avLst>
@@ -5512,118 +5386,14 @@
           <a:lstStyle/>
           <a:p>
             <a:pPr algn="ctr"/>
-            <a:r>
-              <a:rPr lang="en-US" sz="2800" b="1" dirty="0">
-                <a:latin typeface="Segoe UI" panose="020B0502040204020203" pitchFamily="34" charset="0"/>
-                <a:cs typeface="Segoe UI" panose="020B0502040204020203" pitchFamily="34" charset="0"/>
-              </a:rPr>
-              <a:t>A</a:t>
-            </a:r>
-          </a:p>
-        </p:txBody>
-      </p:sp>
-      <p:sp>
-        <p:nvSpPr>
-          <p:cNvPr id="2" name="Arrow: Up 1">
-            <a:extLst>
-              <a:ext uri="{FF2B5EF4-FFF2-40B4-BE49-F238E27FC236}">
-                <a16:creationId xmlns:a16="http://schemas.microsoft.com/office/drawing/2014/main" id="{8B76CCBD-C1ED-4DDC-97F0-83E06CC708A8}"/>
-              </a:ext>
-            </a:extLst>
-          </p:cNvPr>
-          <p:cNvSpPr/>
-          <p:nvPr/>
-        </p:nvSpPr>
-        <p:spPr>
-          <a:xfrm rot="16200000">
-            <a:off x="8684815" y="4705022"/>
-            <a:ext cx="802133" cy="1619399"/>
-          </a:xfrm>
-          <a:prstGeom prst="upArrow">
-            <a:avLst>
-              <a:gd name="adj1" fmla="val 50000"/>
-              <a:gd name="adj2" fmla="val 89626"/>
-            </a:avLst>
-          </a:prstGeom>
-          <a:solidFill>
-            <a:srgbClr val="C00000"/>
-          </a:solidFill>
-          <a:ln>
-            <a:noFill/>
-          </a:ln>
-        </p:spPr>
-        <p:style>
-          <a:lnRef idx="0">
-            <a:schemeClr val="accent1"/>
-          </a:lnRef>
-          <a:fillRef idx="3">
-            <a:schemeClr val="accent1"/>
-          </a:fillRef>
-          <a:effectRef idx="3">
-            <a:schemeClr val="accent1"/>
-          </a:effectRef>
-          <a:fontRef idx="minor">
-            <a:schemeClr val="lt1"/>
-          </a:fontRef>
-        </p:style>
-        <p:txBody>
-          <a:bodyPr rtlCol="0" anchor="ctr"/>
-          <a:lstStyle/>
-          <a:p>
-            <a:pPr algn="ctr"/>
-            <a:endParaRPr lang="en-US" sz="2800" b="1" dirty="0">
-              <a:latin typeface="Segoe UI" panose="020B0502040204020203" pitchFamily="34" charset="0"/>
-              <a:cs typeface="Segoe UI" panose="020B0502040204020203" pitchFamily="34" charset="0"/>
-            </a:endParaRPr>
-          </a:p>
-        </p:txBody>
-      </p:sp>
-      <p:sp>
-        <p:nvSpPr>
-          <p:cNvPr id="3" name="TextBox 2">
-            <a:extLst>
-              <a:ext uri="{FF2B5EF4-FFF2-40B4-BE49-F238E27FC236}">
-                <a16:creationId xmlns:a16="http://schemas.microsoft.com/office/drawing/2014/main" id="{0F64D66C-A3B4-40A2-9ED6-B47440BF84AB}"/>
-              </a:ext>
-            </a:extLst>
-          </p:cNvPr>
-          <p:cNvSpPr txBox="1"/>
-          <p:nvPr/>
-        </p:nvSpPr>
-        <p:spPr>
-          <a:xfrm>
-            <a:off x="8942101" y="5244970"/>
-            <a:ext cx="290319" cy="523220"/>
-          </a:xfrm>
-          <a:prstGeom prst="rect">
-            <a:avLst/>
-          </a:prstGeom>
-          <a:noFill/>
-        </p:spPr>
-        <p:txBody>
-          <a:bodyPr wrap="square" rtlCol="0">
-            <a:spAutoFit/>
-          </a:bodyPr>
-          <a:lstStyle/>
-          <a:p>
-            <a:pPr algn="l"/>
-            <a:r>
-              <a:rPr lang="en-US" sz="2800" b="1" dirty="0">
-                <a:solidFill>
-                  <a:schemeClr val="bg1"/>
-                </a:solidFill>
-                <a:latin typeface="Segoe UI" panose="020B0502040204020203" pitchFamily="34" charset="0"/>
-                <a:cs typeface="Segoe UI" panose="020B0502040204020203" pitchFamily="34" charset="0"/>
-              </a:rPr>
-              <a:t>B</a:t>
-            </a:r>
+            <a:endParaRPr lang="en-US"/>
           </a:p>
         </p:txBody>
       </p:sp>
     </p:spTree>
     <p:extLst>
       <p:ext uri="{BB962C8B-B14F-4D97-AF65-F5344CB8AC3E}">
-        <p14:creationId xmlns:p14="http://schemas.microsoft.com/office/powerpoint/2010/main" val="61427506"/>
+        <p14:creationId xmlns:p14="http://schemas.microsoft.com/office/powerpoint/2010/main" val="1960626006"/>
       </p:ext>
     </p:extLst>
   </p:cSld>
@@ -5655,7 +5425,7 @@
           <p:cNvPr id="4" name="Picture 3">
             <a:extLst>
               <a:ext uri="{FF2B5EF4-FFF2-40B4-BE49-F238E27FC236}">
-                <a16:creationId xmlns:a16="http://schemas.microsoft.com/office/drawing/2014/main" id="{932BDEF3-F0DC-4603-BC87-E0BF4C21CE63}"/>
+                <a16:creationId xmlns:a16="http://schemas.microsoft.com/office/drawing/2014/main" id="{5CB39BDA-3DDE-469C-B3DB-B3F102BA4DCF}"/>
               </a:ext>
             </a:extLst>
           </p:cNvPr>
@@ -5672,8 +5442,8 @@
         </p:blipFill>
         <p:spPr>
           <a:xfrm>
-            <a:off x="2000250" y="1590675"/>
-            <a:ext cx="8191500" cy="3676650"/>
+            <a:off x="2005012" y="1309687"/>
+            <a:ext cx="8181975" cy="4238625"/>
           </a:xfrm>
           <a:prstGeom prst="rect">
             <a:avLst/>
@@ -5685,7 +5455,7 @@
           <p:cNvPr id="6" name="Arrow: Up 5">
             <a:extLst>
               <a:ext uri="{FF2B5EF4-FFF2-40B4-BE49-F238E27FC236}">
-                <a16:creationId xmlns:a16="http://schemas.microsoft.com/office/drawing/2014/main" id="{FA149F40-A253-4F63-8CF4-986F72B0EFCC}"/>
+                <a16:creationId xmlns:a16="http://schemas.microsoft.com/office/drawing/2014/main" id="{68C2EB49-4750-4752-8DA6-5CF5C6FEA46E}"/>
               </a:ext>
             </a:extLst>
           </p:cNvPr>
@@ -5693,8 +5463,8 @@
           <p:nvPr/>
         </p:nvSpPr>
         <p:spPr>
-          <a:xfrm rot="16200000">
-            <a:off x="3547828" y="2278996"/>
+          <a:xfrm>
+            <a:off x="2687593" y="3280344"/>
             <a:ext cx="802133" cy="1619399"/>
           </a:xfrm>
           <a:prstGeom prst="upArrow">
@@ -5736,10 +5506,52 @@
           </a:p>
         </p:txBody>
       </p:sp>
+      <p:sp>
+        <p:nvSpPr>
+          <p:cNvPr id="8" name="TextBox 7">
+            <a:extLst>
+              <a:ext uri="{FF2B5EF4-FFF2-40B4-BE49-F238E27FC236}">
+                <a16:creationId xmlns:a16="http://schemas.microsoft.com/office/drawing/2014/main" id="{F72F49D7-DB6F-42FC-B4D4-D8AEAF1E227A}"/>
+              </a:ext>
+            </a:extLst>
+          </p:cNvPr>
+          <p:cNvSpPr txBox="1"/>
+          <p:nvPr/>
+        </p:nvSpPr>
+        <p:spPr>
+          <a:xfrm>
+            <a:off x="2879751" y="3820292"/>
+            <a:ext cx="290319" cy="523220"/>
+          </a:xfrm>
+          <a:prstGeom prst="rect">
+            <a:avLst/>
+          </a:prstGeom>
+          <a:noFill/>
+        </p:spPr>
+        <p:txBody>
+          <a:bodyPr wrap="square" rtlCol="0">
+            <a:spAutoFit/>
+          </a:bodyPr>
+          <a:lstStyle/>
+          <a:p>
+            <a:pPr algn="l"/>
+            <a:r>
+              <a:rPr lang="en-US" sz="2800" b="1" dirty="0">
+                <a:solidFill>
+                  <a:schemeClr val="bg1"/>
+                </a:solidFill>
+                <a:latin typeface="Segoe UI" panose="020B0502040204020203" pitchFamily="34" charset="0"/>
+                <a:cs typeface="Segoe UI" panose="020B0502040204020203" pitchFamily="34" charset="0"/>
+              </a:rPr>
+              <a:t>C</a:t>
+            </a:r>
+          </a:p>
+        </p:txBody>
+      </p:sp>
     </p:spTree>
     <p:extLst>
       <p:ext uri="{BB962C8B-B14F-4D97-AF65-F5344CB8AC3E}">
-        <p14:creationId xmlns:p14="http://schemas.microsoft.com/office/powerpoint/2010/main" val="2806491056"/>
+        <p14:creationId xmlns:p14="http://schemas.microsoft.com/office/powerpoint/2010/main" val="831793758"/>
       </p:ext>
     </p:extLst>
   </p:cSld>
@@ -5771,7 +5583,7 @@
           <p:cNvPr id="4" name="Picture 3">
             <a:extLst>
               <a:ext uri="{FF2B5EF4-FFF2-40B4-BE49-F238E27FC236}">
-                <a16:creationId xmlns:a16="http://schemas.microsoft.com/office/drawing/2014/main" id="{71550629-96FC-4E67-99CF-2A15FF6201F0}"/>
+                <a16:creationId xmlns:a16="http://schemas.microsoft.com/office/drawing/2014/main" id="{932BDEF3-F0DC-4603-BC87-E0BF4C21CE63}"/>
               </a:ext>
             </a:extLst>
           </p:cNvPr>
@@ -5788,8 +5600,8 @@
         </p:blipFill>
         <p:spPr>
           <a:xfrm>
-            <a:off x="2005012" y="1352550"/>
-            <a:ext cx="8181975" cy="4152900"/>
+            <a:off x="2000250" y="1590675"/>
+            <a:ext cx="8191500" cy="3676650"/>
           </a:xfrm>
           <a:prstGeom prst="rect">
             <a:avLst/>
@@ -5801,7 +5613,7 @@
           <p:cNvPr id="6" name="Arrow: Up 5">
             <a:extLst>
               <a:ext uri="{FF2B5EF4-FFF2-40B4-BE49-F238E27FC236}">
-                <a16:creationId xmlns:a16="http://schemas.microsoft.com/office/drawing/2014/main" id="{27F17E6C-D8F3-499B-B498-F2E6C80ED6E4}"/>
+                <a16:creationId xmlns:a16="http://schemas.microsoft.com/office/drawing/2014/main" id="{FA149F40-A253-4F63-8CF4-986F72B0EFCC}"/>
               </a:ext>
             </a:extLst>
           </p:cNvPr>
@@ -5809,8 +5621,8 @@
           <p:nvPr/>
         </p:nvSpPr>
         <p:spPr>
-          <a:xfrm>
-            <a:off x="2134004" y="3785087"/>
+          <a:xfrm rot="16200000">
+            <a:off x="3547828" y="2278996"/>
             <a:ext cx="802133" cy="1619399"/>
           </a:xfrm>
           <a:prstGeom prst="upArrow">
@@ -5852,278 +5664,10 @@
           </a:p>
         </p:txBody>
       </p:sp>
-      <p:sp>
-        <p:nvSpPr>
-          <p:cNvPr id="8" name="TextBox 7">
-            <a:extLst>
-              <a:ext uri="{FF2B5EF4-FFF2-40B4-BE49-F238E27FC236}">
-                <a16:creationId xmlns:a16="http://schemas.microsoft.com/office/drawing/2014/main" id="{0F586391-C06B-4965-BD49-A05F09EAF0A3}"/>
-              </a:ext>
-            </a:extLst>
-          </p:cNvPr>
-          <p:cNvSpPr txBox="1"/>
-          <p:nvPr/>
-        </p:nvSpPr>
-        <p:spPr>
-          <a:xfrm>
-            <a:off x="2326162" y="4325035"/>
-            <a:ext cx="290319" cy="523220"/>
-          </a:xfrm>
-          <a:prstGeom prst="rect">
-            <a:avLst/>
-          </a:prstGeom>
-          <a:noFill/>
-        </p:spPr>
-        <p:txBody>
-          <a:bodyPr wrap="square" rtlCol="0">
-            <a:spAutoFit/>
-          </a:bodyPr>
-          <a:lstStyle/>
-          <a:p>
-            <a:pPr algn="l"/>
-            <a:r>
-              <a:rPr lang="en-US" sz="2800" b="1" dirty="0">
-                <a:solidFill>
-                  <a:schemeClr val="bg1"/>
-                </a:solidFill>
-                <a:latin typeface="Segoe UI" panose="020B0502040204020203" pitchFamily="34" charset="0"/>
-                <a:cs typeface="Segoe UI" panose="020B0502040204020203" pitchFamily="34" charset="0"/>
-              </a:rPr>
-              <a:t>A</a:t>
-            </a:r>
-          </a:p>
-        </p:txBody>
-      </p:sp>
-      <p:sp>
-        <p:nvSpPr>
-          <p:cNvPr id="10" name="Arrow: Up 9">
-            <a:extLst>
-              <a:ext uri="{FF2B5EF4-FFF2-40B4-BE49-F238E27FC236}">
-                <a16:creationId xmlns:a16="http://schemas.microsoft.com/office/drawing/2014/main" id="{3029AAE9-D4BA-4480-981C-B3B05C7C804A}"/>
-              </a:ext>
-            </a:extLst>
-          </p:cNvPr>
-          <p:cNvSpPr/>
-          <p:nvPr/>
-        </p:nvSpPr>
-        <p:spPr>
-          <a:xfrm>
-            <a:off x="3947916" y="2277377"/>
-            <a:ext cx="802133" cy="1619399"/>
-          </a:xfrm>
-          <a:prstGeom prst="upArrow">
-            <a:avLst>
-              <a:gd name="adj1" fmla="val 50000"/>
-              <a:gd name="adj2" fmla="val 89626"/>
-            </a:avLst>
-          </a:prstGeom>
-          <a:solidFill>
-            <a:srgbClr val="C00000"/>
-          </a:solidFill>
-          <a:ln>
-            <a:noFill/>
-          </a:ln>
-        </p:spPr>
-        <p:style>
-          <a:lnRef idx="0">
-            <a:schemeClr val="accent1"/>
-          </a:lnRef>
-          <a:fillRef idx="3">
-            <a:schemeClr val="accent1"/>
-          </a:fillRef>
-          <a:effectRef idx="3">
-            <a:schemeClr val="accent1"/>
-          </a:effectRef>
-          <a:fontRef idx="minor">
-            <a:schemeClr val="lt1"/>
-          </a:fontRef>
-        </p:style>
-        <p:txBody>
-          <a:bodyPr rtlCol="0" anchor="ctr"/>
-          <a:lstStyle/>
-          <a:p>
-            <a:pPr algn="ctr"/>
-            <a:endParaRPr lang="en-US" sz="2800" b="1" dirty="0">
-              <a:latin typeface="Segoe UI" panose="020B0502040204020203" pitchFamily="34" charset="0"/>
-              <a:cs typeface="Segoe UI" panose="020B0502040204020203" pitchFamily="34" charset="0"/>
-            </a:endParaRPr>
-          </a:p>
-        </p:txBody>
-      </p:sp>
-      <p:sp>
-        <p:nvSpPr>
-          <p:cNvPr id="12" name="TextBox 11">
-            <a:extLst>
-              <a:ext uri="{FF2B5EF4-FFF2-40B4-BE49-F238E27FC236}">
-                <a16:creationId xmlns:a16="http://schemas.microsoft.com/office/drawing/2014/main" id="{617ECFC3-91FA-4DC4-8291-228F816BECB9}"/>
-              </a:ext>
-            </a:extLst>
-          </p:cNvPr>
-          <p:cNvSpPr txBox="1"/>
-          <p:nvPr/>
-        </p:nvSpPr>
-        <p:spPr>
-          <a:xfrm>
-            <a:off x="4140074" y="2817325"/>
-            <a:ext cx="290319" cy="523220"/>
-          </a:xfrm>
-          <a:prstGeom prst="rect">
-            <a:avLst/>
-          </a:prstGeom>
-          <a:noFill/>
-        </p:spPr>
-        <p:txBody>
-          <a:bodyPr wrap="square" rtlCol="0">
-            <a:spAutoFit/>
-          </a:bodyPr>
-          <a:lstStyle/>
-          <a:p>
-            <a:pPr algn="l"/>
-            <a:r>
-              <a:rPr lang="en-US" sz="2800" b="1" dirty="0">
-                <a:solidFill>
-                  <a:schemeClr val="bg1"/>
-                </a:solidFill>
-                <a:latin typeface="Segoe UI" panose="020B0502040204020203" pitchFamily="34" charset="0"/>
-                <a:cs typeface="Segoe UI" panose="020B0502040204020203" pitchFamily="34" charset="0"/>
-              </a:rPr>
-              <a:t>B</a:t>
-            </a:r>
-          </a:p>
-        </p:txBody>
-      </p:sp>
-      <p:pic>
-        <p:nvPicPr>
-          <p:cNvPr id="15" name="Picture 14">
-            <a:extLst>
-              <a:ext uri="{FF2B5EF4-FFF2-40B4-BE49-F238E27FC236}">
-                <a16:creationId xmlns:a16="http://schemas.microsoft.com/office/drawing/2014/main" id="{3960078F-975C-45C5-AB18-941ED747863F}"/>
-              </a:ext>
-            </a:extLst>
-          </p:cNvPr>
-          <p:cNvPicPr>
-            <a:picLocks noChangeAspect="1"/>
-          </p:cNvPicPr>
-          <p:nvPr/>
-        </p:nvPicPr>
-        <p:blipFill>
-          <a:blip r:embed="rId3"/>
-          <a:stretch>
-            <a:fillRect/>
-          </a:stretch>
-        </p:blipFill>
-        <p:spPr>
-          <a:xfrm>
-            <a:off x="4750049" y="3896776"/>
-            <a:ext cx="4591050" cy="2343150"/>
-          </a:xfrm>
-          <a:prstGeom prst="rect">
-            <a:avLst/>
-          </a:prstGeom>
-        </p:spPr>
-      </p:pic>
-      <p:sp>
-        <p:nvSpPr>
-          <p:cNvPr id="17" name="Arrow: Up 16">
-            <a:extLst>
-              <a:ext uri="{FF2B5EF4-FFF2-40B4-BE49-F238E27FC236}">
-                <a16:creationId xmlns:a16="http://schemas.microsoft.com/office/drawing/2014/main" id="{C80F160C-5AEF-4541-9DDC-8BC96DC7DCD6}"/>
-              </a:ext>
-            </a:extLst>
-          </p:cNvPr>
-          <p:cNvSpPr/>
-          <p:nvPr/>
-        </p:nvSpPr>
-        <p:spPr>
-          <a:xfrm rot="10800000">
-            <a:off x="7438137" y="4139393"/>
-            <a:ext cx="802133" cy="1619399"/>
-          </a:xfrm>
-          <a:prstGeom prst="upArrow">
-            <a:avLst>
-              <a:gd name="adj1" fmla="val 50000"/>
-              <a:gd name="adj2" fmla="val 89626"/>
-            </a:avLst>
-          </a:prstGeom>
-          <a:solidFill>
-            <a:srgbClr val="C00000"/>
-          </a:solidFill>
-          <a:ln>
-            <a:noFill/>
-          </a:ln>
-        </p:spPr>
-        <p:style>
-          <a:lnRef idx="0">
-            <a:schemeClr val="accent1"/>
-          </a:lnRef>
-          <a:fillRef idx="3">
-            <a:schemeClr val="accent1"/>
-          </a:fillRef>
-          <a:effectRef idx="3">
-            <a:schemeClr val="accent1"/>
-          </a:effectRef>
-          <a:fontRef idx="minor">
-            <a:schemeClr val="lt1"/>
-          </a:fontRef>
-        </p:style>
-        <p:txBody>
-          <a:bodyPr rtlCol="0" anchor="ctr"/>
-          <a:lstStyle/>
-          <a:p>
-            <a:pPr algn="ctr"/>
-            <a:endParaRPr lang="en-US" sz="2800" b="1" dirty="0">
-              <a:latin typeface="Segoe UI" panose="020B0502040204020203" pitchFamily="34" charset="0"/>
-              <a:cs typeface="Segoe UI" panose="020B0502040204020203" pitchFamily="34" charset="0"/>
-            </a:endParaRPr>
-          </a:p>
-        </p:txBody>
-      </p:sp>
-      <p:sp>
-        <p:nvSpPr>
-          <p:cNvPr id="19" name="TextBox 18">
-            <a:extLst>
-              <a:ext uri="{FF2B5EF4-FFF2-40B4-BE49-F238E27FC236}">
-                <a16:creationId xmlns:a16="http://schemas.microsoft.com/office/drawing/2014/main" id="{7F25F45A-60AF-462E-8D7D-E44E7427B9FA}"/>
-              </a:ext>
-            </a:extLst>
-          </p:cNvPr>
-          <p:cNvSpPr txBox="1"/>
-          <p:nvPr/>
-        </p:nvSpPr>
-        <p:spPr>
-          <a:xfrm>
-            <a:off x="7630294" y="4619742"/>
-            <a:ext cx="290319" cy="523220"/>
-          </a:xfrm>
-          <a:prstGeom prst="rect">
-            <a:avLst/>
-          </a:prstGeom>
-          <a:noFill/>
-        </p:spPr>
-        <p:txBody>
-          <a:bodyPr wrap="square" rtlCol="0">
-            <a:spAutoFit/>
-          </a:bodyPr>
-          <a:lstStyle/>
-          <a:p>
-            <a:pPr algn="l"/>
-            <a:r>
-              <a:rPr lang="en-US" sz="2800" b="1" dirty="0">
-                <a:solidFill>
-                  <a:schemeClr val="bg1"/>
-                </a:solidFill>
-                <a:latin typeface="Segoe UI" panose="020B0502040204020203" pitchFamily="34" charset="0"/>
-                <a:cs typeface="Segoe UI" panose="020B0502040204020203" pitchFamily="34" charset="0"/>
-              </a:rPr>
-              <a:t>C</a:t>
-            </a:r>
-          </a:p>
-        </p:txBody>
-      </p:sp>
     </p:spTree>
     <p:extLst>
       <p:ext uri="{BB962C8B-B14F-4D97-AF65-F5344CB8AC3E}">
-        <p14:creationId xmlns:p14="http://schemas.microsoft.com/office/powerpoint/2010/main" val="1918321829"/>
+        <p14:creationId xmlns:p14="http://schemas.microsoft.com/office/powerpoint/2010/main" val="2806491056"/>
       </p:ext>
     </p:extLst>
   </p:cSld>
@@ -6150,10 +5694,364 @@
           <a:chExt cx="0" cy="0"/>
         </a:xfrm>
       </p:grpSpPr>
+      <p:pic>
+        <p:nvPicPr>
+          <p:cNvPr id="4" name="Picture 3">
+            <a:extLst>
+              <a:ext uri="{FF2B5EF4-FFF2-40B4-BE49-F238E27FC236}">
+                <a16:creationId xmlns:a16="http://schemas.microsoft.com/office/drawing/2014/main" id="{71550629-96FC-4E67-99CF-2A15FF6201F0}"/>
+              </a:ext>
+            </a:extLst>
+          </p:cNvPr>
+          <p:cNvPicPr>
+            <a:picLocks noChangeAspect="1"/>
+          </p:cNvPicPr>
+          <p:nvPr/>
+        </p:nvPicPr>
+        <p:blipFill>
+          <a:blip r:embed="rId2"/>
+          <a:stretch>
+            <a:fillRect/>
+          </a:stretch>
+        </p:blipFill>
+        <p:spPr>
+          <a:xfrm>
+            <a:off x="2005012" y="1352550"/>
+            <a:ext cx="8181975" cy="4152900"/>
+          </a:xfrm>
+          <a:prstGeom prst="rect">
+            <a:avLst/>
+          </a:prstGeom>
+        </p:spPr>
+      </p:pic>
+      <p:sp>
+        <p:nvSpPr>
+          <p:cNvPr id="6" name="Arrow: Up 5">
+            <a:extLst>
+              <a:ext uri="{FF2B5EF4-FFF2-40B4-BE49-F238E27FC236}">
+                <a16:creationId xmlns:a16="http://schemas.microsoft.com/office/drawing/2014/main" id="{27F17E6C-D8F3-499B-B498-F2E6C80ED6E4}"/>
+              </a:ext>
+            </a:extLst>
+          </p:cNvPr>
+          <p:cNvSpPr/>
+          <p:nvPr/>
+        </p:nvSpPr>
+        <p:spPr>
+          <a:xfrm>
+            <a:off x="2134004" y="3785087"/>
+            <a:ext cx="802133" cy="1619399"/>
+          </a:xfrm>
+          <a:prstGeom prst="upArrow">
+            <a:avLst>
+              <a:gd name="adj1" fmla="val 50000"/>
+              <a:gd name="adj2" fmla="val 89626"/>
+            </a:avLst>
+          </a:prstGeom>
+          <a:solidFill>
+            <a:srgbClr val="C00000"/>
+          </a:solidFill>
+          <a:ln>
+            <a:noFill/>
+          </a:ln>
+        </p:spPr>
+        <p:style>
+          <a:lnRef idx="0">
+            <a:schemeClr val="accent1"/>
+          </a:lnRef>
+          <a:fillRef idx="3">
+            <a:schemeClr val="accent1"/>
+          </a:fillRef>
+          <a:effectRef idx="3">
+            <a:schemeClr val="accent1"/>
+          </a:effectRef>
+          <a:fontRef idx="minor">
+            <a:schemeClr val="lt1"/>
+          </a:fontRef>
+        </p:style>
+        <p:txBody>
+          <a:bodyPr rtlCol="0" anchor="ctr"/>
+          <a:lstStyle/>
+          <a:p>
+            <a:pPr algn="ctr"/>
+            <a:endParaRPr lang="en-US" sz="2800" b="1" dirty="0">
+              <a:latin typeface="Segoe UI" panose="020B0502040204020203" pitchFamily="34" charset="0"/>
+              <a:cs typeface="Segoe UI" panose="020B0502040204020203" pitchFamily="34" charset="0"/>
+            </a:endParaRPr>
+          </a:p>
+        </p:txBody>
+      </p:sp>
+      <p:sp>
+        <p:nvSpPr>
+          <p:cNvPr id="8" name="TextBox 7">
+            <a:extLst>
+              <a:ext uri="{FF2B5EF4-FFF2-40B4-BE49-F238E27FC236}">
+                <a16:creationId xmlns:a16="http://schemas.microsoft.com/office/drawing/2014/main" id="{0F586391-C06B-4965-BD49-A05F09EAF0A3}"/>
+              </a:ext>
+            </a:extLst>
+          </p:cNvPr>
+          <p:cNvSpPr txBox="1"/>
+          <p:nvPr/>
+        </p:nvSpPr>
+        <p:spPr>
+          <a:xfrm>
+            <a:off x="2326162" y="4325035"/>
+            <a:ext cx="290319" cy="523220"/>
+          </a:xfrm>
+          <a:prstGeom prst="rect">
+            <a:avLst/>
+          </a:prstGeom>
+          <a:noFill/>
+        </p:spPr>
+        <p:txBody>
+          <a:bodyPr wrap="square" rtlCol="0">
+            <a:spAutoFit/>
+          </a:bodyPr>
+          <a:lstStyle/>
+          <a:p>
+            <a:pPr algn="l"/>
+            <a:r>
+              <a:rPr lang="en-US" sz="2800" b="1" dirty="0">
+                <a:solidFill>
+                  <a:schemeClr val="bg1"/>
+                </a:solidFill>
+                <a:latin typeface="Segoe UI" panose="020B0502040204020203" pitchFamily="34" charset="0"/>
+                <a:cs typeface="Segoe UI" panose="020B0502040204020203" pitchFamily="34" charset="0"/>
+              </a:rPr>
+              <a:t>A</a:t>
+            </a:r>
+          </a:p>
+        </p:txBody>
+      </p:sp>
+      <p:sp>
+        <p:nvSpPr>
+          <p:cNvPr id="10" name="Arrow: Up 9">
+            <a:extLst>
+              <a:ext uri="{FF2B5EF4-FFF2-40B4-BE49-F238E27FC236}">
+                <a16:creationId xmlns:a16="http://schemas.microsoft.com/office/drawing/2014/main" id="{3029AAE9-D4BA-4480-981C-B3B05C7C804A}"/>
+              </a:ext>
+            </a:extLst>
+          </p:cNvPr>
+          <p:cNvSpPr/>
+          <p:nvPr/>
+        </p:nvSpPr>
+        <p:spPr>
+          <a:xfrm>
+            <a:off x="3947916" y="2277377"/>
+            <a:ext cx="802133" cy="1619399"/>
+          </a:xfrm>
+          <a:prstGeom prst="upArrow">
+            <a:avLst>
+              <a:gd name="adj1" fmla="val 50000"/>
+              <a:gd name="adj2" fmla="val 89626"/>
+            </a:avLst>
+          </a:prstGeom>
+          <a:solidFill>
+            <a:srgbClr val="C00000"/>
+          </a:solidFill>
+          <a:ln>
+            <a:noFill/>
+          </a:ln>
+        </p:spPr>
+        <p:style>
+          <a:lnRef idx="0">
+            <a:schemeClr val="accent1"/>
+          </a:lnRef>
+          <a:fillRef idx="3">
+            <a:schemeClr val="accent1"/>
+          </a:fillRef>
+          <a:effectRef idx="3">
+            <a:schemeClr val="accent1"/>
+          </a:effectRef>
+          <a:fontRef idx="minor">
+            <a:schemeClr val="lt1"/>
+          </a:fontRef>
+        </p:style>
+        <p:txBody>
+          <a:bodyPr rtlCol="0" anchor="ctr"/>
+          <a:lstStyle/>
+          <a:p>
+            <a:pPr algn="ctr"/>
+            <a:endParaRPr lang="en-US" sz="2800" b="1" dirty="0">
+              <a:latin typeface="Segoe UI" panose="020B0502040204020203" pitchFamily="34" charset="0"/>
+              <a:cs typeface="Segoe UI" panose="020B0502040204020203" pitchFamily="34" charset="0"/>
+            </a:endParaRPr>
+          </a:p>
+        </p:txBody>
+      </p:sp>
+      <p:sp>
+        <p:nvSpPr>
+          <p:cNvPr id="12" name="TextBox 11">
+            <a:extLst>
+              <a:ext uri="{FF2B5EF4-FFF2-40B4-BE49-F238E27FC236}">
+                <a16:creationId xmlns:a16="http://schemas.microsoft.com/office/drawing/2014/main" id="{617ECFC3-91FA-4DC4-8291-228F816BECB9}"/>
+              </a:ext>
+            </a:extLst>
+          </p:cNvPr>
+          <p:cNvSpPr txBox="1"/>
+          <p:nvPr/>
+        </p:nvSpPr>
+        <p:spPr>
+          <a:xfrm>
+            <a:off x="4140074" y="2817325"/>
+            <a:ext cx="290319" cy="523220"/>
+          </a:xfrm>
+          <a:prstGeom prst="rect">
+            <a:avLst/>
+          </a:prstGeom>
+          <a:noFill/>
+        </p:spPr>
+        <p:txBody>
+          <a:bodyPr wrap="square" rtlCol="0">
+            <a:spAutoFit/>
+          </a:bodyPr>
+          <a:lstStyle/>
+          <a:p>
+            <a:pPr algn="l"/>
+            <a:r>
+              <a:rPr lang="en-US" sz="2800" b="1" dirty="0">
+                <a:solidFill>
+                  <a:schemeClr val="bg1"/>
+                </a:solidFill>
+                <a:latin typeface="Segoe UI" panose="020B0502040204020203" pitchFamily="34" charset="0"/>
+                <a:cs typeface="Segoe UI" panose="020B0502040204020203" pitchFamily="34" charset="0"/>
+              </a:rPr>
+              <a:t>B</a:t>
+            </a:r>
+          </a:p>
+        </p:txBody>
+      </p:sp>
+      <p:pic>
+        <p:nvPicPr>
+          <p:cNvPr id="15" name="Picture 14">
+            <a:extLst>
+              <a:ext uri="{FF2B5EF4-FFF2-40B4-BE49-F238E27FC236}">
+                <a16:creationId xmlns:a16="http://schemas.microsoft.com/office/drawing/2014/main" id="{3960078F-975C-45C5-AB18-941ED747863F}"/>
+              </a:ext>
+            </a:extLst>
+          </p:cNvPr>
+          <p:cNvPicPr>
+            <a:picLocks noChangeAspect="1"/>
+          </p:cNvPicPr>
+          <p:nvPr/>
+        </p:nvPicPr>
+        <p:blipFill>
+          <a:blip r:embed="rId3"/>
+          <a:stretch>
+            <a:fillRect/>
+          </a:stretch>
+        </p:blipFill>
+        <p:spPr>
+          <a:xfrm>
+            <a:off x="4750049" y="3896776"/>
+            <a:ext cx="4591050" cy="2343150"/>
+          </a:xfrm>
+          <a:prstGeom prst="rect">
+            <a:avLst/>
+          </a:prstGeom>
+        </p:spPr>
+      </p:pic>
+      <p:sp>
+        <p:nvSpPr>
+          <p:cNvPr id="17" name="Arrow: Up 16">
+            <a:extLst>
+              <a:ext uri="{FF2B5EF4-FFF2-40B4-BE49-F238E27FC236}">
+                <a16:creationId xmlns:a16="http://schemas.microsoft.com/office/drawing/2014/main" id="{C80F160C-5AEF-4541-9DDC-8BC96DC7DCD6}"/>
+              </a:ext>
+            </a:extLst>
+          </p:cNvPr>
+          <p:cNvSpPr/>
+          <p:nvPr/>
+        </p:nvSpPr>
+        <p:spPr>
+          <a:xfrm rot="10800000">
+            <a:off x="7438137" y="4139393"/>
+            <a:ext cx="802133" cy="1619399"/>
+          </a:xfrm>
+          <a:prstGeom prst="upArrow">
+            <a:avLst>
+              <a:gd name="adj1" fmla="val 50000"/>
+              <a:gd name="adj2" fmla="val 89626"/>
+            </a:avLst>
+          </a:prstGeom>
+          <a:solidFill>
+            <a:srgbClr val="C00000"/>
+          </a:solidFill>
+          <a:ln>
+            <a:noFill/>
+          </a:ln>
+        </p:spPr>
+        <p:style>
+          <a:lnRef idx="0">
+            <a:schemeClr val="accent1"/>
+          </a:lnRef>
+          <a:fillRef idx="3">
+            <a:schemeClr val="accent1"/>
+          </a:fillRef>
+          <a:effectRef idx="3">
+            <a:schemeClr val="accent1"/>
+          </a:effectRef>
+          <a:fontRef idx="minor">
+            <a:schemeClr val="lt1"/>
+          </a:fontRef>
+        </p:style>
+        <p:txBody>
+          <a:bodyPr rtlCol="0" anchor="ctr"/>
+          <a:lstStyle/>
+          <a:p>
+            <a:pPr algn="ctr"/>
+            <a:endParaRPr lang="en-US" sz="2800" b="1" dirty="0">
+              <a:latin typeface="Segoe UI" panose="020B0502040204020203" pitchFamily="34" charset="0"/>
+              <a:cs typeface="Segoe UI" panose="020B0502040204020203" pitchFamily="34" charset="0"/>
+            </a:endParaRPr>
+          </a:p>
+        </p:txBody>
+      </p:sp>
+      <p:sp>
+        <p:nvSpPr>
+          <p:cNvPr id="19" name="TextBox 18">
+            <a:extLst>
+              <a:ext uri="{FF2B5EF4-FFF2-40B4-BE49-F238E27FC236}">
+                <a16:creationId xmlns:a16="http://schemas.microsoft.com/office/drawing/2014/main" id="{7F25F45A-60AF-462E-8D7D-E44E7427B9FA}"/>
+              </a:ext>
+            </a:extLst>
+          </p:cNvPr>
+          <p:cNvSpPr txBox="1"/>
+          <p:nvPr/>
+        </p:nvSpPr>
+        <p:spPr>
+          <a:xfrm>
+            <a:off x="7630294" y="4619742"/>
+            <a:ext cx="290319" cy="523220"/>
+          </a:xfrm>
+          <a:prstGeom prst="rect">
+            <a:avLst/>
+          </a:prstGeom>
+          <a:noFill/>
+        </p:spPr>
+        <p:txBody>
+          <a:bodyPr wrap="square" rtlCol="0">
+            <a:spAutoFit/>
+          </a:bodyPr>
+          <a:lstStyle/>
+          <a:p>
+            <a:pPr algn="l"/>
+            <a:r>
+              <a:rPr lang="en-US" sz="2800" b="1" dirty="0">
+                <a:solidFill>
+                  <a:schemeClr val="bg1"/>
+                </a:solidFill>
+                <a:latin typeface="Segoe UI" panose="020B0502040204020203" pitchFamily="34" charset="0"/>
+                <a:cs typeface="Segoe UI" panose="020B0502040204020203" pitchFamily="34" charset="0"/>
+              </a:rPr>
+              <a:t>C</a:t>
+            </a:r>
+          </a:p>
+        </p:txBody>
+      </p:sp>
     </p:spTree>
     <p:extLst>
       <p:ext uri="{BB962C8B-B14F-4D97-AF65-F5344CB8AC3E}">
-        <p14:creationId xmlns:p14="http://schemas.microsoft.com/office/powerpoint/2010/main" val="528842390"/>
+        <p14:creationId xmlns:p14="http://schemas.microsoft.com/office/powerpoint/2010/main" val="1918321829"/>
       </p:ext>
     </p:extLst>
   </p:cSld>
@@ -6662,10 +6560,63 @@
           <a:chExt cx="0" cy="0"/>
         </a:xfrm>
       </p:grpSpPr>
+      <p:sp>
+        <p:nvSpPr>
+          <p:cNvPr id="2" name="Title 1">
+            <a:extLst>
+              <a:ext uri="{FF2B5EF4-FFF2-40B4-BE49-F238E27FC236}">
+                <a16:creationId xmlns:a16="http://schemas.microsoft.com/office/drawing/2014/main" id="{E0E8EDEA-948A-4780-8A55-BAD68E32D808}"/>
+              </a:ext>
+            </a:extLst>
+          </p:cNvPr>
+          <p:cNvSpPr>
+            <a:spLocks noGrp="1"/>
+          </p:cNvSpPr>
+          <p:nvPr>
+            <p:ph type="title"/>
+          </p:nvPr>
+        </p:nvSpPr>
+        <p:spPr/>
+        <p:txBody>
+          <a:bodyPr/>
+          <a:lstStyle/>
+          <a:p>
+            <a:r>
+              <a:rPr lang="en-US" dirty="0"/>
+              <a:t>Setting up Azure</a:t>
+            </a:r>
+          </a:p>
+        </p:txBody>
+      </p:sp>
+      <p:sp>
+        <p:nvSpPr>
+          <p:cNvPr id="3" name="Content Placeholder 2">
+            <a:extLst>
+              <a:ext uri="{FF2B5EF4-FFF2-40B4-BE49-F238E27FC236}">
+                <a16:creationId xmlns:a16="http://schemas.microsoft.com/office/drawing/2014/main" id="{3E12B8A9-CB0A-41C6-94FA-53F00E6999FD}"/>
+              </a:ext>
+            </a:extLst>
+          </p:cNvPr>
+          <p:cNvSpPr>
+            <a:spLocks noGrp="1"/>
+          </p:cNvSpPr>
+          <p:nvPr>
+            <p:ph idx="1"/>
+          </p:nvPr>
+        </p:nvSpPr>
+        <p:spPr/>
+        <p:txBody>
+          <a:bodyPr/>
+          <a:lstStyle/>
+          <a:p>
+            <a:endParaRPr lang="en-US"/>
+          </a:p>
+        </p:txBody>
+      </p:sp>
     </p:spTree>
     <p:extLst>
       <p:ext uri="{BB962C8B-B14F-4D97-AF65-F5344CB8AC3E}">
-        <p14:creationId xmlns:p14="http://schemas.microsoft.com/office/powerpoint/2010/main" val="2084267165"/>
+        <p14:creationId xmlns:p14="http://schemas.microsoft.com/office/powerpoint/2010/main" val="827071046"/>
       </p:ext>
     </p:extLst>
   </p:cSld>
@@ -6692,10 +6643,93 @@
           <a:chExt cx="0" cy="0"/>
         </a:xfrm>
       </p:grpSpPr>
+      <p:pic>
+        <p:nvPicPr>
+          <p:cNvPr id="4" name="Picture 3">
+            <a:extLst>
+              <a:ext uri="{FF2B5EF4-FFF2-40B4-BE49-F238E27FC236}">
+                <a16:creationId xmlns:a16="http://schemas.microsoft.com/office/drawing/2014/main" id="{8F424DBE-47A5-4674-8ACB-73C5B6B7F036}"/>
+              </a:ext>
+            </a:extLst>
+          </p:cNvPr>
+          <p:cNvPicPr>
+            <a:picLocks noChangeAspect="1"/>
+          </p:cNvPicPr>
+          <p:nvPr/>
+        </p:nvPicPr>
+        <p:blipFill>
+          <a:blip r:embed="rId2"/>
+          <a:stretch>
+            <a:fillRect/>
+          </a:stretch>
+        </p:blipFill>
+        <p:spPr>
+          <a:xfrm>
+            <a:off x="609600" y="342900"/>
+            <a:ext cx="10972800" cy="6172200"/>
+          </a:xfrm>
+          <a:prstGeom prst="rect">
+            <a:avLst/>
+          </a:prstGeom>
+        </p:spPr>
+      </p:pic>
+      <p:sp>
+        <p:nvSpPr>
+          <p:cNvPr id="6" name="Arrow: Up 5">
+            <a:extLst>
+              <a:ext uri="{FF2B5EF4-FFF2-40B4-BE49-F238E27FC236}">
+                <a16:creationId xmlns:a16="http://schemas.microsoft.com/office/drawing/2014/main" id="{2475A5EF-4E79-49D1-9E68-5CCE992B6BF0}"/>
+              </a:ext>
+            </a:extLst>
+          </p:cNvPr>
+          <p:cNvSpPr/>
+          <p:nvPr/>
+        </p:nvSpPr>
+        <p:spPr>
+          <a:xfrm rot="5400000">
+            <a:off x="4546522" y="2422840"/>
+            <a:ext cx="472535" cy="953985"/>
+          </a:xfrm>
+          <a:prstGeom prst="upArrow">
+            <a:avLst>
+              <a:gd name="adj1" fmla="val 50000"/>
+              <a:gd name="adj2" fmla="val 89626"/>
+            </a:avLst>
+          </a:prstGeom>
+          <a:solidFill>
+            <a:srgbClr val="C00000"/>
+          </a:solidFill>
+          <a:ln>
+            <a:noFill/>
+          </a:ln>
+        </p:spPr>
+        <p:style>
+          <a:lnRef idx="0">
+            <a:schemeClr val="accent1"/>
+          </a:lnRef>
+          <a:fillRef idx="3">
+            <a:schemeClr val="accent1"/>
+          </a:fillRef>
+          <a:effectRef idx="3">
+            <a:schemeClr val="accent1"/>
+          </a:effectRef>
+          <a:fontRef idx="minor">
+            <a:schemeClr val="lt1"/>
+          </a:fontRef>
+        </p:style>
+        <p:txBody>
+          <a:bodyPr rtlCol="0" anchor="ctr"/>
+          <a:lstStyle/>
+          <a:p>
+            <a:pPr algn="ctr"/>
+            <a:endParaRPr lang="en-US"/>
+          </a:p>
+        </p:txBody>
+      </p:sp>
     </p:spTree>
     <p:extLst>
       <p:ext uri="{BB962C8B-B14F-4D97-AF65-F5344CB8AC3E}">
-        <p14:creationId xmlns:p14="http://schemas.microsoft.com/office/powerpoint/2010/main" val="2903145560"/>
+        <p14:creationId xmlns:p14="http://schemas.microsoft.com/office/powerpoint/2010/main" val="528842390"/>
       </p:ext>
     </p:extLst>
   </p:cSld>
@@ -6722,10 +6756,194 @@
           <a:chExt cx="0" cy="0"/>
         </a:xfrm>
       </p:grpSpPr>
+      <p:pic>
+        <p:nvPicPr>
+          <p:cNvPr id="4" name="Picture 3">
+            <a:extLst>
+              <a:ext uri="{FF2B5EF4-FFF2-40B4-BE49-F238E27FC236}">
+                <a16:creationId xmlns:a16="http://schemas.microsoft.com/office/drawing/2014/main" id="{2F020A34-9A61-47F8-9E35-CE5D9BA5F1C4}"/>
+              </a:ext>
+            </a:extLst>
+          </p:cNvPr>
+          <p:cNvPicPr>
+            <a:picLocks noChangeAspect="1"/>
+          </p:cNvPicPr>
+          <p:nvPr/>
+        </p:nvPicPr>
+        <p:blipFill>
+          <a:blip r:embed="rId2"/>
+          <a:stretch>
+            <a:fillRect/>
+          </a:stretch>
+        </p:blipFill>
+        <p:spPr>
+          <a:xfrm>
+            <a:off x="-595312" y="-476250"/>
+            <a:ext cx="13382625" cy="7810500"/>
+          </a:xfrm>
+          <a:prstGeom prst="rect">
+            <a:avLst/>
+          </a:prstGeom>
+        </p:spPr>
+      </p:pic>
+      <p:sp>
+        <p:nvSpPr>
+          <p:cNvPr id="5" name="Rectangle 4">
+            <a:extLst>
+              <a:ext uri="{FF2B5EF4-FFF2-40B4-BE49-F238E27FC236}">
+                <a16:creationId xmlns:a16="http://schemas.microsoft.com/office/drawing/2014/main" id="{D1E06D25-D2F8-4626-9B23-A8A608962A9D}"/>
+              </a:ext>
+            </a:extLst>
+          </p:cNvPr>
+          <p:cNvSpPr/>
+          <p:nvPr/>
+        </p:nvSpPr>
+        <p:spPr>
+          <a:xfrm>
+            <a:off x="3404532" y="3698688"/>
+            <a:ext cx="2161055" cy="326092"/>
+          </a:xfrm>
+          <a:prstGeom prst="rect">
+            <a:avLst/>
+          </a:prstGeom>
+          <a:ln>
+            <a:noFill/>
+          </a:ln>
+        </p:spPr>
+        <p:style>
+          <a:lnRef idx="2">
+            <a:schemeClr val="dk1">
+              <a:shade val="50000"/>
+            </a:schemeClr>
+          </a:lnRef>
+          <a:fillRef idx="1">
+            <a:schemeClr val="dk1"/>
+          </a:fillRef>
+          <a:effectRef idx="0">
+            <a:schemeClr val="dk1"/>
+          </a:effectRef>
+          <a:fontRef idx="minor">
+            <a:schemeClr val="lt1"/>
+          </a:fontRef>
+        </p:style>
+        <p:txBody>
+          <a:bodyPr rtlCol="0" anchor="ctr"/>
+          <a:lstStyle/>
+          <a:p>
+            <a:pPr algn="ctr"/>
+            <a:endParaRPr lang="en-US"/>
+          </a:p>
+        </p:txBody>
+      </p:sp>
+      <p:sp>
+        <p:nvSpPr>
+          <p:cNvPr id="7" name="Arrow: Up 6">
+            <a:extLst>
+              <a:ext uri="{FF2B5EF4-FFF2-40B4-BE49-F238E27FC236}">
+                <a16:creationId xmlns:a16="http://schemas.microsoft.com/office/drawing/2014/main" id="{3C616593-3511-4E88-94DB-6BF6FF6DBA7A}"/>
+              </a:ext>
+            </a:extLst>
+          </p:cNvPr>
+          <p:cNvSpPr/>
+          <p:nvPr/>
+        </p:nvSpPr>
+        <p:spPr>
+          <a:xfrm rot="16200000">
+            <a:off x="4885234" y="4379381"/>
+            <a:ext cx="802133" cy="1619399"/>
+          </a:xfrm>
+          <a:prstGeom prst="upArrow">
+            <a:avLst>
+              <a:gd name="adj1" fmla="val 50000"/>
+              <a:gd name="adj2" fmla="val 89626"/>
+            </a:avLst>
+          </a:prstGeom>
+          <a:solidFill>
+            <a:srgbClr val="C00000"/>
+          </a:solidFill>
+          <a:ln>
+            <a:noFill/>
+          </a:ln>
+        </p:spPr>
+        <p:style>
+          <a:lnRef idx="0">
+            <a:schemeClr val="accent1"/>
+          </a:lnRef>
+          <a:fillRef idx="3">
+            <a:schemeClr val="accent1"/>
+          </a:fillRef>
+          <a:effectRef idx="3">
+            <a:schemeClr val="accent1"/>
+          </a:effectRef>
+          <a:fontRef idx="minor">
+            <a:schemeClr val="lt1"/>
+          </a:fontRef>
+        </p:style>
+        <p:txBody>
+          <a:bodyPr rtlCol="0" anchor="ctr"/>
+          <a:lstStyle/>
+          <a:p>
+            <a:pPr algn="ctr"/>
+            <a:endParaRPr lang="en-US" sz="2800" b="1" dirty="0">
+              <a:latin typeface="Segoe UI" panose="020B0502040204020203" pitchFamily="34" charset="0"/>
+              <a:cs typeface="Segoe UI" panose="020B0502040204020203" pitchFamily="34" charset="0"/>
+            </a:endParaRPr>
+          </a:p>
+        </p:txBody>
+      </p:sp>
+      <p:sp>
+        <p:nvSpPr>
+          <p:cNvPr id="9" name="Rectangle 8">
+            <a:extLst>
+              <a:ext uri="{FF2B5EF4-FFF2-40B4-BE49-F238E27FC236}">
+                <a16:creationId xmlns:a16="http://schemas.microsoft.com/office/drawing/2014/main" id="{0EE89781-F6CD-4752-BF25-5A44C9BF933D}"/>
+              </a:ext>
+            </a:extLst>
+          </p:cNvPr>
+          <p:cNvSpPr/>
+          <p:nvPr/>
+        </p:nvSpPr>
+        <p:spPr>
+          <a:xfrm>
+            <a:off x="3396073" y="4351665"/>
+            <a:ext cx="2161055" cy="326092"/>
+          </a:xfrm>
+          <a:prstGeom prst="rect">
+            <a:avLst/>
+          </a:prstGeom>
+          <a:ln>
+            <a:noFill/>
+          </a:ln>
+        </p:spPr>
+        <p:style>
+          <a:lnRef idx="2">
+            <a:schemeClr val="dk1">
+              <a:shade val="50000"/>
+            </a:schemeClr>
+          </a:lnRef>
+          <a:fillRef idx="1">
+            <a:schemeClr val="dk1"/>
+          </a:fillRef>
+          <a:effectRef idx="0">
+            <a:schemeClr val="dk1"/>
+          </a:effectRef>
+          <a:fontRef idx="minor">
+            <a:schemeClr val="lt1"/>
+          </a:fontRef>
+        </p:style>
+        <p:txBody>
+          <a:bodyPr rtlCol="0" anchor="ctr"/>
+          <a:lstStyle/>
+          <a:p>
+            <a:pPr algn="ctr"/>
+            <a:endParaRPr lang="en-US"/>
+          </a:p>
+        </p:txBody>
+      </p:sp>
     </p:spTree>
     <p:extLst>
       <p:ext uri="{BB962C8B-B14F-4D97-AF65-F5344CB8AC3E}">
-        <p14:creationId xmlns:p14="http://schemas.microsoft.com/office/powerpoint/2010/main" val="2275897497"/>
+        <p14:creationId xmlns:p14="http://schemas.microsoft.com/office/powerpoint/2010/main" val="2084267165"/>
       </p:ext>
     </p:extLst>
   </p:cSld>
@@ -6752,10 +6970,144 @@
           <a:chExt cx="0" cy="0"/>
         </a:xfrm>
       </p:grpSpPr>
+      <p:pic>
+        <p:nvPicPr>
+          <p:cNvPr id="11" name="Picture 10">
+            <a:extLst>
+              <a:ext uri="{FF2B5EF4-FFF2-40B4-BE49-F238E27FC236}">
+                <a16:creationId xmlns:a16="http://schemas.microsoft.com/office/drawing/2014/main" id="{C6C3CAA5-5A9D-40D0-88CD-C170F273F17B}"/>
+              </a:ext>
+            </a:extLst>
+          </p:cNvPr>
+          <p:cNvPicPr>
+            <a:picLocks noChangeAspect="1"/>
+          </p:cNvPicPr>
+          <p:nvPr/>
+        </p:nvPicPr>
+        <p:blipFill rotWithShape="1">
+          <a:blip r:embed="rId2"/>
+          <a:srcRect t="5127"/>
+          <a:stretch/>
+        </p:blipFill>
+        <p:spPr>
+          <a:xfrm>
+            <a:off x="609600" y="659424"/>
+            <a:ext cx="10972800" cy="5855676"/>
+          </a:xfrm>
+          <a:prstGeom prst="rect">
+            <a:avLst/>
+          </a:prstGeom>
+        </p:spPr>
+      </p:pic>
+      <p:sp>
+        <p:nvSpPr>
+          <p:cNvPr id="8" name="Rectangle 7">
+            <a:extLst>
+              <a:ext uri="{FF2B5EF4-FFF2-40B4-BE49-F238E27FC236}">
+                <a16:creationId xmlns:a16="http://schemas.microsoft.com/office/drawing/2014/main" id="{B03000DA-C528-46E9-BEC7-FDC78EACDE96}"/>
+              </a:ext>
+            </a:extLst>
+          </p:cNvPr>
+          <p:cNvSpPr/>
+          <p:nvPr/>
+        </p:nvSpPr>
+        <p:spPr>
+          <a:xfrm>
+            <a:off x="3111137" y="2861858"/>
+            <a:ext cx="2161055" cy="326092"/>
+          </a:xfrm>
+          <a:prstGeom prst="rect">
+            <a:avLst/>
+          </a:prstGeom>
+          <a:ln>
+            <a:noFill/>
+          </a:ln>
+        </p:spPr>
+        <p:style>
+          <a:lnRef idx="2">
+            <a:schemeClr val="dk1">
+              <a:shade val="50000"/>
+            </a:schemeClr>
+          </a:lnRef>
+          <a:fillRef idx="1">
+            <a:schemeClr val="dk1"/>
+          </a:fillRef>
+          <a:effectRef idx="0">
+            <a:schemeClr val="dk1"/>
+          </a:effectRef>
+          <a:fontRef idx="minor">
+            <a:schemeClr val="lt1"/>
+          </a:fontRef>
+        </p:style>
+        <p:txBody>
+          <a:bodyPr rtlCol="0" anchor="ctr"/>
+          <a:lstStyle/>
+          <a:p>
+            <a:pPr algn="ctr"/>
+            <a:endParaRPr lang="en-US"/>
+          </a:p>
+        </p:txBody>
+      </p:sp>
+      <p:sp>
+        <p:nvSpPr>
+          <p:cNvPr id="6" name="Arrow: Up 5">
+            <a:extLst>
+              <a:ext uri="{FF2B5EF4-FFF2-40B4-BE49-F238E27FC236}">
+                <a16:creationId xmlns:a16="http://schemas.microsoft.com/office/drawing/2014/main" id="{58A07BF2-A280-4269-9304-12DB2F1BB53F}"/>
+              </a:ext>
+            </a:extLst>
+          </p:cNvPr>
+          <p:cNvSpPr/>
+          <p:nvPr/>
+        </p:nvSpPr>
+        <p:spPr>
+          <a:xfrm rot="16200000">
+            <a:off x="4543310" y="2692569"/>
+            <a:ext cx="802133" cy="1619399"/>
+          </a:xfrm>
+          <a:prstGeom prst="upArrow">
+            <a:avLst>
+              <a:gd name="adj1" fmla="val 50000"/>
+              <a:gd name="adj2" fmla="val 89626"/>
+            </a:avLst>
+          </a:prstGeom>
+          <a:solidFill>
+            <a:srgbClr val="C00000"/>
+          </a:solidFill>
+          <a:ln>
+            <a:noFill/>
+          </a:ln>
+        </p:spPr>
+        <p:style>
+          <a:lnRef idx="0">
+            <a:schemeClr val="accent1"/>
+          </a:lnRef>
+          <a:fillRef idx="3">
+            <a:schemeClr val="accent1"/>
+          </a:fillRef>
+          <a:effectRef idx="3">
+            <a:schemeClr val="accent1"/>
+          </a:effectRef>
+          <a:fontRef idx="minor">
+            <a:schemeClr val="lt1"/>
+          </a:fontRef>
+        </p:style>
+        <p:txBody>
+          <a:bodyPr rtlCol="0" anchor="ctr"/>
+          <a:lstStyle/>
+          <a:p>
+            <a:pPr algn="ctr"/>
+            <a:endParaRPr lang="en-US" sz="2800" b="1" dirty="0">
+              <a:latin typeface="Segoe UI" panose="020B0502040204020203" pitchFamily="34" charset="0"/>
+              <a:cs typeface="Segoe UI" panose="020B0502040204020203" pitchFamily="34" charset="0"/>
+            </a:endParaRPr>
+          </a:p>
+        </p:txBody>
+      </p:sp>
     </p:spTree>
     <p:extLst>
       <p:ext uri="{BB962C8B-B14F-4D97-AF65-F5344CB8AC3E}">
-        <p14:creationId xmlns:p14="http://schemas.microsoft.com/office/powerpoint/2010/main" val="1648755881"/>
+        <p14:creationId xmlns:p14="http://schemas.microsoft.com/office/powerpoint/2010/main" val="2903145560"/>
       </p:ext>
     </p:extLst>
   </p:cSld>
@@ -6784,10 +7136,10 @@
       </p:grpSpPr>
       <p:pic>
         <p:nvPicPr>
-          <p:cNvPr id="3" name="Picture 2">
-            <a:extLst>
-              <a:ext uri="{FF2B5EF4-FFF2-40B4-BE49-F238E27FC236}">
-                <a16:creationId xmlns:a16="http://schemas.microsoft.com/office/drawing/2014/main" id="{5D03E0FF-9446-4D7F-B6B2-DF1ACC82D297}"/>
+          <p:cNvPr id="6" name="Picture 5">
+            <a:extLst>
+              <a:ext uri="{FF2B5EF4-FFF2-40B4-BE49-F238E27FC236}">
+                <a16:creationId xmlns:a16="http://schemas.microsoft.com/office/drawing/2014/main" id="{880DCB38-0C19-4820-8353-E33E8B234890}"/>
               </a:ext>
             </a:extLst>
           </p:cNvPr>
@@ -6804,18 +7156,175 @@
         </p:blipFill>
         <p:spPr>
           <a:xfrm>
-            <a:off x="2243137" y="1109662"/>
-            <a:ext cx="7705725" cy="4638675"/>
+            <a:off x="-1819275" y="-762000"/>
+            <a:ext cx="15830550" cy="8382000"/>
           </a:xfrm>
           <a:prstGeom prst="rect">
             <a:avLst/>
           </a:prstGeom>
         </p:spPr>
       </p:pic>
+      <p:sp>
+        <p:nvSpPr>
+          <p:cNvPr id="8" name="Arrow: Up 7">
+            <a:extLst>
+              <a:ext uri="{FF2B5EF4-FFF2-40B4-BE49-F238E27FC236}">
+                <a16:creationId xmlns:a16="http://schemas.microsoft.com/office/drawing/2014/main" id="{0A438ACE-D7F4-4CEA-BE64-9E6A3E6F9226}"/>
+              </a:ext>
+            </a:extLst>
+          </p:cNvPr>
+          <p:cNvSpPr/>
+          <p:nvPr/>
+        </p:nvSpPr>
+        <p:spPr>
+          <a:xfrm>
+            <a:off x="5694933" y="3002555"/>
+            <a:ext cx="802133" cy="1619399"/>
+          </a:xfrm>
+          <a:prstGeom prst="upArrow">
+            <a:avLst>
+              <a:gd name="adj1" fmla="val 50000"/>
+              <a:gd name="adj2" fmla="val 89626"/>
+            </a:avLst>
+          </a:prstGeom>
+          <a:solidFill>
+            <a:srgbClr val="C00000"/>
+          </a:solidFill>
+          <a:ln>
+            <a:noFill/>
+          </a:ln>
+        </p:spPr>
+        <p:style>
+          <a:lnRef idx="0">
+            <a:schemeClr val="accent1"/>
+          </a:lnRef>
+          <a:fillRef idx="3">
+            <a:schemeClr val="accent1"/>
+          </a:fillRef>
+          <a:effectRef idx="3">
+            <a:schemeClr val="accent1"/>
+          </a:effectRef>
+          <a:fontRef idx="minor">
+            <a:schemeClr val="lt1"/>
+          </a:fontRef>
+        </p:style>
+        <p:txBody>
+          <a:bodyPr rtlCol="0" anchor="ctr"/>
+          <a:lstStyle/>
+          <a:p>
+            <a:pPr algn="ctr"/>
+            <a:r>
+              <a:rPr lang="en-US" sz="2800" b="1" dirty="0">
+                <a:latin typeface="Segoe UI" panose="020B0502040204020203" pitchFamily="34" charset="0"/>
+                <a:cs typeface="Segoe UI" panose="020B0502040204020203" pitchFamily="34" charset="0"/>
+              </a:rPr>
+              <a:t>A</a:t>
+            </a:r>
+          </a:p>
+        </p:txBody>
+      </p:sp>
+      <p:sp>
+        <p:nvSpPr>
+          <p:cNvPr id="2" name="Arrow: Up 1">
+            <a:extLst>
+              <a:ext uri="{FF2B5EF4-FFF2-40B4-BE49-F238E27FC236}">
+                <a16:creationId xmlns:a16="http://schemas.microsoft.com/office/drawing/2014/main" id="{8B76CCBD-C1ED-4DDC-97F0-83E06CC708A8}"/>
+              </a:ext>
+            </a:extLst>
+          </p:cNvPr>
+          <p:cNvSpPr/>
+          <p:nvPr/>
+        </p:nvSpPr>
+        <p:spPr>
+          <a:xfrm rot="16200000">
+            <a:off x="8684815" y="4705022"/>
+            <a:ext cx="802133" cy="1619399"/>
+          </a:xfrm>
+          <a:prstGeom prst="upArrow">
+            <a:avLst>
+              <a:gd name="adj1" fmla="val 50000"/>
+              <a:gd name="adj2" fmla="val 89626"/>
+            </a:avLst>
+          </a:prstGeom>
+          <a:solidFill>
+            <a:srgbClr val="C00000"/>
+          </a:solidFill>
+          <a:ln>
+            <a:noFill/>
+          </a:ln>
+        </p:spPr>
+        <p:style>
+          <a:lnRef idx="0">
+            <a:schemeClr val="accent1"/>
+          </a:lnRef>
+          <a:fillRef idx="3">
+            <a:schemeClr val="accent1"/>
+          </a:fillRef>
+          <a:effectRef idx="3">
+            <a:schemeClr val="accent1"/>
+          </a:effectRef>
+          <a:fontRef idx="minor">
+            <a:schemeClr val="lt1"/>
+          </a:fontRef>
+        </p:style>
+        <p:txBody>
+          <a:bodyPr rtlCol="0" anchor="ctr"/>
+          <a:lstStyle/>
+          <a:p>
+            <a:pPr algn="ctr"/>
+            <a:endParaRPr lang="en-US" sz="2800" b="1" dirty="0">
+              <a:latin typeface="Segoe UI" panose="020B0502040204020203" pitchFamily="34" charset="0"/>
+              <a:cs typeface="Segoe UI" panose="020B0502040204020203" pitchFamily="34" charset="0"/>
+            </a:endParaRPr>
+          </a:p>
+        </p:txBody>
+      </p:sp>
+      <p:sp>
+        <p:nvSpPr>
+          <p:cNvPr id="3" name="TextBox 2">
+            <a:extLst>
+              <a:ext uri="{FF2B5EF4-FFF2-40B4-BE49-F238E27FC236}">
+                <a16:creationId xmlns:a16="http://schemas.microsoft.com/office/drawing/2014/main" id="{0F64D66C-A3B4-40A2-9ED6-B47440BF84AB}"/>
+              </a:ext>
+            </a:extLst>
+          </p:cNvPr>
+          <p:cNvSpPr txBox="1"/>
+          <p:nvPr/>
+        </p:nvSpPr>
+        <p:spPr>
+          <a:xfrm>
+            <a:off x="8942101" y="5244970"/>
+            <a:ext cx="290319" cy="523220"/>
+          </a:xfrm>
+          <a:prstGeom prst="rect">
+            <a:avLst/>
+          </a:prstGeom>
+          <a:noFill/>
+        </p:spPr>
+        <p:txBody>
+          <a:bodyPr wrap="square" rtlCol="0">
+            <a:spAutoFit/>
+          </a:bodyPr>
+          <a:lstStyle/>
+          <a:p>
+            <a:pPr algn="l"/>
+            <a:r>
+              <a:rPr lang="en-US" sz="2800" b="1" dirty="0">
+                <a:solidFill>
+                  <a:schemeClr val="bg1"/>
+                </a:solidFill>
+                <a:latin typeface="Segoe UI" panose="020B0502040204020203" pitchFamily="34" charset="0"/>
+                <a:cs typeface="Segoe UI" panose="020B0502040204020203" pitchFamily="34" charset="0"/>
+              </a:rPr>
+              <a:t>B</a:t>
+            </a:r>
+          </a:p>
+        </p:txBody>
+      </p:sp>
     </p:spTree>
     <p:extLst>
       <p:ext uri="{BB962C8B-B14F-4D97-AF65-F5344CB8AC3E}">
-        <p14:creationId xmlns:p14="http://schemas.microsoft.com/office/powerpoint/2010/main" val="3092223672"/>
+        <p14:creationId xmlns:p14="http://schemas.microsoft.com/office/powerpoint/2010/main" val="61427506"/>
       </p:ext>
     </p:extLst>
   </p:cSld>
@@ -6842,10 +7351,96 @@
           <a:chExt cx="0" cy="0"/>
         </a:xfrm>
       </p:grpSpPr>
+      <p:pic>
+        <p:nvPicPr>
+          <p:cNvPr id="4" name="Picture 3">
+            <a:extLst>
+              <a:ext uri="{FF2B5EF4-FFF2-40B4-BE49-F238E27FC236}">
+                <a16:creationId xmlns:a16="http://schemas.microsoft.com/office/drawing/2014/main" id="{D619111E-A633-4998-AC7D-327E989F75F1}"/>
+              </a:ext>
+            </a:extLst>
+          </p:cNvPr>
+          <p:cNvPicPr>
+            <a:picLocks noChangeAspect="1"/>
+          </p:cNvPicPr>
+          <p:nvPr/>
+        </p:nvPicPr>
+        <p:blipFill>
+          <a:blip r:embed="rId2"/>
+          <a:stretch>
+            <a:fillRect/>
+          </a:stretch>
+        </p:blipFill>
+        <p:spPr>
+          <a:xfrm>
+            <a:off x="495300" y="-723900"/>
+            <a:ext cx="11201400" cy="8305800"/>
+          </a:xfrm>
+          <a:prstGeom prst="rect">
+            <a:avLst/>
+          </a:prstGeom>
+        </p:spPr>
+      </p:pic>
+      <p:sp>
+        <p:nvSpPr>
+          <p:cNvPr id="8" name="Arrow: Up 7">
+            <a:extLst>
+              <a:ext uri="{FF2B5EF4-FFF2-40B4-BE49-F238E27FC236}">
+                <a16:creationId xmlns:a16="http://schemas.microsoft.com/office/drawing/2014/main" id="{EC089CBD-A318-4B8D-A0C9-46ECFB4708FA}"/>
+              </a:ext>
+            </a:extLst>
+          </p:cNvPr>
+          <p:cNvSpPr/>
+          <p:nvPr/>
+        </p:nvSpPr>
+        <p:spPr>
+          <a:xfrm rot="16200000">
+            <a:off x="4885234" y="6119941"/>
+            <a:ext cx="802133" cy="1619399"/>
+          </a:xfrm>
+          <a:prstGeom prst="upArrow">
+            <a:avLst>
+              <a:gd name="adj1" fmla="val 50000"/>
+              <a:gd name="adj2" fmla="val 89626"/>
+            </a:avLst>
+          </a:prstGeom>
+          <a:solidFill>
+            <a:srgbClr val="C00000"/>
+          </a:solidFill>
+          <a:ln>
+            <a:noFill/>
+          </a:ln>
+        </p:spPr>
+        <p:style>
+          <a:lnRef idx="0">
+            <a:schemeClr val="accent1"/>
+          </a:lnRef>
+          <a:fillRef idx="3">
+            <a:schemeClr val="accent1"/>
+          </a:fillRef>
+          <a:effectRef idx="3">
+            <a:schemeClr val="accent1"/>
+          </a:effectRef>
+          <a:fontRef idx="minor">
+            <a:schemeClr val="lt1"/>
+          </a:fontRef>
+        </p:style>
+        <p:txBody>
+          <a:bodyPr rtlCol="0" anchor="ctr"/>
+          <a:lstStyle/>
+          <a:p>
+            <a:pPr algn="ctr"/>
+            <a:endParaRPr lang="en-US" sz="2800" b="1" dirty="0">
+              <a:latin typeface="Segoe UI" panose="020B0502040204020203" pitchFamily="34" charset="0"/>
+              <a:cs typeface="Segoe UI" panose="020B0502040204020203" pitchFamily="34" charset="0"/>
+            </a:endParaRPr>
+          </a:p>
+        </p:txBody>
+      </p:sp>
     </p:spTree>
     <p:extLst>
       <p:ext uri="{BB962C8B-B14F-4D97-AF65-F5344CB8AC3E}">
-        <p14:creationId xmlns:p14="http://schemas.microsoft.com/office/powerpoint/2010/main" val="4130343805"/>
+        <p14:creationId xmlns:p14="http://schemas.microsoft.com/office/powerpoint/2010/main" val="2275897497"/>
       </p:ext>
     </p:extLst>
   </p:cSld>
@@ -6872,6 +7467,212 @@
           <a:chExt cx="0" cy="0"/>
         </a:xfrm>
       </p:grpSpPr>
+      <p:pic>
+        <p:nvPicPr>
+          <p:cNvPr id="4" name="Picture 3">
+            <a:extLst>
+              <a:ext uri="{FF2B5EF4-FFF2-40B4-BE49-F238E27FC236}">
+                <a16:creationId xmlns:a16="http://schemas.microsoft.com/office/drawing/2014/main" id="{BE7BF0D7-84E8-4C90-A845-F377352996C2}"/>
+              </a:ext>
+            </a:extLst>
+          </p:cNvPr>
+          <p:cNvPicPr>
+            <a:picLocks noChangeAspect="1"/>
+          </p:cNvPicPr>
+          <p:nvPr/>
+        </p:nvPicPr>
+        <p:blipFill>
+          <a:blip r:embed="rId2"/>
+          <a:stretch>
+            <a:fillRect/>
+          </a:stretch>
+        </p:blipFill>
+        <p:spPr>
+          <a:xfrm>
+            <a:off x="609600" y="342900"/>
+            <a:ext cx="10972800" cy="6172200"/>
+          </a:xfrm>
+          <a:prstGeom prst="rect">
+            <a:avLst/>
+          </a:prstGeom>
+        </p:spPr>
+      </p:pic>
+      <p:sp>
+        <p:nvSpPr>
+          <p:cNvPr id="6" name="Arrow: Up 5">
+            <a:extLst>
+              <a:ext uri="{FF2B5EF4-FFF2-40B4-BE49-F238E27FC236}">
+                <a16:creationId xmlns:a16="http://schemas.microsoft.com/office/drawing/2014/main" id="{85C50DA9-252D-4365-B1E1-7000BB8E768F}"/>
+              </a:ext>
+            </a:extLst>
+          </p:cNvPr>
+          <p:cNvSpPr/>
+          <p:nvPr/>
+        </p:nvSpPr>
+        <p:spPr>
+          <a:xfrm rot="16200000">
+            <a:off x="4600297" y="3091479"/>
+            <a:ext cx="802133" cy="1619399"/>
+          </a:xfrm>
+          <a:prstGeom prst="upArrow">
+            <a:avLst>
+              <a:gd name="adj1" fmla="val 50000"/>
+              <a:gd name="adj2" fmla="val 89626"/>
+            </a:avLst>
+          </a:prstGeom>
+          <a:solidFill>
+            <a:srgbClr val="C00000"/>
+          </a:solidFill>
+          <a:ln>
+            <a:noFill/>
+          </a:ln>
+        </p:spPr>
+        <p:style>
+          <a:lnRef idx="0">
+            <a:schemeClr val="accent1"/>
+          </a:lnRef>
+          <a:fillRef idx="3">
+            <a:schemeClr val="accent1"/>
+          </a:fillRef>
+          <a:effectRef idx="3">
+            <a:schemeClr val="accent1"/>
+          </a:effectRef>
+          <a:fontRef idx="minor">
+            <a:schemeClr val="lt1"/>
+          </a:fontRef>
+        </p:style>
+        <p:txBody>
+          <a:bodyPr rtlCol="0" anchor="ctr"/>
+          <a:lstStyle/>
+          <a:p>
+            <a:pPr algn="ctr"/>
+            <a:endParaRPr lang="en-US" sz="2800" b="1" dirty="0">
+              <a:latin typeface="Segoe UI" panose="020B0502040204020203" pitchFamily="34" charset="0"/>
+              <a:cs typeface="Segoe UI" panose="020B0502040204020203" pitchFamily="34" charset="0"/>
+            </a:endParaRPr>
+          </a:p>
+        </p:txBody>
+      </p:sp>
+    </p:spTree>
+    <p:extLst>
+      <p:ext uri="{BB962C8B-B14F-4D97-AF65-F5344CB8AC3E}">
+        <p14:creationId xmlns:p14="http://schemas.microsoft.com/office/powerpoint/2010/main" val="1648755881"/>
+      </p:ext>
+    </p:extLst>
+  </p:cSld>
+  <p:clrMapOvr>
+    <a:masterClrMapping/>
+  </p:clrMapOvr>
+</p:sld>
+</file>
+
+<file path=ppt/slides/slide32.xml><?xml version="1.0" encoding="utf-8"?>
+<p:sld xmlns:a="http://schemas.openxmlformats.org/drawingml/2006/main" xmlns:r="http://schemas.openxmlformats.org/officeDocument/2006/relationships" xmlns:p="http://schemas.openxmlformats.org/presentationml/2006/main">
+  <p:cSld>
+    <p:spTree>
+      <p:nvGrpSpPr>
+        <p:cNvPr id="1" name=""/>
+        <p:cNvGrpSpPr/>
+        <p:nvPr/>
+      </p:nvGrpSpPr>
+      <p:grpSpPr>
+        <a:xfrm>
+          <a:off x="0" y="0"/>
+          <a:ext cx="0" cy="0"/>
+          <a:chOff x="0" y="0"/>
+          <a:chExt cx="0" cy="0"/>
+        </a:xfrm>
+      </p:grpSpPr>
+      <p:pic>
+        <p:nvPicPr>
+          <p:cNvPr id="4" name="Picture 3">
+            <a:extLst>
+              <a:ext uri="{FF2B5EF4-FFF2-40B4-BE49-F238E27FC236}">
+                <a16:creationId xmlns:a16="http://schemas.microsoft.com/office/drawing/2014/main" id="{D13E2DBD-10BE-4CD0-BA46-ADC2DC609D9C}"/>
+              </a:ext>
+            </a:extLst>
+          </p:cNvPr>
+          <p:cNvPicPr>
+            <a:picLocks noChangeAspect="1"/>
+          </p:cNvPicPr>
+          <p:nvPr/>
+        </p:nvPicPr>
+        <p:blipFill>
+          <a:blip r:embed="rId2"/>
+          <a:stretch>
+            <a:fillRect/>
+          </a:stretch>
+        </p:blipFill>
+        <p:spPr>
+          <a:xfrm>
+            <a:off x="2105025" y="-214312"/>
+            <a:ext cx="7981950" cy="7286625"/>
+          </a:xfrm>
+          <a:prstGeom prst="rect">
+            <a:avLst/>
+          </a:prstGeom>
+        </p:spPr>
+      </p:pic>
+    </p:spTree>
+    <p:extLst>
+      <p:ext uri="{BB962C8B-B14F-4D97-AF65-F5344CB8AC3E}">
+        <p14:creationId xmlns:p14="http://schemas.microsoft.com/office/powerpoint/2010/main" val="4130343805"/>
+      </p:ext>
+    </p:extLst>
+  </p:cSld>
+  <p:clrMapOvr>
+    <a:masterClrMapping/>
+  </p:clrMapOvr>
+</p:sld>
+</file>
+
+<file path=ppt/slides/slide33.xml><?xml version="1.0" encoding="utf-8"?>
+<p:sld xmlns:a="http://schemas.openxmlformats.org/drawingml/2006/main" xmlns:r="http://schemas.openxmlformats.org/officeDocument/2006/relationships" xmlns:p="http://schemas.openxmlformats.org/presentationml/2006/main">
+  <p:cSld>
+    <p:spTree>
+      <p:nvGrpSpPr>
+        <p:cNvPr id="1" name=""/>
+        <p:cNvGrpSpPr/>
+        <p:nvPr/>
+      </p:nvGrpSpPr>
+      <p:grpSpPr>
+        <a:xfrm>
+          <a:off x="0" y="0"/>
+          <a:ext cx="0" cy="0"/>
+          <a:chOff x="0" y="0"/>
+          <a:chExt cx="0" cy="0"/>
+        </a:xfrm>
+      </p:grpSpPr>
+      <p:pic>
+        <p:nvPicPr>
+          <p:cNvPr id="4" name="Picture 3">
+            <a:extLst>
+              <a:ext uri="{FF2B5EF4-FFF2-40B4-BE49-F238E27FC236}">
+                <a16:creationId xmlns:a16="http://schemas.microsoft.com/office/drawing/2014/main" id="{BBCC33E2-BEC4-48AD-A4A5-E64303178E70}"/>
+              </a:ext>
+            </a:extLst>
+          </p:cNvPr>
+          <p:cNvPicPr>
+            <a:picLocks noChangeAspect="1"/>
+          </p:cNvPicPr>
+          <p:nvPr/>
+        </p:nvPicPr>
+        <p:blipFill>
+          <a:blip r:embed="rId2"/>
+          <a:stretch>
+            <a:fillRect/>
+          </a:stretch>
+        </p:blipFill>
+        <p:spPr>
+          <a:xfrm>
+            <a:off x="609600" y="342900"/>
+            <a:ext cx="10972800" cy="6172200"/>
+          </a:xfrm>
+          <a:prstGeom prst="rect">
+            <a:avLst/>
+          </a:prstGeom>
+        </p:spPr>
+      </p:pic>
     </p:spTree>
     <p:extLst>
       <p:ext uri="{BB962C8B-B14F-4D97-AF65-F5344CB8AC3E}">
@@ -6885,7 +7686,7 @@
 </p:sld>
 </file>
 
-<file path=ppt/slides/slide32.xml><?xml version="1.0" encoding="utf-8"?>
+<file path=ppt/slides/slide34.xml><?xml version="1.0" encoding="utf-8"?>
 <p:sld xmlns:a="http://schemas.openxmlformats.org/drawingml/2006/main" xmlns:r="http://schemas.openxmlformats.org/officeDocument/2006/relationships" xmlns:p="http://schemas.openxmlformats.org/presentationml/2006/main">
   <p:cSld>
     <p:spTree>
@@ -6915,7 +7716,7 @@
 </p:sld>
 </file>
 
-<file path=ppt/slides/slide33.xml><?xml version="1.0" encoding="utf-8"?>
+<file path=ppt/slides/slide35.xml><?xml version="1.0" encoding="utf-8"?>
 <p:sld xmlns:a="http://schemas.openxmlformats.org/drawingml/2006/main" xmlns:r="http://schemas.openxmlformats.org/officeDocument/2006/relationships" xmlns:p="http://schemas.openxmlformats.org/presentationml/2006/main">
   <p:cSld>
     <p:spTree>
@@ -6945,7 +7746,7 @@
 </p:sld>
 </file>
 
-<file path=ppt/slides/slide34.xml><?xml version="1.0" encoding="utf-8"?>
+<file path=ppt/slides/slide36.xml><?xml version="1.0" encoding="utf-8"?>
 <p:sld xmlns:a="http://schemas.openxmlformats.org/drawingml/2006/main" xmlns:r="http://schemas.openxmlformats.org/officeDocument/2006/relationships" xmlns:p="http://schemas.openxmlformats.org/presentationml/2006/main">
   <p:cSld>
     <p:spTree>
@@ -6975,7 +7776,7 @@
 </p:sld>
 </file>
 
-<file path=ppt/slides/slide35.xml><?xml version="1.0" encoding="utf-8"?>
+<file path=ppt/slides/slide37.xml><?xml version="1.0" encoding="utf-8"?>
 <p:sld xmlns:a="http://schemas.openxmlformats.org/drawingml/2006/main" xmlns:r="http://schemas.openxmlformats.org/officeDocument/2006/relationships" xmlns:p="http://schemas.openxmlformats.org/presentationml/2006/main">
   <p:cSld>
     <p:spTree>
@@ -7005,7 +7806,7 @@
 </p:sld>
 </file>
 
-<file path=ppt/slides/slide36.xml><?xml version="1.0" encoding="utf-8"?>
+<file path=ppt/slides/slide38.xml><?xml version="1.0" encoding="utf-8"?>
 <p:sld xmlns:a="http://schemas.openxmlformats.org/drawingml/2006/main" xmlns:r="http://schemas.openxmlformats.org/officeDocument/2006/relationships" xmlns:p="http://schemas.openxmlformats.org/presentationml/2006/main">
   <p:cSld>
     <p:spTree>
@@ -7035,7 +7836,7 @@
 </p:sld>
 </file>
 
-<file path=ppt/slides/slide37.xml><?xml version="1.0" encoding="utf-8"?>
+<file path=ppt/slides/slide39.xml><?xml version="1.0" encoding="utf-8"?>
 <p:sld xmlns:a="http://schemas.openxmlformats.org/drawingml/2006/main" xmlns:r="http://schemas.openxmlformats.org/officeDocument/2006/relationships" xmlns:p="http://schemas.openxmlformats.org/presentationml/2006/main">
   <p:cSld>
     <p:spTree>
@@ -7065,7 +7866,67 @@
 </p:sld>
 </file>
 
-<file path=ppt/slides/slide38.xml><?xml version="1.0" encoding="utf-8"?>
+<file path=ppt/slides/slide4.xml><?xml version="1.0" encoding="utf-8"?>
+<p:sld xmlns:a="http://schemas.openxmlformats.org/drawingml/2006/main" xmlns:r="http://schemas.openxmlformats.org/officeDocument/2006/relationships" xmlns:p="http://schemas.openxmlformats.org/presentationml/2006/main">
+  <p:cSld>
+    <p:spTree>
+      <p:nvGrpSpPr>
+        <p:cNvPr id="1" name=""/>
+        <p:cNvGrpSpPr/>
+        <p:nvPr/>
+      </p:nvGrpSpPr>
+      <p:grpSpPr>
+        <a:xfrm>
+          <a:off x="0" y="0"/>
+          <a:ext cx="0" cy="0"/>
+          <a:chOff x="0" y="0"/>
+          <a:chExt cx="0" cy="0"/>
+        </a:xfrm>
+      </p:grpSpPr>
+      <p:pic>
+        <p:nvPicPr>
+          <p:cNvPr id="3" name="Picture 2">
+            <a:extLst>
+              <a:ext uri="{FF2B5EF4-FFF2-40B4-BE49-F238E27FC236}">
+                <a16:creationId xmlns:a16="http://schemas.microsoft.com/office/drawing/2014/main" id="{5D03E0FF-9446-4D7F-B6B2-DF1ACC82D297}"/>
+              </a:ext>
+            </a:extLst>
+          </p:cNvPr>
+          <p:cNvPicPr>
+            <a:picLocks noChangeAspect="1"/>
+          </p:cNvPicPr>
+          <p:nvPr/>
+        </p:nvPicPr>
+        <p:blipFill>
+          <a:blip r:embed="rId2"/>
+          <a:stretch>
+            <a:fillRect/>
+          </a:stretch>
+        </p:blipFill>
+        <p:spPr>
+          <a:xfrm>
+            <a:off x="2243137" y="1109662"/>
+            <a:ext cx="7705725" cy="4638675"/>
+          </a:xfrm>
+          <a:prstGeom prst="rect">
+            <a:avLst/>
+          </a:prstGeom>
+        </p:spPr>
+      </p:pic>
+    </p:spTree>
+    <p:extLst>
+      <p:ext uri="{BB962C8B-B14F-4D97-AF65-F5344CB8AC3E}">
+        <p14:creationId xmlns:p14="http://schemas.microsoft.com/office/powerpoint/2010/main" val="3092223672"/>
+      </p:ext>
+    </p:extLst>
+  </p:cSld>
+  <p:clrMapOvr>
+    <a:masterClrMapping/>
+  </p:clrMapOvr>
+</p:sld>
+</file>
+
+<file path=ppt/slides/slide40.xml><?xml version="1.0" encoding="utf-8"?>
 <p:sld xmlns:a="http://schemas.openxmlformats.org/drawingml/2006/main" xmlns:r="http://schemas.openxmlformats.org/officeDocument/2006/relationships" xmlns:p="http://schemas.openxmlformats.org/presentationml/2006/main">
   <p:cSld>
     <p:spTree>
@@ -7095,7 +7956,7 @@
 </p:sld>
 </file>
 
-<file path=ppt/slides/slide39.xml><?xml version="1.0" encoding="utf-8"?>
+<file path=ppt/slides/slide41.xml><?xml version="1.0" encoding="utf-8"?>
 <p:sld xmlns:a="http://schemas.openxmlformats.org/drawingml/2006/main" xmlns:r="http://schemas.openxmlformats.org/officeDocument/2006/relationships" xmlns:p="http://schemas.openxmlformats.org/presentationml/2006/main">
   <p:cSld>
     <p:spTree>
@@ -7125,67 +7986,7 @@
 </p:sld>
 </file>
 
-<file path=ppt/slides/slide4.xml><?xml version="1.0" encoding="utf-8"?>
-<p:sld xmlns:a="http://schemas.openxmlformats.org/drawingml/2006/main" xmlns:r="http://schemas.openxmlformats.org/officeDocument/2006/relationships" xmlns:p="http://schemas.openxmlformats.org/presentationml/2006/main">
-  <p:cSld>
-    <p:spTree>
-      <p:nvGrpSpPr>
-        <p:cNvPr id="1" name=""/>
-        <p:cNvGrpSpPr/>
-        <p:nvPr/>
-      </p:nvGrpSpPr>
-      <p:grpSpPr>
-        <a:xfrm>
-          <a:off x="0" y="0"/>
-          <a:ext cx="0" cy="0"/>
-          <a:chOff x="0" y="0"/>
-          <a:chExt cx="0" cy="0"/>
-        </a:xfrm>
-      </p:grpSpPr>
-      <p:pic>
-        <p:nvPicPr>
-          <p:cNvPr id="4" name="Picture 3">
-            <a:extLst>
-              <a:ext uri="{FF2B5EF4-FFF2-40B4-BE49-F238E27FC236}">
-                <a16:creationId xmlns:a16="http://schemas.microsoft.com/office/drawing/2014/main" id="{2EF669CA-7876-4B42-AC5F-E8A29319696D}"/>
-              </a:ext>
-            </a:extLst>
-          </p:cNvPr>
-          <p:cNvPicPr>
-            <a:picLocks noChangeAspect="1"/>
-          </p:cNvPicPr>
-          <p:nvPr/>
-        </p:nvPicPr>
-        <p:blipFill>
-          <a:blip/>
-          <a:stretch>
-            <a:fillRect/>
-          </a:stretch>
-        </p:blipFill>
-        <p:spPr>
-          <a:xfrm>
-            <a:off x="2671284" y="1652339"/>
-            <a:ext cx="6849431" cy="3553321"/>
-          </a:xfrm>
-          <a:prstGeom prst="rect">
-            <a:avLst/>
-          </a:prstGeom>
-        </p:spPr>
-      </p:pic>
-    </p:spTree>
-    <p:extLst>
-      <p:ext uri="{BB962C8B-B14F-4D97-AF65-F5344CB8AC3E}">
-        <p14:creationId xmlns:p14="http://schemas.microsoft.com/office/powerpoint/2010/main" val="1744603589"/>
-      </p:ext>
-    </p:extLst>
-  </p:cSld>
-  <p:clrMapOvr>
-    <a:masterClrMapping/>
-  </p:clrMapOvr>
-</p:sld>
-</file>
-
-<file path=ppt/slides/slide40.xml><?xml version="1.0" encoding="utf-8"?>
+<file path=ppt/slides/slide42.xml><?xml version="1.0" encoding="utf-8"?>
 <p:sld xmlns:a="http://schemas.openxmlformats.org/drawingml/2006/main" xmlns:r="http://schemas.openxmlformats.org/officeDocument/2006/relationships" xmlns:p="http://schemas.openxmlformats.org/presentationml/2006/main">
   <p:cSld>
     <p:spTree>
@@ -7215,7 +8016,7 @@
 </p:sld>
 </file>
 
-<file path=ppt/slides/slide41.xml><?xml version="1.0" encoding="utf-8"?>
+<file path=ppt/slides/slide43.xml><?xml version="1.0" encoding="utf-8"?>
 <p:sld xmlns:a="http://schemas.openxmlformats.org/drawingml/2006/main" xmlns:r="http://schemas.openxmlformats.org/officeDocument/2006/relationships" xmlns:p="http://schemas.openxmlformats.org/presentationml/2006/main">
   <p:cSld>
     <p:spTree>
@@ -7245,7 +8046,7 @@
 </p:sld>
 </file>
 
-<file path=ppt/slides/slide42.xml><?xml version="1.0" encoding="utf-8"?>
+<file path=ppt/slides/slide44.xml><?xml version="1.0" encoding="utf-8"?>
 <p:sld xmlns:a="http://schemas.openxmlformats.org/drawingml/2006/main" xmlns:r="http://schemas.openxmlformats.org/officeDocument/2006/relationships" xmlns:p="http://schemas.openxmlformats.org/presentationml/2006/main">
   <p:cSld>
     <p:spTree>
@@ -7297,6 +8098,66 @@
           <p:cNvPr id="4" name="Picture 3">
             <a:extLst>
               <a:ext uri="{FF2B5EF4-FFF2-40B4-BE49-F238E27FC236}">
+                <a16:creationId xmlns:a16="http://schemas.microsoft.com/office/drawing/2014/main" id="{2EF669CA-7876-4B42-AC5F-E8A29319696D}"/>
+              </a:ext>
+            </a:extLst>
+          </p:cNvPr>
+          <p:cNvPicPr>
+            <a:picLocks noChangeAspect="1"/>
+          </p:cNvPicPr>
+          <p:nvPr/>
+        </p:nvPicPr>
+        <p:blipFill>
+          <a:blip/>
+          <a:stretch>
+            <a:fillRect/>
+          </a:stretch>
+        </p:blipFill>
+        <p:spPr>
+          <a:xfrm>
+            <a:off x="2671284" y="1652339"/>
+            <a:ext cx="6849431" cy="3553321"/>
+          </a:xfrm>
+          <a:prstGeom prst="rect">
+            <a:avLst/>
+          </a:prstGeom>
+        </p:spPr>
+      </p:pic>
+    </p:spTree>
+    <p:extLst>
+      <p:ext uri="{BB962C8B-B14F-4D97-AF65-F5344CB8AC3E}">
+        <p14:creationId xmlns:p14="http://schemas.microsoft.com/office/powerpoint/2010/main" val="1744603589"/>
+      </p:ext>
+    </p:extLst>
+  </p:cSld>
+  <p:clrMapOvr>
+    <a:masterClrMapping/>
+  </p:clrMapOvr>
+</p:sld>
+</file>
+
+<file path=ppt/slides/slide6.xml><?xml version="1.0" encoding="utf-8"?>
+<p:sld xmlns:a="http://schemas.openxmlformats.org/drawingml/2006/main" xmlns:r="http://schemas.openxmlformats.org/officeDocument/2006/relationships" xmlns:p="http://schemas.openxmlformats.org/presentationml/2006/main">
+  <p:cSld>
+    <p:spTree>
+      <p:nvGrpSpPr>
+        <p:cNvPr id="1" name=""/>
+        <p:cNvGrpSpPr/>
+        <p:nvPr/>
+      </p:nvGrpSpPr>
+      <p:grpSpPr>
+        <a:xfrm>
+          <a:off x="0" y="0"/>
+          <a:ext cx="0" cy="0"/>
+          <a:chOff x="0" y="0"/>
+          <a:chExt cx="0" cy="0"/>
+        </a:xfrm>
+      </p:grpSpPr>
+      <p:pic>
+        <p:nvPicPr>
+          <p:cNvPr id="4" name="Picture 3">
+            <a:extLst>
+              <a:ext uri="{FF2B5EF4-FFF2-40B4-BE49-F238E27FC236}">
                 <a16:creationId xmlns:a16="http://schemas.microsoft.com/office/drawing/2014/main" id="{6213EF1B-9F06-4887-ADD4-D7298F4CE6C5}"/>
               </a:ext>
             </a:extLst>
@@ -7335,7 +8196,7 @@
 </p:sld>
 </file>
 
-<file path=ppt/slides/slide6.xml><?xml version="1.0" encoding="utf-8"?>
+<file path=ppt/slides/slide7.xml><?xml version="1.0" encoding="utf-8"?>
 <p:sld xmlns:a="http://schemas.openxmlformats.org/drawingml/2006/main" xmlns:r="http://schemas.openxmlformats.org/officeDocument/2006/relationships" xmlns:p="http://schemas.openxmlformats.org/presentationml/2006/main">
   <p:cSld>
     <p:spTree>
@@ -8236,7 +9097,7 @@
 </p:sld>
 </file>
 
-<file path=ppt/slides/slide7.xml><?xml version="1.0" encoding="utf-8"?>
+<file path=ppt/slides/slide8.xml><?xml version="1.0" encoding="utf-8"?>
 <p:sld xmlns:a="http://schemas.openxmlformats.org/drawingml/2006/main" xmlns:r="http://schemas.openxmlformats.org/officeDocument/2006/relationships" xmlns:p="http://schemas.openxmlformats.org/presentationml/2006/main">
   <p:cSld>
     <p:spTree>
@@ -8287,66 +9148,6 @@
     <p:extLst>
       <p:ext uri="{BB962C8B-B14F-4D97-AF65-F5344CB8AC3E}">
         <p14:creationId xmlns:p14="http://schemas.microsoft.com/office/powerpoint/2010/main" val="3033485251"/>
-      </p:ext>
-    </p:extLst>
-  </p:cSld>
-  <p:clrMapOvr>
-    <a:masterClrMapping/>
-  </p:clrMapOvr>
-</p:sld>
-</file>
-
-<file path=ppt/slides/slide8.xml><?xml version="1.0" encoding="utf-8"?>
-<p:sld xmlns:a="http://schemas.openxmlformats.org/drawingml/2006/main" xmlns:r="http://schemas.openxmlformats.org/officeDocument/2006/relationships" xmlns:p="http://schemas.openxmlformats.org/presentationml/2006/main">
-  <p:cSld>
-    <p:spTree>
-      <p:nvGrpSpPr>
-        <p:cNvPr id="1" name=""/>
-        <p:cNvGrpSpPr/>
-        <p:nvPr/>
-      </p:nvGrpSpPr>
-      <p:grpSpPr>
-        <a:xfrm>
-          <a:off x="0" y="0"/>
-          <a:ext cx="0" cy="0"/>
-          <a:chOff x="0" y="0"/>
-          <a:chExt cx="0" cy="0"/>
-        </a:xfrm>
-      </p:grpSpPr>
-      <p:pic>
-        <p:nvPicPr>
-          <p:cNvPr id="4" name="Picture 3">
-            <a:extLst>
-              <a:ext uri="{FF2B5EF4-FFF2-40B4-BE49-F238E27FC236}">
-                <a16:creationId xmlns:a16="http://schemas.microsoft.com/office/drawing/2014/main" id="{862C303A-E45C-4C47-8C80-5908C1493D6C}"/>
-              </a:ext>
-            </a:extLst>
-          </p:cNvPr>
-          <p:cNvPicPr>
-            <a:picLocks noChangeAspect="1"/>
-          </p:cNvPicPr>
-          <p:nvPr/>
-        </p:nvPicPr>
-        <p:blipFill>
-          <a:blip r:embed="rId2"/>
-          <a:stretch>
-            <a:fillRect/>
-          </a:stretch>
-        </p:blipFill>
-        <p:spPr>
-          <a:xfrm>
-            <a:off x="2800350" y="2105025"/>
-            <a:ext cx="6591300" cy="2647950"/>
-          </a:xfrm>
-          <a:prstGeom prst="rect">
-            <a:avLst/>
-          </a:prstGeom>
-        </p:spPr>
-      </p:pic>
-    </p:spTree>
-    <p:extLst>
-      <p:ext uri="{BB962C8B-B14F-4D97-AF65-F5344CB8AC3E}">
-        <p14:creationId xmlns:p14="http://schemas.microsoft.com/office/powerpoint/2010/main" val="3244628056"/>
       </p:ext>
     </p:extLst>
   </p:cSld>
@@ -8378,7 +9179,7 @@
           <p:cNvPr id="4" name="Picture 3">
             <a:extLst>
               <a:ext uri="{FF2B5EF4-FFF2-40B4-BE49-F238E27FC236}">
-                <a16:creationId xmlns:a16="http://schemas.microsoft.com/office/drawing/2014/main" id="{21A58B69-488E-4681-954E-4AF44AEFE120}"/>
+                <a16:creationId xmlns:a16="http://schemas.microsoft.com/office/drawing/2014/main" id="{862C303A-E45C-4C47-8C80-5908C1493D6C}"/>
               </a:ext>
             </a:extLst>
           </p:cNvPr>
@@ -8395,8 +9196,8 @@
         </p:blipFill>
         <p:spPr>
           <a:xfrm>
-            <a:off x="609600" y="342900"/>
-            <a:ext cx="10972800" cy="6172200"/>
+            <a:off x="2800350" y="2105025"/>
+            <a:ext cx="6591300" cy="2647950"/>
           </a:xfrm>
           <a:prstGeom prst="rect">
             <a:avLst/>
@@ -8406,7 +9207,7 @@
     </p:spTree>
     <p:extLst>
       <p:ext uri="{BB962C8B-B14F-4D97-AF65-F5344CB8AC3E}">
-        <p14:creationId xmlns:p14="http://schemas.microsoft.com/office/powerpoint/2010/main" val="4074301061"/>
+        <p14:creationId xmlns:p14="http://schemas.microsoft.com/office/powerpoint/2010/main" val="3244628056"/>
       </p:ext>
     </p:extLst>
   </p:cSld>

</xml_diff>

<commit_message>
~+ shortening the steps
</commit_message>
<xml_diff>
--- a/imgs/src/step-by-step-imgs.pptx
+++ b/imgs/src/step-by-step-imgs.pptx
@@ -7703,6 +7703,379 @@
           <a:chExt cx="0" cy="0"/>
         </a:xfrm>
       </p:grpSpPr>
+      <p:pic>
+        <p:nvPicPr>
+          <p:cNvPr id="9" name="Picture 8">
+            <a:extLst>
+              <a:ext uri="{FF2B5EF4-FFF2-40B4-BE49-F238E27FC236}">
+                <a16:creationId xmlns:a16="http://schemas.microsoft.com/office/drawing/2014/main" id="{49216D37-A970-43C6-B743-7C0A72378BDD}"/>
+              </a:ext>
+            </a:extLst>
+          </p:cNvPr>
+          <p:cNvPicPr>
+            <a:picLocks noChangeAspect="1"/>
+          </p:cNvPicPr>
+          <p:nvPr/>
+        </p:nvPicPr>
+        <p:blipFill>
+          <a:blip r:embed="rId2"/>
+          <a:stretch>
+            <a:fillRect/>
+          </a:stretch>
+        </p:blipFill>
+        <p:spPr>
+          <a:xfrm>
+            <a:off x="457200" y="57150"/>
+            <a:ext cx="11277600" cy="6743700"/>
+          </a:xfrm>
+          <a:prstGeom prst="rect">
+            <a:avLst/>
+          </a:prstGeom>
+        </p:spPr>
+      </p:pic>
+      <p:sp>
+        <p:nvSpPr>
+          <p:cNvPr id="11" name="Arrow: Up 10">
+            <a:extLst>
+              <a:ext uri="{FF2B5EF4-FFF2-40B4-BE49-F238E27FC236}">
+                <a16:creationId xmlns:a16="http://schemas.microsoft.com/office/drawing/2014/main" id="{D003DF54-C1B9-460B-9D1A-1919EE87C622}"/>
+              </a:ext>
+            </a:extLst>
+          </p:cNvPr>
+          <p:cNvSpPr/>
+          <p:nvPr/>
+        </p:nvSpPr>
+        <p:spPr>
+          <a:xfrm rot="16200000">
+            <a:off x="2644173" y="1920792"/>
+            <a:ext cx="802133" cy="1619399"/>
+          </a:xfrm>
+          <a:prstGeom prst="upArrow">
+            <a:avLst>
+              <a:gd name="adj1" fmla="val 50000"/>
+              <a:gd name="adj2" fmla="val 89626"/>
+            </a:avLst>
+          </a:prstGeom>
+          <a:solidFill>
+            <a:srgbClr val="C00000"/>
+          </a:solidFill>
+          <a:ln>
+            <a:noFill/>
+          </a:ln>
+        </p:spPr>
+        <p:style>
+          <a:lnRef idx="0">
+            <a:schemeClr val="accent1"/>
+          </a:lnRef>
+          <a:fillRef idx="3">
+            <a:schemeClr val="accent1"/>
+          </a:fillRef>
+          <a:effectRef idx="3">
+            <a:schemeClr val="accent1"/>
+          </a:effectRef>
+          <a:fontRef idx="minor">
+            <a:schemeClr val="lt1"/>
+          </a:fontRef>
+        </p:style>
+        <p:txBody>
+          <a:bodyPr rtlCol="0" anchor="ctr"/>
+          <a:lstStyle/>
+          <a:p>
+            <a:pPr algn="ctr"/>
+            <a:endParaRPr lang="en-US" sz="2800" b="1" dirty="0">
+              <a:latin typeface="Segoe UI" panose="020B0502040204020203" pitchFamily="34" charset="0"/>
+              <a:cs typeface="Segoe UI" panose="020B0502040204020203" pitchFamily="34" charset="0"/>
+            </a:endParaRPr>
+          </a:p>
+        </p:txBody>
+      </p:sp>
+      <p:sp>
+        <p:nvSpPr>
+          <p:cNvPr id="13" name="TextBox 12">
+            <a:extLst>
+              <a:ext uri="{FF2B5EF4-FFF2-40B4-BE49-F238E27FC236}">
+                <a16:creationId xmlns:a16="http://schemas.microsoft.com/office/drawing/2014/main" id="{1D6A395C-CB4F-4FA6-A5ED-BAF8B7966BF1}"/>
+              </a:ext>
+            </a:extLst>
+          </p:cNvPr>
+          <p:cNvSpPr txBox="1"/>
+          <p:nvPr/>
+        </p:nvSpPr>
+        <p:spPr>
+          <a:xfrm>
+            <a:off x="2901459" y="2460740"/>
+            <a:ext cx="290319" cy="523220"/>
+          </a:xfrm>
+          <a:prstGeom prst="rect">
+            <a:avLst/>
+          </a:prstGeom>
+          <a:noFill/>
+        </p:spPr>
+        <p:txBody>
+          <a:bodyPr wrap="square" rtlCol="0">
+            <a:spAutoFit/>
+          </a:bodyPr>
+          <a:lstStyle/>
+          <a:p>
+            <a:pPr algn="l"/>
+            <a:r>
+              <a:rPr lang="en-US" sz="2800" b="1" dirty="0">
+                <a:solidFill>
+                  <a:schemeClr val="bg1"/>
+                </a:solidFill>
+                <a:latin typeface="Segoe UI" panose="020B0502040204020203" pitchFamily="34" charset="0"/>
+                <a:cs typeface="Segoe UI" panose="020B0502040204020203" pitchFamily="34" charset="0"/>
+              </a:rPr>
+              <a:t>A</a:t>
+            </a:r>
+          </a:p>
+        </p:txBody>
+      </p:sp>
+      <p:sp>
+        <p:nvSpPr>
+          <p:cNvPr id="15" name="Arrow: Up 14">
+            <a:extLst>
+              <a:ext uri="{FF2B5EF4-FFF2-40B4-BE49-F238E27FC236}">
+                <a16:creationId xmlns:a16="http://schemas.microsoft.com/office/drawing/2014/main" id="{75B05260-0D98-494F-9FD8-597E755E468A}"/>
+              </a:ext>
+            </a:extLst>
+          </p:cNvPr>
+          <p:cNvSpPr/>
+          <p:nvPr/>
+        </p:nvSpPr>
+        <p:spPr>
+          <a:xfrm rot="16200000">
+            <a:off x="8888340" y="5364446"/>
+            <a:ext cx="802133" cy="1619399"/>
+          </a:xfrm>
+          <a:prstGeom prst="upArrow">
+            <a:avLst>
+              <a:gd name="adj1" fmla="val 50000"/>
+              <a:gd name="adj2" fmla="val 89626"/>
+            </a:avLst>
+          </a:prstGeom>
+          <a:solidFill>
+            <a:srgbClr val="C00000"/>
+          </a:solidFill>
+          <a:ln>
+            <a:noFill/>
+          </a:ln>
+        </p:spPr>
+        <p:style>
+          <a:lnRef idx="0">
+            <a:schemeClr val="accent1"/>
+          </a:lnRef>
+          <a:fillRef idx="3">
+            <a:schemeClr val="accent1"/>
+          </a:fillRef>
+          <a:effectRef idx="3">
+            <a:schemeClr val="accent1"/>
+          </a:effectRef>
+          <a:fontRef idx="minor">
+            <a:schemeClr val="lt1"/>
+          </a:fontRef>
+        </p:style>
+        <p:txBody>
+          <a:bodyPr rtlCol="0" anchor="ctr"/>
+          <a:lstStyle/>
+          <a:p>
+            <a:pPr algn="ctr"/>
+            <a:endParaRPr lang="en-US" sz="2800" b="1" dirty="0">
+              <a:latin typeface="Segoe UI" panose="020B0502040204020203" pitchFamily="34" charset="0"/>
+              <a:cs typeface="Segoe UI" panose="020B0502040204020203" pitchFamily="34" charset="0"/>
+            </a:endParaRPr>
+          </a:p>
+        </p:txBody>
+      </p:sp>
+      <p:sp>
+        <p:nvSpPr>
+          <p:cNvPr id="17" name="TextBox 16">
+            <a:extLst>
+              <a:ext uri="{FF2B5EF4-FFF2-40B4-BE49-F238E27FC236}">
+                <a16:creationId xmlns:a16="http://schemas.microsoft.com/office/drawing/2014/main" id="{07CF32B8-84BA-4611-90CF-DB92FD3534BB}"/>
+              </a:ext>
+            </a:extLst>
+          </p:cNvPr>
+          <p:cNvSpPr txBox="1"/>
+          <p:nvPr/>
+        </p:nvSpPr>
+        <p:spPr>
+          <a:xfrm>
+            <a:off x="9145626" y="5904394"/>
+            <a:ext cx="290319" cy="523220"/>
+          </a:xfrm>
+          <a:prstGeom prst="rect">
+            <a:avLst/>
+          </a:prstGeom>
+          <a:noFill/>
+        </p:spPr>
+        <p:txBody>
+          <a:bodyPr wrap="square" rtlCol="0">
+            <a:spAutoFit/>
+          </a:bodyPr>
+          <a:lstStyle/>
+          <a:p>
+            <a:pPr algn="l"/>
+            <a:r>
+              <a:rPr lang="en-US" sz="2800" b="1" dirty="0">
+                <a:solidFill>
+                  <a:schemeClr val="bg1"/>
+                </a:solidFill>
+                <a:latin typeface="Segoe UI" panose="020B0502040204020203" pitchFamily="34" charset="0"/>
+                <a:cs typeface="Segoe UI" panose="020B0502040204020203" pitchFamily="34" charset="0"/>
+              </a:rPr>
+              <a:t>B</a:t>
+            </a:r>
+          </a:p>
+        </p:txBody>
+      </p:sp>
+      <p:sp>
+        <p:nvSpPr>
+          <p:cNvPr id="18" name="Rectangle 17">
+            <a:extLst>
+              <a:ext uri="{FF2B5EF4-FFF2-40B4-BE49-F238E27FC236}">
+                <a16:creationId xmlns:a16="http://schemas.microsoft.com/office/drawing/2014/main" id="{30622DCE-B6B1-4BE9-9698-70105C1B997A}"/>
+              </a:ext>
+            </a:extLst>
+          </p:cNvPr>
+          <p:cNvSpPr/>
+          <p:nvPr/>
+        </p:nvSpPr>
+        <p:spPr>
+          <a:xfrm>
+            <a:off x="5633279" y="3042008"/>
+            <a:ext cx="1619399" cy="222544"/>
+          </a:xfrm>
+          <a:prstGeom prst="rect">
+            <a:avLst/>
+          </a:prstGeom>
+          <a:ln>
+            <a:noFill/>
+          </a:ln>
+        </p:spPr>
+        <p:style>
+          <a:lnRef idx="2">
+            <a:schemeClr val="dk1">
+              <a:shade val="50000"/>
+            </a:schemeClr>
+          </a:lnRef>
+          <a:fillRef idx="1">
+            <a:schemeClr val="dk1"/>
+          </a:fillRef>
+          <a:effectRef idx="0">
+            <a:schemeClr val="dk1"/>
+          </a:effectRef>
+          <a:fontRef idx="minor">
+            <a:schemeClr val="lt1"/>
+          </a:fontRef>
+        </p:style>
+        <p:txBody>
+          <a:bodyPr rtlCol="0" anchor="ctr"/>
+          <a:lstStyle/>
+          <a:p>
+            <a:pPr algn="ctr"/>
+            <a:endParaRPr lang="en-US"/>
+          </a:p>
+        </p:txBody>
+      </p:sp>
+      <p:sp>
+        <p:nvSpPr>
+          <p:cNvPr id="20" name="Rectangle 19">
+            <a:extLst>
+              <a:ext uri="{FF2B5EF4-FFF2-40B4-BE49-F238E27FC236}">
+                <a16:creationId xmlns:a16="http://schemas.microsoft.com/office/drawing/2014/main" id="{4889217F-988E-4BBC-95AA-8AEE9A44AD63}"/>
+              </a:ext>
+            </a:extLst>
+          </p:cNvPr>
+          <p:cNvSpPr/>
+          <p:nvPr/>
+        </p:nvSpPr>
+        <p:spPr>
+          <a:xfrm>
+            <a:off x="5633279" y="4415562"/>
+            <a:ext cx="1619399" cy="222544"/>
+          </a:xfrm>
+          <a:prstGeom prst="rect">
+            <a:avLst/>
+          </a:prstGeom>
+          <a:ln>
+            <a:noFill/>
+          </a:ln>
+        </p:spPr>
+        <p:style>
+          <a:lnRef idx="2">
+            <a:schemeClr val="dk1">
+              <a:shade val="50000"/>
+            </a:schemeClr>
+          </a:lnRef>
+          <a:fillRef idx="1">
+            <a:schemeClr val="dk1"/>
+          </a:fillRef>
+          <a:effectRef idx="0">
+            <a:schemeClr val="dk1"/>
+          </a:effectRef>
+          <a:fontRef idx="minor">
+            <a:schemeClr val="lt1"/>
+          </a:fontRef>
+        </p:style>
+        <p:txBody>
+          <a:bodyPr rtlCol="0" anchor="ctr"/>
+          <a:lstStyle/>
+          <a:p>
+            <a:pPr algn="ctr"/>
+            <a:endParaRPr lang="en-US"/>
+          </a:p>
+        </p:txBody>
+      </p:sp>
+      <p:sp>
+        <p:nvSpPr>
+          <p:cNvPr id="22" name="Rectangle 21">
+            <a:extLst>
+              <a:ext uri="{FF2B5EF4-FFF2-40B4-BE49-F238E27FC236}">
+                <a16:creationId xmlns:a16="http://schemas.microsoft.com/office/drawing/2014/main" id="{3395224D-97F4-42A9-BD8D-2EEBCBF80626}"/>
+              </a:ext>
+            </a:extLst>
+          </p:cNvPr>
+          <p:cNvSpPr/>
+          <p:nvPr/>
+        </p:nvSpPr>
+        <p:spPr>
+          <a:xfrm>
+            <a:off x="5647933" y="3745067"/>
+            <a:ext cx="1619399" cy="222544"/>
+          </a:xfrm>
+          <a:prstGeom prst="rect">
+            <a:avLst/>
+          </a:prstGeom>
+          <a:ln>
+            <a:noFill/>
+          </a:ln>
+        </p:spPr>
+        <p:style>
+          <a:lnRef idx="2">
+            <a:schemeClr val="dk1">
+              <a:shade val="50000"/>
+            </a:schemeClr>
+          </a:lnRef>
+          <a:fillRef idx="1">
+            <a:schemeClr val="dk1"/>
+          </a:fillRef>
+          <a:effectRef idx="0">
+            <a:schemeClr val="dk1"/>
+          </a:effectRef>
+          <a:fontRef idx="minor">
+            <a:schemeClr val="lt1"/>
+          </a:fontRef>
+        </p:style>
+        <p:txBody>
+          <a:bodyPr rtlCol="0" anchor="ctr"/>
+          <a:lstStyle/>
+          <a:p>
+            <a:pPr algn="ctr"/>
+            <a:endParaRPr lang="en-US"/>
+          </a:p>
+        </p:txBody>
+      </p:sp>
     </p:spTree>
     <p:extLst>
       <p:ext uri="{BB962C8B-B14F-4D97-AF65-F5344CB8AC3E}">

</xml_diff>